<commit_message>
Updated the docs and architecture diagrams
</commit_message>
<xml_diff>
--- a/docs/deployment_guide/images/elastigroup-quickstart-architecture-diagram.pptx
+++ b/docs/deployment_guide/images/elastigroup-quickstart-architecture-diagram.pptx
@@ -4,8 +4,12 @@
   <p:sldMasterIdLst>
     <p:sldMasterId id="2147483660" r:id="rId1"/>
   </p:sldMasterIdLst>
+  <p:handoutMasterIdLst>
+    <p:handoutMasterId r:id="rId4"/>
+  </p:handoutMasterIdLst>
   <p:sldIdLst>
-    <p:sldId id="257" r:id="rId2"/>
+    <p:sldId id="258" r:id="rId2"/>
+    <p:sldId id="257" r:id="rId3"/>
   </p:sldIdLst>
   <p:sldSz cx="21945600" cy="14630400"/>
   <p:notesSz cx="6858000" cy="9144000"/>
@@ -112,6 +116,195 @@
 </p:presentation>
 </file>
 
+<file path=ppt/handoutMasters/handoutMaster1.xml><?xml version="1.0" encoding="utf-8"?>
+<p:handoutMaster xmlns:a="http://schemas.openxmlformats.org/drawingml/2006/main" xmlns:r="http://schemas.openxmlformats.org/officeDocument/2006/relationships" xmlns:p="http://schemas.openxmlformats.org/presentationml/2006/main">
+  <p:cSld>
+    <p:bg>
+      <p:bgRef idx="1001">
+        <a:schemeClr val="bg1"/>
+      </p:bgRef>
+    </p:bg>
+    <p:spTree>
+      <p:nvGrpSpPr>
+        <p:cNvPr id="1" name=""/>
+        <p:cNvGrpSpPr/>
+        <p:nvPr/>
+      </p:nvGrpSpPr>
+      <p:grpSpPr>
+        <a:xfrm>
+          <a:off x="0" y="0"/>
+          <a:ext cx="0" cy="0"/>
+          <a:chOff x="0" y="0"/>
+          <a:chExt cx="0" cy="0"/>
+        </a:xfrm>
+      </p:grpSpPr>
+      <p:sp>
+        <p:nvSpPr>
+          <p:cNvPr id="2" name="Header Placeholder 1">
+            <a:extLst>
+              <a:ext uri="{FF2B5EF4-FFF2-40B4-BE49-F238E27FC236}">
+                <a16:creationId xmlns:a16="http://schemas.microsoft.com/office/drawing/2014/main" id="{88083CC0-99B8-165E-E743-256EB34D25E5}"/>
+              </a:ext>
+            </a:extLst>
+          </p:cNvPr>
+          <p:cNvSpPr>
+            <a:spLocks noGrp="1"/>
+          </p:cNvSpPr>
+          <p:nvPr>
+            <p:ph type="hdr" sz="quarter"/>
+          </p:nvPr>
+        </p:nvSpPr>
+        <p:spPr>
+          <a:xfrm>
+            <a:off x="0" y="0"/>
+            <a:ext cx="2971800" cy="458788"/>
+          </a:xfrm>
+          <a:prstGeom prst="rect">
+            <a:avLst/>
+          </a:prstGeom>
+        </p:spPr>
+        <p:txBody>
+          <a:bodyPr vert="horz" lIns="91440" tIns="45720" rIns="91440" bIns="45720" rtlCol="0"/>
+          <a:lstStyle>
+            <a:lvl1pPr algn="l">
+              <a:defRPr sz="1200"/>
+            </a:lvl1pPr>
+          </a:lstStyle>
+          <a:p>
+            <a:endParaRPr lang="en-US"/>
+          </a:p>
+        </p:txBody>
+      </p:sp>
+      <p:sp>
+        <p:nvSpPr>
+          <p:cNvPr id="3" name="Date Placeholder 2">
+            <a:extLst>
+              <a:ext uri="{FF2B5EF4-FFF2-40B4-BE49-F238E27FC236}">
+                <a16:creationId xmlns:a16="http://schemas.microsoft.com/office/drawing/2014/main" id="{8E73DF33-C3B2-677C-6FB5-E7390D81629D}"/>
+              </a:ext>
+            </a:extLst>
+          </p:cNvPr>
+          <p:cNvSpPr>
+            <a:spLocks noGrp="1"/>
+          </p:cNvSpPr>
+          <p:nvPr>
+            <p:ph type="dt" sz="quarter" idx="1"/>
+          </p:nvPr>
+        </p:nvSpPr>
+        <p:spPr>
+          <a:xfrm>
+            <a:off x="3884613" y="0"/>
+            <a:ext cx="2971800" cy="458788"/>
+          </a:xfrm>
+          <a:prstGeom prst="rect">
+            <a:avLst/>
+          </a:prstGeom>
+        </p:spPr>
+        <p:txBody>
+          <a:bodyPr vert="horz" lIns="91440" tIns="45720" rIns="91440" bIns="45720" rtlCol="0"/>
+          <a:lstStyle>
+            <a:lvl1pPr algn="r">
+              <a:defRPr sz="1200"/>
+            </a:lvl1pPr>
+          </a:lstStyle>
+          <a:p>
+            <a:fld id="{DFE671C9-BB83-DE41-B8B7-94AB1B25B57E}" type="datetimeFigureOut">
+              <a:rPr lang="en-US" smtClean="0"/>
+              <a:t>11/3/22</a:t>
+            </a:fld>
+            <a:endParaRPr lang="en-US"/>
+          </a:p>
+        </p:txBody>
+      </p:sp>
+      <p:sp>
+        <p:nvSpPr>
+          <p:cNvPr id="4" name="Footer Placeholder 3">
+            <a:extLst>
+              <a:ext uri="{FF2B5EF4-FFF2-40B4-BE49-F238E27FC236}">
+                <a16:creationId xmlns:a16="http://schemas.microsoft.com/office/drawing/2014/main" id="{75A46849-8A10-EB3E-35F9-B208D71C3C2B}"/>
+              </a:ext>
+            </a:extLst>
+          </p:cNvPr>
+          <p:cNvSpPr>
+            <a:spLocks noGrp="1"/>
+          </p:cNvSpPr>
+          <p:nvPr>
+            <p:ph type="ftr" sz="quarter" idx="2"/>
+          </p:nvPr>
+        </p:nvSpPr>
+        <p:spPr>
+          <a:xfrm>
+            <a:off x="0" y="8685213"/>
+            <a:ext cx="2971800" cy="458787"/>
+          </a:xfrm>
+          <a:prstGeom prst="rect">
+            <a:avLst/>
+          </a:prstGeom>
+        </p:spPr>
+        <p:txBody>
+          <a:bodyPr vert="horz" lIns="91440" tIns="45720" rIns="91440" bIns="45720" rtlCol="0" anchor="b"/>
+          <a:lstStyle>
+            <a:lvl1pPr algn="l">
+              <a:defRPr sz="1200"/>
+            </a:lvl1pPr>
+          </a:lstStyle>
+          <a:p>
+            <a:endParaRPr lang="en-US"/>
+          </a:p>
+        </p:txBody>
+      </p:sp>
+      <p:sp>
+        <p:nvSpPr>
+          <p:cNvPr id="5" name="Slide Number Placeholder 4">
+            <a:extLst>
+              <a:ext uri="{FF2B5EF4-FFF2-40B4-BE49-F238E27FC236}">
+                <a16:creationId xmlns:a16="http://schemas.microsoft.com/office/drawing/2014/main" id="{C6FA4DDB-742B-D35A-13A6-5AA80FC3B4A4}"/>
+              </a:ext>
+            </a:extLst>
+          </p:cNvPr>
+          <p:cNvSpPr>
+            <a:spLocks noGrp="1"/>
+          </p:cNvSpPr>
+          <p:nvPr>
+            <p:ph type="sldNum" sz="quarter" idx="3"/>
+          </p:nvPr>
+        </p:nvSpPr>
+        <p:spPr>
+          <a:xfrm>
+            <a:off x="3884613" y="8685213"/>
+            <a:ext cx="2971800" cy="458787"/>
+          </a:xfrm>
+          <a:prstGeom prst="rect">
+            <a:avLst/>
+          </a:prstGeom>
+        </p:spPr>
+        <p:txBody>
+          <a:bodyPr vert="horz" lIns="91440" tIns="45720" rIns="91440" bIns="45720" rtlCol="0" anchor="b"/>
+          <a:lstStyle>
+            <a:lvl1pPr algn="r">
+              <a:defRPr sz="1200"/>
+            </a:lvl1pPr>
+          </a:lstStyle>
+          <a:p>
+            <a:fld id="{7D87F13E-DA69-6E4D-A693-EAE7477E36CC}" type="slidenum">
+              <a:rPr lang="en-US" smtClean="0"/>
+              <a:t>‹#›</a:t>
+            </a:fld>
+            <a:endParaRPr lang="en-US"/>
+          </a:p>
+        </p:txBody>
+      </p:sp>
+    </p:spTree>
+    <p:extLst>
+      <p:ext uri="{BB962C8B-B14F-4D97-AF65-F5344CB8AC3E}">
+        <p14:creationId xmlns:p14="http://schemas.microsoft.com/office/powerpoint/2010/main" val="3339434841"/>
+      </p:ext>
+    </p:extLst>
+  </p:cSld>
+  <p:clrMap bg1="lt1" tx1="dk1" bg2="lt2" tx2="dk2" accent1="accent1" accent2="accent2" accent3="accent3" accent4="accent4" accent5="accent5" accent6="accent6" hlink="hlink" folHlink="folHlink"/>
+</p:handoutMaster>
+</file>
+
 <file path=ppt/slideLayouts/slideLayout1.xml><?xml version="1.0" encoding="utf-8"?>
 <p:sldLayout xmlns:a="http://schemas.openxmlformats.org/drawingml/2006/main" xmlns:r="http://schemas.openxmlformats.org/officeDocument/2006/relationships" xmlns:p="http://schemas.openxmlformats.org/presentationml/2006/main" type="title" preserve="1">
   <p:cSld name="Title Slide">
@@ -243,7 +436,7 @@
           <a:p>
             <a:fld id="{87F3BBB2-E533-43A8-AA78-2DC6FC5FE5A0}" type="datetimeFigureOut">
               <a:rPr lang="en-US" smtClean="0"/>
-              <a:t>9/14/22</a:t>
+              <a:t>11/2/22</a:t>
             </a:fld>
             <a:endParaRPr lang="en-US"/>
           </a:p>
@@ -413,7 +606,7 @@
           <a:p>
             <a:fld id="{87F3BBB2-E533-43A8-AA78-2DC6FC5FE5A0}" type="datetimeFigureOut">
               <a:rPr lang="en-US" smtClean="0"/>
-              <a:t>9/14/22</a:t>
+              <a:t>11/2/22</a:t>
             </a:fld>
             <a:endParaRPr lang="en-US"/>
           </a:p>
@@ -593,7 +786,7 @@
           <a:p>
             <a:fld id="{87F3BBB2-E533-43A8-AA78-2DC6FC5FE5A0}" type="datetimeFigureOut">
               <a:rPr lang="en-US" smtClean="0"/>
-              <a:t>9/14/22</a:t>
+              <a:t>11/2/22</a:t>
             </a:fld>
             <a:endParaRPr lang="en-US"/>
           </a:p>
@@ -763,7 +956,7 @@
           <a:p>
             <a:fld id="{87F3BBB2-E533-43A8-AA78-2DC6FC5FE5A0}" type="datetimeFigureOut">
               <a:rPr lang="en-US" smtClean="0"/>
-              <a:t>9/14/22</a:t>
+              <a:t>11/2/22</a:t>
             </a:fld>
             <a:endParaRPr lang="en-US"/>
           </a:p>
@@ -1007,7 +1200,7 @@
           <a:p>
             <a:fld id="{87F3BBB2-E533-43A8-AA78-2DC6FC5FE5A0}" type="datetimeFigureOut">
               <a:rPr lang="en-US" smtClean="0"/>
-              <a:t>9/14/22</a:t>
+              <a:t>11/2/22</a:t>
             </a:fld>
             <a:endParaRPr lang="en-US"/>
           </a:p>
@@ -1239,7 +1432,7 @@
           <a:p>
             <a:fld id="{87F3BBB2-E533-43A8-AA78-2DC6FC5FE5A0}" type="datetimeFigureOut">
               <a:rPr lang="en-US" smtClean="0"/>
-              <a:t>9/14/22</a:t>
+              <a:t>11/2/22</a:t>
             </a:fld>
             <a:endParaRPr lang="en-US"/>
           </a:p>
@@ -1606,7 +1799,7 @@
           <a:p>
             <a:fld id="{87F3BBB2-E533-43A8-AA78-2DC6FC5FE5A0}" type="datetimeFigureOut">
               <a:rPr lang="en-US" smtClean="0"/>
-              <a:t>9/14/22</a:t>
+              <a:t>11/2/22</a:t>
             </a:fld>
             <a:endParaRPr lang="en-US"/>
           </a:p>
@@ -1724,7 +1917,7 @@
           <a:p>
             <a:fld id="{87F3BBB2-E533-43A8-AA78-2DC6FC5FE5A0}" type="datetimeFigureOut">
               <a:rPr lang="en-US" smtClean="0"/>
-              <a:t>9/14/22</a:t>
+              <a:t>11/2/22</a:t>
             </a:fld>
             <a:endParaRPr lang="en-US"/>
           </a:p>
@@ -1819,7 +2012,7 @@
           <a:p>
             <a:fld id="{87F3BBB2-E533-43A8-AA78-2DC6FC5FE5A0}" type="datetimeFigureOut">
               <a:rPr lang="en-US" smtClean="0"/>
-              <a:t>9/14/22</a:t>
+              <a:t>11/2/22</a:t>
             </a:fld>
             <a:endParaRPr lang="en-US"/>
           </a:p>
@@ -2096,7 +2289,7 @@
           <a:p>
             <a:fld id="{87F3BBB2-E533-43A8-AA78-2DC6FC5FE5A0}" type="datetimeFigureOut">
               <a:rPr lang="en-US" smtClean="0"/>
-              <a:t>9/14/22</a:t>
+              <a:t>11/2/22</a:t>
             </a:fld>
             <a:endParaRPr lang="en-US"/>
           </a:p>
@@ -2353,7 +2546,7 @@
           <a:p>
             <a:fld id="{87F3BBB2-E533-43A8-AA78-2DC6FC5FE5A0}" type="datetimeFigureOut">
               <a:rPr lang="en-US" smtClean="0"/>
-              <a:t>9/14/22</a:t>
+              <a:t>11/2/22</a:t>
             </a:fld>
             <a:endParaRPr lang="en-US"/>
           </a:p>
@@ -2566,7 +2759,7 @@
           <a:p>
             <a:fld id="{87F3BBB2-E533-43A8-AA78-2DC6FC5FE5A0}" type="datetimeFigureOut">
               <a:rPr lang="en-US" smtClean="0"/>
-              <a:t>9/14/22</a:t>
+              <a:t>11/2/22</a:t>
             </a:fld>
             <a:endParaRPr lang="en-US"/>
           </a:p>
@@ -2973,6 +3166,2633 @@
       </p:grpSpPr>
       <p:sp>
         <p:nvSpPr>
+          <p:cNvPr id="39" name="Rectangle 38">
+            <a:extLst>
+              <a:ext uri="{FF2B5EF4-FFF2-40B4-BE49-F238E27FC236}">
+                <a16:creationId xmlns:a16="http://schemas.microsoft.com/office/drawing/2014/main" id="{D0A3FE1B-33B8-5FE8-4A4D-35FD50A74D77}"/>
+              </a:ext>
+            </a:extLst>
+          </p:cNvPr>
+          <p:cNvSpPr/>
+          <p:nvPr/>
+        </p:nvSpPr>
+        <p:spPr>
+          <a:xfrm>
+            <a:off x="2843618" y="1731891"/>
+            <a:ext cx="15104139" cy="10091514"/>
+          </a:xfrm>
+          <a:prstGeom prst="rect">
+            <a:avLst/>
+          </a:prstGeom>
+          <a:noFill/>
+          <a:ln w="12700">
+            <a:solidFill>
+              <a:schemeClr val="tx1"/>
+            </a:solidFill>
+          </a:ln>
+        </p:spPr>
+        <p:style>
+          <a:lnRef idx="2">
+            <a:schemeClr val="accent1">
+              <a:shade val="50000"/>
+            </a:schemeClr>
+          </a:lnRef>
+          <a:fillRef idx="1">
+            <a:schemeClr val="accent1"/>
+          </a:fillRef>
+          <a:effectRef idx="0">
+            <a:schemeClr val="accent1"/>
+          </a:effectRef>
+          <a:fontRef idx="minor">
+            <a:schemeClr val="lt1"/>
+          </a:fontRef>
+        </p:style>
+        <p:txBody>
+          <a:bodyPr lIns="502920" tIns="91440"/>
+          <a:lstStyle/>
+          <a:p>
+            <a:pPr eaLnBrk="1" fontAlgn="auto" hangingPunct="1">
+              <a:spcBef>
+                <a:spcPts val="0"/>
+              </a:spcBef>
+              <a:spcAft>
+                <a:spcPts val="0"/>
+              </a:spcAft>
+              <a:defRPr/>
+            </a:pPr>
+            <a:r>
+              <a:rPr lang="en-US" sz="1200" dirty="0">
+                <a:solidFill>
+                  <a:sysClr val="windowText" lastClr="000000"/>
+                </a:solidFill>
+                <a:latin typeface="Arial" panose="020B0604020202020204" pitchFamily="34" charset="0"/>
+                <a:cs typeface="Arial" panose="020B0604020202020204" pitchFamily="34" charset="0"/>
+              </a:rPr>
+              <a:t>AWS Cloud</a:t>
+            </a:r>
+          </a:p>
+        </p:txBody>
+      </p:sp>
+      <p:pic>
+        <p:nvPicPr>
+          <p:cNvPr id="40" name="Graphic 39">
+            <a:extLst>
+              <a:ext uri="{FF2B5EF4-FFF2-40B4-BE49-F238E27FC236}">
+                <a16:creationId xmlns:a16="http://schemas.microsoft.com/office/drawing/2014/main" id="{A794E28E-860B-9C89-F9C6-B2C5A6198A7E}"/>
+              </a:ext>
+            </a:extLst>
+          </p:cNvPr>
+          <p:cNvPicPr>
+            <a:picLocks noChangeAspect="1"/>
+          </p:cNvPicPr>
+          <p:nvPr/>
+        </p:nvPicPr>
+        <p:blipFill>
+          <a:blip r:embed="rId2">
+            <a:extLst>
+              <a:ext uri="{96DAC541-7B7A-43D3-8B79-37D633B846F1}">
+                <asvg:svgBlip xmlns:asvg="http://schemas.microsoft.com/office/drawing/2016/SVG/main" r:embed="rId3"/>
+              </a:ext>
+            </a:extLst>
+          </a:blip>
+          <a:srcRect/>
+          <a:stretch/>
+        </p:blipFill>
+        <p:spPr>
+          <a:xfrm>
+            <a:off x="2843618" y="1731891"/>
+            <a:ext cx="381000" cy="381000"/>
+          </a:xfrm>
+          <a:prstGeom prst="rect">
+            <a:avLst/>
+          </a:prstGeom>
+        </p:spPr>
+      </p:pic>
+      <p:sp>
+        <p:nvSpPr>
+          <p:cNvPr id="41" name="Rectangle 40">
+            <a:extLst>
+              <a:ext uri="{FF2B5EF4-FFF2-40B4-BE49-F238E27FC236}">
+                <a16:creationId xmlns:a16="http://schemas.microsoft.com/office/drawing/2014/main" id="{7C436415-3B71-6203-4926-F8CBB762AB41}"/>
+              </a:ext>
+            </a:extLst>
+          </p:cNvPr>
+          <p:cNvSpPr/>
+          <p:nvPr/>
+        </p:nvSpPr>
+        <p:spPr>
+          <a:xfrm>
+            <a:off x="3997842" y="2750353"/>
+            <a:ext cx="13030245" cy="7733349"/>
+          </a:xfrm>
+          <a:prstGeom prst="rect">
+            <a:avLst/>
+          </a:prstGeom>
+          <a:noFill/>
+          <a:ln w="12700">
+            <a:solidFill>
+              <a:srgbClr val="1E8900"/>
+            </a:solidFill>
+          </a:ln>
+        </p:spPr>
+        <p:style>
+          <a:lnRef idx="2">
+            <a:schemeClr val="accent1">
+              <a:shade val="50000"/>
+            </a:schemeClr>
+          </a:lnRef>
+          <a:fillRef idx="1">
+            <a:schemeClr val="accent1"/>
+          </a:fillRef>
+          <a:effectRef idx="0">
+            <a:schemeClr val="accent1"/>
+          </a:effectRef>
+          <a:fontRef idx="minor">
+            <a:schemeClr val="lt1"/>
+          </a:fontRef>
+        </p:style>
+        <p:txBody>
+          <a:bodyPr lIns="502920" tIns="91440"/>
+          <a:lstStyle/>
+          <a:p>
+            <a:pPr eaLnBrk="1" fontAlgn="auto" hangingPunct="1">
+              <a:spcBef>
+                <a:spcPts val="0"/>
+              </a:spcBef>
+              <a:spcAft>
+                <a:spcPts val="0"/>
+              </a:spcAft>
+              <a:defRPr/>
+            </a:pPr>
+            <a:r>
+              <a:rPr lang="en-US" sz="1200" dirty="0">
+                <a:ln w="0"/>
+                <a:solidFill>
+                  <a:srgbClr val="1E8900"/>
+                </a:solidFill>
+                <a:latin typeface="Arial" panose="020B0604020202020204" pitchFamily="34" charset="0"/>
+                <a:cs typeface="Arial" panose="020B0604020202020204" pitchFamily="34" charset="0"/>
+              </a:rPr>
+              <a:t>VPC</a:t>
+            </a:r>
+          </a:p>
+        </p:txBody>
+      </p:sp>
+      <p:pic>
+        <p:nvPicPr>
+          <p:cNvPr id="42" name="Graphic 41">
+            <a:extLst>
+              <a:ext uri="{FF2B5EF4-FFF2-40B4-BE49-F238E27FC236}">
+                <a16:creationId xmlns:a16="http://schemas.microsoft.com/office/drawing/2014/main" id="{FD2547F4-7309-FDD1-B777-AFE73E28721F}"/>
+              </a:ext>
+            </a:extLst>
+          </p:cNvPr>
+          <p:cNvPicPr>
+            <a:picLocks noChangeAspect="1"/>
+          </p:cNvPicPr>
+          <p:nvPr/>
+        </p:nvPicPr>
+        <p:blipFill>
+          <a:blip r:embed="rId4">
+            <a:extLst>
+              <a:ext uri="{96DAC541-7B7A-43D3-8B79-37D633B846F1}">
+                <asvg:svgBlip xmlns:asvg="http://schemas.microsoft.com/office/drawing/2016/SVG/main" r:embed="rId5"/>
+              </a:ext>
+            </a:extLst>
+          </a:blip>
+          <a:stretch>
+            <a:fillRect/>
+          </a:stretch>
+        </p:blipFill>
+        <p:spPr>
+          <a:xfrm>
+            <a:off x="3998454" y="2743778"/>
+            <a:ext cx="381000" cy="381000"/>
+          </a:xfrm>
+          <a:prstGeom prst="rect">
+            <a:avLst/>
+          </a:prstGeom>
+        </p:spPr>
+      </p:pic>
+      <p:sp>
+        <p:nvSpPr>
+          <p:cNvPr id="45" name="Rectangle 44">
+            <a:extLst>
+              <a:ext uri="{FF2B5EF4-FFF2-40B4-BE49-F238E27FC236}">
+                <a16:creationId xmlns:a16="http://schemas.microsoft.com/office/drawing/2014/main" id="{FC7D6A46-44FA-8D6C-8AEB-CA719BBC69F2}"/>
+              </a:ext>
+            </a:extLst>
+          </p:cNvPr>
+          <p:cNvSpPr/>
+          <p:nvPr/>
+        </p:nvSpPr>
+        <p:spPr>
+          <a:xfrm>
+            <a:off x="8993791" y="5674207"/>
+            <a:ext cx="2803791" cy="2920441"/>
+          </a:xfrm>
+          <a:prstGeom prst="rect">
+            <a:avLst/>
+          </a:prstGeom>
+          <a:solidFill>
+            <a:srgbClr val="1D8900">
+              <a:alpha val="9804"/>
+            </a:srgbClr>
+          </a:solidFill>
+          <a:ln w="12700">
+            <a:noFill/>
+            <a:prstDash val="dash"/>
+          </a:ln>
+        </p:spPr>
+        <p:style>
+          <a:lnRef idx="2">
+            <a:schemeClr val="accent1">
+              <a:shade val="50000"/>
+            </a:schemeClr>
+          </a:lnRef>
+          <a:fillRef idx="1">
+            <a:schemeClr val="accent1"/>
+          </a:fillRef>
+          <a:effectRef idx="0">
+            <a:schemeClr val="accent1"/>
+          </a:effectRef>
+          <a:fontRef idx="minor">
+            <a:schemeClr val="lt1"/>
+          </a:fontRef>
+        </p:style>
+        <p:txBody>
+          <a:bodyPr lIns="502920"/>
+          <a:lstStyle/>
+          <a:p>
+            <a:pPr eaLnBrk="1" fontAlgn="auto" hangingPunct="1">
+              <a:spcBef>
+                <a:spcPts val="0"/>
+              </a:spcBef>
+              <a:spcAft>
+                <a:spcPts val="0"/>
+              </a:spcAft>
+              <a:defRPr/>
+            </a:pPr>
+            <a:r>
+              <a:rPr lang="en-US" sz="1200" dirty="0">
+                <a:solidFill>
+                  <a:srgbClr val="1E8900"/>
+                </a:solidFill>
+                <a:latin typeface="Arial" panose="020B0604020202020204" pitchFamily="34" charset="0"/>
+                <a:cs typeface="Arial" panose="020B0604020202020204" pitchFamily="34" charset="0"/>
+              </a:rPr>
+              <a:t>Public subnet</a:t>
+            </a:r>
+          </a:p>
+        </p:txBody>
+      </p:sp>
+      <p:sp>
+        <p:nvSpPr>
+          <p:cNvPr id="46" name="Rectangle 45">
+            <a:extLst>
+              <a:ext uri="{FF2B5EF4-FFF2-40B4-BE49-F238E27FC236}">
+                <a16:creationId xmlns:a16="http://schemas.microsoft.com/office/drawing/2014/main" id="{B03E098B-B182-1116-A316-9A7101D8FB49}"/>
+              </a:ext>
+            </a:extLst>
+          </p:cNvPr>
+          <p:cNvSpPr/>
+          <p:nvPr/>
+        </p:nvSpPr>
+        <p:spPr>
+          <a:xfrm>
+            <a:off x="4869316" y="5740235"/>
+            <a:ext cx="2803791" cy="2920441"/>
+          </a:xfrm>
+          <a:prstGeom prst="rect">
+            <a:avLst/>
+          </a:prstGeom>
+          <a:solidFill>
+            <a:srgbClr val="1D8900">
+              <a:alpha val="9804"/>
+            </a:srgbClr>
+          </a:solidFill>
+          <a:ln w="12700">
+            <a:noFill/>
+            <a:prstDash val="dash"/>
+          </a:ln>
+        </p:spPr>
+        <p:style>
+          <a:lnRef idx="2">
+            <a:schemeClr val="accent1">
+              <a:shade val="50000"/>
+            </a:schemeClr>
+          </a:lnRef>
+          <a:fillRef idx="1">
+            <a:schemeClr val="accent1"/>
+          </a:fillRef>
+          <a:effectRef idx="0">
+            <a:schemeClr val="accent1"/>
+          </a:effectRef>
+          <a:fontRef idx="minor">
+            <a:schemeClr val="lt1"/>
+          </a:fontRef>
+        </p:style>
+        <p:txBody>
+          <a:bodyPr lIns="502920"/>
+          <a:lstStyle/>
+          <a:p>
+            <a:pPr eaLnBrk="1" fontAlgn="auto" hangingPunct="1">
+              <a:spcBef>
+                <a:spcPts val="0"/>
+              </a:spcBef>
+              <a:spcAft>
+                <a:spcPts val="0"/>
+              </a:spcAft>
+              <a:defRPr/>
+            </a:pPr>
+            <a:r>
+              <a:rPr lang="en-US" sz="1200" dirty="0">
+                <a:solidFill>
+                  <a:srgbClr val="1E8900"/>
+                </a:solidFill>
+                <a:latin typeface="Arial" panose="020B0604020202020204" pitchFamily="34" charset="0"/>
+                <a:cs typeface="Arial" panose="020B0604020202020204" pitchFamily="34" charset="0"/>
+              </a:rPr>
+              <a:t>Public subnet</a:t>
+            </a:r>
+          </a:p>
+        </p:txBody>
+      </p:sp>
+      <p:sp>
+        <p:nvSpPr>
+          <p:cNvPr id="47" name="Rectangle 46">
+            <a:extLst>
+              <a:ext uri="{FF2B5EF4-FFF2-40B4-BE49-F238E27FC236}">
+                <a16:creationId xmlns:a16="http://schemas.microsoft.com/office/drawing/2014/main" id="{D9136239-9E30-F72C-0A3F-31684A5D51A6}"/>
+              </a:ext>
+            </a:extLst>
+          </p:cNvPr>
+          <p:cNvSpPr/>
+          <p:nvPr/>
+        </p:nvSpPr>
+        <p:spPr>
+          <a:xfrm>
+            <a:off x="13337865" y="5674208"/>
+            <a:ext cx="2803791" cy="2920441"/>
+          </a:xfrm>
+          <a:prstGeom prst="rect">
+            <a:avLst/>
+          </a:prstGeom>
+          <a:solidFill>
+            <a:srgbClr val="1D8900">
+              <a:alpha val="9804"/>
+            </a:srgbClr>
+          </a:solidFill>
+          <a:ln w="12700">
+            <a:noFill/>
+            <a:prstDash val="dash"/>
+          </a:ln>
+        </p:spPr>
+        <p:style>
+          <a:lnRef idx="2">
+            <a:schemeClr val="accent1">
+              <a:shade val="50000"/>
+            </a:schemeClr>
+          </a:lnRef>
+          <a:fillRef idx="1">
+            <a:schemeClr val="accent1"/>
+          </a:fillRef>
+          <a:effectRef idx="0">
+            <a:schemeClr val="accent1"/>
+          </a:effectRef>
+          <a:fontRef idx="minor">
+            <a:schemeClr val="lt1"/>
+          </a:fontRef>
+        </p:style>
+        <p:txBody>
+          <a:bodyPr lIns="502920"/>
+          <a:lstStyle/>
+          <a:p>
+            <a:pPr eaLnBrk="1" fontAlgn="auto" hangingPunct="1">
+              <a:spcBef>
+                <a:spcPts val="0"/>
+              </a:spcBef>
+              <a:spcAft>
+                <a:spcPts val="0"/>
+              </a:spcAft>
+              <a:defRPr/>
+            </a:pPr>
+            <a:r>
+              <a:rPr lang="en-US" sz="1200" dirty="0">
+                <a:solidFill>
+                  <a:srgbClr val="1E8900"/>
+                </a:solidFill>
+                <a:latin typeface="Arial" panose="020B0604020202020204" pitchFamily="34" charset="0"/>
+                <a:cs typeface="Arial" panose="020B0604020202020204" pitchFamily="34" charset="0"/>
+              </a:rPr>
+              <a:t>Public subnet</a:t>
+            </a:r>
+          </a:p>
+        </p:txBody>
+      </p:sp>
+      <p:pic>
+        <p:nvPicPr>
+          <p:cNvPr id="48" name="Graphic 47">
+            <a:extLst>
+              <a:ext uri="{FF2B5EF4-FFF2-40B4-BE49-F238E27FC236}">
+                <a16:creationId xmlns:a16="http://schemas.microsoft.com/office/drawing/2014/main" id="{64D961C4-9431-0AB6-1936-37A1ADD2BCF2}"/>
+              </a:ext>
+            </a:extLst>
+          </p:cNvPr>
+          <p:cNvPicPr>
+            <a:picLocks noChangeAspect="1"/>
+          </p:cNvPicPr>
+          <p:nvPr/>
+        </p:nvPicPr>
+        <p:blipFill>
+          <a:blip r:embed="rId6">
+            <a:extLst>
+              <a:ext uri="{96DAC541-7B7A-43D3-8B79-37D633B846F1}">
+                <asvg:svgBlip xmlns:asvg="http://schemas.microsoft.com/office/drawing/2016/SVG/main" r:embed="rId7"/>
+              </a:ext>
+            </a:extLst>
+          </a:blip>
+          <a:stretch>
+            <a:fillRect/>
+          </a:stretch>
+        </p:blipFill>
+        <p:spPr>
+          <a:xfrm>
+            <a:off x="13337865" y="5674207"/>
+            <a:ext cx="381000" cy="381000"/>
+          </a:xfrm>
+          <a:prstGeom prst="rect">
+            <a:avLst/>
+          </a:prstGeom>
+        </p:spPr>
+      </p:pic>
+      <p:pic>
+        <p:nvPicPr>
+          <p:cNvPr id="49" name="Graphic 48">
+            <a:extLst>
+              <a:ext uri="{FF2B5EF4-FFF2-40B4-BE49-F238E27FC236}">
+                <a16:creationId xmlns:a16="http://schemas.microsoft.com/office/drawing/2014/main" id="{15A16C9B-2C30-46D1-6572-C2D9C0AB88DB}"/>
+              </a:ext>
+            </a:extLst>
+          </p:cNvPr>
+          <p:cNvPicPr>
+            <a:picLocks noChangeAspect="1"/>
+          </p:cNvPicPr>
+          <p:nvPr/>
+        </p:nvPicPr>
+        <p:blipFill>
+          <a:blip r:embed="rId6">
+            <a:extLst>
+              <a:ext uri="{96DAC541-7B7A-43D3-8B79-37D633B846F1}">
+                <asvg:svgBlip xmlns:asvg="http://schemas.microsoft.com/office/drawing/2016/SVG/main" r:embed="rId7"/>
+              </a:ext>
+            </a:extLst>
+          </a:blip>
+          <a:stretch>
+            <a:fillRect/>
+          </a:stretch>
+        </p:blipFill>
+        <p:spPr>
+          <a:xfrm>
+            <a:off x="8993791" y="5680635"/>
+            <a:ext cx="381000" cy="381000"/>
+          </a:xfrm>
+          <a:prstGeom prst="rect">
+            <a:avLst/>
+          </a:prstGeom>
+        </p:spPr>
+      </p:pic>
+      <p:pic>
+        <p:nvPicPr>
+          <p:cNvPr id="50" name="Graphic 49">
+            <a:extLst>
+              <a:ext uri="{FF2B5EF4-FFF2-40B4-BE49-F238E27FC236}">
+                <a16:creationId xmlns:a16="http://schemas.microsoft.com/office/drawing/2014/main" id="{7E200D9D-25C9-C6E8-0DED-0954D2424017}"/>
+              </a:ext>
+            </a:extLst>
+          </p:cNvPr>
+          <p:cNvPicPr>
+            <a:picLocks noChangeAspect="1"/>
+          </p:cNvPicPr>
+          <p:nvPr/>
+        </p:nvPicPr>
+        <p:blipFill>
+          <a:blip r:embed="rId6">
+            <a:extLst>
+              <a:ext uri="{96DAC541-7B7A-43D3-8B79-37D633B846F1}">
+                <asvg:svgBlip xmlns:asvg="http://schemas.microsoft.com/office/drawing/2016/SVG/main" r:embed="rId7"/>
+              </a:ext>
+            </a:extLst>
+          </a:blip>
+          <a:stretch>
+            <a:fillRect/>
+          </a:stretch>
+        </p:blipFill>
+        <p:spPr>
+          <a:xfrm>
+            <a:off x="4917512" y="5674207"/>
+            <a:ext cx="381000" cy="381000"/>
+          </a:xfrm>
+          <a:prstGeom prst="rect">
+            <a:avLst/>
+          </a:prstGeom>
+        </p:spPr>
+      </p:pic>
+      <p:sp>
+        <p:nvSpPr>
+          <p:cNvPr id="52" name="Rectangle 51">
+            <a:extLst>
+              <a:ext uri="{FF2B5EF4-FFF2-40B4-BE49-F238E27FC236}">
+                <a16:creationId xmlns:a16="http://schemas.microsoft.com/office/drawing/2014/main" id="{48F81D2C-9308-E6FE-B225-01E1A885B3DB}"/>
+              </a:ext>
+            </a:extLst>
+          </p:cNvPr>
+          <p:cNvSpPr/>
+          <p:nvPr/>
+        </p:nvSpPr>
+        <p:spPr>
+          <a:xfrm>
+            <a:off x="4699591" y="4867758"/>
+            <a:ext cx="3250768" cy="4276242"/>
+          </a:xfrm>
+          <a:prstGeom prst="rect">
+            <a:avLst/>
+          </a:prstGeom>
+          <a:noFill/>
+          <a:ln w="12700">
+            <a:solidFill>
+              <a:srgbClr val="5B9CD5"/>
+            </a:solidFill>
+            <a:prstDash val="dash"/>
+          </a:ln>
+        </p:spPr>
+        <p:style>
+          <a:lnRef idx="2">
+            <a:schemeClr val="accent1">
+              <a:shade val="50000"/>
+            </a:schemeClr>
+          </a:lnRef>
+          <a:fillRef idx="1">
+            <a:schemeClr val="accent1"/>
+          </a:fillRef>
+          <a:effectRef idx="0">
+            <a:schemeClr val="accent1"/>
+          </a:effectRef>
+          <a:fontRef idx="minor">
+            <a:schemeClr val="lt1"/>
+          </a:fontRef>
+        </p:style>
+        <p:txBody>
+          <a:bodyPr tIns="91440"/>
+          <a:lstStyle/>
+          <a:p>
+            <a:pPr algn="ctr" eaLnBrk="1" fontAlgn="auto" hangingPunct="1">
+              <a:spcBef>
+                <a:spcPts val="0"/>
+              </a:spcBef>
+              <a:spcAft>
+                <a:spcPts val="0"/>
+              </a:spcAft>
+              <a:defRPr/>
+            </a:pPr>
+            <a:r>
+              <a:rPr lang="en-US" sz="1200" dirty="0">
+                <a:solidFill>
+                  <a:srgbClr val="5B9CD5"/>
+                </a:solidFill>
+                <a:latin typeface="Arial" panose="020B0604020202020204" pitchFamily="34" charset="0"/>
+                <a:cs typeface="Arial" panose="020B0604020202020204" pitchFamily="34" charset="0"/>
+              </a:rPr>
+              <a:t>Availability Zone</a:t>
+            </a:r>
+          </a:p>
+        </p:txBody>
+      </p:sp>
+      <p:sp>
+        <p:nvSpPr>
+          <p:cNvPr id="54" name="Rectangle 53">
+            <a:extLst>
+              <a:ext uri="{FF2B5EF4-FFF2-40B4-BE49-F238E27FC236}">
+                <a16:creationId xmlns:a16="http://schemas.microsoft.com/office/drawing/2014/main" id="{A0D21D4F-72D7-9F30-5C5A-43DDBDAD4CFB}"/>
+              </a:ext>
+            </a:extLst>
+          </p:cNvPr>
+          <p:cNvSpPr/>
+          <p:nvPr/>
+        </p:nvSpPr>
+        <p:spPr>
+          <a:xfrm>
+            <a:off x="8762626" y="4869349"/>
+            <a:ext cx="3250768" cy="4276242"/>
+          </a:xfrm>
+          <a:prstGeom prst="rect">
+            <a:avLst/>
+          </a:prstGeom>
+          <a:noFill/>
+          <a:ln w="12700">
+            <a:solidFill>
+              <a:srgbClr val="5B9CD5"/>
+            </a:solidFill>
+            <a:prstDash val="dash"/>
+          </a:ln>
+        </p:spPr>
+        <p:style>
+          <a:lnRef idx="2">
+            <a:schemeClr val="accent1">
+              <a:shade val="50000"/>
+            </a:schemeClr>
+          </a:lnRef>
+          <a:fillRef idx="1">
+            <a:schemeClr val="accent1"/>
+          </a:fillRef>
+          <a:effectRef idx="0">
+            <a:schemeClr val="accent1"/>
+          </a:effectRef>
+          <a:fontRef idx="minor">
+            <a:schemeClr val="lt1"/>
+          </a:fontRef>
+        </p:style>
+        <p:txBody>
+          <a:bodyPr tIns="91440"/>
+          <a:lstStyle/>
+          <a:p>
+            <a:pPr algn="ctr" eaLnBrk="1" fontAlgn="auto" hangingPunct="1">
+              <a:spcBef>
+                <a:spcPts val="0"/>
+              </a:spcBef>
+              <a:spcAft>
+                <a:spcPts val="0"/>
+              </a:spcAft>
+              <a:defRPr/>
+            </a:pPr>
+            <a:r>
+              <a:rPr lang="en-US" sz="1200" dirty="0">
+                <a:solidFill>
+                  <a:srgbClr val="5B9CD5"/>
+                </a:solidFill>
+                <a:latin typeface="Arial" panose="020B0604020202020204" pitchFamily="34" charset="0"/>
+                <a:cs typeface="Arial" panose="020B0604020202020204" pitchFamily="34" charset="0"/>
+              </a:rPr>
+              <a:t>Availability Zone</a:t>
+            </a:r>
+          </a:p>
+        </p:txBody>
+      </p:sp>
+      <p:sp>
+        <p:nvSpPr>
+          <p:cNvPr id="55" name="Rectangle 54">
+            <a:extLst>
+              <a:ext uri="{FF2B5EF4-FFF2-40B4-BE49-F238E27FC236}">
+                <a16:creationId xmlns:a16="http://schemas.microsoft.com/office/drawing/2014/main" id="{72857E63-AD42-CCBF-9E5B-DA43D0878B0C}"/>
+              </a:ext>
+            </a:extLst>
+          </p:cNvPr>
+          <p:cNvSpPr/>
+          <p:nvPr/>
+        </p:nvSpPr>
+        <p:spPr>
+          <a:xfrm>
+            <a:off x="13103527" y="4867758"/>
+            <a:ext cx="3250768" cy="4276242"/>
+          </a:xfrm>
+          <a:prstGeom prst="rect">
+            <a:avLst/>
+          </a:prstGeom>
+          <a:noFill/>
+          <a:ln w="12700">
+            <a:solidFill>
+              <a:srgbClr val="5B9CD5"/>
+            </a:solidFill>
+            <a:prstDash val="dash"/>
+          </a:ln>
+        </p:spPr>
+        <p:style>
+          <a:lnRef idx="2">
+            <a:schemeClr val="accent1">
+              <a:shade val="50000"/>
+            </a:schemeClr>
+          </a:lnRef>
+          <a:fillRef idx="1">
+            <a:schemeClr val="accent1"/>
+          </a:fillRef>
+          <a:effectRef idx="0">
+            <a:schemeClr val="accent1"/>
+          </a:effectRef>
+          <a:fontRef idx="minor">
+            <a:schemeClr val="lt1"/>
+          </a:fontRef>
+        </p:style>
+        <p:txBody>
+          <a:bodyPr tIns="91440"/>
+          <a:lstStyle/>
+          <a:p>
+            <a:pPr algn="ctr" eaLnBrk="1" fontAlgn="auto" hangingPunct="1">
+              <a:spcBef>
+                <a:spcPts val="0"/>
+              </a:spcBef>
+              <a:spcAft>
+                <a:spcPts val="0"/>
+              </a:spcAft>
+              <a:defRPr/>
+            </a:pPr>
+            <a:r>
+              <a:rPr lang="en-US" sz="1200" dirty="0">
+                <a:solidFill>
+                  <a:srgbClr val="5B9CD5"/>
+                </a:solidFill>
+                <a:latin typeface="Arial" panose="020B0604020202020204" pitchFamily="34" charset="0"/>
+                <a:cs typeface="Arial" panose="020B0604020202020204" pitchFamily="34" charset="0"/>
+              </a:rPr>
+              <a:t>Availability Zone</a:t>
+            </a:r>
+          </a:p>
+        </p:txBody>
+      </p:sp>
+      <p:pic>
+        <p:nvPicPr>
+          <p:cNvPr id="57" name="Graphic 60">
+            <a:extLst>
+              <a:ext uri="{FF2B5EF4-FFF2-40B4-BE49-F238E27FC236}">
+                <a16:creationId xmlns:a16="http://schemas.microsoft.com/office/drawing/2014/main" id="{8A866A09-21F6-05A3-6F7B-FE7127A963CB}"/>
+              </a:ext>
+            </a:extLst>
+          </p:cNvPr>
+          <p:cNvPicPr>
+            <a:picLocks noChangeAspect="1" noChangeArrowheads="1"/>
+          </p:cNvPicPr>
+          <p:nvPr/>
+        </p:nvPicPr>
+        <p:blipFill>
+          <a:blip r:embed="rId8">
+            <a:extLst>
+              <a:ext uri="{28A0092B-C50C-407E-A947-70E740481C1C}">
+                <a14:useLocalDpi xmlns:a14="http://schemas.microsoft.com/office/drawing/2010/main" val="0"/>
+              </a:ext>
+            </a:extLst>
+          </a:blip>
+          <a:srcRect/>
+          <a:stretch>
+            <a:fillRect/>
+          </a:stretch>
+        </p:blipFill>
+        <p:spPr bwMode="auto">
+          <a:xfrm>
+            <a:off x="5385404" y="6743256"/>
+            <a:ext cx="457200" cy="457200"/>
+          </a:xfrm>
+          <a:prstGeom prst="rect">
+            <a:avLst/>
+          </a:prstGeom>
+          <a:noFill/>
+          <a:ln>
+            <a:noFill/>
+          </a:ln>
+          <a:extLst>
+            <a:ext uri="{909E8E84-426E-40DD-AFC4-6F175D3DCCD1}">
+              <a14:hiddenFill xmlns:a14="http://schemas.microsoft.com/office/drawing/2010/main">
+                <a:solidFill>
+                  <a:srgbClr val="FFFFFF"/>
+                </a:solidFill>
+              </a14:hiddenFill>
+            </a:ext>
+            <a:ext uri="{91240B29-F687-4F45-9708-019B960494DF}">
+              <a14:hiddenLine xmlns:a14="http://schemas.microsoft.com/office/drawing/2010/main" w="9525">
+                <a:solidFill>
+                  <a:srgbClr val="000000"/>
+                </a:solidFill>
+                <a:miter lim="800000"/>
+                <a:headEnd/>
+                <a:tailEnd/>
+              </a14:hiddenLine>
+            </a:ext>
+          </a:extLst>
+        </p:spPr>
+      </p:pic>
+      <p:pic>
+        <p:nvPicPr>
+          <p:cNvPr id="58" name="Graphic 60">
+            <a:extLst>
+              <a:ext uri="{FF2B5EF4-FFF2-40B4-BE49-F238E27FC236}">
+                <a16:creationId xmlns:a16="http://schemas.microsoft.com/office/drawing/2014/main" id="{E473ABC9-CCBB-B5EF-226A-D623550B6B88}"/>
+              </a:ext>
+            </a:extLst>
+          </p:cNvPr>
+          <p:cNvPicPr>
+            <a:picLocks noChangeAspect="1" noChangeArrowheads="1"/>
+          </p:cNvPicPr>
+          <p:nvPr/>
+        </p:nvPicPr>
+        <p:blipFill>
+          <a:blip r:embed="rId8">
+            <a:extLst>
+              <a:ext uri="{28A0092B-C50C-407E-A947-70E740481C1C}">
+                <a14:useLocalDpi xmlns:a14="http://schemas.microsoft.com/office/drawing/2010/main" val="0"/>
+              </a:ext>
+            </a:extLst>
+          </a:blip>
+          <a:srcRect/>
+          <a:stretch>
+            <a:fillRect/>
+          </a:stretch>
+        </p:blipFill>
+        <p:spPr bwMode="auto">
+          <a:xfrm>
+            <a:off x="6654871" y="6743256"/>
+            <a:ext cx="457200" cy="457200"/>
+          </a:xfrm>
+          <a:prstGeom prst="rect">
+            <a:avLst/>
+          </a:prstGeom>
+          <a:noFill/>
+          <a:ln>
+            <a:noFill/>
+          </a:ln>
+          <a:extLst>
+            <a:ext uri="{909E8E84-426E-40DD-AFC4-6F175D3DCCD1}">
+              <a14:hiddenFill xmlns:a14="http://schemas.microsoft.com/office/drawing/2010/main">
+                <a:solidFill>
+                  <a:srgbClr val="FFFFFF"/>
+                </a:solidFill>
+              </a14:hiddenFill>
+            </a:ext>
+            <a:ext uri="{91240B29-F687-4F45-9708-019B960494DF}">
+              <a14:hiddenLine xmlns:a14="http://schemas.microsoft.com/office/drawing/2010/main" w="9525">
+                <a:solidFill>
+                  <a:srgbClr val="000000"/>
+                </a:solidFill>
+                <a:miter lim="800000"/>
+                <a:headEnd/>
+                <a:tailEnd/>
+              </a14:hiddenLine>
+            </a:ext>
+          </a:extLst>
+        </p:spPr>
+      </p:pic>
+      <p:sp>
+        <p:nvSpPr>
+          <p:cNvPr id="59" name="TextBox 16">
+            <a:extLst>
+              <a:ext uri="{FF2B5EF4-FFF2-40B4-BE49-F238E27FC236}">
+                <a16:creationId xmlns:a16="http://schemas.microsoft.com/office/drawing/2014/main" id="{7DFB7786-5A35-2C91-F367-7CD01172F7C9}"/>
+              </a:ext>
+            </a:extLst>
+          </p:cNvPr>
+          <p:cNvSpPr txBox="1">
+            <a:spLocks noChangeArrowheads="1"/>
+          </p:cNvSpPr>
+          <p:nvPr/>
+        </p:nvSpPr>
+        <p:spPr bwMode="auto">
+          <a:xfrm>
+            <a:off x="5070214" y="7206750"/>
+            <a:ext cx="1115568" cy="261610"/>
+          </a:xfrm>
+          <a:prstGeom prst="rect">
+            <a:avLst/>
+          </a:prstGeom>
+          <a:noFill/>
+          <a:ln>
+            <a:noFill/>
+          </a:ln>
+          <a:extLst>
+            <a:ext uri="{909E8E84-426E-40DD-AFC4-6F175D3DCCD1}">
+              <a14:hiddenFill xmlns:a14="http://schemas.microsoft.com/office/drawing/2010/main">
+                <a:solidFill>
+                  <a:srgbClr val="FFFFFF"/>
+                </a:solidFill>
+              </a14:hiddenFill>
+            </a:ext>
+            <a:ext uri="{91240B29-F687-4F45-9708-019B960494DF}">
+              <a14:hiddenLine xmlns:a14="http://schemas.microsoft.com/office/drawing/2010/main" w="9525">
+                <a:solidFill>
+                  <a:srgbClr val="000000"/>
+                </a:solidFill>
+                <a:miter lim="800000"/>
+                <a:headEnd/>
+                <a:tailEnd/>
+              </a14:hiddenLine>
+            </a:ext>
+          </a:extLst>
+        </p:spPr>
+        <p:txBody>
+          <a:bodyPr wrap="square" lIns="0" rIns="0">
+            <a:spAutoFit/>
+          </a:bodyPr>
+          <a:lstStyle>
+            <a:lvl1pPr>
+              <a:defRPr>
+                <a:solidFill>
+                  <a:schemeClr val="tx1"/>
+                </a:solidFill>
+                <a:latin typeface="Calibri" panose="020F0502020204030204" pitchFamily="34" charset="0"/>
+              </a:defRPr>
+            </a:lvl1pPr>
+            <a:lvl2pPr marL="742950" indent="-285750">
+              <a:defRPr>
+                <a:solidFill>
+                  <a:schemeClr val="tx1"/>
+                </a:solidFill>
+                <a:latin typeface="Calibri" panose="020F0502020204030204" pitchFamily="34" charset="0"/>
+              </a:defRPr>
+            </a:lvl2pPr>
+            <a:lvl3pPr marL="1143000" indent="-228600">
+              <a:defRPr>
+                <a:solidFill>
+                  <a:schemeClr val="tx1"/>
+                </a:solidFill>
+                <a:latin typeface="Calibri" panose="020F0502020204030204" pitchFamily="34" charset="0"/>
+              </a:defRPr>
+            </a:lvl3pPr>
+            <a:lvl4pPr marL="1600200" indent="-228600">
+              <a:defRPr>
+                <a:solidFill>
+                  <a:schemeClr val="tx1"/>
+                </a:solidFill>
+                <a:latin typeface="Calibri" panose="020F0502020204030204" pitchFamily="34" charset="0"/>
+              </a:defRPr>
+            </a:lvl4pPr>
+            <a:lvl5pPr marL="2057400" indent="-228600">
+              <a:defRPr>
+                <a:solidFill>
+                  <a:schemeClr val="tx1"/>
+                </a:solidFill>
+                <a:latin typeface="Calibri" panose="020F0502020204030204" pitchFamily="34" charset="0"/>
+              </a:defRPr>
+            </a:lvl5pPr>
+            <a:lvl6pPr marL="2514600" indent="-228600" eaLnBrk="0" fontAlgn="base" hangingPunct="0">
+              <a:spcBef>
+                <a:spcPct val="0"/>
+              </a:spcBef>
+              <a:spcAft>
+                <a:spcPct val="0"/>
+              </a:spcAft>
+              <a:defRPr>
+                <a:solidFill>
+                  <a:schemeClr val="tx1"/>
+                </a:solidFill>
+                <a:latin typeface="Calibri" panose="020F0502020204030204" pitchFamily="34" charset="0"/>
+              </a:defRPr>
+            </a:lvl6pPr>
+            <a:lvl7pPr marL="2971800" indent="-228600" eaLnBrk="0" fontAlgn="base" hangingPunct="0">
+              <a:spcBef>
+                <a:spcPct val="0"/>
+              </a:spcBef>
+              <a:spcAft>
+                <a:spcPct val="0"/>
+              </a:spcAft>
+              <a:defRPr>
+                <a:solidFill>
+                  <a:schemeClr val="tx1"/>
+                </a:solidFill>
+                <a:latin typeface="Calibri" panose="020F0502020204030204" pitchFamily="34" charset="0"/>
+              </a:defRPr>
+            </a:lvl7pPr>
+            <a:lvl8pPr marL="3429000" indent="-228600" eaLnBrk="0" fontAlgn="base" hangingPunct="0">
+              <a:spcBef>
+                <a:spcPct val="0"/>
+              </a:spcBef>
+              <a:spcAft>
+                <a:spcPct val="0"/>
+              </a:spcAft>
+              <a:defRPr>
+                <a:solidFill>
+                  <a:schemeClr val="tx1"/>
+                </a:solidFill>
+                <a:latin typeface="Calibri" panose="020F0502020204030204" pitchFamily="34" charset="0"/>
+              </a:defRPr>
+            </a:lvl8pPr>
+            <a:lvl9pPr marL="3886200" indent="-228600" eaLnBrk="0" fontAlgn="base" hangingPunct="0">
+              <a:spcBef>
+                <a:spcPct val="0"/>
+              </a:spcBef>
+              <a:spcAft>
+                <a:spcPct val="0"/>
+              </a:spcAft>
+              <a:defRPr>
+                <a:solidFill>
+                  <a:schemeClr val="tx1"/>
+                </a:solidFill>
+                <a:latin typeface="Calibri" panose="020F0502020204030204" pitchFamily="34" charset="0"/>
+              </a:defRPr>
+            </a:lvl9pPr>
+          </a:lstStyle>
+          <a:p>
+            <a:pPr algn="ctr" eaLnBrk="1" hangingPunct="1"/>
+            <a:r>
+              <a:rPr lang="en-US" altLang="en-US" sz="1100" dirty="0">
+                <a:latin typeface="Arial" panose="020B0604020202020204" pitchFamily="34" charset="0"/>
+                <a:ea typeface="Amazon Ember" panose="020B0603020204020204" pitchFamily="34" charset="0"/>
+                <a:cs typeface="Arial" panose="020B0604020202020204" pitchFamily="34" charset="0"/>
+              </a:rPr>
+              <a:t>Instance</a:t>
+            </a:r>
+          </a:p>
+        </p:txBody>
+      </p:sp>
+      <p:sp>
+        <p:nvSpPr>
+          <p:cNvPr id="60" name="TextBox 16">
+            <a:extLst>
+              <a:ext uri="{FF2B5EF4-FFF2-40B4-BE49-F238E27FC236}">
+                <a16:creationId xmlns:a16="http://schemas.microsoft.com/office/drawing/2014/main" id="{F3F493D1-63A7-962E-7044-07EFA34423F1}"/>
+              </a:ext>
+            </a:extLst>
+          </p:cNvPr>
+          <p:cNvSpPr txBox="1">
+            <a:spLocks noChangeArrowheads="1"/>
+          </p:cNvSpPr>
+          <p:nvPr/>
+        </p:nvSpPr>
+        <p:spPr bwMode="auto">
+          <a:xfrm>
+            <a:off x="14235437" y="7313277"/>
+            <a:ext cx="1115568" cy="261610"/>
+          </a:xfrm>
+          <a:prstGeom prst="rect">
+            <a:avLst/>
+          </a:prstGeom>
+          <a:noFill/>
+          <a:ln>
+            <a:noFill/>
+          </a:ln>
+          <a:extLst>
+            <a:ext uri="{909E8E84-426E-40DD-AFC4-6F175D3DCCD1}">
+              <a14:hiddenFill xmlns:a14="http://schemas.microsoft.com/office/drawing/2010/main">
+                <a:solidFill>
+                  <a:srgbClr val="FFFFFF"/>
+                </a:solidFill>
+              </a14:hiddenFill>
+            </a:ext>
+            <a:ext uri="{91240B29-F687-4F45-9708-019B960494DF}">
+              <a14:hiddenLine xmlns:a14="http://schemas.microsoft.com/office/drawing/2010/main" w="9525">
+                <a:solidFill>
+                  <a:srgbClr val="000000"/>
+                </a:solidFill>
+                <a:miter lim="800000"/>
+                <a:headEnd/>
+                <a:tailEnd/>
+              </a14:hiddenLine>
+            </a:ext>
+          </a:extLst>
+        </p:spPr>
+        <p:txBody>
+          <a:bodyPr wrap="square" lIns="0" rIns="0">
+            <a:spAutoFit/>
+          </a:bodyPr>
+          <a:lstStyle>
+            <a:lvl1pPr>
+              <a:defRPr>
+                <a:solidFill>
+                  <a:schemeClr val="tx1"/>
+                </a:solidFill>
+                <a:latin typeface="Calibri" panose="020F0502020204030204" pitchFamily="34" charset="0"/>
+              </a:defRPr>
+            </a:lvl1pPr>
+            <a:lvl2pPr marL="742950" indent="-285750">
+              <a:defRPr>
+                <a:solidFill>
+                  <a:schemeClr val="tx1"/>
+                </a:solidFill>
+                <a:latin typeface="Calibri" panose="020F0502020204030204" pitchFamily="34" charset="0"/>
+              </a:defRPr>
+            </a:lvl2pPr>
+            <a:lvl3pPr marL="1143000" indent="-228600">
+              <a:defRPr>
+                <a:solidFill>
+                  <a:schemeClr val="tx1"/>
+                </a:solidFill>
+                <a:latin typeface="Calibri" panose="020F0502020204030204" pitchFamily="34" charset="0"/>
+              </a:defRPr>
+            </a:lvl3pPr>
+            <a:lvl4pPr marL="1600200" indent="-228600">
+              <a:defRPr>
+                <a:solidFill>
+                  <a:schemeClr val="tx1"/>
+                </a:solidFill>
+                <a:latin typeface="Calibri" panose="020F0502020204030204" pitchFamily="34" charset="0"/>
+              </a:defRPr>
+            </a:lvl4pPr>
+            <a:lvl5pPr marL="2057400" indent="-228600">
+              <a:defRPr>
+                <a:solidFill>
+                  <a:schemeClr val="tx1"/>
+                </a:solidFill>
+                <a:latin typeface="Calibri" panose="020F0502020204030204" pitchFamily="34" charset="0"/>
+              </a:defRPr>
+            </a:lvl5pPr>
+            <a:lvl6pPr marL="2514600" indent="-228600" eaLnBrk="0" fontAlgn="base" hangingPunct="0">
+              <a:spcBef>
+                <a:spcPct val="0"/>
+              </a:spcBef>
+              <a:spcAft>
+                <a:spcPct val="0"/>
+              </a:spcAft>
+              <a:defRPr>
+                <a:solidFill>
+                  <a:schemeClr val="tx1"/>
+                </a:solidFill>
+                <a:latin typeface="Calibri" panose="020F0502020204030204" pitchFamily="34" charset="0"/>
+              </a:defRPr>
+            </a:lvl6pPr>
+            <a:lvl7pPr marL="2971800" indent="-228600" eaLnBrk="0" fontAlgn="base" hangingPunct="0">
+              <a:spcBef>
+                <a:spcPct val="0"/>
+              </a:spcBef>
+              <a:spcAft>
+                <a:spcPct val="0"/>
+              </a:spcAft>
+              <a:defRPr>
+                <a:solidFill>
+                  <a:schemeClr val="tx1"/>
+                </a:solidFill>
+                <a:latin typeface="Calibri" panose="020F0502020204030204" pitchFamily="34" charset="0"/>
+              </a:defRPr>
+            </a:lvl7pPr>
+            <a:lvl8pPr marL="3429000" indent="-228600" eaLnBrk="0" fontAlgn="base" hangingPunct="0">
+              <a:spcBef>
+                <a:spcPct val="0"/>
+              </a:spcBef>
+              <a:spcAft>
+                <a:spcPct val="0"/>
+              </a:spcAft>
+              <a:defRPr>
+                <a:solidFill>
+                  <a:schemeClr val="tx1"/>
+                </a:solidFill>
+                <a:latin typeface="Calibri" panose="020F0502020204030204" pitchFamily="34" charset="0"/>
+              </a:defRPr>
+            </a:lvl8pPr>
+            <a:lvl9pPr marL="3886200" indent="-228600" eaLnBrk="0" fontAlgn="base" hangingPunct="0">
+              <a:spcBef>
+                <a:spcPct val="0"/>
+              </a:spcBef>
+              <a:spcAft>
+                <a:spcPct val="0"/>
+              </a:spcAft>
+              <a:defRPr>
+                <a:solidFill>
+                  <a:schemeClr val="tx1"/>
+                </a:solidFill>
+                <a:latin typeface="Calibri" panose="020F0502020204030204" pitchFamily="34" charset="0"/>
+              </a:defRPr>
+            </a:lvl9pPr>
+          </a:lstStyle>
+          <a:p>
+            <a:pPr algn="ctr" eaLnBrk="1" hangingPunct="1"/>
+            <a:r>
+              <a:rPr lang="en-US" altLang="en-US" sz="1100" dirty="0">
+                <a:latin typeface="Arial" panose="020B0604020202020204" pitchFamily="34" charset="0"/>
+                <a:ea typeface="Amazon Ember" panose="020B0603020204020204" pitchFamily="34" charset="0"/>
+                <a:cs typeface="Arial" panose="020B0604020202020204" pitchFamily="34" charset="0"/>
+              </a:rPr>
+              <a:t>Instance</a:t>
+            </a:r>
+          </a:p>
+        </p:txBody>
+      </p:sp>
+      <p:pic>
+        <p:nvPicPr>
+          <p:cNvPr id="61" name="Graphic 60">
+            <a:extLst>
+              <a:ext uri="{FF2B5EF4-FFF2-40B4-BE49-F238E27FC236}">
+                <a16:creationId xmlns:a16="http://schemas.microsoft.com/office/drawing/2014/main" id="{640D71F4-AEF7-B9CE-615C-B56442FBE654}"/>
+              </a:ext>
+            </a:extLst>
+          </p:cNvPr>
+          <p:cNvPicPr>
+            <a:picLocks noChangeAspect="1" noChangeArrowheads="1"/>
+          </p:cNvPicPr>
+          <p:nvPr/>
+        </p:nvPicPr>
+        <p:blipFill>
+          <a:blip r:embed="rId8">
+            <a:extLst>
+              <a:ext uri="{28A0092B-C50C-407E-A947-70E740481C1C}">
+                <a14:useLocalDpi xmlns:a14="http://schemas.microsoft.com/office/drawing/2010/main" val="0"/>
+              </a:ext>
+            </a:extLst>
+          </a:blip>
+          <a:srcRect/>
+          <a:stretch>
+            <a:fillRect/>
+          </a:stretch>
+        </p:blipFill>
+        <p:spPr bwMode="auto">
+          <a:xfrm>
+            <a:off x="10797640" y="6777279"/>
+            <a:ext cx="457200" cy="457200"/>
+          </a:xfrm>
+          <a:prstGeom prst="rect">
+            <a:avLst/>
+          </a:prstGeom>
+          <a:noFill/>
+          <a:ln>
+            <a:noFill/>
+          </a:ln>
+          <a:extLst>
+            <a:ext uri="{909E8E84-426E-40DD-AFC4-6F175D3DCCD1}">
+              <a14:hiddenFill xmlns:a14="http://schemas.microsoft.com/office/drawing/2010/main">
+                <a:solidFill>
+                  <a:srgbClr val="FFFFFF"/>
+                </a:solidFill>
+              </a14:hiddenFill>
+            </a:ext>
+            <a:ext uri="{91240B29-F687-4F45-9708-019B960494DF}">
+              <a14:hiddenLine xmlns:a14="http://schemas.microsoft.com/office/drawing/2010/main" w="9525">
+                <a:solidFill>
+                  <a:srgbClr val="000000"/>
+                </a:solidFill>
+                <a:miter lim="800000"/>
+                <a:headEnd/>
+                <a:tailEnd/>
+              </a14:hiddenLine>
+            </a:ext>
+          </a:extLst>
+        </p:spPr>
+      </p:pic>
+      <p:pic>
+        <p:nvPicPr>
+          <p:cNvPr id="62" name="Graphic 60">
+            <a:extLst>
+              <a:ext uri="{FF2B5EF4-FFF2-40B4-BE49-F238E27FC236}">
+                <a16:creationId xmlns:a16="http://schemas.microsoft.com/office/drawing/2014/main" id="{EB42CF53-A8F9-32FD-FDC0-52E034B0BF27}"/>
+              </a:ext>
+            </a:extLst>
+          </p:cNvPr>
+          <p:cNvPicPr>
+            <a:picLocks noChangeAspect="1" noChangeArrowheads="1"/>
+          </p:cNvPicPr>
+          <p:nvPr/>
+        </p:nvPicPr>
+        <p:blipFill>
+          <a:blip r:embed="rId8">
+            <a:extLst>
+              <a:ext uri="{28A0092B-C50C-407E-A947-70E740481C1C}">
+                <a14:useLocalDpi xmlns:a14="http://schemas.microsoft.com/office/drawing/2010/main" val="0"/>
+              </a:ext>
+            </a:extLst>
+          </a:blip>
+          <a:srcRect/>
+          <a:stretch>
+            <a:fillRect/>
+          </a:stretch>
+        </p:blipFill>
+        <p:spPr bwMode="auto">
+          <a:xfrm>
+            <a:off x="9478907" y="6778738"/>
+            <a:ext cx="457200" cy="457200"/>
+          </a:xfrm>
+          <a:prstGeom prst="rect">
+            <a:avLst/>
+          </a:prstGeom>
+          <a:noFill/>
+          <a:ln>
+            <a:noFill/>
+          </a:ln>
+          <a:extLst>
+            <a:ext uri="{909E8E84-426E-40DD-AFC4-6F175D3DCCD1}">
+              <a14:hiddenFill xmlns:a14="http://schemas.microsoft.com/office/drawing/2010/main">
+                <a:solidFill>
+                  <a:srgbClr val="FFFFFF"/>
+                </a:solidFill>
+              </a14:hiddenFill>
+            </a:ext>
+            <a:ext uri="{91240B29-F687-4F45-9708-019B960494DF}">
+              <a14:hiddenLine xmlns:a14="http://schemas.microsoft.com/office/drawing/2010/main" w="9525">
+                <a:solidFill>
+                  <a:srgbClr val="000000"/>
+                </a:solidFill>
+                <a:miter lim="800000"/>
+                <a:headEnd/>
+                <a:tailEnd/>
+              </a14:hiddenLine>
+            </a:ext>
+          </a:extLst>
+        </p:spPr>
+      </p:pic>
+      <p:pic>
+        <p:nvPicPr>
+          <p:cNvPr id="63" name="Graphic 60">
+            <a:extLst>
+              <a:ext uri="{FF2B5EF4-FFF2-40B4-BE49-F238E27FC236}">
+                <a16:creationId xmlns:a16="http://schemas.microsoft.com/office/drawing/2014/main" id="{7A70B2AF-F763-9956-368A-82A1E3BA18A8}"/>
+              </a:ext>
+            </a:extLst>
+          </p:cNvPr>
+          <p:cNvPicPr>
+            <a:picLocks noChangeAspect="1" noChangeArrowheads="1"/>
+          </p:cNvPicPr>
+          <p:nvPr/>
+        </p:nvPicPr>
+        <p:blipFill>
+          <a:blip r:embed="rId8">
+            <a:extLst>
+              <a:ext uri="{28A0092B-C50C-407E-A947-70E740481C1C}">
+                <a14:useLocalDpi xmlns:a14="http://schemas.microsoft.com/office/drawing/2010/main" val="0"/>
+              </a:ext>
+            </a:extLst>
+          </a:blip>
+          <a:srcRect/>
+          <a:stretch>
+            <a:fillRect/>
+          </a:stretch>
+        </p:blipFill>
+        <p:spPr bwMode="auto">
+          <a:xfrm>
+            <a:off x="13718865" y="6777279"/>
+            <a:ext cx="457200" cy="457200"/>
+          </a:xfrm>
+          <a:prstGeom prst="rect">
+            <a:avLst/>
+          </a:prstGeom>
+          <a:noFill/>
+          <a:ln>
+            <a:noFill/>
+          </a:ln>
+          <a:extLst>
+            <a:ext uri="{909E8E84-426E-40DD-AFC4-6F175D3DCCD1}">
+              <a14:hiddenFill xmlns:a14="http://schemas.microsoft.com/office/drawing/2010/main">
+                <a:solidFill>
+                  <a:srgbClr val="FFFFFF"/>
+                </a:solidFill>
+              </a14:hiddenFill>
+            </a:ext>
+            <a:ext uri="{91240B29-F687-4F45-9708-019B960494DF}">
+              <a14:hiddenLine xmlns:a14="http://schemas.microsoft.com/office/drawing/2010/main" w="9525">
+                <a:solidFill>
+                  <a:srgbClr val="000000"/>
+                </a:solidFill>
+                <a:miter lim="800000"/>
+                <a:headEnd/>
+                <a:tailEnd/>
+              </a14:hiddenLine>
+            </a:ext>
+          </a:extLst>
+        </p:spPr>
+      </p:pic>
+      <p:pic>
+        <p:nvPicPr>
+          <p:cNvPr id="64" name="Graphic 60">
+            <a:extLst>
+              <a:ext uri="{FF2B5EF4-FFF2-40B4-BE49-F238E27FC236}">
+                <a16:creationId xmlns:a16="http://schemas.microsoft.com/office/drawing/2014/main" id="{563A90D5-ACFE-9F38-7B51-0E01B659A5D8}"/>
+              </a:ext>
+            </a:extLst>
+          </p:cNvPr>
+          <p:cNvPicPr>
+            <a:picLocks noChangeAspect="1" noChangeArrowheads="1"/>
+          </p:cNvPicPr>
+          <p:nvPr/>
+        </p:nvPicPr>
+        <p:blipFill>
+          <a:blip r:embed="rId8">
+            <a:extLst>
+              <a:ext uri="{28A0092B-C50C-407E-A947-70E740481C1C}">
+                <a14:useLocalDpi xmlns:a14="http://schemas.microsoft.com/office/drawing/2010/main" val="0"/>
+              </a:ext>
+            </a:extLst>
+          </a:blip>
+          <a:srcRect/>
+          <a:stretch>
+            <a:fillRect/>
+          </a:stretch>
+        </p:blipFill>
+        <p:spPr bwMode="auto">
+          <a:xfrm>
+            <a:off x="14564621" y="6825214"/>
+            <a:ext cx="457200" cy="457200"/>
+          </a:xfrm>
+          <a:prstGeom prst="rect">
+            <a:avLst/>
+          </a:prstGeom>
+          <a:noFill/>
+          <a:ln>
+            <a:noFill/>
+          </a:ln>
+          <a:extLst>
+            <a:ext uri="{909E8E84-426E-40DD-AFC4-6F175D3DCCD1}">
+              <a14:hiddenFill xmlns:a14="http://schemas.microsoft.com/office/drawing/2010/main">
+                <a:solidFill>
+                  <a:srgbClr val="FFFFFF"/>
+                </a:solidFill>
+              </a14:hiddenFill>
+            </a:ext>
+            <a:ext uri="{91240B29-F687-4F45-9708-019B960494DF}">
+              <a14:hiddenLine xmlns:a14="http://schemas.microsoft.com/office/drawing/2010/main" w="9525">
+                <a:solidFill>
+                  <a:srgbClr val="000000"/>
+                </a:solidFill>
+                <a:miter lim="800000"/>
+                <a:headEnd/>
+                <a:tailEnd/>
+              </a14:hiddenLine>
+            </a:ext>
+          </a:extLst>
+        </p:spPr>
+      </p:pic>
+      <p:pic>
+        <p:nvPicPr>
+          <p:cNvPr id="65" name="Graphic 60">
+            <a:extLst>
+              <a:ext uri="{FF2B5EF4-FFF2-40B4-BE49-F238E27FC236}">
+                <a16:creationId xmlns:a16="http://schemas.microsoft.com/office/drawing/2014/main" id="{E2763441-6680-CB90-2976-BD0C164AB217}"/>
+              </a:ext>
+            </a:extLst>
+          </p:cNvPr>
+          <p:cNvPicPr>
+            <a:picLocks noChangeAspect="1" noChangeArrowheads="1"/>
+          </p:cNvPicPr>
+          <p:nvPr/>
+        </p:nvPicPr>
+        <p:blipFill>
+          <a:blip r:embed="rId8">
+            <a:extLst>
+              <a:ext uri="{28A0092B-C50C-407E-A947-70E740481C1C}">
+                <a14:useLocalDpi xmlns:a14="http://schemas.microsoft.com/office/drawing/2010/main" val="0"/>
+              </a:ext>
+            </a:extLst>
+          </a:blip>
+          <a:srcRect/>
+          <a:stretch>
+            <a:fillRect/>
+          </a:stretch>
+        </p:blipFill>
+        <p:spPr bwMode="auto">
+          <a:xfrm>
+            <a:off x="15470881" y="6777279"/>
+            <a:ext cx="457200" cy="457200"/>
+          </a:xfrm>
+          <a:prstGeom prst="rect">
+            <a:avLst/>
+          </a:prstGeom>
+          <a:noFill/>
+          <a:ln>
+            <a:noFill/>
+          </a:ln>
+          <a:extLst>
+            <a:ext uri="{909E8E84-426E-40DD-AFC4-6F175D3DCCD1}">
+              <a14:hiddenFill xmlns:a14="http://schemas.microsoft.com/office/drawing/2010/main">
+                <a:solidFill>
+                  <a:srgbClr val="FFFFFF"/>
+                </a:solidFill>
+              </a14:hiddenFill>
+            </a:ext>
+            <a:ext uri="{91240B29-F687-4F45-9708-019B960494DF}">
+              <a14:hiddenLine xmlns:a14="http://schemas.microsoft.com/office/drawing/2010/main" w="9525">
+                <a:solidFill>
+                  <a:srgbClr val="000000"/>
+                </a:solidFill>
+                <a:miter lim="800000"/>
+                <a:headEnd/>
+                <a:tailEnd/>
+              </a14:hiddenLine>
+            </a:ext>
+          </a:extLst>
+        </p:spPr>
+      </p:pic>
+      <p:sp>
+        <p:nvSpPr>
+          <p:cNvPr id="67" name="TextBox 16">
+            <a:extLst>
+              <a:ext uri="{FF2B5EF4-FFF2-40B4-BE49-F238E27FC236}">
+                <a16:creationId xmlns:a16="http://schemas.microsoft.com/office/drawing/2014/main" id="{E21B13EC-DB61-3B3B-A04B-64DCF5ACD8E8}"/>
+              </a:ext>
+            </a:extLst>
+          </p:cNvPr>
+          <p:cNvSpPr txBox="1">
+            <a:spLocks noChangeArrowheads="1"/>
+          </p:cNvSpPr>
+          <p:nvPr/>
+        </p:nvSpPr>
+        <p:spPr bwMode="auto">
+          <a:xfrm>
+            <a:off x="9149723" y="7263658"/>
+            <a:ext cx="1115568" cy="261610"/>
+          </a:xfrm>
+          <a:prstGeom prst="rect">
+            <a:avLst/>
+          </a:prstGeom>
+          <a:noFill/>
+          <a:ln>
+            <a:noFill/>
+          </a:ln>
+          <a:extLst>
+            <a:ext uri="{909E8E84-426E-40DD-AFC4-6F175D3DCCD1}">
+              <a14:hiddenFill xmlns:a14="http://schemas.microsoft.com/office/drawing/2010/main">
+                <a:solidFill>
+                  <a:srgbClr val="FFFFFF"/>
+                </a:solidFill>
+              </a14:hiddenFill>
+            </a:ext>
+            <a:ext uri="{91240B29-F687-4F45-9708-019B960494DF}">
+              <a14:hiddenLine xmlns:a14="http://schemas.microsoft.com/office/drawing/2010/main" w="9525">
+                <a:solidFill>
+                  <a:srgbClr val="000000"/>
+                </a:solidFill>
+                <a:miter lim="800000"/>
+                <a:headEnd/>
+                <a:tailEnd/>
+              </a14:hiddenLine>
+            </a:ext>
+          </a:extLst>
+        </p:spPr>
+        <p:txBody>
+          <a:bodyPr wrap="square" lIns="0" rIns="0">
+            <a:spAutoFit/>
+          </a:bodyPr>
+          <a:lstStyle>
+            <a:lvl1pPr>
+              <a:defRPr>
+                <a:solidFill>
+                  <a:schemeClr val="tx1"/>
+                </a:solidFill>
+                <a:latin typeface="Calibri" panose="020F0502020204030204" pitchFamily="34" charset="0"/>
+              </a:defRPr>
+            </a:lvl1pPr>
+            <a:lvl2pPr marL="742950" indent="-285750">
+              <a:defRPr>
+                <a:solidFill>
+                  <a:schemeClr val="tx1"/>
+                </a:solidFill>
+                <a:latin typeface="Calibri" panose="020F0502020204030204" pitchFamily="34" charset="0"/>
+              </a:defRPr>
+            </a:lvl2pPr>
+            <a:lvl3pPr marL="1143000" indent="-228600">
+              <a:defRPr>
+                <a:solidFill>
+                  <a:schemeClr val="tx1"/>
+                </a:solidFill>
+                <a:latin typeface="Calibri" panose="020F0502020204030204" pitchFamily="34" charset="0"/>
+              </a:defRPr>
+            </a:lvl3pPr>
+            <a:lvl4pPr marL="1600200" indent="-228600">
+              <a:defRPr>
+                <a:solidFill>
+                  <a:schemeClr val="tx1"/>
+                </a:solidFill>
+                <a:latin typeface="Calibri" panose="020F0502020204030204" pitchFamily="34" charset="0"/>
+              </a:defRPr>
+            </a:lvl4pPr>
+            <a:lvl5pPr marL="2057400" indent="-228600">
+              <a:defRPr>
+                <a:solidFill>
+                  <a:schemeClr val="tx1"/>
+                </a:solidFill>
+                <a:latin typeface="Calibri" panose="020F0502020204030204" pitchFamily="34" charset="0"/>
+              </a:defRPr>
+            </a:lvl5pPr>
+            <a:lvl6pPr marL="2514600" indent="-228600" eaLnBrk="0" fontAlgn="base" hangingPunct="0">
+              <a:spcBef>
+                <a:spcPct val="0"/>
+              </a:spcBef>
+              <a:spcAft>
+                <a:spcPct val="0"/>
+              </a:spcAft>
+              <a:defRPr>
+                <a:solidFill>
+                  <a:schemeClr val="tx1"/>
+                </a:solidFill>
+                <a:latin typeface="Calibri" panose="020F0502020204030204" pitchFamily="34" charset="0"/>
+              </a:defRPr>
+            </a:lvl6pPr>
+            <a:lvl7pPr marL="2971800" indent="-228600" eaLnBrk="0" fontAlgn="base" hangingPunct="0">
+              <a:spcBef>
+                <a:spcPct val="0"/>
+              </a:spcBef>
+              <a:spcAft>
+                <a:spcPct val="0"/>
+              </a:spcAft>
+              <a:defRPr>
+                <a:solidFill>
+                  <a:schemeClr val="tx1"/>
+                </a:solidFill>
+                <a:latin typeface="Calibri" panose="020F0502020204030204" pitchFamily="34" charset="0"/>
+              </a:defRPr>
+            </a:lvl7pPr>
+            <a:lvl8pPr marL="3429000" indent="-228600" eaLnBrk="0" fontAlgn="base" hangingPunct="0">
+              <a:spcBef>
+                <a:spcPct val="0"/>
+              </a:spcBef>
+              <a:spcAft>
+                <a:spcPct val="0"/>
+              </a:spcAft>
+              <a:defRPr>
+                <a:solidFill>
+                  <a:schemeClr val="tx1"/>
+                </a:solidFill>
+                <a:latin typeface="Calibri" panose="020F0502020204030204" pitchFamily="34" charset="0"/>
+              </a:defRPr>
+            </a:lvl8pPr>
+            <a:lvl9pPr marL="3886200" indent="-228600" eaLnBrk="0" fontAlgn="base" hangingPunct="0">
+              <a:spcBef>
+                <a:spcPct val="0"/>
+              </a:spcBef>
+              <a:spcAft>
+                <a:spcPct val="0"/>
+              </a:spcAft>
+              <a:defRPr>
+                <a:solidFill>
+                  <a:schemeClr val="tx1"/>
+                </a:solidFill>
+                <a:latin typeface="Calibri" panose="020F0502020204030204" pitchFamily="34" charset="0"/>
+              </a:defRPr>
+            </a:lvl9pPr>
+          </a:lstStyle>
+          <a:p>
+            <a:pPr algn="ctr" eaLnBrk="1" hangingPunct="1"/>
+            <a:r>
+              <a:rPr lang="en-US" altLang="en-US" sz="1100" dirty="0">
+                <a:latin typeface="Arial" panose="020B0604020202020204" pitchFamily="34" charset="0"/>
+                <a:ea typeface="Amazon Ember" panose="020B0603020204020204" pitchFamily="34" charset="0"/>
+                <a:cs typeface="Arial" panose="020B0604020202020204" pitchFamily="34" charset="0"/>
+              </a:rPr>
+              <a:t>Instance</a:t>
+            </a:r>
+          </a:p>
+        </p:txBody>
+      </p:sp>
+      <p:sp>
+        <p:nvSpPr>
+          <p:cNvPr id="68" name="TextBox 16">
+            <a:extLst>
+              <a:ext uri="{FF2B5EF4-FFF2-40B4-BE49-F238E27FC236}">
+                <a16:creationId xmlns:a16="http://schemas.microsoft.com/office/drawing/2014/main" id="{964458C2-B701-C3E6-51AA-D3DE6C9397EF}"/>
+              </a:ext>
+            </a:extLst>
+          </p:cNvPr>
+          <p:cNvSpPr txBox="1">
+            <a:spLocks noChangeArrowheads="1"/>
+          </p:cNvSpPr>
+          <p:nvPr/>
+        </p:nvSpPr>
+        <p:spPr bwMode="auto">
+          <a:xfrm>
+            <a:off x="10473652" y="7263658"/>
+            <a:ext cx="1115568" cy="261610"/>
+          </a:xfrm>
+          <a:prstGeom prst="rect">
+            <a:avLst/>
+          </a:prstGeom>
+          <a:noFill/>
+          <a:ln>
+            <a:noFill/>
+          </a:ln>
+          <a:extLst>
+            <a:ext uri="{909E8E84-426E-40DD-AFC4-6F175D3DCCD1}">
+              <a14:hiddenFill xmlns:a14="http://schemas.microsoft.com/office/drawing/2010/main">
+                <a:solidFill>
+                  <a:srgbClr val="FFFFFF"/>
+                </a:solidFill>
+              </a14:hiddenFill>
+            </a:ext>
+            <a:ext uri="{91240B29-F687-4F45-9708-019B960494DF}">
+              <a14:hiddenLine xmlns:a14="http://schemas.microsoft.com/office/drawing/2010/main" w="9525">
+                <a:solidFill>
+                  <a:srgbClr val="000000"/>
+                </a:solidFill>
+                <a:miter lim="800000"/>
+                <a:headEnd/>
+                <a:tailEnd/>
+              </a14:hiddenLine>
+            </a:ext>
+          </a:extLst>
+        </p:spPr>
+        <p:txBody>
+          <a:bodyPr wrap="square" lIns="0" rIns="0">
+            <a:spAutoFit/>
+          </a:bodyPr>
+          <a:lstStyle>
+            <a:lvl1pPr>
+              <a:defRPr>
+                <a:solidFill>
+                  <a:schemeClr val="tx1"/>
+                </a:solidFill>
+                <a:latin typeface="Calibri" panose="020F0502020204030204" pitchFamily="34" charset="0"/>
+              </a:defRPr>
+            </a:lvl1pPr>
+            <a:lvl2pPr marL="742950" indent="-285750">
+              <a:defRPr>
+                <a:solidFill>
+                  <a:schemeClr val="tx1"/>
+                </a:solidFill>
+                <a:latin typeface="Calibri" panose="020F0502020204030204" pitchFamily="34" charset="0"/>
+              </a:defRPr>
+            </a:lvl2pPr>
+            <a:lvl3pPr marL="1143000" indent="-228600">
+              <a:defRPr>
+                <a:solidFill>
+                  <a:schemeClr val="tx1"/>
+                </a:solidFill>
+                <a:latin typeface="Calibri" panose="020F0502020204030204" pitchFamily="34" charset="0"/>
+              </a:defRPr>
+            </a:lvl3pPr>
+            <a:lvl4pPr marL="1600200" indent="-228600">
+              <a:defRPr>
+                <a:solidFill>
+                  <a:schemeClr val="tx1"/>
+                </a:solidFill>
+                <a:latin typeface="Calibri" panose="020F0502020204030204" pitchFamily="34" charset="0"/>
+              </a:defRPr>
+            </a:lvl4pPr>
+            <a:lvl5pPr marL="2057400" indent="-228600">
+              <a:defRPr>
+                <a:solidFill>
+                  <a:schemeClr val="tx1"/>
+                </a:solidFill>
+                <a:latin typeface="Calibri" panose="020F0502020204030204" pitchFamily="34" charset="0"/>
+              </a:defRPr>
+            </a:lvl5pPr>
+            <a:lvl6pPr marL="2514600" indent="-228600" eaLnBrk="0" fontAlgn="base" hangingPunct="0">
+              <a:spcBef>
+                <a:spcPct val="0"/>
+              </a:spcBef>
+              <a:spcAft>
+                <a:spcPct val="0"/>
+              </a:spcAft>
+              <a:defRPr>
+                <a:solidFill>
+                  <a:schemeClr val="tx1"/>
+                </a:solidFill>
+                <a:latin typeface="Calibri" panose="020F0502020204030204" pitchFamily="34" charset="0"/>
+              </a:defRPr>
+            </a:lvl6pPr>
+            <a:lvl7pPr marL="2971800" indent="-228600" eaLnBrk="0" fontAlgn="base" hangingPunct="0">
+              <a:spcBef>
+                <a:spcPct val="0"/>
+              </a:spcBef>
+              <a:spcAft>
+                <a:spcPct val="0"/>
+              </a:spcAft>
+              <a:defRPr>
+                <a:solidFill>
+                  <a:schemeClr val="tx1"/>
+                </a:solidFill>
+                <a:latin typeface="Calibri" panose="020F0502020204030204" pitchFamily="34" charset="0"/>
+              </a:defRPr>
+            </a:lvl7pPr>
+            <a:lvl8pPr marL="3429000" indent="-228600" eaLnBrk="0" fontAlgn="base" hangingPunct="0">
+              <a:spcBef>
+                <a:spcPct val="0"/>
+              </a:spcBef>
+              <a:spcAft>
+                <a:spcPct val="0"/>
+              </a:spcAft>
+              <a:defRPr>
+                <a:solidFill>
+                  <a:schemeClr val="tx1"/>
+                </a:solidFill>
+                <a:latin typeface="Calibri" panose="020F0502020204030204" pitchFamily="34" charset="0"/>
+              </a:defRPr>
+            </a:lvl8pPr>
+            <a:lvl9pPr marL="3886200" indent="-228600" eaLnBrk="0" fontAlgn="base" hangingPunct="0">
+              <a:spcBef>
+                <a:spcPct val="0"/>
+              </a:spcBef>
+              <a:spcAft>
+                <a:spcPct val="0"/>
+              </a:spcAft>
+              <a:defRPr>
+                <a:solidFill>
+                  <a:schemeClr val="tx1"/>
+                </a:solidFill>
+                <a:latin typeface="Calibri" panose="020F0502020204030204" pitchFamily="34" charset="0"/>
+              </a:defRPr>
+            </a:lvl9pPr>
+          </a:lstStyle>
+          <a:p>
+            <a:pPr algn="ctr" eaLnBrk="1" hangingPunct="1"/>
+            <a:r>
+              <a:rPr lang="en-US" altLang="en-US" sz="1100" dirty="0">
+                <a:latin typeface="Arial" panose="020B0604020202020204" pitchFamily="34" charset="0"/>
+                <a:ea typeface="Amazon Ember" panose="020B0603020204020204" pitchFamily="34" charset="0"/>
+                <a:cs typeface="Arial" panose="020B0604020202020204" pitchFamily="34" charset="0"/>
+              </a:rPr>
+              <a:t>Instance</a:t>
+            </a:r>
+          </a:p>
+        </p:txBody>
+      </p:sp>
+      <p:sp>
+        <p:nvSpPr>
+          <p:cNvPr id="69" name="TextBox 16">
+            <a:extLst>
+              <a:ext uri="{FF2B5EF4-FFF2-40B4-BE49-F238E27FC236}">
+                <a16:creationId xmlns:a16="http://schemas.microsoft.com/office/drawing/2014/main" id="{9072A64C-E361-0573-BD2D-13EBD32A8BF2}"/>
+              </a:ext>
+            </a:extLst>
+          </p:cNvPr>
+          <p:cNvSpPr txBox="1">
+            <a:spLocks noChangeArrowheads="1"/>
+          </p:cNvSpPr>
+          <p:nvPr/>
+        </p:nvSpPr>
+        <p:spPr bwMode="auto">
+          <a:xfrm>
+            <a:off x="13389681" y="7284923"/>
+            <a:ext cx="1115568" cy="261610"/>
+          </a:xfrm>
+          <a:prstGeom prst="rect">
+            <a:avLst/>
+          </a:prstGeom>
+          <a:noFill/>
+          <a:ln>
+            <a:noFill/>
+          </a:ln>
+          <a:extLst>
+            <a:ext uri="{909E8E84-426E-40DD-AFC4-6F175D3DCCD1}">
+              <a14:hiddenFill xmlns:a14="http://schemas.microsoft.com/office/drawing/2010/main">
+                <a:solidFill>
+                  <a:srgbClr val="FFFFFF"/>
+                </a:solidFill>
+              </a14:hiddenFill>
+            </a:ext>
+            <a:ext uri="{91240B29-F687-4F45-9708-019B960494DF}">
+              <a14:hiddenLine xmlns:a14="http://schemas.microsoft.com/office/drawing/2010/main" w="9525">
+                <a:solidFill>
+                  <a:srgbClr val="000000"/>
+                </a:solidFill>
+                <a:miter lim="800000"/>
+                <a:headEnd/>
+                <a:tailEnd/>
+              </a14:hiddenLine>
+            </a:ext>
+          </a:extLst>
+        </p:spPr>
+        <p:txBody>
+          <a:bodyPr wrap="square" lIns="0" rIns="0">
+            <a:spAutoFit/>
+          </a:bodyPr>
+          <a:lstStyle>
+            <a:lvl1pPr>
+              <a:defRPr>
+                <a:solidFill>
+                  <a:schemeClr val="tx1"/>
+                </a:solidFill>
+                <a:latin typeface="Calibri" panose="020F0502020204030204" pitchFamily="34" charset="0"/>
+              </a:defRPr>
+            </a:lvl1pPr>
+            <a:lvl2pPr marL="742950" indent="-285750">
+              <a:defRPr>
+                <a:solidFill>
+                  <a:schemeClr val="tx1"/>
+                </a:solidFill>
+                <a:latin typeface="Calibri" panose="020F0502020204030204" pitchFamily="34" charset="0"/>
+              </a:defRPr>
+            </a:lvl2pPr>
+            <a:lvl3pPr marL="1143000" indent="-228600">
+              <a:defRPr>
+                <a:solidFill>
+                  <a:schemeClr val="tx1"/>
+                </a:solidFill>
+                <a:latin typeface="Calibri" panose="020F0502020204030204" pitchFamily="34" charset="0"/>
+              </a:defRPr>
+            </a:lvl3pPr>
+            <a:lvl4pPr marL="1600200" indent="-228600">
+              <a:defRPr>
+                <a:solidFill>
+                  <a:schemeClr val="tx1"/>
+                </a:solidFill>
+                <a:latin typeface="Calibri" panose="020F0502020204030204" pitchFamily="34" charset="0"/>
+              </a:defRPr>
+            </a:lvl4pPr>
+            <a:lvl5pPr marL="2057400" indent="-228600">
+              <a:defRPr>
+                <a:solidFill>
+                  <a:schemeClr val="tx1"/>
+                </a:solidFill>
+                <a:latin typeface="Calibri" panose="020F0502020204030204" pitchFamily="34" charset="0"/>
+              </a:defRPr>
+            </a:lvl5pPr>
+            <a:lvl6pPr marL="2514600" indent="-228600" eaLnBrk="0" fontAlgn="base" hangingPunct="0">
+              <a:spcBef>
+                <a:spcPct val="0"/>
+              </a:spcBef>
+              <a:spcAft>
+                <a:spcPct val="0"/>
+              </a:spcAft>
+              <a:defRPr>
+                <a:solidFill>
+                  <a:schemeClr val="tx1"/>
+                </a:solidFill>
+                <a:latin typeface="Calibri" panose="020F0502020204030204" pitchFamily="34" charset="0"/>
+              </a:defRPr>
+            </a:lvl6pPr>
+            <a:lvl7pPr marL="2971800" indent="-228600" eaLnBrk="0" fontAlgn="base" hangingPunct="0">
+              <a:spcBef>
+                <a:spcPct val="0"/>
+              </a:spcBef>
+              <a:spcAft>
+                <a:spcPct val="0"/>
+              </a:spcAft>
+              <a:defRPr>
+                <a:solidFill>
+                  <a:schemeClr val="tx1"/>
+                </a:solidFill>
+                <a:latin typeface="Calibri" panose="020F0502020204030204" pitchFamily="34" charset="0"/>
+              </a:defRPr>
+            </a:lvl7pPr>
+            <a:lvl8pPr marL="3429000" indent="-228600" eaLnBrk="0" fontAlgn="base" hangingPunct="0">
+              <a:spcBef>
+                <a:spcPct val="0"/>
+              </a:spcBef>
+              <a:spcAft>
+                <a:spcPct val="0"/>
+              </a:spcAft>
+              <a:defRPr>
+                <a:solidFill>
+                  <a:schemeClr val="tx1"/>
+                </a:solidFill>
+                <a:latin typeface="Calibri" panose="020F0502020204030204" pitchFamily="34" charset="0"/>
+              </a:defRPr>
+            </a:lvl8pPr>
+            <a:lvl9pPr marL="3886200" indent="-228600" eaLnBrk="0" fontAlgn="base" hangingPunct="0">
+              <a:spcBef>
+                <a:spcPct val="0"/>
+              </a:spcBef>
+              <a:spcAft>
+                <a:spcPct val="0"/>
+              </a:spcAft>
+              <a:defRPr>
+                <a:solidFill>
+                  <a:schemeClr val="tx1"/>
+                </a:solidFill>
+                <a:latin typeface="Calibri" panose="020F0502020204030204" pitchFamily="34" charset="0"/>
+              </a:defRPr>
+            </a:lvl9pPr>
+          </a:lstStyle>
+          <a:p>
+            <a:pPr algn="ctr" eaLnBrk="1" hangingPunct="1"/>
+            <a:r>
+              <a:rPr lang="en-US" altLang="en-US" sz="1100" dirty="0">
+                <a:latin typeface="Arial" panose="020B0604020202020204" pitchFamily="34" charset="0"/>
+                <a:ea typeface="Amazon Ember" panose="020B0603020204020204" pitchFamily="34" charset="0"/>
+                <a:cs typeface="Arial" panose="020B0604020202020204" pitchFamily="34" charset="0"/>
+              </a:rPr>
+              <a:t>Instance</a:t>
+            </a:r>
+          </a:p>
+        </p:txBody>
+      </p:sp>
+      <p:sp>
+        <p:nvSpPr>
+          <p:cNvPr id="70" name="TextBox 16">
+            <a:extLst>
+              <a:ext uri="{FF2B5EF4-FFF2-40B4-BE49-F238E27FC236}">
+                <a16:creationId xmlns:a16="http://schemas.microsoft.com/office/drawing/2014/main" id="{50B0F0E6-08BE-0278-0F97-898FB0C5D18C}"/>
+              </a:ext>
+            </a:extLst>
+          </p:cNvPr>
+          <p:cNvSpPr txBox="1">
+            <a:spLocks noChangeArrowheads="1"/>
+          </p:cNvSpPr>
+          <p:nvPr/>
+        </p:nvSpPr>
+        <p:spPr bwMode="auto">
+          <a:xfrm>
+            <a:off x="6273755" y="7234479"/>
+            <a:ext cx="1115568" cy="261610"/>
+          </a:xfrm>
+          <a:prstGeom prst="rect">
+            <a:avLst/>
+          </a:prstGeom>
+          <a:noFill/>
+          <a:ln>
+            <a:noFill/>
+          </a:ln>
+          <a:extLst>
+            <a:ext uri="{909E8E84-426E-40DD-AFC4-6F175D3DCCD1}">
+              <a14:hiddenFill xmlns:a14="http://schemas.microsoft.com/office/drawing/2010/main">
+                <a:solidFill>
+                  <a:srgbClr val="FFFFFF"/>
+                </a:solidFill>
+              </a14:hiddenFill>
+            </a:ext>
+            <a:ext uri="{91240B29-F687-4F45-9708-019B960494DF}">
+              <a14:hiddenLine xmlns:a14="http://schemas.microsoft.com/office/drawing/2010/main" w="9525">
+                <a:solidFill>
+                  <a:srgbClr val="000000"/>
+                </a:solidFill>
+                <a:miter lim="800000"/>
+                <a:headEnd/>
+                <a:tailEnd/>
+              </a14:hiddenLine>
+            </a:ext>
+          </a:extLst>
+        </p:spPr>
+        <p:txBody>
+          <a:bodyPr wrap="square" lIns="0" rIns="0">
+            <a:spAutoFit/>
+          </a:bodyPr>
+          <a:lstStyle>
+            <a:lvl1pPr>
+              <a:defRPr>
+                <a:solidFill>
+                  <a:schemeClr val="tx1"/>
+                </a:solidFill>
+                <a:latin typeface="Calibri" panose="020F0502020204030204" pitchFamily="34" charset="0"/>
+              </a:defRPr>
+            </a:lvl1pPr>
+            <a:lvl2pPr marL="742950" indent="-285750">
+              <a:defRPr>
+                <a:solidFill>
+                  <a:schemeClr val="tx1"/>
+                </a:solidFill>
+                <a:latin typeface="Calibri" panose="020F0502020204030204" pitchFamily="34" charset="0"/>
+              </a:defRPr>
+            </a:lvl2pPr>
+            <a:lvl3pPr marL="1143000" indent="-228600">
+              <a:defRPr>
+                <a:solidFill>
+                  <a:schemeClr val="tx1"/>
+                </a:solidFill>
+                <a:latin typeface="Calibri" panose="020F0502020204030204" pitchFamily="34" charset="0"/>
+              </a:defRPr>
+            </a:lvl3pPr>
+            <a:lvl4pPr marL="1600200" indent="-228600">
+              <a:defRPr>
+                <a:solidFill>
+                  <a:schemeClr val="tx1"/>
+                </a:solidFill>
+                <a:latin typeface="Calibri" panose="020F0502020204030204" pitchFamily="34" charset="0"/>
+              </a:defRPr>
+            </a:lvl4pPr>
+            <a:lvl5pPr marL="2057400" indent="-228600">
+              <a:defRPr>
+                <a:solidFill>
+                  <a:schemeClr val="tx1"/>
+                </a:solidFill>
+                <a:latin typeface="Calibri" panose="020F0502020204030204" pitchFamily="34" charset="0"/>
+              </a:defRPr>
+            </a:lvl5pPr>
+            <a:lvl6pPr marL="2514600" indent="-228600" eaLnBrk="0" fontAlgn="base" hangingPunct="0">
+              <a:spcBef>
+                <a:spcPct val="0"/>
+              </a:spcBef>
+              <a:spcAft>
+                <a:spcPct val="0"/>
+              </a:spcAft>
+              <a:defRPr>
+                <a:solidFill>
+                  <a:schemeClr val="tx1"/>
+                </a:solidFill>
+                <a:latin typeface="Calibri" panose="020F0502020204030204" pitchFamily="34" charset="0"/>
+              </a:defRPr>
+            </a:lvl6pPr>
+            <a:lvl7pPr marL="2971800" indent="-228600" eaLnBrk="0" fontAlgn="base" hangingPunct="0">
+              <a:spcBef>
+                <a:spcPct val="0"/>
+              </a:spcBef>
+              <a:spcAft>
+                <a:spcPct val="0"/>
+              </a:spcAft>
+              <a:defRPr>
+                <a:solidFill>
+                  <a:schemeClr val="tx1"/>
+                </a:solidFill>
+                <a:latin typeface="Calibri" panose="020F0502020204030204" pitchFamily="34" charset="0"/>
+              </a:defRPr>
+            </a:lvl7pPr>
+            <a:lvl8pPr marL="3429000" indent="-228600" eaLnBrk="0" fontAlgn="base" hangingPunct="0">
+              <a:spcBef>
+                <a:spcPct val="0"/>
+              </a:spcBef>
+              <a:spcAft>
+                <a:spcPct val="0"/>
+              </a:spcAft>
+              <a:defRPr>
+                <a:solidFill>
+                  <a:schemeClr val="tx1"/>
+                </a:solidFill>
+                <a:latin typeface="Calibri" panose="020F0502020204030204" pitchFamily="34" charset="0"/>
+              </a:defRPr>
+            </a:lvl8pPr>
+            <a:lvl9pPr marL="3886200" indent="-228600" eaLnBrk="0" fontAlgn="base" hangingPunct="0">
+              <a:spcBef>
+                <a:spcPct val="0"/>
+              </a:spcBef>
+              <a:spcAft>
+                <a:spcPct val="0"/>
+              </a:spcAft>
+              <a:defRPr>
+                <a:solidFill>
+                  <a:schemeClr val="tx1"/>
+                </a:solidFill>
+                <a:latin typeface="Calibri" panose="020F0502020204030204" pitchFamily="34" charset="0"/>
+              </a:defRPr>
+            </a:lvl9pPr>
+          </a:lstStyle>
+          <a:p>
+            <a:pPr algn="ctr" eaLnBrk="1" hangingPunct="1"/>
+            <a:r>
+              <a:rPr lang="en-US" altLang="en-US" sz="1100" dirty="0">
+                <a:latin typeface="Arial" panose="020B0604020202020204" pitchFamily="34" charset="0"/>
+                <a:ea typeface="Amazon Ember" panose="020B0603020204020204" pitchFamily="34" charset="0"/>
+                <a:cs typeface="Arial" panose="020B0604020202020204" pitchFamily="34" charset="0"/>
+              </a:rPr>
+              <a:t>Instance</a:t>
+            </a:r>
+          </a:p>
+        </p:txBody>
+      </p:sp>
+      <p:sp>
+        <p:nvSpPr>
+          <p:cNvPr id="71" name="TextBox 16">
+            <a:extLst>
+              <a:ext uri="{FF2B5EF4-FFF2-40B4-BE49-F238E27FC236}">
+                <a16:creationId xmlns:a16="http://schemas.microsoft.com/office/drawing/2014/main" id="{80472F09-1B85-754D-0C69-D8BDFA22BDE2}"/>
+              </a:ext>
+            </a:extLst>
+          </p:cNvPr>
+          <p:cNvSpPr txBox="1">
+            <a:spLocks noChangeArrowheads="1"/>
+          </p:cNvSpPr>
+          <p:nvPr/>
+        </p:nvSpPr>
+        <p:spPr bwMode="auto">
+          <a:xfrm>
+            <a:off x="15141697" y="7337555"/>
+            <a:ext cx="1115568" cy="261610"/>
+          </a:xfrm>
+          <a:prstGeom prst="rect">
+            <a:avLst/>
+          </a:prstGeom>
+          <a:noFill/>
+          <a:ln>
+            <a:noFill/>
+          </a:ln>
+          <a:extLst>
+            <a:ext uri="{909E8E84-426E-40DD-AFC4-6F175D3DCCD1}">
+              <a14:hiddenFill xmlns:a14="http://schemas.microsoft.com/office/drawing/2010/main">
+                <a:solidFill>
+                  <a:srgbClr val="FFFFFF"/>
+                </a:solidFill>
+              </a14:hiddenFill>
+            </a:ext>
+            <a:ext uri="{91240B29-F687-4F45-9708-019B960494DF}">
+              <a14:hiddenLine xmlns:a14="http://schemas.microsoft.com/office/drawing/2010/main" w="9525">
+                <a:solidFill>
+                  <a:srgbClr val="000000"/>
+                </a:solidFill>
+                <a:miter lim="800000"/>
+                <a:headEnd/>
+                <a:tailEnd/>
+              </a14:hiddenLine>
+            </a:ext>
+          </a:extLst>
+        </p:spPr>
+        <p:txBody>
+          <a:bodyPr wrap="square" lIns="0" rIns="0">
+            <a:spAutoFit/>
+          </a:bodyPr>
+          <a:lstStyle>
+            <a:lvl1pPr>
+              <a:defRPr>
+                <a:solidFill>
+                  <a:schemeClr val="tx1"/>
+                </a:solidFill>
+                <a:latin typeface="Calibri" panose="020F0502020204030204" pitchFamily="34" charset="0"/>
+              </a:defRPr>
+            </a:lvl1pPr>
+            <a:lvl2pPr marL="742950" indent="-285750">
+              <a:defRPr>
+                <a:solidFill>
+                  <a:schemeClr val="tx1"/>
+                </a:solidFill>
+                <a:latin typeface="Calibri" panose="020F0502020204030204" pitchFamily="34" charset="0"/>
+              </a:defRPr>
+            </a:lvl2pPr>
+            <a:lvl3pPr marL="1143000" indent="-228600">
+              <a:defRPr>
+                <a:solidFill>
+                  <a:schemeClr val="tx1"/>
+                </a:solidFill>
+                <a:latin typeface="Calibri" panose="020F0502020204030204" pitchFamily="34" charset="0"/>
+              </a:defRPr>
+            </a:lvl3pPr>
+            <a:lvl4pPr marL="1600200" indent="-228600">
+              <a:defRPr>
+                <a:solidFill>
+                  <a:schemeClr val="tx1"/>
+                </a:solidFill>
+                <a:latin typeface="Calibri" panose="020F0502020204030204" pitchFamily="34" charset="0"/>
+              </a:defRPr>
+            </a:lvl4pPr>
+            <a:lvl5pPr marL="2057400" indent="-228600">
+              <a:defRPr>
+                <a:solidFill>
+                  <a:schemeClr val="tx1"/>
+                </a:solidFill>
+                <a:latin typeface="Calibri" panose="020F0502020204030204" pitchFamily="34" charset="0"/>
+              </a:defRPr>
+            </a:lvl5pPr>
+            <a:lvl6pPr marL="2514600" indent="-228600" eaLnBrk="0" fontAlgn="base" hangingPunct="0">
+              <a:spcBef>
+                <a:spcPct val="0"/>
+              </a:spcBef>
+              <a:spcAft>
+                <a:spcPct val="0"/>
+              </a:spcAft>
+              <a:defRPr>
+                <a:solidFill>
+                  <a:schemeClr val="tx1"/>
+                </a:solidFill>
+                <a:latin typeface="Calibri" panose="020F0502020204030204" pitchFamily="34" charset="0"/>
+              </a:defRPr>
+            </a:lvl6pPr>
+            <a:lvl7pPr marL="2971800" indent="-228600" eaLnBrk="0" fontAlgn="base" hangingPunct="0">
+              <a:spcBef>
+                <a:spcPct val="0"/>
+              </a:spcBef>
+              <a:spcAft>
+                <a:spcPct val="0"/>
+              </a:spcAft>
+              <a:defRPr>
+                <a:solidFill>
+                  <a:schemeClr val="tx1"/>
+                </a:solidFill>
+                <a:latin typeface="Calibri" panose="020F0502020204030204" pitchFamily="34" charset="0"/>
+              </a:defRPr>
+            </a:lvl7pPr>
+            <a:lvl8pPr marL="3429000" indent="-228600" eaLnBrk="0" fontAlgn="base" hangingPunct="0">
+              <a:spcBef>
+                <a:spcPct val="0"/>
+              </a:spcBef>
+              <a:spcAft>
+                <a:spcPct val="0"/>
+              </a:spcAft>
+              <a:defRPr>
+                <a:solidFill>
+                  <a:schemeClr val="tx1"/>
+                </a:solidFill>
+                <a:latin typeface="Calibri" panose="020F0502020204030204" pitchFamily="34" charset="0"/>
+              </a:defRPr>
+            </a:lvl8pPr>
+            <a:lvl9pPr marL="3886200" indent="-228600" eaLnBrk="0" fontAlgn="base" hangingPunct="0">
+              <a:spcBef>
+                <a:spcPct val="0"/>
+              </a:spcBef>
+              <a:spcAft>
+                <a:spcPct val="0"/>
+              </a:spcAft>
+              <a:defRPr>
+                <a:solidFill>
+                  <a:schemeClr val="tx1"/>
+                </a:solidFill>
+                <a:latin typeface="Calibri" panose="020F0502020204030204" pitchFamily="34" charset="0"/>
+              </a:defRPr>
+            </a:lvl9pPr>
+          </a:lstStyle>
+          <a:p>
+            <a:pPr algn="ctr" eaLnBrk="1" hangingPunct="1"/>
+            <a:r>
+              <a:rPr lang="en-US" altLang="en-US" sz="1100" dirty="0">
+                <a:latin typeface="Arial" panose="020B0604020202020204" pitchFamily="34" charset="0"/>
+                <a:ea typeface="Amazon Ember" panose="020B0603020204020204" pitchFamily="34" charset="0"/>
+                <a:cs typeface="Arial" panose="020B0604020202020204" pitchFamily="34" charset="0"/>
+              </a:rPr>
+              <a:t>Instance</a:t>
+            </a:r>
+          </a:p>
+        </p:txBody>
+      </p:sp>
+      <p:pic>
+        <p:nvPicPr>
+          <p:cNvPr id="72" name="Graphic 8">
+            <a:extLst>
+              <a:ext uri="{FF2B5EF4-FFF2-40B4-BE49-F238E27FC236}">
+                <a16:creationId xmlns:a16="http://schemas.microsoft.com/office/drawing/2014/main" id="{1B6794AE-43DA-E350-7E93-0AF0D48ADA97}"/>
+              </a:ext>
+            </a:extLst>
+          </p:cNvPr>
+          <p:cNvPicPr>
+            <a:picLocks noChangeAspect="1" noChangeArrowheads="1"/>
+          </p:cNvPicPr>
+          <p:nvPr/>
+        </p:nvPicPr>
+        <p:blipFill>
+          <a:blip r:embed="rId9">
+            <a:extLst>
+              <a:ext uri="{28A0092B-C50C-407E-A947-70E740481C1C}">
+                <a14:useLocalDpi xmlns:a14="http://schemas.microsoft.com/office/drawing/2010/main" val="0"/>
+              </a:ext>
+            </a:extLst>
+          </a:blip>
+          <a:srcRect/>
+          <a:stretch>
+            <a:fillRect/>
+          </a:stretch>
+        </p:blipFill>
+        <p:spPr bwMode="auto">
+          <a:xfrm flipV="1">
+            <a:off x="10155490" y="3279825"/>
+            <a:ext cx="410609" cy="410609"/>
+          </a:xfrm>
+          <a:prstGeom prst="rect">
+            <a:avLst/>
+          </a:prstGeom>
+          <a:noFill/>
+          <a:ln>
+            <a:noFill/>
+          </a:ln>
+          <a:extLst>
+            <a:ext uri="{909E8E84-426E-40DD-AFC4-6F175D3DCCD1}">
+              <a14:hiddenFill xmlns:a14="http://schemas.microsoft.com/office/drawing/2010/main">
+                <a:solidFill>
+                  <a:srgbClr val="FFFFFF"/>
+                </a:solidFill>
+              </a14:hiddenFill>
+            </a:ext>
+            <a:ext uri="{91240B29-F687-4F45-9708-019B960494DF}">
+              <a14:hiddenLine xmlns:a14="http://schemas.microsoft.com/office/drawing/2010/main" w="9525">
+                <a:solidFill>
+                  <a:srgbClr val="000000"/>
+                </a:solidFill>
+                <a:miter lim="800000"/>
+                <a:headEnd/>
+                <a:tailEnd/>
+              </a14:hiddenLine>
+            </a:ext>
+          </a:extLst>
+        </p:spPr>
+      </p:pic>
+      <p:sp>
+        <p:nvSpPr>
+          <p:cNvPr id="73" name="TextBox 19">
+            <a:extLst>
+              <a:ext uri="{FF2B5EF4-FFF2-40B4-BE49-F238E27FC236}">
+                <a16:creationId xmlns:a16="http://schemas.microsoft.com/office/drawing/2014/main" id="{3BCA8C64-ED59-4F99-325A-841375788408}"/>
+              </a:ext>
+            </a:extLst>
+          </p:cNvPr>
+          <p:cNvSpPr txBox="1">
+            <a:spLocks noChangeArrowheads="1"/>
+          </p:cNvSpPr>
+          <p:nvPr/>
+        </p:nvSpPr>
+        <p:spPr bwMode="auto">
+          <a:xfrm>
+            <a:off x="9707507" y="3951022"/>
+            <a:ext cx="1252536" cy="430887"/>
+          </a:xfrm>
+          <a:prstGeom prst="rect">
+            <a:avLst/>
+          </a:prstGeom>
+          <a:noFill/>
+          <a:ln>
+            <a:noFill/>
+          </a:ln>
+          <a:extLst>
+            <a:ext uri="{909E8E84-426E-40DD-AFC4-6F175D3DCCD1}">
+              <a14:hiddenFill xmlns:a14="http://schemas.microsoft.com/office/drawing/2010/main">
+                <a:solidFill>
+                  <a:srgbClr val="FFFFFF"/>
+                </a:solidFill>
+              </a14:hiddenFill>
+            </a:ext>
+            <a:ext uri="{91240B29-F687-4F45-9708-019B960494DF}">
+              <a14:hiddenLine xmlns:a14="http://schemas.microsoft.com/office/drawing/2010/main" w="9525">
+                <a:solidFill>
+                  <a:srgbClr val="000000"/>
+                </a:solidFill>
+                <a:miter lim="800000"/>
+                <a:headEnd/>
+                <a:tailEnd/>
+              </a14:hiddenLine>
+            </a:ext>
+          </a:extLst>
+        </p:spPr>
+        <p:txBody>
+          <a:bodyPr wrap="square">
+            <a:spAutoFit/>
+          </a:bodyPr>
+          <a:lstStyle>
+            <a:lvl1pPr>
+              <a:defRPr>
+                <a:solidFill>
+                  <a:schemeClr val="tx1"/>
+                </a:solidFill>
+                <a:latin typeface="Calibri" panose="020F0502020204030204" pitchFamily="34" charset="0"/>
+              </a:defRPr>
+            </a:lvl1pPr>
+            <a:lvl2pPr marL="742950" indent="-285750">
+              <a:defRPr>
+                <a:solidFill>
+                  <a:schemeClr val="tx1"/>
+                </a:solidFill>
+                <a:latin typeface="Calibri" panose="020F0502020204030204" pitchFamily="34" charset="0"/>
+              </a:defRPr>
+            </a:lvl2pPr>
+            <a:lvl3pPr marL="1143000" indent="-228600">
+              <a:defRPr>
+                <a:solidFill>
+                  <a:schemeClr val="tx1"/>
+                </a:solidFill>
+                <a:latin typeface="Calibri" panose="020F0502020204030204" pitchFamily="34" charset="0"/>
+              </a:defRPr>
+            </a:lvl3pPr>
+            <a:lvl4pPr marL="1600200" indent="-228600">
+              <a:defRPr>
+                <a:solidFill>
+                  <a:schemeClr val="tx1"/>
+                </a:solidFill>
+                <a:latin typeface="Calibri" panose="020F0502020204030204" pitchFamily="34" charset="0"/>
+              </a:defRPr>
+            </a:lvl4pPr>
+            <a:lvl5pPr marL="2057400" indent="-228600">
+              <a:defRPr>
+                <a:solidFill>
+                  <a:schemeClr val="tx1"/>
+                </a:solidFill>
+                <a:latin typeface="Calibri" panose="020F0502020204030204" pitchFamily="34" charset="0"/>
+              </a:defRPr>
+            </a:lvl5pPr>
+            <a:lvl6pPr marL="2514600" indent="-228600" eaLnBrk="0" fontAlgn="base" hangingPunct="0">
+              <a:spcBef>
+                <a:spcPct val="0"/>
+              </a:spcBef>
+              <a:spcAft>
+                <a:spcPct val="0"/>
+              </a:spcAft>
+              <a:defRPr>
+                <a:solidFill>
+                  <a:schemeClr val="tx1"/>
+                </a:solidFill>
+                <a:latin typeface="Calibri" panose="020F0502020204030204" pitchFamily="34" charset="0"/>
+              </a:defRPr>
+            </a:lvl6pPr>
+            <a:lvl7pPr marL="2971800" indent="-228600" eaLnBrk="0" fontAlgn="base" hangingPunct="0">
+              <a:spcBef>
+                <a:spcPct val="0"/>
+              </a:spcBef>
+              <a:spcAft>
+                <a:spcPct val="0"/>
+              </a:spcAft>
+              <a:defRPr>
+                <a:solidFill>
+                  <a:schemeClr val="tx1"/>
+                </a:solidFill>
+                <a:latin typeface="Calibri" panose="020F0502020204030204" pitchFamily="34" charset="0"/>
+              </a:defRPr>
+            </a:lvl7pPr>
+            <a:lvl8pPr marL="3429000" indent="-228600" eaLnBrk="0" fontAlgn="base" hangingPunct="0">
+              <a:spcBef>
+                <a:spcPct val="0"/>
+              </a:spcBef>
+              <a:spcAft>
+                <a:spcPct val="0"/>
+              </a:spcAft>
+              <a:defRPr>
+                <a:solidFill>
+                  <a:schemeClr val="tx1"/>
+                </a:solidFill>
+                <a:latin typeface="Calibri" panose="020F0502020204030204" pitchFamily="34" charset="0"/>
+              </a:defRPr>
+            </a:lvl8pPr>
+            <a:lvl9pPr marL="3886200" indent="-228600" eaLnBrk="0" fontAlgn="base" hangingPunct="0">
+              <a:spcBef>
+                <a:spcPct val="0"/>
+              </a:spcBef>
+              <a:spcAft>
+                <a:spcPct val="0"/>
+              </a:spcAft>
+              <a:defRPr>
+                <a:solidFill>
+                  <a:schemeClr val="tx1"/>
+                </a:solidFill>
+                <a:latin typeface="Calibri" panose="020F0502020204030204" pitchFamily="34" charset="0"/>
+              </a:defRPr>
+            </a:lvl9pPr>
+          </a:lstStyle>
+          <a:p>
+            <a:pPr algn="ctr" eaLnBrk="1" hangingPunct="1"/>
+            <a:r>
+              <a:rPr lang="en-US" altLang="en-US" sz="1100" dirty="0">
+                <a:latin typeface="Arial" panose="020B0604020202020204" pitchFamily="34" charset="0"/>
+                <a:ea typeface="Amazon Ember" panose="020B0603020204020204" pitchFamily="34" charset="0"/>
+                <a:cs typeface="Arial" panose="020B0604020202020204" pitchFamily="34" charset="0"/>
+              </a:rPr>
+              <a:t>Application Load </a:t>
+            </a:r>
+            <a:br>
+              <a:rPr lang="en-US" altLang="en-US" sz="1100" dirty="0">
+                <a:latin typeface="Arial" panose="020B0604020202020204" pitchFamily="34" charset="0"/>
+                <a:ea typeface="Amazon Ember" panose="020B0603020204020204" pitchFamily="34" charset="0"/>
+                <a:cs typeface="Arial" panose="020B0604020202020204" pitchFamily="34" charset="0"/>
+              </a:rPr>
+            </a:br>
+            <a:r>
+              <a:rPr lang="en-US" altLang="en-US" sz="1100" dirty="0">
+                <a:latin typeface="Arial" panose="020B0604020202020204" pitchFamily="34" charset="0"/>
+                <a:ea typeface="Amazon Ember" panose="020B0603020204020204" pitchFamily="34" charset="0"/>
+                <a:cs typeface="Arial" panose="020B0604020202020204" pitchFamily="34" charset="0"/>
+              </a:rPr>
+              <a:t>Balancer</a:t>
+            </a:r>
+          </a:p>
+        </p:txBody>
+      </p:sp>
+      <p:sp>
+        <p:nvSpPr>
+          <p:cNvPr id="74" name="Rectangle 73">
+            <a:extLst>
+              <a:ext uri="{FF2B5EF4-FFF2-40B4-BE49-F238E27FC236}">
+                <a16:creationId xmlns:a16="http://schemas.microsoft.com/office/drawing/2014/main" id="{2F51F5E0-B1FF-5DC8-2E03-4F0A782205BA}"/>
+              </a:ext>
+            </a:extLst>
+          </p:cNvPr>
+          <p:cNvSpPr/>
+          <p:nvPr/>
+        </p:nvSpPr>
+        <p:spPr>
+          <a:xfrm>
+            <a:off x="4379454" y="6336195"/>
+            <a:ext cx="12180741" cy="1489368"/>
+          </a:xfrm>
+          <a:prstGeom prst="rect">
+            <a:avLst/>
+          </a:prstGeom>
+          <a:noFill/>
+          <a:ln w="12700">
+            <a:solidFill>
+              <a:srgbClr val="5A6B86"/>
+            </a:solidFill>
+            <a:prstDash val="dash"/>
+          </a:ln>
+        </p:spPr>
+        <p:style>
+          <a:lnRef idx="2">
+            <a:schemeClr val="accent1">
+              <a:shade val="50000"/>
+            </a:schemeClr>
+          </a:lnRef>
+          <a:fillRef idx="1">
+            <a:schemeClr val="accent1"/>
+          </a:fillRef>
+          <a:effectRef idx="0">
+            <a:schemeClr val="accent1"/>
+          </a:effectRef>
+          <a:fontRef idx="minor">
+            <a:schemeClr val="lt1"/>
+          </a:fontRef>
+        </p:style>
+        <p:txBody>
+          <a:bodyPr tIns="91440"/>
+          <a:lstStyle/>
+          <a:p>
+            <a:pPr algn="ctr" eaLnBrk="1" fontAlgn="auto" hangingPunct="1">
+              <a:spcBef>
+                <a:spcPts val="0"/>
+              </a:spcBef>
+              <a:spcAft>
+                <a:spcPts val="0"/>
+              </a:spcAft>
+              <a:defRPr/>
+            </a:pPr>
+            <a:r>
+              <a:rPr lang="en-US" sz="1200" dirty="0">
+                <a:solidFill>
+                  <a:srgbClr val="5A6B86"/>
+                </a:solidFill>
+                <a:latin typeface="Arial" panose="020B0604020202020204" pitchFamily="34" charset="0"/>
+                <a:cs typeface="Arial" panose="020B0604020202020204" pitchFamily="34" charset="0"/>
+              </a:rPr>
+              <a:t>Generic group</a:t>
+            </a:r>
+          </a:p>
+        </p:txBody>
+      </p:sp>
+    </p:spTree>
+    <p:extLst>
+      <p:ext uri="{BB962C8B-B14F-4D97-AF65-F5344CB8AC3E}">
+        <p14:creationId xmlns:p14="http://schemas.microsoft.com/office/powerpoint/2010/main" val="383250449"/>
+      </p:ext>
+    </p:extLst>
+  </p:cSld>
+  <p:clrMapOvr>
+    <a:masterClrMapping/>
+  </p:clrMapOvr>
+</p:sld>
+</file>
+
+<file path=ppt/slides/slide2.xml><?xml version="1.0" encoding="utf-8"?>
+<p:sld xmlns:a="http://schemas.openxmlformats.org/drawingml/2006/main" xmlns:r="http://schemas.openxmlformats.org/officeDocument/2006/relationships" xmlns:p="http://schemas.openxmlformats.org/presentationml/2006/main">
+  <p:cSld>
+    <p:spTree>
+      <p:nvGrpSpPr>
+        <p:cNvPr id="1" name=""/>
+        <p:cNvGrpSpPr/>
+        <p:nvPr/>
+      </p:nvGrpSpPr>
+      <p:grpSpPr>
+        <a:xfrm>
+          <a:off x="0" y="0"/>
+          <a:ext cx="0" cy="0"/>
+          <a:chOff x="0" y="0"/>
+          <a:chExt cx="0" cy="0"/>
+        </a:xfrm>
+      </p:grpSpPr>
+      <p:sp>
+        <p:nvSpPr>
           <p:cNvPr id="58" name="Rectangle 57">
             <a:extLst>
               <a:ext uri="{FF2B5EF4-FFF2-40B4-BE49-F238E27FC236}">
@@ -4922,6 +7742,41 @@
                 <a:cs typeface="Arial" panose="020B0604020202020204" pitchFamily="34" charset="0"/>
               </a:rPr>
               <a:t>35% Traffic</a:t>
+            </a:r>
+          </a:p>
+        </p:txBody>
+      </p:sp>
+      <p:sp>
+        <p:nvSpPr>
+          <p:cNvPr id="3" name="TextBox 2">
+            <a:extLst>
+              <a:ext uri="{FF2B5EF4-FFF2-40B4-BE49-F238E27FC236}">
+                <a16:creationId xmlns:a16="http://schemas.microsoft.com/office/drawing/2014/main" id="{003C276A-B9B7-35DE-9F30-CDD5220D36F7}"/>
+              </a:ext>
+            </a:extLst>
+          </p:cNvPr>
+          <p:cNvSpPr txBox="1"/>
+          <p:nvPr/>
+        </p:nvSpPr>
+        <p:spPr>
+          <a:xfrm>
+            <a:off x="6677247" y="1105786"/>
+            <a:ext cx="936475" cy="369332"/>
+          </a:xfrm>
+          <a:prstGeom prst="rect">
+            <a:avLst/>
+          </a:prstGeom>
+          <a:noFill/>
+        </p:spPr>
+        <p:txBody>
+          <a:bodyPr wrap="none" rtlCol="0">
+            <a:spAutoFit/>
+          </a:bodyPr>
+          <a:lstStyle/>
+          <a:p>
+            <a:r>
+              <a:rPr lang="en-US" b="1" dirty="0"/>
+              <a:t>Original</a:t>
             </a:r>
           </a:p>
         </p:txBody>
@@ -5198,4 +8053,299 @@
     </a:ext>
   </a:extLst>
 </a:theme>
+</file>
+
+<file path=ppt/theme/theme2.xml><?xml version="1.0" encoding="utf-8"?>
+<a:theme xmlns:a="http://schemas.openxmlformats.org/drawingml/2006/main" name="Office Theme">
+  <a:themeElements>
+    <a:clrScheme name="Office">
+      <a:dk1>
+        <a:sysClr val="windowText" lastClr="000000"/>
+      </a:dk1>
+      <a:lt1>
+        <a:sysClr val="window" lastClr="FFFFFF"/>
+      </a:lt1>
+      <a:dk2>
+        <a:srgbClr val="44546A"/>
+      </a:dk2>
+      <a:lt2>
+        <a:srgbClr val="E7E6E6"/>
+      </a:lt2>
+      <a:accent1>
+        <a:srgbClr val="4472C4"/>
+      </a:accent1>
+      <a:accent2>
+        <a:srgbClr val="ED7D31"/>
+      </a:accent2>
+      <a:accent3>
+        <a:srgbClr val="A5A5A5"/>
+      </a:accent3>
+      <a:accent4>
+        <a:srgbClr val="FFC000"/>
+      </a:accent4>
+      <a:accent5>
+        <a:srgbClr val="5B9BD5"/>
+      </a:accent5>
+      <a:accent6>
+        <a:srgbClr val="70AD47"/>
+      </a:accent6>
+      <a:hlink>
+        <a:srgbClr val="0563C1"/>
+      </a:hlink>
+      <a:folHlink>
+        <a:srgbClr val="954F72"/>
+      </a:folHlink>
+    </a:clrScheme>
+    <a:fontScheme name="Office">
+      <a:majorFont>
+        <a:latin typeface="Calibri Light" panose="020F0302020204030204"/>
+        <a:ea typeface=""/>
+        <a:cs typeface=""/>
+        <a:font script="Jpan" typeface="游ゴシック Light"/>
+        <a:font script="Hang" typeface="맑은 고딕"/>
+        <a:font script="Hans" typeface="等线 Light"/>
+        <a:font script="Hant" typeface="新細明體"/>
+        <a:font script="Arab" typeface="Times New Roman"/>
+        <a:font script="Hebr" typeface="Times New Roman"/>
+        <a:font script="Thai" typeface="Angsana New"/>
+        <a:font script="Ethi" typeface="Nyala"/>
+        <a:font script="Beng" typeface="Vrinda"/>
+        <a:font script="Gujr" typeface="Shruti"/>
+        <a:font script="Khmr" typeface="MoolBoran"/>
+        <a:font script="Knda" typeface="Tunga"/>
+        <a:font script="Guru" typeface="Raavi"/>
+        <a:font script="Cans" typeface="Euphemia"/>
+        <a:font script="Cher" typeface="Plantagenet Cherokee"/>
+        <a:font script="Yiii" typeface="Microsoft Yi Baiti"/>
+        <a:font script="Tibt" typeface="Microsoft Himalaya"/>
+        <a:font script="Thaa" typeface="MV Boli"/>
+        <a:font script="Deva" typeface="Mangal"/>
+        <a:font script="Telu" typeface="Gautami"/>
+        <a:font script="Taml" typeface="Latha"/>
+        <a:font script="Syrc" typeface="Estrangelo Edessa"/>
+        <a:font script="Orya" typeface="Kalinga"/>
+        <a:font script="Mlym" typeface="Kartika"/>
+        <a:font script="Laoo" typeface="DokChampa"/>
+        <a:font script="Sinh" typeface="Iskoola Pota"/>
+        <a:font script="Mong" typeface="Mongolian Baiti"/>
+        <a:font script="Viet" typeface="Times New Roman"/>
+        <a:font script="Uigh" typeface="Microsoft Uighur"/>
+        <a:font script="Geor" typeface="Sylfaen"/>
+        <a:font script="Armn" typeface="Arial"/>
+        <a:font script="Bugi" typeface="Leelawadee UI"/>
+        <a:font script="Bopo" typeface="Microsoft JhengHei"/>
+        <a:font script="Java" typeface="Javanese Text"/>
+        <a:font script="Lisu" typeface="Segoe UI"/>
+        <a:font script="Mymr" typeface="Myanmar Text"/>
+        <a:font script="Nkoo" typeface="Ebrima"/>
+        <a:font script="Olck" typeface="Nirmala UI"/>
+        <a:font script="Osma" typeface="Ebrima"/>
+        <a:font script="Phag" typeface="Phagspa"/>
+        <a:font script="Syrn" typeface="Estrangelo Edessa"/>
+        <a:font script="Syrj" typeface="Estrangelo Edessa"/>
+        <a:font script="Syre" typeface="Estrangelo Edessa"/>
+        <a:font script="Sora" typeface="Nirmala UI"/>
+        <a:font script="Tale" typeface="Microsoft Tai Le"/>
+        <a:font script="Talu" typeface="Microsoft New Tai Lue"/>
+        <a:font script="Tfng" typeface="Ebrima"/>
+      </a:majorFont>
+      <a:minorFont>
+        <a:latin typeface="Calibri" panose="020F0502020204030204"/>
+        <a:ea typeface=""/>
+        <a:cs typeface=""/>
+        <a:font script="Jpan" typeface="游ゴシック"/>
+        <a:font script="Hang" typeface="맑은 고딕"/>
+        <a:font script="Hans" typeface="等线"/>
+        <a:font script="Hant" typeface="新細明體"/>
+        <a:font script="Arab" typeface="Arial"/>
+        <a:font script="Hebr" typeface="Arial"/>
+        <a:font script="Thai" typeface="Cordia New"/>
+        <a:font script="Ethi" typeface="Nyala"/>
+        <a:font script="Beng" typeface="Vrinda"/>
+        <a:font script="Gujr" typeface="Shruti"/>
+        <a:font script="Khmr" typeface="DaunPenh"/>
+        <a:font script="Knda" typeface="Tunga"/>
+        <a:font script="Guru" typeface="Raavi"/>
+        <a:font script="Cans" typeface="Euphemia"/>
+        <a:font script="Cher" typeface="Plantagenet Cherokee"/>
+        <a:font script="Yiii" typeface="Microsoft Yi Baiti"/>
+        <a:font script="Tibt" typeface="Microsoft Himalaya"/>
+        <a:font script="Thaa" typeface="MV Boli"/>
+        <a:font script="Deva" typeface="Mangal"/>
+        <a:font script="Telu" typeface="Gautami"/>
+        <a:font script="Taml" typeface="Latha"/>
+        <a:font script="Syrc" typeface="Estrangelo Edessa"/>
+        <a:font script="Orya" typeface="Kalinga"/>
+        <a:font script="Mlym" typeface="Kartika"/>
+        <a:font script="Laoo" typeface="DokChampa"/>
+        <a:font script="Sinh" typeface="Iskoola Pota"/>
+        <a:font script="Mong" typeface="Mongolian Baiti"/>
+        <a:font script="Viet" typeface="Arial"/>
+        <a:font script="Uigh" typeface="Microsoft Uighur"/>
+        <a:font script="Geor" typeface="Sylfaen"/>
+        <a:font script="Armn" typeface="Arial"/>
+        <a:font script="Bugi" typeface="Leelawadee UI"/>
+        <a:font script="Bopo" typeface="Microsoft JhengHei"/>
+        <a:font script="Java" typeface="Javanese Text"/>
+        <a:font script="Lisu" typeface="Segoe UI"/>
+        <a:font script="Mymr" typeface="Myanmar Text"/>
+        <a:font script="Nkoo" typeface="Ebrima"/>
+        <a:font script="Olck" typeface="Nirmala UI"/>
+        <a:font script="Osma" typeface="Ebrima"/>
+        <a:font script="Phag" typeface="Phagspa"/>
+        <a:font script="Syrn" typeface="Estrangelo Edessa"/>
+        <a:font script="Syrj" typeface="Estrangelo Edessa"/>
+        <a:font script="Syre" typeface="Estrangelo Edessa"/>
+        <a:font script="Sora" typeface="Nirmala UI"/>
+        <a:font script="Tale" typeface="Microsoft Tai Le"/>
+        <a:font script="Talu" typeface="Microsoft New Tai Lue"/>
+        <a:font script="Tfng" typeface="Ebrima"/>
+      </a:minorFont>
+    </a:fontScheme>
+    <a:fmtScheme name="Office">
+      <a:fillStyleLst>
+        <a:solidFill>
+          <a:schemeClr val="phClr"/>
+        </a:solidFill>
+        <a:gradFill rotWithShape="1">
+          <a:gsLst>
+            <a:gs pos="0">
+              <a:schemeClr val="phClr">
+                <a:lumMod val="110000"/>
+                <a:satMod val="105000"/>
+                <a:tint val="67000"/>
+              </a:schemeClr>
+            </a:gs>
+            <a:gs pos="50000">
+              <a:schemeClr val="phClr">
+                <a:lumMod val="105000"/>
+                <a:satMod val="103000"/>
+                <a:tint val="73000"/>
+              </a:schemeClr>
+            </a:gs>
+            <a:gs pos="100000">
+              <a:schemeClr val="phClr">
+                <a:lumMod val="105000"/>
+                <a:satMod val="109000"/>
+                <a:tint val="81000"/>
+              </a:schemeClr>
+            </a:gs>
+          </a:gsLst>
+          <a:lin ang="5400000" scaled="0"/>
+        </a:gradFill>
+        <a:gradFill rotWithShape="1">
+          <a:gsLst>
+            <a:gs pos="0">
+              <a:schemeClr val="phClr">
+                <a:satMod val="103000"/>
+                <a:lumMod val="102000"/>
+                <a:tint val="94000"/>
+              </a:schemeClr>
+            </a:gs>
+            <a:gs pos="50000">
+              <a:schemeClr val="phClr">
+                <a:satMod val="110000"/>
+                <a:lumMod val="100000"/>
+                <a:shade val="100000"/>
+              </a:schemeClr>
+            </a:gs>
+            <a:gs pos="100000">
+              <a:schemeClr val="phClr">
+                <a:lumMod val="99000"/>
+                <a:satMod val="120000"/>
+                <a:shade val="78000"/>
+              </a:schemeClr>
+            </a:gs>
+          </a:gsLst>
+          <a:lin ang="5400000" scaled="0"/>
+        </a:gradFill>
+      </a:fillStyleLst>
+      <a:lnStyleLst>
+        <a:ln w="6350" cap="flat" cmpd="sng" algn="ctr">
+          <a:solidFill>
+            <a:schemeClr val="phClr"/>
+          </a:solidFill>
+          <a:prstDash val="solid"/>
+          <a:miter lim="800000"/>
+        </a:ln>
+        <a:ln w="12700" cap="flat" cmpd="sng" algn="ctr">
+          <a:solidFill>
+            <a:schemeClr val="phClr"/>
+          </a:solidFill>
+          <a:prstDash val="solid"/>
+          <a:miter lim="800000"/>
+        </a:ln>
+        <a:ln w="19050" cap="flat" cmpd="sng" algn="ctr">
+          <a:solidFill>
+            <a:schemeClr val="phClr"/>
+          </a:solidFill>
+          <a:prstDash val="solid"/>
+          <a:miter lim="800000"/>
+        </a:ln>
+      </a:lnStyleLst>
+      <a:effectStyleLst>
+        <a:effectStyle>
+          <a:effectLst/>
+        </a:effectStyle>
+        <a:effectStyle>
+          <a:effectLst/>
+        </a:effectStyle>
+        <a:effectStyle>
+          <a:effectLst>
+            <a:outerShdw blurRad="57150" dist="19050" dir="5400000" algn="ctr" rotWithShape="0">
+              <a:srgbClr val="000000">
+                <a:alpha val="63000"/>
+              </a:srgbClr>
+            </a:outerShdw>
+          </a:effectLst>
+        </a:effectStyle>
+      </a:effectStyleLst>
+      <a:bgFillStyleLst>
+        <a:solidFill>
+          <a:schemeClr val="phClr"/>
+        </a:solidFill>
+        <a:solidFill>
+          <a:schemeClr val="phClr">
+            <a:tint val="95000"/>
+            <a:satMod val="170000"/>
+          </a:schemeClr>
+        </a:solidFill>
+        <a:gradFill rotWithShape="1">
+          <a:gsLst>
+            <a:gs pos="0">
+              <a:schemeClr val="phClr">
+                <a:tint val="93000"/>
+                <a:satMod val="150000"/>
+                <a:shade val="98000"/>
+                <a:lumMod val="102000"/>
+              </a:schemeClr>
+            </a:gs>
+            <a:gs pos="50000">
+              <a:schemeClr val="phClr">
+                <a:tint val="98000"/>
+                <a:satMod val="130000"/>
+                <a:shade val="90000"/>
+                <a:lumMod val="103000"/>
+              </a:schemeClr>
+            </a:gs>
+            <a:gs pos="100000">
+              <a:schemeClr val="phClr">
+                <a:shade val="63000"/>
+                <a:satMod val="120000"/>
+              </a:schemeClr>
+            </a:gs>
+          </a:gsLst>
+          <a:lin ang="5400000" scaled="0"/>
+        </a:gradFill>
+      </a:bgFillStyleLst>
+    </a:fmtScheme>
+  </a:themeElements>
+  <a:objectDefaults/>
+  <a:extraClrSchemeLst/>
+  <a:extLst>
+    <a:ext uri="{05A4C25C-085E-4340-85A3-A5531E510DB2}">
+      <thm15:themeFamily xmlns:thm15="http://schemas.microsoft.com/office/thememl/2012/main" name="Office Theme" id="{62F939B6-93AF-4DB8-9C6B-D6C7DFDC589F}" vid="{4A3C46E8-61CC-4603-A589-7422A47A8E4A}"/>
+    </a:ext>
+  </a:extLst>
+</a:theme>
 </file>
</xml_diff>

<commit_message>
Edited architecture diagram AZs and instance names
</commit_message>
<xml_diff>
--- a/docs/deployment_guide/images/elastigroup-quickstart-architecture-diagram.pptx
+++ b/docs/deployment_guide/images/elastigroup-quickstart-architecture-diagram.pptx
@@ -112,6 +112,9 @@
     <p:ext uri="{EFAFB233-063F-42B5-8137-9DF3F51BA10A}">
       <p15:sldGuideLst xmlns:p15="http://schemas.microsoft.com/office/powerpoint/2012/main"/>
     </p:ext>
+    <p:ext uri="{2D200454-40CA-4A62-9FC3-DE9A4176ACB9}">
+      <p15:notesGuideLst xmlns:p15="http://schemas.microsoft.com/office/powerpoint/2012/main"/>
+    </p:ext>
   </p:extLst>
 </p:presentation>
 </file>
@@ -210,7 +213,7 @@
           <a:p>
             <a:fld id="{DFE671C9-BB83-DE41-B8B7-94AB1B25B57E}" type="datetimeFigureOut">
               <a:rPr lang="en-US" smtClean="0"/>
-              <a:t>11/3/22</a:t>
+              <a:t>11/11/22</a:t>
             </a:fld>
             <a:endParaRPr lang="en-US"/>
           </a:p>
@@ -436,7 +439,7 @@
           <a:p>
             <a:fld id="{87F3BBB2-E533-43A8-AA78-2DC6FC5FE5A0}" type="datetimeFigureOut">
               <a:rPr lang="en-US" smtClean="0"/>
-              <a:t>11/2/22</a:t>
+              <a:t>11/11/22</a:t>
             </a:fld>
             <a:endParaRPr lang="en-US"/>
           </a:p>
@@ -606,7 +609,7 @@
           <a:p>
             <a:fld id="{87F3BBB2-E533-43A8-AA78-2DC6FC5FE5A0}" type="datetimeFigureOut">
               <a:rPr lang="en-US" smtClean="0"/>
-              <a:t>11/2/22</a:t>
+              <a:t>11/11/22</a:t>
             </a:fld>
             <a:endParaRPr lang="en-US"/>
           </a:p>
@@ -786,7 +789,7 @@
           <a:p>
             <a:fld id="{87F3BBB2-E533-43A8-AA78-2DC6FC5FE5A0}" type="datetimeFigureOut">
               <a:rPr lang="en-US" smtClean="0"/>
-              <a:t>11/2/22</a:t>
+              <a:t>11/11/22</a:t>
             </a:fld>
             <a:endParaRPr lang="en-US"/>
           </a:p>
@@ -956,7 +959,7 @@
           <a:p>
             <a:fld id="{87F3BBB2-E533-43A8-AA78-2DC6FC5FE5A0}" type="datetimeFigureOut">
               <a:rPr lang="en-US" smtClean="0"/>
-              <a:t>11/2/22</a:t>
+              <a:t>11/11/22</a:t>
             </a:fld>
             <a:endParaRPr lang="en-US"/>
           </a:p>
@@ -1200,7 +1203,7 @@
           <a:p>
             <a:fld id="{87F3BBB2-E533-43A8-AA78-2DC6FC5FE5A0}" type="datetimeFigureOut">
               <a:rPr lang="en-US" smtClean="0"/>
-              <a:t>11/2/22</a:t>
+              <a:t>11/11/22</a:t>
             </a:fld>
             <a:endParaRPr lang="en-US"/>
           </a:p>
@@ -1432,7 +1435,7 @@
           <a:p>
             <a:fld id="{87F3BBB2-E533-43A8-AA78-2DC6FC5FE5A0}" type="datetimeFigureOut">
               <a:rPr lang="en-US" smtClean="0"/>
-              <a:t>11/2/22</a:t>
+              <a:t>11/11/22</a:t>
             </a:fld>
             <a:endParaRPr lang="en-US"/>
           </a:p>
@@ -1799,7 +1802,7 @@
           <a:p>
             <a:fld id="{87F3BBB2-E533-43A8-AA78-2DC6FC5FE5A0}" type="datetimeFigureOut">
               <a:rPr lang="en-US" smtClean="0"/>
-              <a:t>11/2/22</a:t>
+              <a:t>11/11/22</a:t>
             </a:fld>
             <a:endParaRPr lang="en-US"/>
           </a:p>
@@ -1917,7 +1920,7 @@
           <a:p>
             <a:fld id="{87F3BBB2-E533-43A8-AA78-2DC6FC5FE5A0}" type="datetimeFigureOut">
               <a:rPr lang="en-US" smtClean="0"/>
-              <a:t>11/2/22</a:t>
+              <a:t>11/11/22</a:t>
             </a:fld>
             <a:endParaRPr lang="en-US"/>
           </a:p>
@@ -2012,7 +2015,7 @@
           <a:p>
             <a:fld id="{87F3BBB2-E533-43A8-AA78-2DC6FC5FE5A0}" type="datetimeFigureOut">
               <a:rPr lang="en-US" smtClean="0"/>
-              <a:t>11/2/22</a:t>
+              <a:t>11/11/22</a:t>
             </a:fld>
             <a:endParaRPr lang="en-US"/>
           </a:p>
@@ -2289,7 +2292,7 @@
           <a:p>
             <a:fld id="{87F3BBB2-E533-43A8-AA78-2DC6FC5FE5A0}" type="datetimeFigureOut">
               <a:rPr lang="en-US" smtClean="0"/>
-              <a:t>11/2/22</a:t>
+              <a:t>11/11/22</a:t>
             </a:fld>
             <a:endParaRPr lang="en-US"/>
           </a:p>
@@ -2546,7 +2549,7 @@
           <a:p>
             <a:fld id="{87F3BBB2-E533-43A8-AA78-2DC6FC5FE5A0}" type="datetimeFigureOut">
               <a:rPr lang="en-US" smtClean="0"/>
-              <a:t>11/2/22</a:t>
+              <a:t>11/11/22</a:t>
             </a:fld>
             <a:endParaRPr lang="en-US"/>
           </a:p>
@@ -2759,7 +2762,7 @@
           <a:p>
             <a:fld id="{87F3BBB2-E533-43A8-AA78-2DC6FC5FE5A0}" type="datetimeFigureOut">
               <a:rPr lang="en-US" smtClean="0"/>
-              <a:t>11/2/22</a:t>
+              <a:t>11/11/22</a:t>
             </a:fld>
             <a:endParaRPr lang="en-US"/>
           </a:p>
@@ -3763,7 +3766,7 @@
                 <a:latin typeface="Arial" panose="020B0604020202020204" pitchFamily="34" charset="0"/>
                 <a:cs typeface="Arial" panose="020B0604020202020204" pitchFamily="34" charset="0"/>
               </a:rPr>
-              <a:t>Availability Zone</a:t>
+              <a:t>Availability Zone 1</a:t>
             </a:r>
           </a:p>
         </p:txBody>
@@ -3833,7 +3836,7 @@
                 <a:latin typeface="Arial" panose="020B0604020202020204" pitchFamily="34" charset="0"/>
                 <a:cs typeface="Arial" panose="020B0604020202020204" pitchFamily="34" charset="0"/>
               </a:rPr>
-              <a:t>Availability Zone</a:t>
+              <a:t>Availability Zone 2</a:t>
             </a:r>
           </a:p>
         </p:txBody>
@@ -3903,1558 +3906,253 @@
                 <a:latin typeface="Arial" panose="020B0604020202020204" pitchFamily="34" charset="0"/>
                 <a:cs typeface="Arial" panose="020B0604020202020204" pitchFamily="34" charset="0"/>
               </a:rPr>
-              <a:t>Availability Zone</a:t>
-            </a:r>
-          </a:p>
-        </p:txBody>
-      </p:sp>
-      <p:pic>
-        <p:nvPicPr>
-          <p:cNvPr id="57" name="Graphic 60">
+              <a:t>Availability Zone 3</a:t>
+            </a:r>
+          </a:p>
+        </p:txBody>
+      </p:sp>
+      <p:grpSp>
+        <p:nvGrpSpPr>
+          <p:cNvPr id="3" name="Group 2">
             <a:extLst>
               <a:ext uri="{FF2B5EF4-FFF2-40B4-BE49-F238E27FC236}">
-                <a16:creationId xmlns:a16="http://schemas.microsoft.com/office/drawing/2014/main" id="{8A866A09-21F6-05A3-6F7B-FE7127A963CB}"/>
+                <a16:creationId xmlns:a16="http://schemas.microsoft.com/office/drawing/2014/main" id="{BC448E1A-369C-984E-97A9-5241F355CC38}"/>
               </a:ext>
             </a:extLst>
           </p:cNvPr>
-          <p:cNvPicPr>
-            <a:picLocks noChangeAspect="1" noChangeArrowheads="1"/>
-          </p:cNvPicPr>
+          <p:cNvGrpSpPr/>
           <p:nvPr/>
-        </p:nvPicPr>
-        <p:blipFill>
-          <a:blip r:embed="rId8">
-            <a:extLst>
-              <a:ext uri="{28A0092B-C50C-407E-A947-70E740481C1C}">
-                <a14:useLocalDpi xmlns:a14="http://schemas.microsoft.com/office/drawing/2010/main" val="0"/>
-              </a:ext>
-            </a:extLst>
-          </a:blip>
-          <a:srcRect/>
-          <a:stretch>
-            <a:fillRect/>
-          </a:stretch>
-        </p:blipFill>
-        <p:spPr bwMode="auto">
+        </p:nvGrpSpPr>
+        <p:grpSpPr>
           <a:xfrm>
-            <a:off x="5385404" y="6743256"/>
-            <a:ext cx="457200" cy="457200"/>
+            <a:off x="5089964" y="6689532"/>
+            <a:ext cx="1115568" cy="847413"/>
+            <a:chOff x="5070214" y="6790224"/>
+            <a:chExt cx="1115568" cy="847413"/>
           </a:xfrm>
-          <a:prstGeom prst="rect">
-            <a:avLst/>
-          </a:prstGeom>
-          <a:noFill/>
-          <a:ln>
+        </p:grpSpPr>
+        <p:pic>
+          <p:nvPicPr>
+            <p:cNvPr id="57" name="Graphic 60">
+              <a:extLst>
+                <a:ext uri="{FF2B5EF4-FFF2-40B4-BE49-F238E27FC236}">
+                  <a16:creationId xmlns:a16="http://schemas.microsoft.com/office/drawing/2014/main" id="{8A866A09-21F6-05A3-6F7B-FE7127A963CB}"/>
+                </a:ext>
+              </a:extLst>
+            </p:cNvPr>
+            <p:cNvPicPr>
+              <a:picLocks noChangeAspect="1" noChangeArrowheads="1"/>
+            </p:cNvPicPr>
+            <p:nvPr/>
+          </p:nvPicPr>
+          <p:blipFill>
+            <a:blip r:embed="rId8">
+              <a:extLst>
+                <a:ext uri="{28A0092B-C50C-407E-A947-70E740481C1C}">
+                  <a14:useLocalDpi xmlns:a14="http://schemas.microsoft.com/office/drawing/2010/main" val="0"/>
+                </a:ext>
+              </a:extLst>
+            </a:blip>
+            <a:srcRect/>
+            <a:stretch>
+              <a:fillRect/>
+            </a:stretch>
+          </p:blipFill>
+          <p:spPr bwMode="auto">
+            <a:xfrm>
+              <a:off x="5399398" y="6790224"/>
+              <a:ext cx="457200" cy="457200"/>
+            </a:xfrm>
+            <a:prstGeom prst="rect">
+              <a:avLst/>
+            </a:prstGeom>
             <a:noFill/>
-          </a:ln>
-          <a:extLst>
-            <a:ext uri="{909E8E84-426E-40DD-AFC4-6F175D3DCCD1}">
-              <a14:hiddenFill xmlns:a14="http://schemas.microsoft.com/office/drawing/2010/main">
-                <a:solidFill>
-                  <a:srgbClr val="FFFFFF"/>
-                </a:solidFill>
-              </a14:hiddenFill>
-            </a:ext>
-            <a:ext uri="{91240B29-F687-4F45-9708-019B960494DF}">
-              <a14:hiddenLine xmlns:a14="http://schemas.microsoft.com/office/drawing/2010/main" w="9525">
-                <a:solidFill>
-                  <a:srgbClr val="000000"/>
-                </a:solidFill>
-                <a:miter lim="800000"/>
-                <a:headEnd/>
-                <a:tailEnd/>
-              </a14:hiddenLine>
-            </a:ext>
-          </a:extLst>
-        </p:spPr>
-      </p:pic>
-      <p:pic>
-        <p:nvPicPr>
-          <p:cNvPr id="58" name="Graphic 60">
-            <a:extLst>
-              <a:ext uri="{FF2B5EF4-FFF2-40B4-BE49-F238E27FC236}">
-                <a16:creationId xmlns:a16="http://schemas.microsoft.com/office/drawing/2014/main" id="{E473ABC9-CCBB-B5EF-226A-D623550B6B88}"/>
-              </a:ext>
-            </a:extLst>
-          </p:cNvPr>
-          <p:cNvPicPr>
-            <a:picLocks noChangeAspect="1" noChangeArrowheads="1"/>
-          </p:cNvPicPr>
-          <p:nvPr/>
-        </p:nvPicPr>
-        <p:blipFill>
-          <a:blip r:embed="rId8">
-            <a:extLst>
-              <a:ext uri="{28A0092B-C50C-407E-A947-70E740481C1C}">
-                <a14:useLocalDpi xmlns:a14="http://schemas.microsoft.com/office/drawing/2010/main" val="0"/>
-              </a:ext>
-            </a:extLst>
-          </a:blip>
-          <a:srcRect/>
-          <a:stretch>
-            <a:fillRect/>
-          </a:stretch>
-        </p:blipFill>
-        <p:spPr bwMode="auto">
-          <a:xfrm>
-            <a:off x="6654871" y="6743256"/>
-            <a:ext cx="457200" cy="457200"/>
-          </a:xfrm>
-          <a:prstGeom prst="rect">
-            <a:avLst/>
-          </a:prstGeom>
-          <a:noFill/>
-          <a:ln>
+            <a:ln>
+              <a:noFill/>
+            </a:ln>
+            <a:extLst>
+              <a:ext uri="{909E8E84-426E-40DD-AFC4-6F175D3DCCD1}">
+                <a14:hiddenFill xmlns:a14="http://schemas.microsoft.com/office/drawing/2010/main">
+                  <a:solidFill>
+                    <a:srgbClr val="FFFFFF"/>
+                  </a:solidFill>
+                </a14:hiddenFill>
+              </a:ext>
+              <a:ext uri="{91240B29-F687-4F45-9708-019B960494DF}">
+                <a14:hiddenLine xmlns:a14="http://schemas.microsoft.com/office/drawing/2010/main" w="9525">
+                  <a:solidFill>
+                    <a:srgbClr val="000000"/>
+                  </a:solidFill>
+                  <a:miter lim="800000"/>
+                  <a:headEnd/>
+                  <a:tailEnd/>
+                </a14:hiddenLine>
+              </a:ext>
+            </a:extLst>
+          </p:spPr>
+        </p:pic>
+        <p:sp>
+          <p:nvSpPr>
+            <p:cNvPr id="59" name="TextBox 16">
+              <a:extLst>
+                <a:ext uri="{FF2B5EF4-FFF2-40B4-BE49-F238E27FC236}">
+                  <a16:creationId xmlns:a16="http://schemas.microsoft.com/office/drawing/2014/main" id="{7DFB7786-5A35-2C91-F367-7CD01172F7C9}"/>
+                </a:ext>
+              </a:extLst>
+            </p:cNvPr>
+            <p:cNvSpPr txBox="1">
+              <a:spLocks noChangeArrowheads="1"/>
+            </p:cNvSpPr>
+            <p:nvPr/>
+          </p:nvSpPr>
+          <p:spPr bwMode="auto">
+            <a:xfrm>
+              <a:off x="5070214" y="7206750"/>
+              <a:ext cx="1115568" cy="430887"/>
+            </a:xfrm>
+            <a:prstGeom prst="rect">
+              <a:avLst/>
+            </a:prstGeom>
             <a:noFill/>
-          </a:ln>
-          <a:extLst>
-            <a:ext uri="{909E8E84-426E-40DD-AFC4-6F175D3DCCD1}">
-              <a14:hiddenFill xmlns:a14="http://schemas.microsoft.com/office/drawing/2010/main">
-                <a:solidFill>
-                  <a:srgbClr val="FFFFFF"/>
-                </a:solidFill>
-              </a14:hiddenFill>
-            </a:ext>
-            <a:ext uri="{91240B29-F687-4F45-9708-019B960494DF}">
-              <a14:hiddenLine xmlns:a14="http://schemas.microsoft.com/office/drawing/2010/main" w="9525">
-                <a:solidFill>
-                  <a:srgbClr val="000000"/>
-                </a:solidFill>
-                <a:miter lim="800000"/>
-                <a:headEnd/>
-                <a:tailEnd/>
-              </a14:hiddenLine>
-            </a:ext>
-          </a:extLst>
-        </p:spPr>
-      </p:pic>
-      <p:sp>
-        <p:nvSpPr>
-          <p:cNvPr id="59" name="TextBox 16">
-            <a:extLst>
-              <a:ext uri="{FF2B5EF4-FFF2-40B4-BE49-F238E27FC236}">
-                <a16:creationId xmlns:a16="http://schemas.microsoft.com/office/drawing/2014/main" id="{7DFB7786-5A35-2C91-F367-7CD01172F7C9}"/>
-              </a:ext>
-            </a:extLst>
-          </p:cNvPr>
-          <p:cNvSpPr txBox="1">
-            <a:spLocks noChangeArrowheads="1"/>
-          </p:cNvSpPr>
-          <p:nvPr/>
-        </p:nvSpPr>
-        <p:spPr bwMode="auto">
-          <a:xfrm>
-            <a:off x="5070214" y="7206750"/>
-            <a:ext cx="1115568" cy="261610"/>
-          </a:xfrm>
-          <a:prstGeom prst="rect">
-            <a:avLst/>
-          </a:prstGeom>
-          <a:noFill/>
-          <a:ln>
-            <a:noFill/>
-          </a:ln>
-          <a:extLst>
-            <a:ext uri="{909E8E84-426E-40DD-AFC4-6F175D3DCCD1}">
-              <a14:hiddenFill xmlns:a14="http://schemas.microsoft.com/office/drawing/2010/main">
-                <a:solidFill>
-                  <a:srgbClr val="FFFFFF"/>
-                </a:solidFill>
-              </a14:hiddenFill>
-            </a:ext>
-            <a:ext uri="{91240B29-F687-4F45-9708-019B960494DF}">
-              <a14:hiddenLine xmlns:a14="http://schemas.microsoft.com/office/drawing/2010/main" w="9525">
-                <a:solidFill>
-                  <a:srgbClr val="000000"/>
-                </a:solidFill>
-                <a:miter lim="800000"/>
-                <a:headEnd/>
-                <a:tailEnd/>
-              </a14:hiddenLine>
-            </a:ext>
-          </a:extLst>
-        </p:spPr>
-        <p:txBody>
-          <a:bodyPr wrap="square" lIns="0" rIns="0">
-            <a:spAutoFit/>
-          </a:bodyPr>
-          <a:lstStyle>
-            <a:lvl1pPr>
-              <a:defRPr>
-                <a:solidFill>
-                  <a:schemeClr val="tx1"/>
-                </a:solidFill>
-                <a:latin typeface="Calibri" panose="020F0502020204030204" pitchFamily="34" charset="0"/>
-              </a:defRPr>
-            </a:lvl1pPr>
-            <a:lvl2pPr marL="742950" indent="-285750">
-              <a:defRPr>
-                <a:solidFill>
-                  <a:schemeClr val="tx1"/>
-                </a:solidFill>
-                <a:latin typeface="Calibri" panose="020F0502020204030204" pitchFamily="34" charset="0"/>
-              </a:defRPr>
-            </a:lvl2pPr>
-            <a:lvl3pPr marL="1143000" indent="-228600">
-              <a:defRPr>
-                <a:solidFill>
-                  <a:schemeClr val="tx1"/>
-                </a:solidFill>
-                <a:latin typeface="Calibri" panose="020F0502020204030204" pitchFamily="34" charset="0"/>
-              </a:defRPr>
-            </a:lvl3pPr>
-            <a:lvl4pPr marL="1600200" indent="-228600">
-              <a:defRPr>
-                <a:solidFill>
-                  <a:schemeClr val="tx1"/>
-                </a:solidFill>
-                <a:latin typeface="Calibri" panose="020F0502020204030204" pitchFamily="34" charset="0"/>
-              </a:defRPr>
-            </a:lvl4pPr>
-            <a:lvl5pPr marL="2057400" indent="-228600">
-              <a:defRPr>
-                <a:solidFill>
-                  <a:schemeClr val="tx1"/>
-                </a:solidFill>
-                <a:latin typeface="Calibri" panose="020F0502020204030204" pitchFamily="34" charset="0"/>
-              </a:defRPr>
-            </a:lvl5pPr>
-            <a:lvl6pPr marL="2514600" indent="-228600" eaLnBrk="0" fontAlgn="base" hangingPunct="0">
-              <a:spcBef>
-                <a:spcPct val="0"/>
-              </a:spcBef>
-              <a:spcAft>
-                <a:spcPct val="0"/>
-              </a:spcAft>
-              <a:defRPr>
-                <a:solidFill>
-                  <a:schemeClr val="tx1"/>
-                </a:solidFill>
-                <a:latin typeface="Calibri" panose="020F0502020204030204" pitchFamily="34" charset="0"/>
-              </a:defRPr>
-            </a:lvl6pPr>
-            <a:lvl7pPr marL="2971800" indent="-228600" eaLnBrk="0" fontAlgn="base" hangingPunct="0">
-              <a:spcBef>
-                <a:spcPct val="0"/>
-              </a:spcBef>
-              <a:spcAft>
-                <a:spcPct val="0"/>
-              </a:spcAft>
-              <a:defRPr>
-                <a:solidFill>
-                  <a:schemeClr val="tx1"/>
-                </a:solidFill>
-                <a:latin typeface="Calibri" panose="020F0502020204030204" pitchFamily="34" charset="0"/>
-              </a:defRPr>
-            </a:lvl7pPr>
-            <a:lvl8pPr marL="3429000" indent="-228600" eaLnBrk="0" fontAlgn="base" hangingPunct="0">
-              <a:spcBef>
-                <a:spcPct val="0"/>
-              </a:spcBef>
-              <a:spcAft>
-                <a:spcPct val="0"/>
-              </a:spcAft>
-              <a:defRPr>
-                <a:solidFill>
-                  <a:schemeClr val="tx1"/>
-                </a:solidFill>
-                <a:latin typeface="Calibri" panose="020F0502020204030204" pitchFamily="34" charset="0"/>
-              </a:defRPr>
-            </a:lvl8pPr>
-            <a:lvl9pPr marL="3886200" indent="-228600" eaLnBrk="0" fontAlgn="base" hangingPunct="0">
-              <a:spcBef>
-                <a:spcPct val="0"/>
-              </a:spcBef>
-              <a:spcAft>
-                <a:spcPct val="0"/>
-              </a:spcAft>
-              <a:defRPr>
-                <a:solidFill>
-                  <a:schemeClr val="tx1"/>
-                </a:solidFill>
-                <a:latin typeface="Calibri" panose="020F0502020204030204" pitchFamily="34" charset="0"/>
-              </a:defRPr>
-            </a:lvl9pPr>
-          </a:lstStyle>
-          <a:p>
-            <a:pPr algn="ctr" eaLnBrk="1" hangingPunct="1"/>
-            <a:r>
-              <a:rPr lang="en-US" altLang="en-US" sz="1100" dirty="0">
-                <a:latin typeface="Arial" panose="020B0604020202020204" pitchFamily="34" charset="0"/>
-                <a:ea typeface="Amazon Ember" panose="020B0603020204020204" pitchFamily="34" charset="0"/>
-                <a:cs typeface="Arial" panose="020B0604020202020204" pitchFamily="34" charset="0"/>
-              </a:rPr>
-              <a:t>Instance</a:t>
-            </a:r>
-          </a:p>
-        </p:txBody>
-      </p:sp>
-      <p:sp>
-        <p:nvSpPr>
-          <p:cNvPr id="60" name="TextBox 16">
-            <a:extLst>
-              <a:ext uri="{FF2B5EF4-FFF2-40B4-BE49-F238E27FC236}">
-                <a16:creationId xmlns:a16="http://schemas.microsoft.com/office/drawing/2014/main" id="{F3F493D1-63A7-962E-7044-07EFA34423F1}"/>
-              </a:ext>
-            </a:extLst>
-          </p:cNvPr>
-          <p:cNvSpPr txBox="1">
-            <a:spLocks noChangeArrowheads="1"/>
-          </p:cNvSpPr>
-          <p:nvPr/>
-        </p:nvSpPr>
-        <p:spPr bwMode="auto">
-          <a:xfrm>
-            <a:off x="14235437" y="7313277"/>
-            <a:ext cx="1115568" cy="261610"/>
-          </a:xfrm>
-          <a:prstGeom prst="rect">
-            <a:avLst/>
-          </a:prstGeom>
-          <a:noFill/>
-          <a:ln>
-            <a:noFill/>
-          </a:ln>
-          <a:extLst>
-            <a:ext uri="{909E8E84-426E-40DD-AFC4-6F175D3DCCD1}">
-              <a14:hiddenFill xmlns:a14="http://schemas.microsoft.com/office/drawing/2010/main">
-                <a:solidFill>
-                  <a:srgbClr val="FFFFFF"/>
-                </a:solidFill>
-              </a14:hiddenFill>
-            </a:ext>
-            <a:ext uri="{91240B29-F687-4F45-9708-019B960494DF}">
-              <a14:hiddenLine xmlns:a14="http://schemas.microsoft.com/office/drawing/2010/main" w="9525">
-                <a:solidFill>
-                  <a:srgbClr val="000000"/>
-                </a:solidFill>
-                <a:miter lim="800000"/>
-                <a:headEnd/>
-                <a:tailEnd/>
-              </a14:hiddenLine>
-            </a:ext>
-          </a:extLst>
-        </p:spPr>
-        <p:txBody>
-          <a:bodyPr wrap="square" lIns="0" rIns="0">
-            <a:spAutoFit/>
-          </a:bodyPr>
-          <a:lstStyle>
-            <a:lvl1pPr>
-              <a:defRPr>
-                <a:solidFill>
-                  <a:schemeClr val="tx1"/>
-                </a:solidFill>
-                <a:latin typeface="Calibri" panose="020F0502020204030204" pitchFamily="34" charset="0"/>
-              </a:defRPr>
-            </a:lvl1pPr>
-            <a:lvl2pPr marL="742950" indent="-285750">
-              <a:defRPr>
-                <a:solidFill>
-                  <a:schemeClr val="tx1"/>
-                </a:solidFill>
-                <a:latin typeface="Calibri" panose="020F0502020204030204" pitchFamily="34" charset="0"/>
-              </a:defRPr>
-            </a:lvl2pPr>
-            <a:lvl3pPr marL="1143000" indent="-228600">
-              <a:defRPr>
-                <a:solidFill>
-                  <a:schemeClr val="tx1"/>
-                </a:solidFill>
-                <a:latin typeface="Calibri" panose="020F0502020204030204" pitchFamily="34" charset="0"/>
-              </a:defRPr>
-            </a:lvl3pPr>
-            <a:lvl4pPr marL="1600200" indent="-228600">
-              <a:defRPr>
-                <a:solidFill>
-                  <a:schemeClr val="tx1"/>
-                </a:solidFill>
-                <a:latin typeface="Calibri" panose="020F0502020204030204" pitchFamily="34" charset="0"/>
-              </a:defRPr>
-            </a:lvl4pPr>
-            <a:lvl5pPr marL="2057400" indent="-228600">
-              <a:defRPr>
-                <a:solidFill>
-                  <a:schemeClr val="tx1"/>
-                </a:solidFill>
-                <a:latin typeface="Calibri" panose="020F0502020204030204" pitchFamily="34" charset="0"/>
-              </a:defRPr>
-            </a:lvl5pPr>
-            <a:lvl6pPr marL="2514600" indent="-228600" eaLnBrk="0" fontAlgn="base" hangingPunct="0">
-              <a:spcBef>
-                <a:spcPct val="0"/>
-              </a:spcBef>
-              <a:spcAft>
-                <a:spcPct val="0"/>
-              </a:spcAft>
-              <a:defRPr>
-                <a:solidFill>
-                  <a:schemeClr val="tx1"/>
-                </a:solidFill>
-                <a:latin typeface="Calibri" panose="020F0502020204030204" pitchFamily="34" charset="0"/>
-              </a:defRPr>
-            </a:lvl6pPr>
-            <a:lvl7pPr marL="2971800" indent="-228600" eaLnBrk="0" fontAlgn="base" hangingPunct="0">
-              <a:spcBef>
-                <a:spcPct val="0"/>
-              </a:spcBef>
-              <a:spcAft>
-                <a:spcPct val="0"/>
-              </a:spcAft>
-              <a:defRPr>
-                <a:solidFill>
-                  <a:schemeClr val="tx1"/>
-                </a:solidFill>
-                <a:latin typeface="Calibri" panose="020F0502020204030204" pitchFamily="34" charset="0"/>
-              </a:defRPr>
-            </a:lvl7pPr>
-            <a:lvl8pPr marL="3429000" indent="-228600" eaLnBrk="0" fontAlgn="base" hangingPunct="0">
-              <a:spcBef>
-                <a:spcPct val="0"/>
-              </a:spcBef>
-              <a:spcAft>
-                <a:spcPct val="0"/>
-              </a:spcAft>
-              <a:defRPr>
-                <a:solidFill>
-                  <a:schemeClr val="tx1"/>
-                </a:solidFill>
-                <a:latin typeface="Calibri" panose="020F0502020204030204" pitchFamily="34" charset="0"/>
-              </a:defRPr>
-            </a:lvl8pPr>
-            <a:lvl9pPr marL="3886200" indent="-228600" eaLnBrk="0" fontAlgn="base" hangingPunct="0">
-              <a:spcBef>
-                <a:spcPct val="0"/>
-              </a:spcBef>
-              <a:spcAft>
-                <a:spcPct val="0"/>
-              </a:spcAft>
-              <a:defRPr>
-                <a:solidFill>
-                  <a:schemeClr val="tx1"/>
-                </a:solidFill>
-                <a:latin typeface="Calibri" panose="020F0502020204030204" pitchFamily="34" charset="0"/>
-              </a:defRPr>
-            </a:lvl9pPr>
-          </a:lstStyle>
-          <a:p>
-            <a:pPr algn="ctr" eaLnBrk="1" hangingPunct="1"/>
-            <a:r>
-              <a:rPr lang="en-US" altLang="en-US" sz="1100" dirty="0">
-                <a:latin typeface="Arial" panose="020B0604020202020204" pitchFamily="34" charset="0"/>
-                <a:ea typeface="Amazon Ember" panose="020B0603020204020204" pitchFamily="34" charset="0"/>
-                <a:cs typeface="Arial" panose="020B0604020202020204" pitchFamily="34" charset="0"/>
-              </a:rPr>
-              <a:t>Instance</a:t>
-            </a:r>
-          </a:p>
-        </p:txBody>
-      </p:sp>
-      <p:pic>
-        <p:nvPicPr>
-          <p:cNvPr id="61" name="Graphic 60">
-            <a:extLst>
-              <a:ext uri="{FF2B5EF4-FFF2-40B4-BE49-F238E27FC236}">
-                <a16:creationId xmlns:a16="http://schemas.microsoft.com/office/drawing/2014/main" id="{640D71F4-AEF7-B9CE-615C-B56442FBE654}"/>
-              </a:ext>
-            </a:extLst>
-          </p:cNvPr>
-          <p:cNvPicPr>
-            <a:picLocks noChangeAspect="1" noChangeArrowheads="1"/>
-          </p:cNvPicPr>
-          <p:nvPr/>
-        </p:nvPicPr>
-        <p:blipFill>
-          <a:blip r:embed="rId8">
-            <a:extLst>
-              <a:ext uri="{28A0092B-C50C-407E-A947-70E740481C1C}">
-                <a14:useLocalDpi xmlns:a14="http://schemas.microsoft.com/office/drawing/2010/main" val="0"/>
-              </a:ext>
-            </a:extLst>
-          </a:blip>
-          <a:srcRect/>
-          <a:stretch>
-            <a:fillRect/>
-          </a:stretch>
-        </p:blipFill>
-        <p:spPr bwMode="auto">
-          <a:xfrm>
-            <a:off x="10797640" y="6777279"/>
-            <a:ext cx="457200" cy="457200"/>
-          </a:xfrm>
-          <a:prstGeom prst="rect">
-            <a:avLst/>
-          </a:prstGeom>
-          <a:noFill/>
-          <a:ln>
-            <a:noFill/>
-          </a:ln>
-          <a:extLst>
-            <a:ext uri="{909E8E84-426E-40DD-AFC4-6F175D3DCCD1}">
-              <a14:hiddenFill xmlns:a14="http://schemas.microsoft.com/office/drawing/2010/main">
-                <a:solidFill>
-                  <a:srgbClr val="FFFFFF"/>
-                </a:solidFill>
-              </a14:hiddenFill>
-            </a:ext>
-            <a:ext uri="{91240B29-F687-4F45-9708-019B960494DF}">
-              <a14:hiddenLine xmlns:a14="http://schemas.microsoft.com/office/drawing/2010/main" w="9525">
-                <a:solidFill>
-                  <a:srgbClr val="000000"/>
-                </a:solidFill>
-                <a:miter lim="800000"/>
-                <a:headEnd/>
-                <a:tailEnd/>
-              </a14:hiddenLine>
-            </a:ext>
-          </a:extLst>
-        </p:spPr>
-      </p:pic>
-      <p:pic>
-        <p:nvPicPr>
-          <p:cNvPr id="62" name="Graphic 60">
-            <a:extLst>
-              <a:ext uri="{FF2B5EF4-FFF2-40B4-BE49-F238E27FC236}">
-                <a16:creationId xmlns:a16="http://schemas.microsoft.com/office/drawing/2014/main" id="{EB42CF53-A8F9-32FD-FDC0-52E034B0BF27}"/>
-              </a:ext>
-            </a:extLst>
-          </p:cNvPr>
-          <p:cNvPicPr>
-            <a:picLocks noChangeAspect="1" noChangeArrowheads="1"/>
-          </p:cNvPicPr>
-          <p:nvPr/>
-        </p:nvPicPr>
-        <p:blipFill>
-          <a:blip r:embed="rId8">
-            <a:extLst>
-              <a:ext uri="{28A0092B-C50C-407E-A947-70E740481C1C}">
-                <a14:useLocalDpi xmlns:a14="http://schemas.microsoft.com/office/drawing/2010/main" val="0"/>
-              </a:ext>
-            </a:extLst>
-          </a:blip>
-          <a:srcRect/>
-          <a:stretch>
-            <a:fillRect/>
-          </a:stretch>
-        </p:blipFill>
-        <p:spPr bwMode="auto">
-          <a:xfrm>
-            <a:off x="9478907" y="6778738"/>
-            <a:ext cx="457200" cy="457200"/>
-          </a:xfrm>
-          <a:prstGeom prst="rect">
-            <a:avLst/>
-          </a:prstGeom>
-          <a:noFill/>
-          <a:ln>
-            <a:noFill/>
-          </a:ln>
-          <a:extLst>
-            <a:ext uri="{909E8E84-426E-40DD-AFC4-6F175D3DCCD1}">
-              <a14:hiddenFill xmlns:a14="http://schemas.microsoft.com/office/drawing/2010/main">
-                <a:solidFill>
-                  <a:srgbClr val="FFFFFF"/>
-                </a:solidFill>
-              </a14:hiddenFill>
-            </a:ext>
-            <a:ext uri="{91240B29-F687-4F45-9708-019B960494DF}">
-              <a14:hiddenLine xmlns:a14="http://schemas.microsoft.com/office/drawing/2010/main" w="9525">
-                <a:solidFill>
-                  <a:srgbClr val="000000"/>
-                </a:solidFill>
-                <a:miter lim="800000"/>
-                <a:headEnd/>
-                <a:tailEnd/>
-              </a14:hiddenLine>
-            </a:ext>
-          </a:extLst>
-        </p:spPr>
-      </p:pic>
-      <p:pic>
-        <p:nvPicPr>
-          <p:cNvPr id="63" name="Graphic 60">
-            <a:extLst>
-              <a:ext uri="{FF2B5EF4-FFF2-40B4-BE49-F238E27FC236}">
-                <a16:creationId xmlns:a16="http://schemas.microsoft.com/office/drawing/2014/main" id="{7A70B2AF-F763-9956-368A-82A1E3BA18A8}"/>
-              </a:ext>
-            </a:extLst>
-          </p:cNvPr>
-          <p:cNvPicPr>
-            <a:picLocks noChangeAspect="1" noChangeArrowheads="1"/>
-          </p:cNvPicPr>
-          <p:nvPr/>
-        </p:nvPicPr>
-        <p:blipFill>
-          <a:blip r:embed="rId8">
-            <a:extLst>
-              <a:ext uri="{28A0092B-C50C-407E-A947-70E740481C1C}">
-                <a14:useLocalDpi xmlns:a14="http://schemas.microsoft.com/office/drawing/2010/main" val="0"/>
-              </a:ext>
-            </a:extLst>
-          </a:blip>
-          <a:srcRect/>
-          <a:stretch>
-            <a:fillRect/>
-          </a:stretch>
-        </p:blipFill>
-        <p:spPr bwMode="auto">
-          <a:xfrm>
-            <a:off x="13718865" y="6777279"/>
-            <a:ext cx="457200" cy="457200"/>
-          </a:xfrm>
-          <a:prstGeom prst="rect">
-            <a:avLst/>
-          </a:prstGeom>
-          <a:noFill/>
-          <a:ln>
-            <a:noFill/>
-          </a:ln>
-          <a:extLst>
-            <a:ext uri="{909E8E84-426E-40DD-AFC4-6F175D3DCCD1}">
-              <a14:hiddenFill xmlns:a14="http://schemas.microsoft.com/office/drawing/2010/main">
-                <a:solidFill>
-                  <a:srgbClr val="FFFFFF"/>
-                </a:solidFill>
-              </a14:hiddenFill>
-            </a:ext>
-            <a:ext uri="{91240B29-F687-4F45-9708-019B960494DF}">
-              <a14:hiddenLine xmlns:a14="http://schemas.microsoft.com/office/drawing/2010/main" w="9525">
-                <a:solidFill>
-                  <a:srgbClr val="000000"/>
-                </a:solidFill>
-                <a:miter lim="800000"/>
-                <a:headEnd/>
-                <a:tailEnd/>
-              </a14:hiddenLine>
-            </a:ext>
-          </a:extLst>
-        </p:spPr>
-      </p:pic>
-      <p:pic>
-        <p:nvPicPr>
-          <p:cNvPr id="64" name="Graphic 60">
-            <a:extLst>
-              <a:ext uri="{FF2B5EF4-FFF2-40B4-BE49-F238E27FC236}">
-                <a16:creationId xmlns:a16="http://schemas.microsoft.com/office/drawing/2014/main" id="{563A90D5-ACFE-9F38-7B51-0E01B659A5D8}"/>
-              </a:ext>
-            </a:extLst>
-          </p:cNvPr>
-          <p:cNvPicPr>
-            <a:picLocks noChangeAspect="1" noChangeArrowheads="1"/>
-          </p:cNvPicPr>
-          <p:nvPr/>
-        </p:nvPicPr>
-        <p:blipFill>
-          <a:blip r:embed="rId8">
-            <a:extLst>
-              <a:ext uri="{28A0092B-C50C-407E-A947-70E740481C1C}">
-                <a14:useLocalDpi xmlns:a14="http://schemas.microsoft.com/office/drawing/2010/main" val="0"/>
-              </a:ext>
-            </a:extLst>
-          </a:blip>
-          <a:srcRect/>
-          <a:stretch>
-            <a:fillRect/>
-          </a:stretch>
-        </p:blipFill>
-        <p:spPr bwMode="auto">
-          <a:xfrm>
-            <a:off x="14564621" y="6825214"/>
-            <a:ext cx="457200" cy="457200"/>
-          </a:xfrm>
-          <a:prstGeom prst="rect">
-            <a:avLst/>
-          </a:prstGeom>
-          <a:noFill/>
-          <a:ln>
-            <a:noFill/>
-          </a:ln>
-          <a:extLst>
-            <a:ext uri="{909E8E84-426E-40DD-AFC4-6F175D3DCCD1}">
-              <a14:hiddenFill xmlns:a14="http://schemas.microsoft.com/office/drawing/2010/main">
-                <a:solidFill>
-                  <a:srgbClr val="FFFFFF"/>
-                </a:solidFill>
-              </a14:hiddenFill>
-            </a:ext>
-            <a:ext uri="{91240B29-F687-4F45-9708-019B960494DF}">
-              <a14:hiddenLine xmlns:a14="http://schemas.microsoft.com/office/drawing/2010/main" w="9525">
-                <a:solidFill>
-                  <a:srgbClr val="000000"/>
-                </a:solidFill>
-                <a:miter lim="800000"/>
-                <a:headEnd/>
-                <a:tailEnd/>
-              </a14:hiddenLine>
-            </a:ext>
-          </a:extLst>
-        </p:spPr>
-      </p:pic>
-      <p:pic>
-        <p:nvPicPr>
-          <p:cNvPr id="65" name="Graphic 60">
-            <a:extLst>
-              <a:ext uri="{FF2B5EF4-FFF2-40B4-BE49-F238E27FC236}">
-                <a16:creationId xmlns:a16="http://schemas.microsoft.com/office/drawing/2014/main" id="{E2763441-6680-CB90-2976-BD0C164AB217}"/>
-              </a:ext>
-            </a:extLst>
-          </p:cNvPr>
-          <p:cNvPicPr>
-            <a:picLocks noChangeAspect="1" noChangeArrowheads="1"/>
-          </p:cNvPicPr>
-          <p:nvPr/>
-        </p:nvPicPr>
-        <p:blipFill>
-          <a:blip r:embed="rId8">
-            <a:extLst>
-              <a:ext uri="{28A0092B-C50C-407E-A947-70E740481C1C}">
-                <a14:useLocalDpi xmlns:a14="http://schemas.microsoft.com/office/drawing/2010/main" val="0"/>
-              </a:ext>
-            </a:extLst>
-          </a:blip>
-          <a:srcRect/>
-          <a:stretch>
-            <a:fillRect/>
-          </a:stretch>
-        </p:blipFill>
-        <p:spPr bwMode="auto">
-          <a:xfrm>
-            <a:off x="15470881" y="6777279"/>
-            <a:ext cx="457200" cy="457200"/>
-          </a:xfrm>
-          <a:prstGeom prst="rect">
-            <a:avLst/>
-          </a:prstGeom>
-          <a:noFill/>
-          <a:ln>
-            <a:noFill/>
-          </a:ln>
-          <a:extLst>
-            <a:ext uri="{909E8E84-426E-40DD-AFC4-6F175D3DCCD1}">
-              <a14:hiddenFill xmlns:a14="http://schemas.microsoft.com/office/drawing/2010/main">
-                <a:solidFill>
-                  <a:srgbClr val="FFFFFF"/>
-                </a:solidFill>
-              </a14:hiddenFill>
-            </a:ext>
-            <a:ext uri="{91240B29-F687-4F45-9708-019B960494DF}">
-              <a14:hiddenLine xmlns:a14="http://schemas.microsoft.com/office/drawing/2010/main" w="9525">
-                <a:solidFill>
-                  <a:srgbClr val="000000"/>
-                </a:solidFill>
-                <a:miter lim="800000"/>
-                <a:headEnd/>
-                <a:tailEnd/>
-              </a14:hiddenLine>
-            </a:ext>
-          </a:extLst>
-        </p:spPr>
-      </p:pic>
-      <p:sp>
-        <p:nvSpPr>
-          <p:cNvPr id="67" name="TextBox 16">
-            <a:extLst>
-              <a:ext uri="{FF2B5EF4-FFF2-40B4-BE49-F238E27FC236}">
-                <a16:creationId xmlns:a16="http://schemas.microsoft.com/office/drawing/2014/main" id="{E21B13EC-DB61-3B3B-A04B-64DCF5ACD8E8}"/>
-              </a:ext>
-            </a:extLst>
-          </p:cNvPr>
-          <p:cNvSpPr txBox="1">
-            <a:spLocks noChangeArrowheads="1"/>
-          </p:cNvSpPr>
-          <p:nvPr/>
-        </p:nvSpPr>
-        <p:spPr bwMode="auto">
-          <a:xfrm>
-            <a:off x="9149723" y="7263658"/>
-            <a:ext cx="1115568" cy="261610"/>
-          </a:xfrm>
-          <a:prstGeom prst="rect">
-            <a:avLst/>
-          </a:prstGeom>
-          <a:noFill/>
-          <a:ln>
-            <a:noFill/>
-          </a:ln>
-          <a:extLst>
-            <a:ext uri="{909E8E84-426E-40DD-AFC4-6F175D3DCCD1}">
-              <a14:hiddenFill xmlns:a14="http://schemas.microsoft.com/office/drawing/2010/main">
-                <a:solidFill>
-                  <a:srgbClr val="FFFFFF"/>
-                </a:solidFill>
-              </a14:hiddenFill>
-            </a:ext>
-            <a:ext uri="{91240B29-F687-4F45-9708-019B960494DF}">
-              <a14:hiddenLine xmlns:a14="http://schemas.microsoft.com/office/drawing/2010/main" w="9525">
-                <a:solidFill>
-                  <a:srgbClr val="000000"/>
-                </a:solidFill>
-                <a:miter lim="800000"/>
-                <a:headEnd/>
-                <a:tailEnd/>
-              </a14:hiddenLine>
-            </a:ext>
-          </a:extLst>
-        </p:spPr>
-        <p:txBody>
-          <a:bodyPr wrap="square" lIns="0" rIns="0">
-            <a:spAutoFit/>
-          </a:bodyPr>
-          <a:lstStyle>
-            <a:lvl1pPr>
-              <a:defRPr>
-                <a:solidFill>
-                  <a:schemeClr val="tx1"/>
-                </a:solidFill>
-                <a:latin typeface="Calibri" panose="020F0502020204030204" pitchFamily="34" charset="0"/>
-              </a:defRPr>
-            </a:lvl1pPr>
-            <a:lvl2pPr marL="742950" indent="-285750">
-              <a:defRPr>
-                <a:solidFill>
-                  <a:schemeClr val="tx1"/>
-                </a:solidFill>
-                <a:latin typeface="Calibri" panose="020F0502020204030204" pitchFamily="34" charset="0"/>
-              </a:defRPr>
-            </a:lvl2pPr>
-            <a:lvl3pPr marL="1143000" indent="-228600">
-              <a:defRPr>
-                <a:solidFill>
-                  <a:schemeClr val="tx1"/>
-                </a:solidFill>
-                <a:latin typeface="Calibri" panose="020F0502020204030204" pitchFamily="34" charset="0"/>
-              </a:defRPr>
-            </a:lvl3pPr>
-            <a:lvl4pPr marL="1600200" indent="-228600">
-              <a:defRPr>
-                <a:solidFill>
-                  <a:schemeClr val="tx1"/>
-                </a:solidFill>
-                <a:latin typeface="Calibri" panose="020F0502020204030204" pitchFamily="34" charset="0"/>
-              </a:defRPr>
-            </a:lvl4pPr>
-            <a:lvl5pPr marL="2057400" indent="-228600">
-              <a:defRPr>
-                <a:solidFill>
-                  <a:schemeClr val="tx1"/>
-                </a:solidFill>
-                <a:latin typeface="Calibri" panose="020F0502020204030204" pitchFamily="34" charset="0"/>
-              </a:defRPr>
-            </a:lvl5pPr>
-            <a:lvl6pPr marL="2514600" indent="-228600" eaLnBrk="0" fontAlgn="base" hangingPunct="0">
-              <a:spcBef>
-                <a:spcPct val="0"/>
-              </a:spcBef>
-              <a:spcAft>
-                <a:spcPct val="0"/>
-              </a:spcAft>
-              <a:defRPr>
-                <a:solidFill>
-                  <a:schemeClr val="tx1"/>
-                </a:solidFill>
-                <a:latin typeface="Calibri" panose="020F0502020204030204" pitchFamily="34" charset="0"/>
-              </a:defRPr>
-            </a:lvl6pPr>
-            <a:lvl7pPr marL="2971800" indent="-228600" eaLnBrk="0" fontAlgn="base" hangingPunct="0">
-              <a:spcBef>
-                <a:spcPct val="0"/>
-              </a:spcBef>
-              <a:spcAft>
-                <a:spcPct val="0"/>
-              </a:spcAft>
-              <a:defRPr>
-                <a:solidFill>
-                  <a:schemeClr val="tx1"/>
-                </a:solidFill>
-                <a:latin typeface="Calibri" panose="020F0502020204030204" pitchFamily="34" charset="0"/>
-              </a:defRPr>
-            </a:lvl7pPr>
-            <a:lvl8pPr marL="3429000" indent="-228600" eaLnBrk="0" fontAlgn="base" hangingPunct="0">
-              <a:spcBef>
-                <a:spcPct val="0"/>
-              </a:spcBef>
-              <a:spcAft>
-                <a:spcPct val="0"/>
-              </a:spcAft>
-              <a:defRPr>
-                <a:solidFill>
-                  <a:schemeClr val="tx1"/>
-                </a:solidFill>
-                <a:latin typeface="Calibri" panose="020F0502020204030204" pitchFamily="34" charset="0"/>
-              </a:defRPr>
-            </a:lvl8pPr>
-            <a:lvl9pPr marL="3886200" indent="-228600" eaLnBrk="0" fontAlgn="base" hangingPunct="0">
-              <a:spcBef>
-                <a:spcPct val="0"/>
-              </a:spcBef>
-              <a:spcAft>
-                <a:spcPct val="0"/>
-              </a:spcAft>
-              <a:defRPr>
-                <a:solidFill>
-                  <a:schemeClr val="tx1"/>
-                </a:solidFill>
-                <a:latin typeface="Calibri" panose="020F0502020204030204" pitchFamily="34" charset="0"/>
-              </a:defRPr>
-            </a:lvl9pPr>
-          </a:lstStyle>
-          <a:p>
-            <a:pPr algn="ctr" eaLnBrk="1" hangingPunct="1"/>
-            <a:r>
-              <a:rPr lang="en-US" altLang="en-US" sz="1100" dirty="0">
-                <a:latin typeface="Arial" panose="020B0604020202020204" pitchFamily="34" charset="0"/>
-                <a:ea typeface="Amazon Ember" panose="020B0603020204020204" pitchFamily="34" charset="0"/>
-                <a:cs typeface="Arial" panose="020B0604020202020204" pitchFamily="34" charset="0"/>
-              </a:rPr>
-              <a:t>Instance</a:t>
-            </a:r>
-          </a:p>
-        </p:txBody>
-      </p:sp>
-      <p:sp>
-        <p:nvSpPr>
-          <p:cNvPr id="68" name="TextBox 16">
-            <a:extLst>
-              <a:ext uri="{FF2B5EF4-FFF2-40B4-BE49-F238E27FC236}">
-                <a16:creationId xmlns:a16="http://schemas.microsoft.com/office/drawing/2014/main" id="{964458C2-B701-C3E6-51AA-D3DE6C9397EF}"/>
-              </a:ext>
-            </a:extLst>
-          </p:cNvPr>
-          <p:cNvSpPr txBox="1">
-            <a:spLocks noChangeArrowheads="1"/>
-          </p:cNvSpPr>
-          <p:nvPr/>
-        </p:nvSpPr>
-        <p:spPr bwMode="auto">
-          <a:xfrm>
-            <a:off x="10473652" y="7263658"/>
-            <a:ext cx="1115568" cy="261610"/>
-          </a:xfrm>
-          <a:prstGeom prst="rect">
-            <a:avLst/>
-          </a:prstGeom>
-          <a:noFill/>
-          <a:ln>
-            <a:noFill/>
-          </a:ln>
-          <a:extLst>
-            <a:ext uri="{909E8E84-426E-40DD-AFC4-6F175D3DCCD1}">
-              <a14:hiddenFill xmlns:a14="http://schemas.microsoft.com/office/drawing/2010/main">
-                <a:solidFill>
-                  <a:srgbClr val="FFFFFF"/>
-                </a:solidFill>
-              </a14:hiddenFill>
-            </a:ext>
-            <a:ext uri="{91240B29-F687-4F45-9708-019B960494DF}">
-              <a14:hiddenLine xmlns:a14="http://schemas.microsoft.com/office/drawing/2010/main" w="9525">
-                <a:solidFill>
-                  <a:srgbClr val="000000"/>
-                </a:solidFill>
-                <a:miter lim="800000"/>
-                <a:headEnd/>
-                <a:tailEnd/>
-              </a14:hiddenLine>
-            </a:ext>
-          </a:extLst>
-        </p:spPr>
-        <p:txBody>
-          <a:bodyPr wrap="square" lIns="0" rIns="0">
-            <a:spAutoFit/>
-          </a:bodyPr>
-          <a:lstStyle>
-            <a:lvl1pPr>
-              <a:defRPr>
-                <a:solidFill>
-                  <a:schemeClr val="tx1"/>
-                </a:solidFill>
-                <a:latin typeface="Calibri" panose="020F0502020204030204" pitchFamily="34" charset="0"/>
-              </a:defRPr>
-            </a:lvl1pPr>
-            <a:lvl2pPr marL="742950" indent="-285750">
-              <a:defRPr>
-                <a:solidFill>
-                  <a:schemeClr val="tx1"/>
-                </a:solidFill>
-                <a:latin typeface="Calibri" panose="020F0502020204030204" pitchFamily="34" charset="0"/>
-              </a:defRPr>
-            </a:lvl2pPr>
-            <a:lvl3pPr marL="1143000" indent="-228600">
-              <a:defRPr>
-                <a:solidFill>
-                  <a:schemeClr val="tx1"/>
-                </a:solidFill>
-                <a:latin typeface="Calibri" panose="020F0502020204030204" pitchFamily="34" charset="0"/>
-              </a:defRPr>
-            </a:lvl3pPr>
-            <a:lvl4pPr marL="1600200" indent="-228600">
-              <a:defRPr>
-                <a:solidFill>
-                  <a:schemeClr val="tx1"/>
-                </a:solidFill>
-                <a:latin typeface="Calibri" panose="020F0502020204030204" pitchFamily="34" charset="0"/>
-              </a:defRPr>
-            </a:lvl4pPr>
-            <a:lvl5pPr marL="2057400" indent="-228600">
-              <a:defRPr>
-                <a:solidFill>
-                  <a:schemeClr val="tx1"/>
-                </a:solidFill>
-                <a:latin typeface="Calibri" panose="020F0502020204030204" pitchFamily="34" charset="0"/>
-              </a:defRPr>
-            </a:lvl5pPr>
-            <a:lvl6pPr marL="2514600" indent="-228600" eaLnBrk="0" fontAlgn="base" hangingPunct="0">
-              <a:spcBef>
-                <a:spcPct val="0"/>
-              </a:spcBef>
-              <a:spcAft>
-                <a:spcPct val="0"/>
-              </a:spcAft>
-              <a:defRPr>
-                <a:solidFill>
-                  <a:schemeClr val="tx1"/>
-                </a:solidFill>
-                <a:latin typeface="Calibri" panose="020F0502020204030204" pitchFamily="34" charset="0"/>
-              </a:defRPr>
-            </a:lvl6pPr>
-            <a:lvl7pPr marL="2971800" indent="-228600" eaLnBrk="0" fontAlgn="base" hangingPunct="0">
-              <a:spcBef>
-                <a:spcPct val="0"/>
-              </a:spcBef>
-              <a:spcAft>
-                <a:spcPct val="0"/>
-              </a:spcAft>
-              <a:defRPr>
-                <a:solidFill>
-                  <a:schemeClr val="tx1"/>
-                </a:solidFill>
-                <a:latin typeface="Calibri" panose="020F0502020204030204" pitchFamily="34" charset="0"/>
-              </a:defRPr>
-            </a:lvl7pPr>
-            <a:lvl8pPr marL="3429000" indent="-228600" eaLnBrk="0" fontAlgn="base" hangingPunct="0">
-              <a:spcBef>
-                <a:spcPct val="0"/>
-              </a:spcBef>
-              <a:spcAft>
-                <a:spcPct val="0"/>
-              </a:spcAft>
-              <a:defRPr>
-                <a:solidFill>
-                  <a:schemeClr val="tx1"/>
-                </a:solidFill>
-                <a:latin typeface="Calibri" panose="020F0502020204030204" pitchFamily="34" charset="0"/>
-              </a:defRPr>
-            </a:lvl8pPr>
-            <a:lvl9pPr marL="3886200" indent="-228600" eaLnBrk="0" fontAlgn="base" hangingPunct="0">
-              <a:spcBef>
-                <a:spcPct val="0"/>
-              </a:spcBef>
-              <a:spcAft>
-                <a:spcPct val="0"/>
-              </a:spcAft>
-              <a:defRPr>
-                <a:solidFill>
-                  <a:schemeClr val="tx1"/>
-                </a:solidFill>
-                <a:latin typeface="Calibri" panose="020F0502020204030204" pitchFamily="34" charset="0"/>
-              </a:defRPr>
-            </a:lvl9pPr>
-          </a:lstStyle>
-          <a:p>
-            <a:pPr algn="ctr" eaLnBrk="1" hangingPunct="1"/>
-            <a:r>
-              <a:rPr lang="en-US" altLang="en-US" sz="1100" dirty="0">
-                <a:latin typeface="Arial" panose="020B0604020202020204" pitchFamily="34" charset="0"/>
-                <a:ea typeface="Amazon Ember" panose="020B0603020204020204" pitchFamily="34" charset="0"/>
-                <a:cs typeface="Arial" panose="020B0604020202020204" pitchFamily="34" charset="0"/>
-              </a:rPr>
-              <a:t>Instance</a:t>
-            </a:r>
-          </a:p>
-        </p:txBody>
-      </p:sp>
-      <p:sp>
-        <p:nvSpPr>
-          <p:cNvPr id="69" name="TextBox 16">
-            <a:extLst>
-              <a:ext uri="{FF2B5EF4-FFF2-40B4-BE49-F238E27FC236}">
-                <a16:creationId xmlns:a16="http://schemas.microsoft.com/office/drawing/2014/main" id="{9072A64C-E361-0573-BD2D-13EBD32A8BF2}"/>
-              </a:ext>
-            </a:extLst>
-          </p:cNvPr>
-          <p:cNvSpPr txBox="1">
-            <a:spLocks noChangeArrowheads="1"/>
-          </p:cNvSpPr>
-          <p:nvPr/>
-        </p:nvSpPr>
-        <p:spPr bwMode="auto">
-          <a:xfrm>
-            <a:off x="13389681" y="7284923"/>
-            <a:ext cx="1115568" cy="261610"/>
-          </a:xfrm>
-          <a:prstGeom prst="rect">
-            <a:avLst/>
-          </a:prstGeom>
-          <a:noFill/>
-          <a:ln>
-            <a:noFill/>
-          </a:ln>
-          <a:extLst>
-            <a:ext uri="{909E8E84-426E-40DD-AFC4-6F175D3DCCD1}">
-              <a14:hiddenFill xmlns:a14="http://schemas.microsoft.com/office/drawing/2010/main">
-                <a:solidFill>
-                  <a:srgbClr val="FFFFFF"/>
-                </a:solidFill>
-              </a14:hiddenFill>
-            </a:ext>
-            <a:ext uri="{91240B29-F687-4F45-9708-019B960494DF}">
-              <a14:hiddenLine xmlns:a14="http://schemas.microsoft.com/office/drawing/2010/main" w="9525">
-                <a:solidFill>
-                  <a:srgbClr val="000000"/>
-                </a:solidFill>
-                <a:miter lim="800000"/>
-                <a:headEnd/>
-                <a:tailEnd/>
-              </a14:hiddenLine>
-            </a:ext>
-          </a:extLst>
-        </p:spPr>
-        <p:txBody>
-          <a:bodyPr wrap="square" lIns="0" rIns="0">
-            <a:spAutoFit/>
-          </a:bodyPr>
-          <a:lstStyle>
-            <a:lvl1pPr>
-              <a:defRPr>
-                <a:solidFill>
-                  <a:schemeClr val="tx1"/>
-                </a:solidFill>
-                <a:latin typeface="Calibri" panose="020F0502020204030204" pitchFamily="34" charset="0"/>
-              </a:defRPr>
-            </a:lvl1pPr>
-            <a:lvl2pPr marL="742950" indent="-285750">
-              <a:defRPr>
-                <a:solidFill>
-                  <a:schemeClr val="tx1"/>
-                </a:solidFill>
-                <a:latin typeface="Calibri" panose="020F0502020204030204" pitchFamily="34" charset="0"/>
-              </a:defRPr>
-            </a:lvl2pPr>
-            <a:lvl3pPr marL="1143000" indent="-228600">
-              <a:defRPr>
-                <a:solidFill>
-                  <a:schemeClr val="tx1"/>
-                </a:solidFill>
-                <a:latin typeface="Calibri" panose="020F0502020204030204" pitchFamily="34" charset="0"/>
-              </a:defRPr>
-            </a:lvl3pPr>
-            <a:lvl4pPr marL="1600200" indent="-228600">
-              <a:defRPr>
-                <a:solidFill>
-                  <a:schemeClr val="tx1"/>
-                </a:solidFill>
-                <a:latin typeface="Calibri" panose="020F0502020204030204" pitchFamily="34" charset="0"/>
-              </a:defRPr>
-            </a:lvl4pPr>
-            <a:lvl5pPr marL="2057400" indent="-228600">
-              <a:defRPr>
-                <a:solidFill>
-                  <a:schemeClr val="tx1"/>
-                </a:solidFill>
-                <a:latin typeface="Calibri" panose="020F0502020204030204" pitchFamily="34" charset="0"/>
-              </a:defRPr>
-            </a:lvl5pPr>
-            <a:lvl6pPr marL="2514600" indent="-228600" eaLnBrk="0" fontAlgn="base" hangingPunct="0">
-              <a:spcBef>
-                <a:spcPct val="0"/>
-              </a:spcBef>
-              <a:spcAft>
-                <a:spcPct val="0"/>
-              </a:spcAft>
-              <a:defRPr>
-                <a:solidFill>
-                  <a:schemeClr val="tx1"/>
-                </a:solidFill>
-                <a:latin typeface="Calibri" panose="020F0502020204030204" pitchFamily="34" charset="0"/>
-              </a:defRPr>
-            </a:lvl6pPr>
-            <a:lvl7pPr marL="2971800" indent="-228600" eaLnBrk="0" fontAlgn="base" hangingPunct="0">
-              <a:spcBef>
-                <a:spcPct val="0"/>
-              </a:spcBef>
-              <a:spcAft>
-                <a:spcPct val="0"/>
-              </a:spcAft>
-              <a:defRPr>
-                <a:solidFill>
-                  <a:schemeClr val="tx1"/>
-                </a:solidFill>
-                <a:latin typeface="Calibri" panose="020F0502020204030204" pitchFamily="34" charset="0"/>
-              </a:defRPr>
-            </a:lvl7pPr>
-            <a:lvl8pPr marL="3429000" indent="-228600" eaLnBrk="0" fontAlgn="base" hangingPunct="0">
-              <a:spcBef>
-                <a:spcPct val="0"/>
-              </a:spcBef>
-              <a:spcAft>
-                <a:spcPct val="0"/>
-              </a:spcAft>
-              <a:defRPr>
-                <a:solidFill>
-                  <a:schemeClr val="tx1"/>
-                </a:solidFill>
-                <a:latin typeface="Calibri" panose="020F0502020204030204" pitchFamily="34" charset="0"/>
-              </a:defRPr>
-            </a:lvl8pPr>
-            <a:lvl9pPr marL="3886200" indent="-228600" eaLnBrk="0" fontAlgn="base" hangingPunct="0">
-              <a:spcBef>
-                <a:spcPct val="0"/>
-              </a:spcBef>
-              <a:spcAft>
-                <a:spcPct val="0"/>
-              </a:spcAft>
-              <a:defRPr>
-                <a:solidFill>
-                  <a:schemeClr val="tx1"/>
-                </a:solidFill>
-                <a:latin typeface="Calibri" panose="020F0502020204030204" pitchFamily="34" charset="0"/>
-              </a:defRPr>
-            </a:lvl9pPr>
-          </a:lstStyle>
-          <a:p>
-            <a:pPr algn="ctr" eaLnBrk="1" hangingPunct="1"/>
-            <a:r>
-              <a:rPr lang="en-US" altLang="en-US" sz="1100" dirty="0">
-                <a:latin typeface="Arial" panose="020B0604020202020204" pitchFamily="34" charset="0"/>
-                <a:ea typeface="Amazon Ember" panose="020B0603020204020204" pitchFamily="34" charset="0"/>
-                <a:cs typeface="Arial" panose="020B0604020202020204" pitchFamily="34" charset="0"/>
-              </a:rPr>
-              <a:t>Instance</a:t>
-            </a:r>
-          </a:p>
-        </p:txBody>
-      </p:sp>
-      <p:sp>
-        <p:nvSpPr>
-          <p:cNvPr id="70" name="TextBox 16">
-            <a:extLst>
-              <a:ext uri="{FF2B5EF4-FFF2-40B4-BE49-F238E27FC236}">
-                <a16:creationId xmlns:a16="http://schemas.microsoft.com/office/drawing/2014/main" id="{50B0F0E6-08BE-0278-0F97-898FB0C5D18C}"/>
-              </a:ext>
-            </a:extLst>
-          </p:cNvPr>
-          <p:cNvSpPr txBox="1">
-            <a:spLocks noChangeArrowheads="1"/>
-          </p:cNvSpPr>
-          <p:nvPr/>
-        </p:nvSpPr>
-        <p:spPr bwMode="auto">
-          <a:xfrm>
-            <a:off x="6273755" y="7234479"/>
-            <a:ext cx="1115568" cy="261610"/>
-          </a:xfrm>
-          <a:prstGeom prst="rect">
-            <a:avLst/>
-          </a:prstGeom>
-          <a:noFill/>
-          <a:ln>
-            <a:noFill/>
-          </a:ln>
-          <a:extLst>
-            <a:ext uri="{909E8E84-426E-40DD-AFC4-6F175D3DCCD1}">
-              <a14:hiddenFill xmlns:a14="http://schemas.microsoft.com/office/drawing/2010/main">
-                <a:solidFill>
-                  <a:srgbClr val="FFFFFF"/>
-                </a:solidFill>
-              </a14:hiddenFill>
-            </a:ext>
-            <a:ext uri="{91240B29-F687-4F45-9708-019B960494DF}">
-              <a14:hiddenLine xmlns:a14="http://schemas.microsoft.com/office/drawing/2010/main" w="9525">
-                <a:solidFill>
-                  <a:srgbClr val="000000"/>
-                </a:solidFill>
-                <a:miter lim="800000"/>
-                <a:headEnd/>
-                <a:tailEnd/>
-              </a14:hiddenLine>
-            </a:ext>
-          </a:extLst>
-        </p:spPr>
-        <p:txBody>
-          <a:bodyPr wrap="square" lIns="0" rIns="0">
-            <a:spAutoFit/>
-          </a:bodyPr>
-          <a:lstStyle>
-            <a:lvl1pPr>
-              <a:defRPr>
-                <a:solidFill>
-                  <a:schemeClr val="tx1"/>
-                </a:solidFill>
-                <a:latin typeface="Calibri" panose="020F0502020204030204" pitchFamily="34" charset="0"/>
-              </a:defRPr>
-            </a:lvl1pPr>
-            <a:lvl2pPr marL="742950" indent="-285750">
-              <a:defRPr>
-                <a:solidFill>
-                  <a:schemeClr val="tx1"/>
-                </a:solidFill>
-                <a:latin typeface="Calibri" panose="020F0502020204030204" pitchFamily="34" charset="0"/>
-              </a:defRPr>
-            </a:lvl2pPr>
-            <a:lvl3pPr marL="1143000" indent="-228600">
-              <a:defRPr>
-                <a:solidFill>
-                  <a:schemeClr val="tx1"/>
-                </a:solidFill>
-                <a:latin typeface="Calibri" panose="020F0502020204030204" pitchFamily="34" charset="0"/>
-              </a:defRPr>
-            </a:lvl3pPr>
-            <a:lvl4pPr marL="1600200" indent="-228600">
-              <a:defRPr>
-                <a:solidFill>
-                  <a:schemeClr val="tx1"/>
-                </a:solidFill>
-                <a:latin typeface="Calibri" panose="020F0502020204030204" pitchFamily="34" charset="0"/>
-              </a:defRPr>
-            </a:lvl4pPr>
-            <a:lvl5pPr marL="2057400" indent="-228600">
-              <a:defRPr>
-                <a:solidFill>
-                  <a:schemeClr val="tx1"/>
-                </a:solidFill>
-                <a:latin typeface="Calibri" panose="020F0502020204030204" pitchFamily="34" charset="0"/>
-              </a:defRPr>
-            </a:lvl5pPr>
-            <a:lvl6pPr marL="2514600" indent="-228600" eaLnBrk="0" fontAlgn="base" hangingPunct="0">
-              <a:spcBef>
-                <a:spcPct val="0"/>
-              </a:spcBef>
-              <a:spcAft>
-                <a:spcPct val="0"/>
-              </a:spcAft>
-              <a:defRPr>
-                <a:solidFill>
-                  <a:schemeClr val="tx1"/>
-                </a:solidFill>
-                <a:latin typeface="Calibri" panose="020F0502020204030204" pitchFamily="34" charset="0"/>
-              </a:defRPr>
-            </a:lvl6pPr>
-            <a:lvl7pPr marL="2971800" indent="-228600" eaLnBrk="0" fontAlgn="base" hangingPunct="0">
-              <a:spcBef>
-                <a:spcPct val="0"/>
-              </a:spcBef>
-              <a:spcAft>
-                <a:spcPct val="0"/>
-              </a:spcAft>
-              <a:defRPr>
-                <a:solidFill>
-                  <a:schemeClr val="tx1"/>
-                </a:solidFill>
-                <a:latin typeface="Calibri" panose="020F0502020204030204" pitchFamily="34" charset="0"/>
-              </a:defRPr>
-            </a:lvl7pPr>
-            <a:lvl8pPr marL="3429000" indent="-228600" eaLnBrk="0" fontAlgn="base" hangingPunct="0">
-              <a:spcBef>
-                <a:spcPct val="0"/>
-              </a:spcBef>
-              <a:spcAft>
-                <a:spcPct val="0"/>
-              </a:spcAft>
-              <a:defRPr>
-                <a:solidFill>
-                  <a:schemeClr val="tx1"/>
-                </a:solidFill>
-                <a:latin typeface="Calibri" panose="020F0502020204030204" pitchFamily="34" charset="0"/>
-              </a:defRPr>
-            </a:lvl8pPr>
-            <a:lvl9pPr marL="3886200" indent="-228600" eaLnBrk="0" fontAlgn="base" hangingPunct="0">
-              <a:spcBef>
-                <a:spcPct val="0"/>
-              </a:spcBef>
-              <a:spcAft>
-                <a:spcPct val="0"/>
-              </a:spcAft>
-              <a:defRPr>
-                <a:solidFill>
-                  <a:schemeClr val="tx1"/>
-                </a:solidFill>
-                <a:latin typeface="Calibri" panose="020F0502020204030204" pitchFamily="34" charset="0"/>
-              </a:defRPr>
-            </a:lvl9pPr>
-          </a:lstStyle>
-          <a:p>
-            <a:pPr algn="ctr" eaLnBrk="1" hangingPunct="1"/>
-            <a:r>
-              <a:rPr lang="en-US" altLang="en-US" sz="1100" dirty="0">
-                <a:latin typeface="Arial" panose="020B0604020202020204" pitchFamily="34" charset="0"/>
-                <a:ea typeface="Amazon Ember" panose="020B0603020204020204" pitchFamily="34" charset="0"/>
-                <a:cs typeface="Arial" panose="020B0604020202020204" pitchFamily="34" charset="0"/>
-              </a:rPr>
-              <a:t>Instance</a:t>
-            </a:r>
-          </a:p>
-        </p:txBody>
-      </p:sp>
-      <p:sp>
-        <p:nvSpPr>
-          <p:cNvPr id="71" name="TextBox 16">
-            <a:extLst>
-              <a:ext uri="{FF2B5EF4-FFF2-40B4-BE49-F238E27FC236}">
-                <a16:creationId xmlns:a16="http://schemas.microsoft.com/office/drawing/2014/main" id="{80472F09-1B85-754D-0C69-D8BDFA22BDE2}"/>
-              </a:ext>
-            </a:extLst>
-          </p:cNvPr>
-          <p:cNvSpPr txBox="1">
-            <a:spLocks noChangeArrowheads="1"/>
-          </p:cNvSpPr>
-          <p:nvPr/>
-        </p:nvSpPr>
-        <p:spPr bwMode="auto">
-          <a:xfrm>
-            <a:off x="15141697" y="7337555"/>
-            <a:ext cx="1115568" cy="261610"/>
-          </a:xfrm>
-          <a:prstGeom prst="rect">
-            <a:avLst/>
-          </a:prstGeom>
-          <a:noFill/>
-          <a:ln>
-            <a:noFill/>
-          </a:ln>
-          <a:extLst>
-            <a:ext uri="{909E8E84-426E-40DD-AFC4-6F175D3DCCD1}">
-              <a14:hiddenFill xmlns:a14="http://schemas.microsoft.com/office/drawing/2010/main">
-                <a:solidFill>
-                  <a:srgbClr val="FFFFFF"/>
-                </a:solidFill>
-              </a14:hiddenFill>
-            </a:ext>
-            <a:ext uri="{91240B29-F687-4F45-9708-019B960494DF}">
-              <a14:hiddenLine xmlns:a14="http://schemas.microsoft.com/office/drawing/2010/main" w="9525">
-                <a:solidFill>
-                  <a:srgbClr val="000000"/>
-                </a:solidFill>
-                <a:miter lim="800000"/>
-                <a:headEnd/>
-                <a:tailEnd/>
-              </a14:hiddenLine>
-            </a:ext>
-          </a:extLst>
-        </p:spPr>
-        <p:txBody>
-          <a:bodyPr wrap="square" lIns="0" rIns="0">
-            <a:spAutoFit/>
-          </a:bodyPr>
-          <a:lstStyle>
-            <a:lvl1pPr>
-              <a:defRPr>
-                <a:solidFill>
-                  <a:schemeClr val="tx1"/>
-                </a:solidFill>
-                <a:latin typeface="Calibri" panose="020F0502020204030204" pitchFamily="34" charset="0"/>
-              </a:defRPr>
-            </a:lvl1pPr>
-            <a:lvl2pPr marL="742950" indent="-285750">
-              <a:defRPr>
-                <a:solidFill>
-                  <a:schemeClr val="tx1"/>
-                </a:solidFill>
-                <a:latin typeface="Calibri" panose="020F0502020204030204" pitchFamily="34" charset="0"/>
-              </a:defRPr>
-            </a:lvl2pPr>
-            <a:lvl3pPr marL="1143000" indent="-228600">
-              <a:defRPr>
-                <a:solidFill>
-                  <a:schemeClr val="tx1"/>
-                </a:solidFill>
-                <a:latin typeface="Calibri" panose="020F0502020204030204" pitchFamily="34" charset="0"/>
-              </a:defRPr>
-            </a:lvl3pPr>
-            <a:lvl4pPr marL="1600200" indent="-228600">
-              <a:defRPr>
-                <a:solidFill>
-                  <a:schemeClr val="tx1"/>
-                </a:solidFill>
-                <a:latin typeface="Calibri" panose="020F0502020204030204" pitchFamily="34" charset="0"/>
-              </a:defRPr>
-            </a:lvl4pPr>
-            <a:lvl5pPr marL="2057400" indent="-228600">
-              <a:defRPr>
-                <a:solidFill>
-                  <a:schemeClr val="tx1"/>
-                </a:solidFill>
-                <a:latin typeface="Calibri" panose="020F0502020204030204" pitchFamily="34" charset="0"/>
-              </a:defRPr>
-            </a:lvl5pPr>
-            <a:lvl6pPr marL="2514600" indent="-228600" eaLnBrk="0" fontAlgn="base" hangingPunct="0">
-              <a:spcBef>
-                <a:spcPct val="0"/>
-              </a:spcBef>
-              <a:spcAft>
-                <a:spcPct val="0"/>
-              </a:spcAft>
-              <a:defRPr>
-                <a:solidFill>
-                  <a:schemeClr val="tx1"/>
-                </a:solidFill>
-                <a:latin typeface="Calibri" panose="020F0502020204030204" pitchFamily="34" charset="0"/>
-              </a:defRPr>
-            </a:lvl6pPr>
-            <a:lvl7pPr marL="2971800" indent="-228600" eaLnBrk="0" fontAlgn="base" hangingPunct="0">
-              <a:spcBef>
-                <a:spcPct val="0"/>
-              </a:spcBef>
-              <a:spcAft>
-                <a:spcPct val="0"/>
-              </a:spcAft>
-              <a:defRPr>
-                <a:solidFill>
-                  <a:schemeClr val="tx1"/>
-                </a:solidFill>
-                <a:latin typeface="Calibri" panose="020F0502020204030204" pitchFamily="34" charset="0"/>
-              </a:defRPr>
-            </a:lvl7pPr>
-            <a:lvl8pPr marL="3429000" indent="-228600" eaLnBrk="0" fontAlgn="base" hangingPunct="0">
-              <a:spcBef>
-                <a:spcPct val="0"/>
-              </a:spcBef>
-              <a:spcAft>
-                <a:spcPct val="0"/>
-              </a:spcAft>
-              <a:defRPr>
-                <a:solidFill>
-                  <a:schemeClr val="tx1"/>
-                </a:solidFill>
-                <a:latin typeface="Calibri" panose="020F0502020204030204" pitchFamily="34" charset="0"/>
-              </a:defRPr>
-            </a:lvl8pPr>
-            <a:lvl9pPr marL="3886200" indent="-228600" eaLnBrk="0" fontAlgn="base" hangingPunct="0">
-              <a:spcBef>
-                <a:spcPct val="0"/>
-              </a:spcBef>
-              <a:spcAft>
-                <a:spcPct val="0"/>
-              </a:spcAft>
-              <a:defRPr>
-                <a:solidFill>
-                  <a:schemeClr val="tx1"/>
-                </a:solidFill>
-                <a:latin typeface="Calibri" panose="020F0502020204030204" pitchFamily="34" charset="0"/>
-              </a:defRPr>
-            </a:lvl9pPr>
-          </a:lstStyle>
-          <a:p>
-            <a:pPr algn="ctr" eaLnBrk="1" hangingPunct="1"/>
-            <a:r>
-              <a:rPr lang="en-US" altLang="en-US" sz="1100" dirty="0">
-                <a:latin typeface="Arial" panose="020B0604020202020204" pitchFamily="34" charset="0"/>
-                <a:ea typeface="Amazon Ember" panose="020B0603020204020204" pitchFamily="34" charset="0"/>
-                <a:cs typeface="Arial" panose="020B0604020202020204" pitchFamily="34" charset="0"/>
-              </a:rPr>
-              <a:t>Instance</a:t>
-            </a:r>
-          </a:p>
-        </p:txBody>
-      </p:sp>
+            <a:ln>
+              <a:noFill/>
+            </a:ln>
+            <a:extLst>
+              <a:ext uri="{909E8E84-426E-40DD-AFC4-6F175D3DCCD1}">
+                <a14:hiddenFill xmlns:a14="http://schemas.microsoft.com/office/drawing/2010/main">
+                  <a:solidFill>
+                    <a:srgbClr val="FFFFFF"/>
+                  </a:solidFill>
+                </a14:hiddenFill>
+              </a:ext>
+              <a:ext uri="{91240B29-F687-4F45-9708-019B960494DF}">
+                <a14:hiddenLine xmlns:a14="http://schemas.microsoft.com/office/drawing/2010/main" w="9525">
+                  <a:solidFill>
+                    <a:srgbClr val="000000"/>
+                  </a:solidFill>
+                  <a:miter lim="800000"/>
+                  <a:headEnd/>
+                  <a:tailEnd/>
+                </a14:hiddenLine>
+              </a:ext>
+            </a:extLst>
+          </p:spPr>
+          <p:txBody>
+            <a:bodyPr wrap="square" lIns="0" rIns="0">
+              <a:spAutoFit/>
+            </a:bodyPr>
+            <a:lstStyle>
+              <a:lvl1pPr>
+                <a:defRPr>
+                  <a:solidFill>
+                    <a:schemeClr val="tx1"/>
+                  </a:solidFill>
+                  <a:latin typeface="Calibri" panose="020F0502020204030204" pitchFamily="34" charset="0"/>
+                </a:defRPr>
+              </a:lvl1pPr>
+              <a:lvl2pPr marL="742950" indent="-285750">
+                <a:defRPr>
+                  <a:solidFill>
+                    <a:schemeClr val="tx1"/>
+                  </a:solidFill>
+                  <a:latin typeface="Calibri" panose="020F0502020204030204" pitchFamily="34" charset="0"/>
+                </a:defRPr>
+              </a:lvl2pPr>
+              <a:lvl3pPr marL="1143000" indent="-228600">
+                <a:defRPr>
+                  <a:solidFill>
+                    <a:schemeClr val="tx1"/>
+                  </a:solidFill>
+                  <a:latin typeface="Calibri" panose="020F0502020204030204" pitchFamily="34" charset="0"/>
+                </a:defRPr>
+              </a:lvl3pPr>
+              <a:lvl4pPr marL="1600200" indent="-228600">
+                <a:defRPr>
+                  <a:solidFill>
+                    <a:schemeClr val="tx1"/>
+                  </a:solidFill>
+                  <a:latin typeface="Calibri" panose="020F0502020204030204" pitchFamily="34" charset="0"/>
+                </a:defRPr>
+              </a:lvl4pPr>
+              <a:lvl5pPr marL="2057400" indent="-228600">
+                <a:defRPr>
+                  <a:solidFill>
+                    <a:schemeClr val="tx1"/>
+                  </a:solidFill>
+                  <a:latin typeface="Calibri" panose="020F0502020204030204" pitchFamily="34" charset="0"/>
+                </a:defRPr>
+              </a:lvl5pPr>
+              <a:lvl6pPr marL="2514600" indent="-228600" eaLnBrk="0" fontAlgn="base" hangingPunct="0">
+                <a:spcBef>
+                  <a:spcPct val="0"/>
+                </a:spcBef>
+                <a:spcAft>
+                  <a:spcPct val="0"/>
+                </a:spcAft>
+                <a:defRPr>
+                  <a:solidFill>
+                    <a:schemeClr val="tx1"/>
+                  </a:solidFill>
+                  <a:latin typeface="Calibri" panose="020F0502020204030204" pitchFamily="34" charset="0"/>
+                </a:defRPr>
+              </a:lvl6pPr>
+              <a:lvl7pPr marL="2971800" indent="-228600" eaLnBrk="0" fontAlgn="base" hangingPunct="0">
+                <a:spcBef>
+                  <a:spcPct val="0"/>
+                </a:spcBef>
+                <a:spcAft>
+                  <a:spcPct val="0"/>
+                </a:spcAft>
+                <a:defRPr>
+                  <a:solidFill>
+                    <a:schemeClr val="tx1"/>
+                  </a:solidFill>
+                  <a:latin typeface="Calibri" panose="020F0502020204030204" pitchFamily="34" charset="0"/>
+                </a:defRPr>
+              </a:lvl7pPr>
+              <a:lvl8pPr marL="3429000" indent="-228600" eaLnBrk="0" fontAlgn="base" hangingPunct="0">
+                <a:spcBef>
+                  <a:spcPct val="0"/>
+                </a:spcBef>
+                <a:spcAft>
+                  <a:spcPct val="0"/>
+                </a:spcAft>
+                <a:defRPr>
+                  <a:solidFill>
+                    <a:schemeClr val="tx1"/>
+                  </a:solidFill>
+                  <a:latin typeface="Calibri" panose="020F0502020204030204" pitchFamily="34" charset="0"/>
+                </a:defRPr>
+              </a:lvl8pPr>
+              <a:lvl9pPr marL="3886200" indent="-228600" eaLnBrk="0" fontAlgn="base" hangingPunct="0">
+                <a:spcBef>
+                  <a:spcPct val="0"/>
+                </a:spcBef>
+                <a:spcAft>
+                  <a:spcPct val="0"/>
+                </a:spcAft>
+                <a:defRPr>
+                  <a:solidFill>
+                    <a:schemeClr val="tx1"/>
+                  </a:solidFill>
+                  <a:latin typeface="Calibri" panose="020F0502020204030204" pitchFamily="34" charset="0"/>
+                </a:defRPr>
+              </a:lvl9pPr>
+            </a:lstStyle>
+            <a:p>
+              <a:pPr algn="ctr" eaLnBrk="1" hangingPunct="1"/>
+              <a:r>
+                <a:rPr lang="en-US" altLang="en-US" sz="1100" dirty="0">
+                  <a:latin typeface="Arial" panose="020B0604020202020204" pitchFamily="34" charset="0"/>
+                  <a:ea typeface="Amazon Ember" panose="020B0603020204020204" pitchFamily="34" charset="0"/>
+                  <a:cs typeface="Arial" panose="020B0604020202020204" pitchFamily="34" charset="0"/>
+                </a:rPr>
+                <a:t>Managed Instance</a:t>
+              </a:r>
+            </a:p>
+          </p:txBody>
+        </p:sp>
+      </p:grpSp>
       <p:pic>
         <p:nvPicPr>
           <p:cNvPr id="72" name="Graphic 8">
@@ -5761,6 +4459,1458 @@
           </a:p>
         </p:txBody>
       </p:sp>
+      <p:grpSp>
+        <p:nvGrpSpPr>
+          <p:cNvPr id="75" name="Group 74">
+            <a:extLst>
+              <a:ext uri="{FF2B5EF4-FFF2-40B4-BE49-F238E27FC236}">
+                <a16:creationId xmlns:a16="http://schemas.microsoft.com/office/drawing/2014/main" id="{C72D5782-E8E1-8E45-BC22-55279E805F6C}"/>
+              </a:ext>
+            </a:extLst>
+          </p:cNvPr>
+          <p:cNvGrpSpPr/>
+          <p:nvPr/>
+        </p:nvGrpSpPr>
+        <p:grpSpPr>
+          <a:xfrm>
+            <a:off x="6344725" y="6689532"/>
+            <a:ext cx="1115568" cy="847413"/>
+            <a:chOff x="5070214" y="6790224"/>
+            <a:chExt cx="1115568" cy="847413"/>
+          </a:xfrm>
+        </p:grpSpPr>
+        <p:pic>
+          <p:nvPicPr>
+            <p:cNvPr id="76" name="Graphic 60">
+              <a:extLst>
+                <a:ext uri="{FF2B5EF4-FFF2-40B4-BE49-F238E27FC236}">
+                  <a16:creationId xmlns:a16="http://schemas.microsoft.com/office/drawing/2014/main" id="{D8846C43-ED8F-D647-BBB7-4BE50993E227}"/>
+                </a:ext>
+              </a:extLst>
+            </p:cNvPr>
+            <p:cNvPicPr>
+              <a:picLocks noChangeAspect="1" noChangeArrowheads="1"/>
+            </p:cNvPicPr>
+            <p:nvPr/>
+          </p:nvPicPr>
+          <p:blipFill>
+            <a:blip r:embed="rId8">
+              <a:extLst>
+                <a:ext uri="{28A0092B-C50C-407E-A947-70E740481C1C}">
+                  <a14:useLocalDpi xmlns:a14="http://schemas.microsoft.com/office/drawing/2010/main" val="0"/>
+                </a:ext>
+              </a:extLst>
+            </a:blip>
+            <a:srcRect/>
+            <a:stretch>
+              <a:fillRect/>
+            </a:stretch>
+          </p:blipFill>
+          <p:spPr bwMode="auto">
+            <a:xfrm>
+              <a:off x="5399398" y="6790224"/>
+              <a:ext cx="457200" cy="457200"/>
+            </a:xfrm>
+            <a:prstGeom prst="rect">
+              <a:avLst/>
+            </a:prstGeom>
+            <a:noFill/>
+            <a:ln>
+              <a:noFill/>
+            </a:ln>
+            <a:extLst>
+              <a:ext uri="{909E8E84-426E-40DD-AFC4-6F175D3DCCD1}">
+                <a14:hiddenFill xmlns:a14="http://schemas.microsoft.com/office/drawing/2010/main">
+                  <a:solidFill>
+                    <a:srgbClr val="FFFFFF"/>
+                  </a:solidFill>
+                </a14:hiddenFill>
+              </a:ext>
+              <a:ext uri="{91240B29-F687-4F45-9708-019B960494DF}">
+                <a14:hiddenLine xmlns:a14="http://schemas.microsoft.com/office/drawing/2010/main" w="9525">
+                  <a:solidFill>
+                    <a:srgbClr val="000000"/>
+                  </a:solidFill>
+                  <a:miter lim="800000"/>
+                  <a:headEnd/>
+                  <a:tailEnd/>
+                </a14:hiddenLine>
+              </a:ext>
+            </a:extLst>
+          </p:spPr>
+        </p:pic>
+        <p:sp>
+          <p:nvSpPr>
+            <p:cNvPr id="77" name="TextBox 16">
+              <a:extLst>
+                <a:ext uri="{FF2B5EF4-FFF2-40B4-BE49-F238E27FC236}">
+                  <a16:creationId xmlns:a16="http://schemas.microsoft.com/office/drawing/2014/main" id="{90723440-149C-8846-B25A-D7AFD8B352E4}"/>
+                </a:ext>
+              </a:extLst>
+            </p:cNvPr>
+            <p:cNvSpPr txBox="1">
+              <a:spLocks noChangeArrowheads="1"/>
+            </p:cNvSpPr>
+            <p:nvPr/>
+          </p:nvSpPr>
+          <p:spPr bwMode="auto">
+            <a:xfrm>
+              <a:off x="5070214" y="7206750"/>
+              <a:ext cx="1115568" cy="430887"/>
+            </a:xfrm>
+            <a:prstGeom prst="rect">
+              <a:avLst/>
+            </a:prstGeom>
+            <a:noFill/>
+            <a:ln>
+              <a:noFill/>
+            </a:ln>
+            <a:extLst>
+              <a:ext uri="{909E8E84-426E-40DD-AFC4-6F175D3DCCD1}">
+                <a14:hiddenFill xmlns:a14="http://schemas.microsoft.com/office/drawing/2010/main">
+                  <a:solidFill>
+                    <a:srgbClr val="FFFFFF"/>
+                  </a:solidFill>
+                </a14:hiddenFill>
+              </a:ext>
+              <a:ext uri="{91240B29-F687-4F45-9708-019B960494DF}">
+                <a14:hiddenLine xmlns:a14="http://schemas.microsoft.com/office/drawing/2010/main" w="9525">
+                  <a:solidFill>
+                    <a:srgbClr val="000000"/>
+                  </a:solidFill>
+                  <a:miter lim="800000"/>
+                  <a:headEnd/>
+                  <a:tailEnd/>
+                </a14:hiddenLine>
+              </a:ext>
+            </a:extLst>
+          </p:spPr>
+          <p:txBody>
+            <a:bodyPr wrap="square" lIns="0" rIns="0">
+              <a:spAutoFit/>
+            </a:bodyPr>
+            <a:lstStyle>
+              <a:lvl1pPr>
+                <a:defRPr>
+                  <a:solidFill>
+                    <a:schemeClr val="tx1"/>
+                  </a:solidFill>
+                  <a:latin typeface="Calibri" panose="020F0502020204030204" pitchFamily="34" charset="0"/>
+                </a:defRPr>
+              </a:lvl1pPr>
+              <a:lvl2pPr marL="742950" indent="-285750">
+                <a:defRPr>
+                  <a:solidFill>
+                    <a:schemeClr val="tx1"/>
+                  </a:solidFill>
+                  <a:latin typeface="Calibri" panose="020F0502020204030204" pitchFamily="34" charset="0"/>
+                </a:defRPr>
+              </a:lvl2pPr>
+              <a:lvl3pPr marL="1143000" indent="-228600">
+                <a:defRPr>
+                  <a:solidFill>
+                    <a:schemeClr val="tx1"/>
+                  </a:solidFill>
+                  <a:latin typeface="Calibri" panose="020F0502020204030204" pitchFamily="34" charset="0"/>
+                </a:defRPr>
+              </a:lvl3pPr>
+              <a:lvl4pPr marL="1600200" indent="-228600">
+                <a:defRPr>
+                  <a:solidFill>
+                    <a:schemeClr val="tx1"/>
+                  </a:solidFill>
+                  <a:latin typeface="Calibri" panose="020F0502020204030204" pitchFamily="34" charset="0"/>
+                </a:defRPr>
+              </a:lvl4pPr>
+              <a:lvl5pPr marL="2057400" indent="-228600">
+                <a:defRPr>
+                  <a:solidFill>
+                    <a:schemeClr val="tx1"/>
+                  </a:solidFill>
+                  <a:latin typeface="Calibri" panose="020F0502020204030204" pitchFamily="34" charset="0"/>
+                </a:defRPr>
+              </a:lvl5pPr>
+              <a:lvl6pPr marL="2514600" indent="-228600" eaLnBrk="0" fontAlgn="base" hangingPunct="0">
+                <a:spcBef>
+                  <a:spcPct val="0"/>
+                </a:spcBef>
+                <a:spcAft>
+                  <a:spcPct val="0"/>
+                </a:spcAft>
+                <a:defRPr>
+                  <a:solidFill>
+                    <a:schemeClr val="tx1"/>
+                  </a:solidFill>
+                  <a:latin typeface="Calibri" panose="020F0502020204030204" pitchFamily="34" charset="0"/>
+                </a:defRPr>
+              </a:lvl6pPr>
+              <a:lvl7pPr marL="2971800" indent="-228600" eaLnBrk="0" fontAlgn="base" hangingPunct="0">
+                <a:spcBef>
+                  <a:spcPct val="0"/>
+                </a:spcBef>
+                <a:spcAft>
+                  <a:spcPct val="0"/>
+                </a:spcAft>
+                <a:defRPr>
+                  <a:solidFill>
+                    <a:schemeClr val="tx1"/>
+                  </a:solidFill>
+                  <a:latin typeface="Calibri" panose="020F0502020204030204" pitchFamily="34" charset="0"/>
+                </a:defRPr>
+              </a:lvl7pPr>
+              <a:lvl8pPr marL="3429000" indent="-228600" eaLnBrk="0" fontAlgn="base" hangingPunct="0">
+                <a:spcBef>
+                  <a:spcPct val="0"/>
+                </a:spcBef>
+                <a:spcAft>
+                  <a:spcPct val="0"/>
+                </a:spcAft>
+                <a:defRPr>
+                  <a:solidFill>
+                    <a:schemeClr val="tx1"/>
+                  </a:solidFill>
+                  <a:latin typeface="Calibri" panose="020F0502020204030204" pitchFamily="34" charset="0"/>
+                </a:defRPr>
+              </a:lvl8pPr>
+              <a:lvl9pPr marL="3886200" indent="-228600" eaLnBrk="0" fontAlgn="base" hangingPunct="0">
+                <a:spcBef>
+                  <a:spcPct val="0"/>
+                </a:spcBef>
+                <a:spcAft>
+                  <a:spcPct val="0"/>
+                </a:spcAft>
+                <a:defRPr>
+                  <a:solidFill>
+                    <a:schemeClr val="tx1"/>
+                  </a:solidFill>
+                  <a:latin typeface="Calibri" panose="020F0502020204030204" pitchFamily="34" charset="0"/>
+                </a:defRPr>
+              </a:lvl9pPr>
+            </a:lstStyle>
+            <a:p>
+              <a:pPr algn="ctr" eaLnBrk="1" hangingPunct="1"/>
+              <a:r>
+                <a:rPr lang="en-US" altLang="en-US" sz="1100" dirty="0">
+                  <a:latin typeface="Arial" panose="020B0604020202020204" pitchFamily="34" charset="0"/>
+                  <a:ea typeface="Amazon Ember" panose="020B0603020204020204" pitchFamily="34" charset="0"/>
+                  <a:cs typeface="Arial" panose="020B0604020202020204" pitchFamily="34" charset="0"/>
+                </a:rPr>
+                <a:t>Managed Instance</a:t>
+              </a:r>
+            </a:p>
+          </p:txBody>
+        </p:sp>
+      </p:grpSp>
+      <p:grpSp>
+        <p:nvGrpSpPr>
+          <p:cNvPr id="78" name="Group 77">
+            <a:extLst>
+              <a:ext uri="{FF2B5EF4-FFF2-40B4-BE49-F238E27FC236}">
+                <a16:creationId xmlns:a16="http://schemas.microsoft.com/office/drawing/2014/main" id="{340067B8-CC0A-2F45-8D91-A6F30B1267BC}"/>
+              </a:ext>
+            </a:extLst>
+          </p:cNvPr>
+          <p:cNvGrpSpPr/>
+          <p:nvPr/>
+        </p:nvGrpSpPr>
+        <p:grpSpPr>
+          <a:xfrm>
+            <a:off x="9197811" y="6689532"/>
+            <a:ext cx="1115568" cy="847413"/>
+            <a:chOff x="5070214" y="6790224"/>
+            <a:chExt cx="1115568" cy="847413"/>
+          </a:xfrm>
+        </p:grpSpPr>
+        <p:pic>
+          <p:nvPicPr>
+            <p:cNvPr id="79" name="Graphic 60">
+              <a:extLst>
+                <a:ext uri="{FF2B5EF4-FFF2-40B4-BE49-F238E27FC236}">
+                  <a16:creationId xmlns:a16="http://schemas.microsoft.com/office/drawing/2014/main" id="{73C242F0-8E1C-CC45-8917-2475C97304A4}"/>
+                </a:ext>
+              </a:extLst>
+            </p:cNvPr>
+            <p:cNvPicPr>
+              <a:picLocks noChangeAspect="1" noChangeArrowheads="1"/>
+            </p:cNvPicPr>
+            <p:nvPr/>
+          </p:nvPicPr>
+          <p:blipFill>
+            <a:blip r:embed="rId8">
+              <a:extLst>
+                <a:ext uri="{28A0092B-C50C-407E-A947-70E740481C1C}">
+                  <a14:useLocalDpi xmlns:a14="http://schemas.microsoft.com/office/drawing/2010/main" val="0"/>
+                </a:ext>
+              </a:extLst>
+            </a:blip>
+            <a:srcRect/>
+            <a:stretch>
+              <a:fillRect/>
+            </a:stretch>
+          </p:blipFill>
+          <p:spPr bwMode="auto">
+            <a:xfrm>
+              <a:off x="5399398" y="6790224"/>
+              <a:ext cx="457200" cy="457200"/>
+            </a:xfrm>
+            <a:prstGeom prst="rect">
+              <a:avLst/>
+            </a:prstGeom>
+            <a:noFill/>
+            <a:ln>
+              <a:noFill/>
+            </a:ln>
+            <a:extLst>
+              <a:ext uri="{909E8E84-426E-40DD-AFC4-6F175D3DCCD1}">
+                <a14:hiddenFill xmlns:a14="http://schemas.microsoft.com/office/drawing/2010/main">
+                  <a:solidFill>
+                    <a:srgbClr val="FFFFFF"/>
+                  </a:solidFill>
+                </a14:hiddenFill>
+              </a:ext>
+              <a:ext uri="{91240B29-F687-4F45-9708-019B960494DF}">
+                <a14:hiddenLine xmlns:a14="http://schemas.microsoft.com/office/drawing/2010/main" w="9525">
+                  <a:solidFill>
+                    <a:srgbClr val="000000"/>
+                  </a:solidFill>
+                  <a:miter lim="800000"/>
+                  <a:headEnd/>
+                  <a:tailEnd/>
+                </a14:hiddenLine>
+              </a:ext>
+            </a:extLst>
+          </p:spPr>
+        </p:pic>
+        <p:sp>
+          <p:nvSpPr>
+            <p:cNvPr id="80" name="TextBox 16">
+              <a:extLst>
+                <a:ext uri="{FF2B5EF4-FFF2-40B4-BE49-F238E27FC236}">
+                  <a16:creationId xmlns:a16="http://schemas.microsoft.com/office/drawing/2014/main" id="{DC592FE1-9035-6149-A87D-E0FBFA518ECB}"/>
+                </a:ext>
+              </a:extLst>
+            </p:cNvPr>
+            <p:cNvSpPr txBox="1">
+              <a:spLocks noChangeArrowheads="1"/>
+            </p:cNvSpPr>
+            <p:nvPr/>
+          </p:nvSpPr>
+          <p:spPr bwMode="auto">
+            <a:xfrm>
+              <a:off x="5070214" y="7206750"/>
+              <a:ext cx="1115568" cy="430887"/>
+            </a:xfrm>
+            <a:prstGeom prst="rect">
+              <a:avLst/>
+            </a:prstGeom>
+            <a:noFill/>
+            <a:ln>
+              <a:noFill/>
+            </a:ln>
+            <a:extLst>
+              <a:ext uri="{909E8E84-426E-40DD-AFC4-6F175D3DCCD1}">
+                <a14:hiddenFill xmlns:a14="http://schemas.microsoft.com/office/drawing/2010/main">
+                  <a:solidFill>
+                    <a:srgbClr val="FFFFFF"/>
+                  </a:solidFill>
+                </a14:hiddenFill>
+              </a:ext>
+              <a:ext uri="{91240B29-F687-4F45-9708-019B960494DF}">
+                <a14:hiddenLine xmlns:a14="http://schemas.microsoft.com/office/drawing/2010/main" w="9525">
+                  <a:solidFill>
+                    <a:srgbClr val="000000"/>
+                  </a:solidFill>
+                  <a:miter lim="800000"/>
+                  <a:headEnd/>
+                  <a:tailEnd/>
+                </a14:hiddenLine>
+              </a:ext>
+            </a:extLst>
+          </p:spPr>
+          <p:txBody>
+            <a:bodyPr wrap="square" lIns="0" rIns="0">
+              <a:spAutoFit/>
+            </a:bodyPr>
+            <a:lstStyle>
+              <a:lvl1pPr>
+                <a:defRPr>
+                  <a:solidFill>
+                    <a:schemeClr val="tx1"/>
+                  </a:solidFill>
+                  <a:latin typeface="Calibri" panose="020F0502020204030204" pitchFamily="34" charset="0"/>
+                </a:defRPr>
+              </a:lvl1pPr>
+              <a:lvl2pPr marL="742950" indent="-285750">
+                <a:defRPr>
+                  <a:solidFill>
+                    <a:schemeClr val="tx1"/>
+                  </a:solidFill>
+                  <a:latin typeface="Calibri" panose="020F0502020204030204" pitchFamily="34" charset="0"/>
+                </a:defRPr>
+              </a:lvl2pPr>
+              <a:lvl3pPr marL="1143000" indent="-228600">
+                <a:defRPr>
+                  <a:solidFill>
+                    <a:schemeClr val="tx1"/>
+                  </a:solidFill>
+                  <a:latin typeface="Calibri" panose="020F0502020204030204" pitchFamily="34" charset="0"/>
+                </a:defRPr>
+              </a:lvl3pPr>
+              <a:lvl4pPr marL="1600200" indent="-228600">
+                <a:defRPr>
+                  <a:solidFill>
+                    <a:schemeClr val="tx1"/>
+                  </a:solidFill>
+                  <a:latin typeface="Calibri" panose="020F0502020204030204" pitchFamily="34" charset="0"/>
+                </a:defRPr>
+              </a:lvl4pPr>
+              <a:lvl5pPr marL="2057400" indent="-228600">
+                <a:defRPr>
+                  <a:solidFill>
+                    <a:schemeClr val="tx1"/>
+                  </a:solidFill>
+                  <a:latin typeface="Calibri" panose="020F0502020204030204" pitchFamily="34" charset="0"/>
+                </a:defRPr>
+              </a:lvl5pPr>
+              <a:lvl6pPr marL="2514600" indent="-228600" eaLnBrk="0" fontAlgn="base" hangingPunct="0">
+                <a:spcBef>
+                  <a:spcPct val="0"/>
+                </a:spcBef>
+                <a:spcAft>
+                  <a:spcPct val="0"/>
+                </a:spcAft>
+                <a:defRPr>
+                  <a:solidFill>
+                    <a:schemeClr val="tx1"/>
+                  </a:solidFill>
+                  <a:latin typeface="Calibri" panose="020F0502020204030204" pitchFamily="34" charset="0"/>
+                </a:defRPr>
+              </a:lvl6pPr>
+              <a:lvl7pPr marL="2971800" indent="-228600" eaLnBrk="0" fontAlgn="base" hangingPunct="0">
+                <a:spcBef>
+                  <a:spcPct val="0"/>
+                </a:spcBef>
+                <a:spcAft>
+                  <a:spcPct val="0"/>
+                </a:spcAft>
+                <a:defRPr>
+                  <a:solidFill>
+                    <a:schemeClr val="tx1"/>
+                  </a:solidFill>
+                  <a:latin typeface="Calibri" panose="020F0502020204030204" pitchFamily="34" charset="0"/>
+                </a:defRPr>
+              </a:lvl7pPr>
+              <a:lvl8pPr marL="3429000" indent="-228600" eaLnBrk="0" fontAlgn="base" hangingPunct="0">
+                <a:spcBef>
+                  <a:spcPct val="0"/>
+                </a:spcBef>
+                <a:spcAft>
+                  <a:spcPct val="0"/>
+                </a:spcAft>
+                <a:defRPr>
+                  <a:solidFill>
+                    <a:schemeClr val="tx1"/>
+                  </a:solidFill>
+                  <a:latin typeface="Calibri" panose="020F0502020204030204" pitchFamily="34" charset="0"/>
+                </a:defRPr>
+              </a:lvl8pPr>
+              <a:lvl9pPr marL="3886200" indent="-228600" eaLnBrk="0" fontAlgn="base" hangingPunct="0">
+                <a:spcBef>
+                  <a:spcPct val="0"/>
+                </a:spcBef>
+                <a:spcAft>
+                  <a:spcPct val="0"/>
+                </a:spcAft>
+                <a:defRPr>
+                  <a:solidFill>
+                    <a:schemeClr val="tx1"/>
+                  </a:solidFill>
+                  <a:latin typeface="Calibri" panose="020F0502020204030204" pitchFamily="34" charset="0"/>
+                </a:defRPr>
+              </a:lvl9pPr>
+            </a:lstStyle>
+            <a:p>
+              <a:pPr algn="ctr" eaLnBrk="1" hangingPunct="1"/>
+              <a:r>
+                <a:rPr lang="en-US" altLang="en-US" sz="1100" dirty="0">
+                  <a:latin typeface="Arial" panose="020B0604020202020204" pitchFamily="34" charset="0"/>
+                  <a:ea typeface="Amazon Ember" panose="020B0603020204020204" pitchFamily="34" charset="0"/>
+                  <a:cs typeface="Arial" panose="020B0604020202020204" pitchFamily="34" charset="0"/>
+                </a:rPr>
+                <a:t>Managed Instance</a:t>
+              </a:r>
+            </a:p>
+          </p:txBody>
+        </p:sp>
+      </p:grpSp>
+      <p:grpSp>
+        <p:nvGrpSpPr>
+          <p:cNvPr id="81" name="Group 80">
+            <a:extLst>
+              <a:ext uri="{FF2B5EF4-FFF2-40B4-BE49-F238E27FC236}">
+                <a16:creationId xmlns:a16="http://schemas.microsoft.com/office/drawing/2014/main" id="{AD7E2530-B4D6-C742-8CC8-8F8D4D67A5BE}"/>
+              </a:ext>
+            </a:extLst>
+          </p:cNvPr>
+          <p:cNvGrpSpPr/>
+          <p:nvPr/>
+        </p:nvGrpSpPr>
+        <p:grpSpPr>
+          <a:xfrm>
+            <a:off x="10452572" y="6689532"/>
+            <a:ext cx="1115568" cy="847413"/>
+            <a:chOff x="5070214" y="6790224"/>
+            <a:chExt cx="1115568" cy="847413"/>
+          </a:xfrm>
+        </p:grpSpPr>
+        <p:pic>
+          <p:nvPicPr>
+            <p:cNvPr id="82" name="Graphic 60">
+              <a:extLst>
+                <a:ext uri="{FF2B5EF4-FFF2-40B4-BE49-F238E27FC236}">
+                  <a16:creationId xmlns:a16="http://schemas.microsoft.com/office/drawing/2014/main" id="{B3BA34DC-0E41-B84F-82F6-9CB2CE0B0BE4}"/>
+                </a:ext>
+              </a:extLst>
+            </p:cNvPr>
+            <p:cNvPicPr>
+              <a:picLocks noChangeAspect="1" noChangeArrowheads="1"/>
+            </p:cNvPicPr>
+            <p:nvPr/>
+          </p:nvPicPr>
+          <p:blipFill>
+            <a:blip r:embed="rId8">
+              <a:extLst>
+                <a:ext uri="{28A0092B-C50C-407E-A947-70E740481C1C}">
+                  <a14:useLocalDpi xmlns:a14="http://schemas.microsoft.com/office/drawing/2010/main" val="0"/>
+                </a:ext>
+              </a:extLst>
+            </a:blip>
+            <a:srcRect/>
+            <a:stretch>
+              <a:fillRect/>
+            </a:stretch>
+          </p:blipFill>
+          <p:spPr bwMode="auto">
+            <a:xfrm>
+              <a:off x="5399398" y="6790224"/>
+              <a:ext cx="457200" cy="457200"/>
+            </a:xfrm>
+            <a:prstGeom prst="rect">
+              <a:avLst/>
+            </a:prstGeom>
+            <a:noFill/>
+            <a:ln>
+              <a:noFill/>
+            </a:ln>
+            <a:extLst>
+              <a:ext uri="{909E8E84-426E-40DD-AFC4-6F175D3DCCD1}">
+                <a14:hiddenFill xmlns:a14="http://schemas.microsoft.com/office/drawing/2010/main">
+                  <a:solidFill>
+                    <a:srgbClr val="FFFFFF"/>
+                  </a:solidFill>
+                </a14:hiddenFill>
+              </a:ext>
+              <a:ext uri="{91240B29-F687-4F45-9708-019B960494DF}">
+                <a14:hiddenLine xmlns:a14="http://schemas.microsoft.com/office/drawing/2010/main" w="9525">
+                  <a:solidFill>
+                    <a:srgbClr val="000000"/>
+                  </a:solidFill>
+                  <a:miter lim="800000"/>
+                  <a:headEnd/>
+                  <a:tailEnd/>
+                </a14:hiddenLine>
+              </a:ext>
+            </a:extLst>
+          </p:spPr>
+        </p:pic>
+        <p:sp>
+          <p:nvSpPr>
+            <p:cNvPr id="83" name="TextBox 16">
+              <a:extLst>
+                <a:ext uri="{FF2B5EF4-FFF2-40B4-BE49-F238E27FC236}">
+                  <a16:creationId xmlns:a16="http://schemas.microsoft.com/office/drawing/2014/main" id="{4B5ADEF9-38B1-334C-B15D-EAED057826C1}"/>
+                </a:ext>
+              </a:extLst>
+            </p:cNvPr>
+            <p:cNvSpPr txBox="1">
+              <a:spLocks noChangeArrowheads="1"/>
+            </p:cNvSpPr>
+            <p:nvPr/>
+          </p:nvSpPr>
+          <p:spPr bwMode="auto">
+            <a:xfrm>
+              <a:off x="5070214" y="7206750"/>
+              <a:ext cx="1115568" cy="430887"/>
+            </a:xfrm>
+            <a:prstGeom prst="rect">
+              <a:avLst/>
+            </a:prstGeom>
+            <a:noFill/>
+            <a:ln>
+              <a:noFill/>
+            </a:ln>
+            <a:extLst>
+              <a:ext uri="{909E8E84-426E-40DD-AFC4-6F175D3DCCD1}">
+                <a14:hiddenFill xmlns:a14="http://schemas.microsoft.com/office/drawing/2010/main">
+                  <a:solidFill>
+                    <a:srgbClr val="FFFFFF"/>
+                  </a:solidFill>
+                </a14:hiddenFill>
+              </a:ext>
+              <a:ext uri="{91240B29-F687-4F45-9708-019B960494DF}">
+                <a14:hiddenLine xmlns:a14="http://schemas.microsoft.com/office/drawing/2010/main" w="9525">
+                  <a:solidFill>
+                    <a:srgbClr val="000000"/>
+                  </a:solidFill>
+                  <a:miter lim="800000"/>
+                  <a:headEnd/>
+                  <a:tailEnd/>
+                </a14:hiddenLine>
+              </a:ext>
+            </a:extLst>
+          </p:spPr>
+          <p:txBody>
+            <a:bodyPr wrap="square" lIns="0" rIns="0">
+              <a:spAutoFit/>
+            </a:bodyPr>
+            <a:lstStyle>
+              <a:lvl1pPr>
+                <a:defRPr>
+                  <a:solidFill>
+                    <a:schemeClr val="tx1"/>
+                  </a:solidFill>
+                  <a:latin typeface="Calibri" panose="020F0502020204030204" pitchFamily="34" charset="0"/>
+                </a:defRPr>
+              </a:lvl1pPr>
+              <a:lvl2pPr marL="742950" indent="-285750">
+                <a:defRPr>
+                  <a:solidFill>
+                    <a:schemeClr val="tx1"/>
+                  </a:solidFill>
+                  <a:latin typeface="Calibri" panose="020F0502020204030204" pitchFamily="34" charset="0"/>
+                </a:defRPr>
+              </a:lvl2pPr>
+              <a:lvl3pPr marL="1143000" indent="-228600">
+                <a:defRPr>
+                  <a:solidFill>
+                    <a:schemeClr val="tx1"/>
+                  </a:solidFill>
+                  <a:latin typeface="Calibri" panose="020F0502020204030204" pitchFamily="34" charset="0"/>
+                </a:defRPr>
+              </a:lvl3pPr>
+              <a:lvl4pPr marL="1600200" indent="-228600">
+                <a:defRPr>
+                  <a:solidFill>
+                    <a:schemeClr val="tx1"/>
+                  </a:solidFill>
+                  <a:latin typeface="Calibri" panose="020F0502020204030204" pitchFamily="34" charset="0"/>
+                </a:defRPr>
+              </a:lvl4pPr>
+              <a:lvl5pPr marL="2057400" indent="-228600">
+                <a:defRPr>
+                  <a:solidFill>
+                    <a:schemeClr val="tx1"/>
+                  </a:solidFill>
+                  <a:latin typeface="Calibri" panose="020F0502020204030204" pitchFamily="34" charset="0"/>
+                </a:defRPr>
+              </a:lvl5pPr>
+              <a:lvl6pPr marL="2514600" indent="-228600" eaLnBrk="0" fontAlgn="base" hangingPunct="0">
+                <a:spcBef>
+                  <a:spcPct val="0"/>
+                </a:spcBef>
+                <a:spcAft>
+                  <a:spcPct val="0"/>
+                </a:spcAft>
+                <a:defRPr>
+                  <a:solidFill>
+                    <a:schemeClr val="tx1"/>
+                  </a:solidFill>
+                  <a:latin typeface="Calibri" panose="020F0502020204030204" pitchFamily="34" charset="0"/>
+                </a:defRPr>
+              </a:lvl6pPr>
+              <a:lvl7pPr marL="2971800" indent="-228600" eaLnBrk="0" fontAlgn="base" hangingPunct="0">
+                <a:spcBef>
+                  <a:spcPct val="0"/>
+                </a:spcBef>
+                <a:spcAft>
+                  <a:spcPct val="0"/>
+                </a:spcAft>
+                <a:defRPr>
+                  <a:solidFill>
+                    <a:schemeClr val="tx1"/>
+                  </a:solidFill>
+                  <a:latin typeface="Calibri" panose="020F0502020204030204" pitchFamily="34" charset="0"/>
+                </a:defRPr>
+              </a:lvl7pPr>
+              <a:lvl8pPr marL="3429000" indent="-228600" eaLnBrk="0" fontAlgn="base" hangingPunct="0">
+                <a:spcBef>
+                  <a:spcPct val="0"/>
+                </a:spcBef>
+                <a:spcAft>
+                  <a:spcPct val="0"/>
+                </a:spcAft>
+                <a:defRPr>
+                  <a:solidFill>
+                    <a:schemeClr val="tx1"/>
+                  </a:solidFill>
+                  <a:latin typeface="Calibri" panose="020F0502020204030204" pitchFamily="34" charset="0"/>
+                </a:defRPr>
+              </a:lvl8pPr>
+              <a:lvl9pPr marL="3886200" indent="-228600" eaLnBrk="0" fontAlgn="base" hangingPunct="0">
+                <a:spcBef>
+                  <a:spcPct val="0"/>
+                </a:spcBef>
+                <a:spcAft>
+                  <a:spcPct val="0"/>
+                </a:spcAft>
+                <a:defRPr>
+                  <a:solidFill>
+                    <a:schemeClr val="tx1"/>
+                  </a:solidFill>
+                  <a:latin typeface="Calibri" panose="020F0502020204030204" pitchFamily="34" charset="0"/>
+                </a:defRPr>
+              </a:lvl9pPr>
+            </a:lstStyle>
+            <a:p>
+              <a:pPr algn="ctr" eaLnBrk="1" hangingPunct="1"/>
+              <a:r>
+                <a:rPr lang="en-US" altLang="en-US" sz="1100" dirty="0">
+                  <a:latin typeface="Arial" panose="020B0604020202020204" pitchFamily="34" charset="0"/>
+                  <a:ea typeface="Amazon Ember" panose="020B0603020204020204" pitchFamily="34" charset="0"/>
+                  <a:cs typeface="Arial" panose="020B0604020202020204" pitchFamily="34" charset="0"/>
+                </a:rPr>
+                <a:t>Managed Instance</a:t>
+              </a:r>
+            </a:p>
+          </p:txBody>
+        </p:sp>
+      </p:grpSp>
+      <p:grpSp>
+        <p:nvGrpSpPr>
+          <p:cNvPr id="96" name="Group 95">
+            <a:extLst>
+              <a:ext uri="{FF2B5EF4-FFF2-40B4-BE49-F238E27FC236}">
+                <a16:creationId xmlns:a16="http://schemas.microsoft.com/office/drawing/2014/main" id="{7FA54E68-111A-F545-888C-EC9651B54996}"/>
+              </a:ext>
+            </a:extLst>
+          </p:cNvPr>
+          <p:cNvGrpSpPr/>
+          <p:nvPr/>
+        </p:nvGrpSpPr>
+        <p:grpSpPr>
+          <a:xfrm>
+            <a:off x="13339936" y="6689532"/>
+            <a:ext cx="1115568" cy="847413"/>
+            <a:chOff x="5070214" y="6790224"/>
+            <a:chExt cx="1115568" cy="847413"/>
+          </a:xfrm>
+        </p:grpSpPr>
+        <p:pic>
+          <p:nvPicPr>
+            <p:cNvPr id="97" name="Graphic 60">
+              <a:extLst>
+                <a:ext uri="{FF2B5EF4-FFF2-40B4-BE49-F238E27FC236}">
+                  <a16:creationId xmlns:a16="http://schemas.microsoft.com/office/drawing/2014/main" id="{1F6E6FDB-8592-4C4B-8441-28687D3FC8BF}"/>
+                </a:ext>
+              </a:extLst>
+            </p:cNvPr>
+            <p:cNvPicPr>
+              <a:picLocks noChangeAspect="1" noChangeArrowheads="1"/>
+            </p:cNvPicPr>
+            <p:nvPr/>
+          </p:nvPicPr>
+          <p:blipFill>
+            <a:blip r:embed="rId8">
+              <a:extLst>
+                <a:ext uri="{28A0092B-C50C-407E-A947-70E740481C1C}">
+                  <a14:useLocalDpi xmlns:a14="http://schemas.microsoft.com/office/drawing/2010/main" val="0"/>
+                </a:ext>
+              </a:extLst>
+            </a:blip>
+            <a:srcRect/>
+            <a:stretch>
+              <a:fillRect/>
+            </a:stretch>
+          </p:blipFill>
+          <p:spPr bwMode="auto">
+            <a:xfrm>
+              <a:off x="5399398" y="6790224"/>
+              <a:ext cx="457200" cy="457200"/>
+            </a:xfrm>
+            <a:prstGeom prst="rect">
+              <a:avLst/>
+            </a:prstGeom>
+            <a:noFill/>
+            <a:ln>
+              <a:noFill/>
+            </a:ln>
+            <a:extLst>
+              <a:ext uri="{909E8E84-426E-40DD-AFC4-6F175D3DCCD1}">
+                <a14:hiddenFill xmlns:a14="http://schemas.microsoft.com/office/drawing/2010/main">
+                  <a:solidFill>
+                    <a:srgbClr val="FFFFFF"/>
+                  </a:solidFill>
+                </a14:hiddenFill>
+              </a:ext>
+              <a:ext uri="{91240B29-F687-4F45-9708-019B960494DF}">
+                <a14:hiddenLine xmlns:a14="http://schemas.microsoft.com/office/drawing/2010/main" w="9525">
+                  <a:solidFill>
+                    <a:srgbClr val="000000"/>
+                  </a:solidFill>
+                  <a:miter lim="800000"/>
+                  <a:headEnd/>
+                  <a:tailEnd/>
+                </a14:hiddenLine>
+              </a:ext>
+            </a:extLst>
+          </p:spPr>
+        </p:pic>
+        <p:sp>
+          <p:nvSpPr>
+            <p:cNvPr id="98" name="TextBox 16">
+              <a:extLst>
+                <a:ext uri="{FF2B5EF4-FFF2-40B4-BE49-F238E27FC236}">
+                  <a16:creationId xmlns:a16="http://schemas.microsoft.com/office/drawing/2014/main" id="{BB2B2FF8-FA7A-6347-AB75-33CAEF2A7B87}"/>
+                </a:ext>
+              </a:extLst>
+            </p:cNvPr>
+            <p:cNvSpPr txBox="1">
+              <a:spLocks noChangeArrowheads="1"/>
+            </p:cNvSpPr>
+            <p:nvPr/>
+          </p:nvSpPr>
+          <p:spPr bwMode="auto">
+            <a:xfrm>
+              <a:off x="5070214" y="7206750"/>
+              <a:ext cx="1115568" cy="430887"/>
+            </a:xfrm>
+            <a:prstGeom prst="rect">
+              <a:avLst/>
+            </a:prstGeom>
+            <a:noFill/>
+            <a:ln>
+              <a:noFill/>
+            </a:ln>
+            <a:extLst>
+              <a:ext uri="{909E8E84-426E-40DD-AFC4-6F175D3DCCD1}">
+                <a14:hiddenFill xmlns:a14="http://schemas.microsoft.com/office/drawing/2010/main">
+                  <a:solidFill>
+                    <a:srgbClr val="FFFFFF"/>
+                  </a:solidFill>
+                </a14:hiddenFill>
+              </a:ext>
+              <a:ext uri="{91240B29-F687-4F45-9708-019B960494DF}">
+                <a14:hiddenLine xmlns:a14="http://schemas.microsoft.com/office/drawing/2010/main" w="9525">
+                  <a:solidFill>
+                    <a:srgbClr val="000000"/>
+                  </a:solidFill>
+                  <a:miter lim="800000"/>
+                  <a:headEnd/>
+                  <a:tailEnd/>
+                </a14:hiddenLine>
+              </a:ext>
+            </a:extLst>
+          </p:spPr>
+          <p:txBody>
+            <a:bodyPr wrap="square" lIns="0" rIns="0">
+              <a:spAutoFit/>
+            </a:bodyPr>
+            <a:lstStyle>
+              <a:lvl1pPr>
+                <a:defRPr>
+                  <a:solidFill>
+                    <a:schemeClr val="tx1"/>
+                  </a:solidFill>
+                  <a:latin typeface="Calibri" panose="020F0502020204030204" pitchFamily="34" charset="0"/>
+                </a:defRPr>
+              </a:lvl1pPr>
+              <a:lvl2pPr marL="742950" indent="-285750">
+                <a:defRPr>
+                  <a:solidFill>
+                    <a:schemeClr val="tx1"/>
+                  </a:solidFill>
+                  <a:latin typeface="Calibri" panose="020F0502020204030204" pitchFamily="34" charset="0"/>
+                </a:defRPr>
+              </a:lvl2pPr>
+              <a:lvl3pPr marL="1143000" indent="-228600">
+                <a:defRPr>
+                  <a:solidFill>
+                    <a:schemeClr val="tx1"/>
+                  </a:solidFill>
+                  <a:latin typeface="Calibri" panose="020F0502020204030204" pitchFamily="34" charset="0"/>
+                </a:defRPr>
+              </a:lvl3pPr>
+              <a:lvl4pPr marL="1600200" indent="-228600">
+                <a:defRPr>
+                  <a:solidFill>
+                    <a:schemeClr val="tx1"/>
+                  </a:solidFill>
+                  <a:latin typeface="Calibri" panose="020F0502020204030204" pitchFamily="34" charset="0"/>
+                </a:defRPr>
+              </a:lvl4pPr>
+              <a:lvl5pPr marL="2057400" indent="-228600">
+                <a:defRPr>
+                  <a:solidFill>
+                    <a:schemeClr val="tx1"/>
+                  </a:solidFill>
+                  <a:latin typeface="Calibri" panose="020F0502020204030204" pitchFamily="34" charset="0"/>
+                </a:defRPr>
+              </a:lvl5pPr>
+              <a:lvl6pPr marL="2514600" indent="-228600" eaLnBrk="0" fontAlgn="base" hangingPunct="0">
+                <a:spcBef>
+                  <a:spcPct val="0"/>
+                </a:spcBef>
+                <a:spcAft>
+                  <a:spcPct val="0"/>
+                </a:spcAft>
+                <a:defRPr>
+                  <a:solidFill>
+                    <a:schemeClr val="tx1"/>
+                  </a:solidFill>
+                  <a:latin typeface="Calibri" panose="020F0502020204030204" pitchFamily="34" charset="0"/>
+                </a:defRPr>
+              </a:lvl6pPr>
+              <a:lvl7pPr marL="2971800" indent="-228600" eaLnBrk="0" fontAlgn="base" hangingPunct="0">
+                <a:spcBef>
+                  <a:spcPct val="0"/>
+                </a:spcBef>
+                <a:spcAft>
+                  <a:spcPct val="0"/>
+                </a:spcAft>
+                <a:defRPr>
+                  <a:solidFill>
+                    <a:schemeClr val="tx1"/>
+                  </a:solidFill>
+                  <a:latin typeface="Calibri" panose="020F0502020204030204" pitchFamily="34" charset="0"/>
+                </a:defRPr>
+              </a:lvl7pPr>
+              <a:lvl8pPr marL="3429000" indent="-228600" eaLnBrk="0" fontAlgn="base" hangingPunct="0">
+                <a:spcBef>
+                  <a:spcPct val="0"/>
+                </a:spcBef>
+                <a:spcAft>
+                  <a:spcPct val="0"/>
+                </a:spcAft>
+                <a:defRPr>
+                  <a:solidFill>
+                    <a:schemeClr val="tx1"/>
+                  </a:solidFill>
+                  <a:latin typeface="Calibri" panose="020F0502020204030204" pitchFamily="34" charset="0"/>
+                </a:defRPr>
+              </a:lvl8pPr>
+              <a:lvl9pPr marL="3886200" indent="-228600" eaLnBrk="0" fontAlgn="base" hangingPunct="0">
+                <a:spcBef>
+                  <a:spcPct val="0"/>
+                </a:spcBef>
+                <a:spcAft>
+                  <a:spcPct val="0"/>
+                </a:spcAft>
+                <a:defRPr>
+                  <a:solidFill>
+                    <a:schemeClr val="tx1"/>
+                  </a:solidFill>
+                  <a:latin typeface="Calibri" panose="020F0502020204030204" pitchFamily="34" charset="0"/>
+                </a:defRPr>
+              </a:lvl9pPr>
+            </a:lstStyle>
+            <a:p>
+              <a:pPr algn="ctr" eaLnBrk="1" hangingPunct="1"/>
+              <a:r>
+                <a:rPr lang="en-US" altLang="en-US" sz="1100" dirty="0">
+                  <a:latin typeface="Arial" panose="020B0604020202020204" pitchFamily="34" charset="0"/>
+                  <a:ea typeface="Amazon Ember" panose="020B0603020204020204" pitchFamily="34" charset="0"/>
+                  <a:cs typeface="Arial" panose="020B0604020202020204" pitchFamily="34" charset="0"/>
+                </a:rPr>
+                <a:t>Managed Instance</a:t>
+              </a:r>
+            </a:p>
+          </p:txBody>
+        </p:sp>
+      </p:grpSp>
+      <p:grpSp>
+        <p:nvGrpSpPr>
+          <p:cNvPr id="99" name="Group 98">
+            <a:extLst>
+              <a:ext uri="{FF2B5EF4-FFF2-40B4-BE49-F238E27FC236}">
+                <a16:creationId xmlns:a16="http://schemas.microsoft.com/office/drawing/2014/main" id="{2A7A4E9D-DCFD-C145-B1DC-74046335553A}"/>
+              </a:ext>
+            </a:extLst>
+          </p:cNvPr>
+          <p:cNvGrpSpPr/>
+          <p:nvPr/>
+        </p:nvGrpSpPr>
+        <p:grpSpPr>
+          <a:xfrm>
+            <a:off x="14174619" y="6689532"/>
+            <a:ext cx="1115568" cy="847413"/>
+            <a:chOff x="5070214" y="6790224"/>
+            <a:chExt cx="1115568" cy="847413"/>
+          </a:xfrm>
+        </p:grpSpPr>
+        <p:pic>
+          <p:nvPicPr>
+            <p:cNvPr id="100" name="Graphic 60">
+              <a:extLst>
+                <a:ext uri="{FF2B5EF4-FFF2-40B4-BE49-F238E27FC236}">
+                  <a16:creationId xmlns:a16="http://schemas.microsoft.com/office/drawing/2014/main" id="{AC0A7CB6-B52B-1743-9639-D52F148A54C9}"/>
+                </a:ext>
+              </a:extLst>
+            </p:cNvPr>
+            <p:cNvPicPr>
+              <a:picLocks noChangeAspect="1" noChangeArrowheads="1"/>
+            </p:cNvPicPr>
+            <p:nvPr/>
+          </p:nvPicPr>
+          <p:blipFill>
+            <a:blip r:embed="rId8">
+              <a:extLst>
+                <a:ext uri="{28A0092B-C50C-407E-A947-70E740481C1C}">
+                  <a14:useLocalDpi xmlns:a14="http://schemas.microsoft.com/office/drawing/2010/main" val="0"/>
+                </a:ext>
+              </a:extLst>
+            </a:blip>
+            <a:srcRect/>
+            <a:stretch>
+              <a:fillRect/>
+            </a:stretch>
+          </p:blipFill>
+          <p:spPr bwMode="auto">
+            <a:xfrm>
+              <a:off x="5399398" y="6790224"/>
+              <a:ext cx="457200" cy="457200"/>
+            </a:xfrm>
+            <a:prstGeom prst="rect">
+              <a:avLst/>
+            </a:prstGeom>
+            <a:noFill/>
+            <a:ln>
+              <a:noFill/>
+            </a:ln>
+            <a:extLst>
+              <a:ext uri="{909E8E84-426E-40DD-AFC4-6F175D3DCCD1}">
+                <a14:hiddenFill xmlns:a14="http://schemas.microsoft.com/office/drawing/2010/main">
+                  <a:solidFill>
+                    <a:srgbClr val="FFFFFF"/>
+                  </a:solidFill>
+                </a14:hiddenFill>
+              </a:ext>
+              <a:ext uri="{91240B29-F687-4F45-9708-019B960494DF}">
+                <a14:hiddenLine xmlns:a14="http://schemas.microsoft.com/office/drawing/2010/main" w="9525">
+                  <a:solidFill>
+                    <a:srgbClr val="000000"/>
+                  </a:solidFill>
+                  <a:miter lim="800000"/>
+                  <a:headEnd/>
+                  <a:tailEnd/>
+                </a14:hiddenLine>
+              </a:ext>
+            </a:extLst>
+          </p:spPr>
+        </p:pic>
+        <p:sp>
+          <p:nvSpPr>
+            <p:cNvPr id="101" name="TextBox 16">
+              <a:extLst>
+                <a:ext uri="{FF2B5EF4-FFF2-40B4-BE49-F238E27FC236}">
+                  <a16:creationId xmlns:a16="http://schemas.microsoft.com/office/drawing/2014/main" id="{DCF7F2E5-0C05-F147-9D33-E67C7656C865}"/>
+                </a:ext>
+              </a:extLst>
+            </p:cNvPr>
+            <p:cNvSpPr txBox="1">
+              <a:spLocks noChangeArrowheads="1"/>
+            </p:cNvSpPr>
+            <p:nvPr/>
+          </p:nvSpPr>
+          <p:spPr bwMode="auto">
+            <a:xfrm>
+              <a:off x="5070214" y="7206750"/>
+              <a:ext cx="1115568" cy="430887"/>
+            </a:xfrm>
+            <a:prstGeom prst="rect">
+              <a:avLst/>
+            </a:prstGeom>
+            <a:noFill/>
+            <a:ln>
+              <a:noFill/>
+            </a:ln>
+            <a:extLst>
+              <a:ext uri="{909E8E84-426E-40DD-AFC4-6F175D3DCCD1}">
+                <a14:hiddenFill xmlns:a14="http://schemas.microsoft.com/office/drawing/2010/main">
+                  <a:solidFill>
+                    <a:srgbClr val="FFFFFF"/>
+                  </a:solidFill>
+                </a14:hiddenFill>
+              </a:ext>
+              <a:ext uri="{91240B29-F687-4F45-9708-019B960494DF}">
+                <a14:hiddenLine xmlns:a14="http://schemas.microsoft.com/office/drawing/2010/main" w="9525">
+                  <a:solidFill>
+                    <a:srgbClr val="000000"/>
+                  </a:solidFill>
+                  <a:miter lim="800000"/>
+                  <a:headEnd/>
+                  <a:tailEnd/>
+                </a14:hiddenLine>
+              </a:ext>
+            </a:extLst>
+          </p:spPr>
+          <p:txBody>
+            <a:bodyPr wrap="square" lIns="0" rIns="0">
+              <a:spAutoFit/>
+            </a:bodyPr>
+            <a:lstStyle>
+              <a:lvl1pPr>
+                <a:defRPr>
+                  <a:solidFill>
+                    <a:schemeClr val="tx1"/>
+                  </a:solidFill>
+                  <a:latin typeface="Calibri" panose="020F0502020204030204" pitchFamily="34" charset="0"/>
+                </a:defRPr>
+              </a:lvl1pPr>
+              <a:lvl2pPr marL="742950" indent="-285750">
+                <a:defRPr>
+                  <a:solidFill>
+                    <a:schemeClr val="tx1"/>
+                  </a:solidFill>
+                  <a:latin typeface="Calibri" panose="020F0502020204030204" pitchFamily="34" charset="0"/>
+                </a:defRPr>
+              </a:lvl2pPr>
+              <a:lvl3pPr marL="1143000" indent="-228600">
+                <a:defRPr>
+                  <a:solidFill>
+                    <a:schemeClr val="tx1"/>
+                  </a:solidFill>
+                  <a:latin typeface="Calibri" panose="020F0502020204030204" pitchFamily="34" charset="0"/>
+                </a:defRPr>
+              </a:lvl3pPr>
+              <a:lvl4pPr marL="1600200" indent="-228600">
+                <a:defRPr>
+                  <a:solidFill>
+                    <a:schemeClr val="tx1"/>
+                  </a:solidFill>
+                  <a:latin typeface="Calibri" panose="020F0502020204030204" pitchFamily="34" charset="0"/>
+                </a:defRPr>
+              </a:lvl4pPr>
+              <a:lvl5pPr marL="2057400" indent="-228600">
+                <a:defRPr>
+                  <a:solidFill>
+                    <a:schemeClr val="tx1"/>
+                  </a:solidFill>
+                  <a:latin typeface="Calibri" panose="020F0502020204030204" pitchFamily="34" charset="0"/>
+                </a:defRPr>
+              </a:lvl5pPr>
+              <a:lvl6pPr marL="2514600" indent="-228600" eaLnBrk="0" fontAlgn="base" hangingPunct="0">
+                <a:spcBef>
+                  <a:spcPct val="0"/>
+                </a:spcBef>
+                <a:spcAft>
+                  <a:spcPct val="0"/>
+                </a:spcAft>
+                <a:defRPr>
+                  <a:solidFill>
+                    <a:schemeClr val="tx1"/>
+                  </a:solidFill>
+                  <a:latin typeface="Calibri" panose="020F0502020204030204" pitchFamily="34" charset="0"/>
+                </a:defRPr>
+              </a:lvl6pPr>
+              <a:lvl7pPr marL="2971800" indent="-228600" eaLnBrk="0" fontAlgn="base" hangingPunct="0">
+                <a:spcBef>
+                  <a:spcPct val="0"/>
+                </a:spcBef>
+                <a:spcAft>
+                  <a:spcPct val="0"/>
+                </a:spcAft>
+                <a:defRPr>
+                  <a:solidFill>
+                    <a:schemeClr val="tx1"/>
+                  </a:solidFill>
+                  <a:latin typeface="Calibri" panose="020F0502020204030204" pitchFamily="34" charset="0"/>
+                </a:defRPr>
+              </a:lvl7pPr>
+              <a:lvl8pPr marL="3429000" indent="-228600" eaLnBrk="0" fontAlgn="base" hangingPunct="0">
+                <a:spcBef>
+                  <a:spcPct val="0"/>
+                </a:spcBef>
+                <a:spcAft>
+                  <a:spcPct val="0"/>
+                </a:spcAft>
+                <a:defRPr>
+                  <a:solidFill>
+                    <a:schemeClr val="tx1"/>
+                  </a:solidFill>
+                  <a:latin typeface="Calibri" panose="020F0502020204030204" pitchFamily="34" charset="0"/>
+                </a:defRPr>
+              </a:lvl8pPr>
+              <a:lvl9pPr marL="3886200" indent="-228600" eaLnBrk="0" fontAlgn="base" hangingPunct="0">
+                <a:spcBef>
+                  <a:spcPct val="0"/>
+                </a:spcBef>
+                <a:spcAft>
+                  <a:spcPct val="0"/>
+                </a:spcAft>
+                <a:defRPr>
+                  <a:solidFill>
+                    <a:schemeClr val="tx1"/>
+                  </a:solidFill>
+                  <a:latin typeface="Calibri" panose="020F0502020204030204" pitchFamily="34" charset="0"/>
+                </a:defRPr>
+              </a:lvl9pPr>
+            </a:lstStyle>
+            <a:p>
+              <a:pPr algn="ctr" eaLnBrk="1" hangingPunct="1"/>
+              <a:r>
+                <a:rPr lang="en-US" altLang="en-US" sz="1100" dirty="0">
+                  <a:latin typeface="Arial" panose="020B0604020202020204" pitchFamily="34" charset="0"/>
+                  <a:ea typeface="Amazon Ember" panose="020B0603020204020204" pitchFamily="34" charset="0"/>
+                  <a:cs typeface="Arial" panose="020B0604020202020204" pitchFamily="34" charset="0"/>
+                </a:rPr>
+                <a:t>Managed Instance</a:t>
+              </a:r>
+            </a:p>
+          </p:txBody>
+        </p:sp>
+      </p:grpSp>
+      <p:grpSp>
+        <p:nvGrpSpPr>
+          <p:cNvPr id="102" name="Group 101">
+            <a:extLst>
+              <a:ext uri="{FF2B5EF4-FFF2-40B4-BE49-F238E27FC236}">
+                <a16:creationId xmlns:a16="http://schemas.microsoft.com/office/drawing/2014/main" id="{FCFC9419-260D-5745-9E71-96D4B38D26ED}"/>
+              </a:ext>
+            </a:extLst>
+          </p:cNvPr>
+          <p:cNvGrpSpPr/>
+          <p:nvPr/>
+        </p:nvGrpSpPr>
+        <p:grpSpPr>
+          <a:xfrm>
+            <a:off x="15009302" y="6689532"/>
+            <a:ext cx="1115568" cy="847413"/>
+            <a:chOff x="5070214" y="6790224"/>
+            <a:chExt cx="1115568" cy="847413"/>
+          </a:xfrm>
+        </p:grpSpPr>
+        <p:pic>
+          <p:nvPicPr>
+            <p:cNvPr id="103" name="Graphic 60">
+              <a:extLst>
+                <a:ext uri="{FF2B5EF4-FFF2-40B4-BE49-F238E27FC236}">
+                  <a16:creationId xmlns:a16="http://schemas.microsoft.com/office/drawing/2014/main" id="{4536B0AD-CE81-2145-BADF-A8AE2F65400F}"/>
+                </a:ext>
+              </a:extLst>
+            </p:cNvPr>
+            <p:cNvPicPr>
+              <a:picLocks noChangeAspect="1" noChangeArrowheads="1"/>
+            </p:cNvPicPr>
+            <p:nvPr/>
+          </p:nvPicPr>
+          <p:blipFill>
+            <a:blip r:embed="rId8">
+              <a:extLst>
+                <a:ext uri="{28A0092B-C50C-407E-A947-70E740481C1C}">
+                  <a14:useLocalDpi xmlns:a14="http://schemas.microsoft.com/office/drawing/2010/main" val="0"/>
+                </a:ext>
+              </a:extLst>
+            </a:blip>
+            <a:srcRect/>
+            <a:stretch>
+              <a:fillRect/>
+            </a:stretch>
+          </p:blipFill>
+          <p:spPr bwMode="auto">
+            <a:xfrm>
+              <a:off x="5399398" y="6790224"/>
+              <a:ext cx="457200" cy="457200"/>
+            </a:xfrm>
+            <a:prstGeom prst="rect">
+              <a:avLst/>
+            </a:prstGeom>
+            <a:noFill/>
+            <a:ln>
+              <a:noFill/>
+            </a:ln>
+            <a:extLst>
+              <a:ext uri="{909E8E84-426E-40DD-AFC4-6F175D3DCCD1}">
+                <a14:hiddenFill xmlns:a14="http://schemas.microsoft.com/office/drawing/2010/main">
+                  <a:solidFill>
+                    <a:srgbClr val="FFFFFF"/>
+                  </a:solidFill>
+                </a14:hiddenFill>
+              </a:ext>
+              <a:ext uri="{91240B29-F687-4F45-9708-019B960494DF}">
+                <a14:hiddenLine xmlns:a14="http://schemas.microsoft.com/office/drawing/2010/main" w="9525">
+                  <a:solidFill>
+                    <a:srgbClr val="000000"/>
+                  </a:solidFill>
+                  <a:miter lim="800000"/>
+                  <a:headEnd/>
+                  <a:tailEnd/>
+                </a14:hiddenLine>
+              </a:ext>
+            </a:extLst>
+          </p:spPr>
+        </p:pic>
+        <p:sp>
+          <p:nvSpPr>
+            <p:cNvPr id="104" name="TextBox 16">
+              <a:extLst>
+                <a:ext uri="{FF2B5EF4-FFF2-40B4-BE49-F238E27FC236}">
+                  <a16:creationId xmlns:a16="http://schemas.microsoft.com/office/drawing/2014/main" id="{8EB6473B-1485-1840-8991-848B5CDD2904}"/>
+                </a:ext>
+              </a:extLst>
+            </p:cNvPr>
+            <p:cNvSpPr txBox="1">
+              <a:spLocks noChangeArrowheads="1"/>
+            </p:cNvSpPr>
+            <p:nvPr/>
+          </p:nvSpPr>
+          <p:spPr bwMode="auto">
+            <a:xfrm>
+              <a:off x="5070214" y="7206750"/>
+              <a:ext cx="1115568" cy="430887"/>
+            </a:xfrm>
+            <a:prstGeom prst="rect">
+              <a:avLst/>
+            </a:prstGeom>
+            <a:noFill/>
+            <a:ln>
+              <a:noFill/>
+            </a:ln>
+            <a:extLst>
+              <a:ext uri="{909E8E84-426E-40DD-AFC4-6F175D3DCCD1}">
+                <a14:hiddenFill xmlns:a14="http://schemas.microsoft.com/office/drawing/2010/main">
+                  <a:solidFill>
+                    <a:srgbClr val="FFFFFF"/>
+                  </a:solidFill>
+                </a14:hiddenFill>
+              </a:ext>
+              <a:ext uri="{91240B29-F687-4F45-9708-019B960494DF}">
+                <a14:hiddenLine xmlns:a14="http://schemas.microsoft.com/office/drawing/2010/main" w="9525">
+                  <a:solidFill>
+                    <a:srgbClr val="000000"/>
+                  </a:solidFill>
+                  <a:miter lim="800000"/>
+                  <a:headEnd/>
+                  <a:tailEnd/>
+                </a14:hiddenLine>
+              </a:ext>
+            </a:extLst>
+          </p:spPr>
+          <p:txBody>
+            <a:bodyPr wrap="square" lIns="0" rIns="0">
+              <a:spAutoFit/>
+            </a:bodyPr>
+            <a:lstStyle>
+              <a:lvl1pPr>
+                <a:defRPr>
+                  <a:solidFill>
+                    <a:schemeClr val="tx1"/>
+                  </a:solidFill>
+                  <a:latin typeface="Calibri" panose="020F0502020204030204" pitchFamily="34" charset="0"/>
+                </a:defRPr>
+              </a:lvl1pPr>
+              <a:lvl2pPr marL="742950" indent="-285750">
+                <a:defRPr>
+                  <a:solidFill>
+                    <a:schemeClr val="tx1"/>
+                  </a:solidFill>
+                  <a:latin typeface="Calibri" panose="020F0502020204030204" pitchFamily="34" charset="0"/>
+                </a:defRPr>
+              </a:lvl2pPr>
+              <a:lvl3pPr marL="1143000" indent="-228600">
+                <a:defRPr>
+                  <a:solidFill>
+                    <a:schemeClr val="tx1"/>
+                  </a:solidFill>
+                  <a:latin typeface="Calibri" panose="020F0502020204030204" pitchFamily="34" charset="0"/>
+                </a:defRPr>
+              </a:lvl3pPr>
+              <a:lvl4pPr marL="1600200" indent="-228600">
+                <a:defRPr>
+                  <a:solidFill>
+                    <a:schemeClr val="tx1"/>
+                  </a:solidFill>
+                  <a:latin typeface="Calibri" panose="020F0502020204030204" pitchFamily="34" charset="0"/>
+                </a:defRPr>
+              </a:lvl4pPr>
+              <a:lvl5pPr marL="2057400" indent="-228600">
+                <a:defRPr>
+                  <a:solidFill>
+                    <a:schemeClr val="tx1"/>
+                  </a:solidFill>
+                  <a:latin typeface="Calibri" panose="020F0502020204030204" pitchFamily="34" charset="0"/>
+                </a:defRPr>
+              </a:lvl5pPr>
+              <a:lvl6pPr marL="2514600" indent="-228600" eaLnBrk="0" fontAlgn="base" hangingPunct="0">
+                <a:spcBef>
+                  <a:spcPct val="0"/>
+                </a:spcBef>
+                <a:spcAft>
+                  <a:spcPct val="0"/>
+                </a:spcAft>
+                <a:defRPr>
+                  <a:solidFill>
+                    <a:schemeClr val="tx1"/>
+                  </a:solidFill>
+                  <a:latin typeface="Calibri" panose="020F0502020204030204" pitchFamily="34" charset="0"/>
+                </a:defRPr>
+              </a:lvl6pPr>
+              <a:lvl7pPr marL="2971800" indent="-228600" eaLnBrk="0" fontAlgn="base" hangingPunct="0">
+                <a:spcBef>
+                  <a:spcPct val="0"/>
+                </a:spcBef>
+                <a:spcAft>
+                  <a:spcPct val="0"/>
+                </a:spcAft>
+                <a:defRPr>
+                  <a:solidFill>
+                    <a:schemeClr val="tx1"/>
+                  </a:solidFill>
+                  <a:latin typeface="Calibri" panose="020F0502020204030204" pitchFamily="34" charset="0"/>
+                </a:defRPr>
+              </a:lvl7pPr>
+              <a:lvl8pPr marL="3429000" indent="-228600" eaLnBrk="0" fontAlgn="base" hangingPunct="0">
+                <a:spcBef>
+                  <a:spcPct val="0"/>
+                </a:spcBef>
+                <a:spcAft>
+                  <a:spcPct val="0"/>
+                </a:spcAft>
+                <a:defRPr>
+                  <a:solidFill>
+                    <a:schemeClr val="tx1"/>
+                  </a:solidFill>
+                  <a:latin typeface="Calibri" panose="020F0502020204030204" pitchFamily="34" charset="0"/>
+                </a:defRPr>
+              </a:lvl8pPr>
+              <a:lvl9pPr marL="3886200" indent="-228600" eaLnBrk="0" fontAlgn="base" hangingPunct="0">
+                <a:spcBef>
+                  <a:spcPct val="0"/>
+                </a:spcBef>
+                <a:spcAft>
+                  <a:spcPct val="0"/>
+                </a:spcAft>
+                <a:defRPr>
+                  <a:solidFill>
+                    <a:schemeClr val="tx1"/>
+                  </a:solidFill>
+                  <a:latin typeface="Calibri" panose="020F0502020204030204" pitchFamily="34" charset="0"/>
+                </a:defRPr>
+              </a:lvl9pPr>
+            </a:lstStyle>
+            <a:p>
+              <a:pPr algn="ctr" eaLnBrk="1" hangingPunct="1"/>
+              <a:r>
+                <a:rPr lang="en-US" altLang="en-US" sz="1100" dirty="0">
+                  <a:latin typeface="Arial" panose="020B0604020202020204" pitchFamily="34" charset="0"/>
+                  <a:ea typeface="Amazon Ember" panose="020B0603020204020204" pitchFamily="34" charset="0"/>
+                  <a:cs typeface="Arial" panose="020B0604020202020204" pitchFamily="34" charset="0"/>
+                </a:rPr>
+                <a:t>Managed Instance</a:t>
+              </a:r>
+            </a:p>
+          </p:txBody>
+        </p:sp>
+      </p:grpSp>
     </p:spTree>
     <p:extLst>
       <p:ext uri="{BB962C8B-B14F-4D97-AF65-F5344CB8AC3E}">

</xml_diff>

<commit_message>
TW edits for SA comments, diagram
</commit_message>
<xml_diff>
--- a/docs/deployment_guide/images/elastigroup-quickstart-architecture-diagram.pptx
+++ b/docs/deployment_guide/images/elastigroup-quickstart-architecture-diagram.pptx
@@ -213,7 +213,7 @@
           <a:p>
             <a:fld id="{DFE671C9-BB83-DE41-B8B7-94AB1B25B57E}" type="datetimeFigureOut">
               <a:rPr lang="en-US" smtClean="0"/>
-              <a:t>11/11/22</a:t>
+              <a:t>12/5/2022</a:t>
             </a:fld>
             <a:endParaRPr lang="en-US"/>
           </a:p>
@@ -439,7 +439,7 @@
           <a:p>
             <a:fld id="{87F3BBB2-E533-43A8-AA78-2DC6FC5FE5A0}" type="datetimeFigureOut">
               <a:rPr lang="en-US" smtClean="0"/>
-              <a:t>11/11/22</a:t>
+              <a:t>12/5/2022</a:t>
             </a:fld>
             <a:endParaRPr lang="en-US"/>
           </a:p>
@@ -609,7 +609,7 @@
           <a:p>
             <a:fld id="{87F3BBB2-E533-43A8-AA78-2DC6FC5FE5A0}" type="datetimeFigureOut">
               <a:rPr lang="en-US" smtClean="0"/>
-              <a:t>11/11/22</a:t>
+              <a:t>12/5/2022</a:t>
             </a:fld>
             <a:endParaRPr lang="en-US"/>
           </a:p>
@@ -789,7 +789,7 @@
           <a:p>
             <a:fld id="{87F3BBB2-E533-43A8-AA78-2DC6FC5FE5A0}" type="datetimeFigureOut">
               <a:rPr lang="en-US" smtClean="0"/>
-              <a:t>11/11/22</a:t>
+              <a:t>12/5/2022</a:t>
             </a:fld>
             <a:endParaRPr lang="en-US"/>
           </a:p>
@@ -959,7 +959,7 @@
           <a:p>
             <a:fld id="{87F3BBB2-E533-43A8-AA78-2DC6FC5FE5A0}" type="datetimeFigureOut">
               <a:rPr lang="en-US" smtClean="0"/>
-              <a:t>11/11/22</a:t>
+              <a:t>12/5/2022</a:t>
             </a:fld>
             <a:endParaRPr lang="en-US"/>
           </a:p>
@@ -1203,7 +1203,7 @@
           <a:p>
             <a:fld id="{87F3BBB2-E533-43A8-AA78-2DC6FC5FE5A0}" type="datetimeFigureOut">
               <a:rPr lang="en-US" smtClean="0"/>
-              <a:t>11/11/22</a:t>
+              <a:t>12/5/2022</a:t>
             </a:fld>
             <a:endParaRPr lang="en-US"/>
           </a:p>
@@ -1435,7 +1435,7 @@
           <a:p>
             <a:fld id="{87F3BBB2-E533-43A8-AA78-2DC6FC5FE5A0}" type="datetimeFigureOut">
               <a:rPr lang="en-US" smtClean="0"/>
-              <a:t>11/11/22</a:t>
+              <a:t>12/5/2022</a:t>
             </a:fld>
             <a:endParaRPr lang="en-US"/>
           </a:p>
@@ -1802,7 +1802,7 @@
           <a:p>
             <a:fld id="{87F3BBB2-E533-43A8-AA78-2DC6FC5FE5A0}" type="datetimeFigureOut">
               <a:rPr lang="en-US" smtClean="0"/>
-              <a:t>11/11/22</a:t>
+              <a:t>12/5/2022</a:t>
             </a:fld>
             <a:endParaRPr lang="en-US"/>
           </a:p>
@@ -1920,7 +1920,7 @@
           <a:p>
             <a:fld id="{87F3BBB2-E533-43A8-AA78-2DC6FC5FE5A0}" type="datetimeFigureOut">
               <a:rPr lang="en-US" smtClean="0"/>
-              <a:t>11/11/22</a:t>
+              <a:t>12/5/2022</a:t>
             </a:fld>
             <a:endParaRPr lang="en-US"/>
           </a:p>
@@ -2015,7 +2015,7 @@
           <a:p>
             <a:fld id="{87F3BBB2-E533-43A8-AA78-2DC6FC5FE5A0}" type="datetimeFigureOut">
               <a:rPr lang="en-US" smtClean="0"/>
-              <a:t>11/11/22</a:t>
+              <a:t>12/5/2022</a:t>
             </a:fld>
             <a:endParaRPr lang="en-US"/>
           </a:p>
@@ -2292,7 +2292,7 @@
           <a:p>
             <a:fld id="{87F3BBB2-E533-43A8-AA78-2DC6FC5FE5A0}" type="datetimeFigureOut">
               <a:rPr lang="en-US" smtClean="0"/>
-              <a:t>11/11/22</a:t>
+              <a:t>12/5/2022</a:t>
             </a:fld>
             <a:endParaRPr lang="en-US"/>
           </a:p>
@@ -2549,7 +2549,7 @@
           <a:p>
             <a:fld id="{87F3BBB2-E533-43A8-AA78-2DC6FC5FE5A0}" type="datetimeFigureOut">
               <a:rPr lang="en-US" smtClean="0"/>
-              <a:t>11/11/22</a:t>
+              <a:t>12/5/2022</a:t>
             </a:fld>
             <a:endParaRPr lang="en-US"/>
           </a:p>
@@ -2762,7 +2762,7 @@
           <a:p>
             <a:fld id="{87F3BBB2-E533-43A8-AA78-2DC6FC5FE5A0}" type="datetimeFigureOut">
               <a:rPr lang="en-US" smtClean="0"/>
-              <a:t>11/11/22</a:t>
+              <a:t>12/5/2022</a:t>
             </a:fld>
             <a:endParaRPr lang="en-US"/>
           </a:p>
@@ -3181,8 +3181,8 @@
         </p:nvSpPr>
         <p:spPr>
           <a:xfrm>
-            <a:off x="2843618" y="1731891"/>
-            <a:ext cx="15104139" cy="10091514"/>
+            <a:off x="3528059" y="2880360"/>
+            <a:ext cx="14036041" cy="7078980"/>
           </a:xfrm>
           <a:prstGeom prst="rect">
             <a:avLst/>
@@ -3263,7 +3263,7 @@
         </p:blipFill>
         <p:spPr>
           <a:xfrm>
-            <a:off x="2843618" y="1731891"/>
+            <a:off x="3528061" y="2880359"/>
             <a:ext cx="381000" cy="381000"/>
           </a:xfrm>
           <a:prstGeom prst="rect">
@@ -3285,8 +3285,8 @@
         </p:nvSpPr>
         <p:spPr>
           <a:xfrm>
-            <a:off x="3997842" y="2750353"/>
-            <a:ext cx="13030245" cy="7733349"/>
+            <a:off x="4170680" y="3406140"/>
+            <a:ext cx="12735487" cy="6118860"/>
           </a:xfrm>
           <a:prstGeom prst="rect">
             <a:avLst/>
@@ -3369,7 +3369,7 @@
         </p:blipFill>
         <p:spPr>
           <a:xfrm>
-            <a:off x="3998454" y="2743778"/>
+            <a:off x="4170680" y="3406140"/>
             <a:ext cx="381000" cy="381000"/>
           </a:xfrm>
           <a:prstGeom prst="rect">
@@ -3693,7 +3693,7 @@
         </p:blipFill>
         <p:spPr>
           <a:xfrm>
-            <a:off x="4917512" y="5674207"/>
+            <a:off x="4879412" y="5744057"/>
             <a:ext cx="381000" cy="381000"/>
           </a:xfrm>
           <a:prstGeom prst="rect">
@@ -4182,8 +4182,8 @@
         </p:blipFill>
         <p:spPr bwMode="auto">
           <a:xfrm flipV="1">
-            <a:off x="10155490" y="3279825"/>
-            <a:ext cx="410609" cy="410609"/>
+            <a:off x="10155489" y="3622724"/>
+            <a:ext cx="457200" cy="457200"/>
           </a:xfrm>
           <a:prstGeom prst="rect">
             <a:avLst/>
@@ -4229,7 +4229,7 @@
         </p:nvSpPr>
         <p:spPr bwMode="auto">
           <a:xfrm>
-            <a:off x="9707507" y="3951022"/>
+            <a:off x="9769418" y="4107031"/>
             <a:ext cx="1252536" cy="430887"/>
           </a:xfrm>
           <a:prstGeom prst="rect">
@@ -4403,7 +4403,7 @@
         </p:nvSpPr>
         <p:spPr>
           <a:xfrm>
-            <a:off x="4379454" y="6336195"/>
+            <a:off x="4436604" y="6336195"/>
             <a:ext cx="12180741" cy="1489368"/>
           </a:xfrm>
           <a:prstGeom prst="rect">

</xml_diff>

<commit_message>
TW edits for typos, clarity, condensing, diagram
</commit_message>
<xml_diff>
--- a/docs/deployment_guide/images/elastigroup-quickstart-architecture-diagram.pptx
+++ b/docs/deployment_guide/images/elastigroup-quickstart-architecture-diagram.pptx
@@ -243,7 +243,7 @@
           <a:p>
             <a:fld id="{459B9FD8-0105-4AD8-AA20-CD088C77F3CC}" type="datetimeFigureOut">
               <a:rPr lang="en-US" smtClean="0"/>
-              <a:t>12/9/2022</a:t>
+              <a:t>12/13/2022</a:t>
             </a:fld>
             <a:endParaRPr lang="en-US"/>
           </a:p>
@@ -413,7 +413,7 @@
           <a:p>
             <a:fld id="{459B9FD8-0105-4AD8-AA20-CD088C77F3CC}" type="datetimeFigureOut">
               <a:rPr lang="en-US" smtClean="0"/>
-              <a:t>12/9/2022</a:t>
+              <a:t>12/13/2022</a:t>
             </a:fld>
             <a:endParaRPr lang="en-US"/>
           </a:p>
@@ -593,7 +593,7 @@
           <a:p>
             <a:fld id="{459B9FD8-0105-4AD8-AA20-CD088C77F3CC}" type="datetimeFigureOut">
               <a:rPr lang="en-US" smtClean="0"/>
-              <a:t>12/9/2022</a:t>
+              <a:t>12/13/2022</a:t>
             </a:fld>
             <a:endParaRPr lang="en-US"/>
           </a:p>
@@ -763,7 +763,7 @@
           <a:p>
             <a:fld id="{459B9FD8-0105-4AD8-AA20-CD088C77F3CC}" type="datetimeFigureOut">
               <a:rPr lang="en-US" smtClean="0"/>
-              <a:t>12/9/2022</a:t>
+              <a:t>12/13/2022</a:t>
             </a:fld>
             <a:endParaRPr lang="en-US"/>
           </a:p>
@@ -1007,7 +1007,7 @@
           <a:p>
             <a:fld id="{459B9FD8-0105-4AD8-AA20-CD088C77F3CC}" type="datetimeFigureOut">
               <a:rPr lang="en-US" smtClean="0"/>
-              <a:t>12/9/2022</a:t>
+              <a:t>12/13/2022</a:t>
             </a:fld>
             <a:endParaRPr lang="en-US"/>
           </a:p>
@@ -1239,7 +1239,7 @@
           <a:p>
             <a:fld id="{459B9FD8-0105-4AD8-AA20-CD088C77F3CC}" type="datetimeFigureOut">
               <a:rPr lang="en-US" smtClean="0"/>
-              <a:t>12/9/2022</a:t>
+              <a:t>12/13/2022</a:t>
             </a:fld>
             <a:endParaRPr lang="en-US"/>
           </a:p>
@@ -1606,7 +1606,7 @@
           <a:p>
             <a:fld id="{459B9FD8-0105-4AD8-AA20-CD088C77F3CC}" type="datetimeFigureOut">
               <a:rPr lang="en-US" smtClean="0"/>
-              <a:t>12/9/2022</a:t>
+              <a:t>12/13/2022</a:t>
             </a:fld>
             <a:endParaRPr lang="en-US"/>
           </a:p>
@@ -1724,7 +1724,7 @@
           <a:p>
             <a:fld id="{459B9FD8-0105-4AD8-AA20-CD088C77F3CC}" type="datetimeFigureOut">
               <a:rPr lang="en-US" smtClean="0"/>
-              <a:t>12/9/2022</a:t>
+              <a:t>12/13/2022</a:t>
             </a:fld>
             <a:endParaRPr lang="en-US"/>
           </a:p>
@@ -1819,7 +1819,7 @@
           <a:p>
             <a:fld id="{459B9FD8-0105-4AD8-AA20-CD088C77F3CC}" type="datetimeFigureOut">
               <a:rPr lang="en-US" smtClean="0"/>
-              <a:t>12/9/2022</a:t>
+              <a:t>12/13/2022</a:t>
             </a:fld>
             <a:endParaRPr lang="en-US"/>
           </a:p>
@@ -2096,7 +2096,7 @@
           <a:p>
             <a:fld id="{459B9FD8-0105-4AD8-AA20-CD088C77F3CC}" type="datetimeFigureOut">
               <a:rPr lang="en-US" smtClean="0"/>
-              <a:t>12/9/2022</a:t>
+              <a:t>12/13/2022</a:t>
             </a:fld>
             <a:endParaRPr lang="en-US"/>
           </a:p>
@@ -2353,7 +2353,7 @@
           <a:p>
             <a:fld id="{459B9FD8-0105-4AD8-AA20-CD088C77F3CC}" type="datetimeFigureOut">
               <a:rPr lang="en-US" smtClean="0"/>
-              <a:t>12/9/2022</a:t>
+              <a:t>12/13/2022</a:t>
             </a:fld>
             <a:endParaRPr lang="en-US"/>
           </a:p>
@@ -2566,7 +2566,7 @@
           <a:p>
             <a:fld id="{459B9FD8-0105-4AD8-AA20-CD088C77F3CC}" type="datetimeFigureOut">
               <a:rPr lang="en-US" smtClean="0"/>
-              <a:t>12/9/2022</a:t>
+              <a:t>12/13/2022</a:t>
             </a:fld>
             <a:endParaRPr lang="en-US"/>
           </a:p>
@@ -2986,7 +2986,7 @@
         <p:spPr>
           <a:xfrm>
             <a:off x="1463114" y="914413"/>
-            <a:ext cx="9509760" cy="3200400"/>
+            <a:ext cx="7315200" cy="3108960"/>
           </a:xfrm>
           <a:prstGeom prst="rect">
             <a:avLst/>
@@ -3090,7 +3090,7 @@
         <p:spPr>
           <a:xfrm>
             <a:off x="1645920" y="1645982"/>
-            <a:ext cx="9144000" cy="2103120"/>
+            <a:ext cx="6949440" cy="2011680"/>
           </a:xfrm>
           <a:prstGeom prst="rect">
             <a:avLst/>
@@ -3195,8 +3195,8 @@
         </p:nvSpPr>
         <p:spPr>
           <a:xfrm>
-            <a:off x="2943900" y="2022207"/>
-            <a:ext cx="1920240" cy="1554480"/>
+            <a:off x="2926080" y="1920240"/>
+            <a:ext cx="1554480" cy="1554480"/>
           </a:xfrm>
           <a:prstGeom prst="rect">
             <a:avLst/>
@@ -3267,8 +3267,8 @@
         </p:nvSpPr>
         <p:spPr>
           <a:xfrm>
-            <a:off x="2806740" y="1290638"/>
-            <a:ext cx="2194560" cy="2651760"/>
+            <a:off x="2834640" y="1280160"/>
+            <a:ext cx="1737360" cy="2560320"/>
           </a:xfrm>
           <a:prstGeom prst="rect">
             <a:avLst/>
@@ -3351,7 +3351,7 @@
         </p:blipFill>
         <p:spPr>
           <a:xfrm>
-            <a:off x="2944368" y="2023795"/>
+            <a:off x="2926080" y="1921870"/>
             <a:ext cx="381000" cy="381000"/>
           </a:xfrm>
           <a:prstGeom prst="rect">
@@ -3388,7 +3388,7 @@
         </p:blipFill>
         <p:spPr bwMode="auto">
           <a:xfrm>
-            <a:off x="3241342" y="2548053"/>
+            <a:off x="3474720" y="2377440"/>
             <a:ext cx="457200" cy="457200"/>
           </a:xfrm>
           <a:prstGeom prst="rect">
@@ -3435,8 +3435,8 @@
         </p:nvSpPr>
         <p:spPr bwMode="auto">
           <a:xfrm>
-            <a:off x="3035865" y="2995147"/>
-            <a:ext cx="868155" cy="261610"/>
+            <a:off x="3291840" y="2834640"/>
+            <a:ext cx="868155" cy="430887"/>
           </a:xfrm>
           <a:prstGeom prst="rect">
             <a:avLst/>
@@ -3570,22 +3570,203 @@
           <a:p>
             <a:pPr algn="ctr" eaLnBrk="1" hangingPunct="1"/>
             <a:r>
+              <a:rPr lang="en-US" altLang="en-US" sz="1100">
+                <a:latin typeface="Arial" panose="020B0604020202020204" pitchFamily="34" charset="0"/>
+                <a:ea typeface="Amazon Ember" panose="020B0603020204020204" pitchFamily="34" charset="0"/>
+                <a:cs typeface="Arial" panose="020B0604020202020204" pitchFamily="34" charset="0"/>
+              </a:rPr>
+              <a:t>Elastigroup instances</a:t>
+            </a:r>
+            <a:endParaRPr lang="en-US" altLang="en-US" sz="1100" dirty="0">
+              <a:latin typeface="Arial" panose="020B0604020202020204" pitchFamily="34" charset="0"/>
+              <a:ea typeface="Amazon Ember" panose="020B0603020204020204" pitchFamily="34" charset="0"/>
+              <a:cs typeface="Arial" panose="020B0604020202020204" pitchFamily="34" charset="0"/>
+            </a:endParaRPr>
+          </a:p>
+        </p:txBody>
+      </p:sp>
+      <p:sp>
+        <p:nvSpPr>
+          <p:cNvPr id="37" name="TextBox 19">
+            <a:extLst>
+              <a:ext uri="{FF2B5EF4-FFF2-40B4-BE49-F238E27FC236}">
+                <a16:creationId xmlns:a16="http://schemas.microsoft.com/office/drawing/2014/main" id="{07A0B1D9-21AB-4437-8890-FE28D0AECCED}"/>
+              </a:ext>
+            </a:extLst>
+          </p:cNvPr>
+          <p:cNvSpPr txBox="1">
+            <a:spLocks noChangeArrowheads="1"/>
+          </p:cNvSpPr>
+          <p:nvPr/>
+        </p:nvSpPr>
+        <p:spPr bwMode="auto">
+          <a:xfrm>
+            <a:off x="1600200" y="2834640"/>
+            <a:ext cx="1252536" cy="430887"/>
+          </a:xfrm>
+          <a:prstGeom prst="rect">
+            <a:avLst/>
+          </a:prstGeom>
+          <a:noFill/>
+          <a:ln>
+            <a:noFill/>
+          </a:ln>
+          <a:extLst>
+            <a:ext uri="{909E8E84-426E-40DD-AFC4-6F175D3DCCD1}">
+              <a14:hiddenFill xmlns:a14="http://schemas.microsoft.com/office/drawing/2010/main">
+                <a:solidFill>
+                  <a:srgbClr val="FFFFFF"/>
+                </a:solidFill>
+              </a14:hiddenFill>
+            </a:ext>
+            <a:ext uri="{91240B29-F687-4F45-9708-019B960494DF}">
+              <a14:hiddenLine xmlns:a14="http://schemas.microsoft.com/office/drawing/2010/main" w="9525">
+                <a:solidFill>
+                  <a:srgbClr val="000000"/>
+                </a:solidFill>
+                <a:miter lim="800000"/>
+                <a:headEnd/>
+                <a:tailEnd/>
+              </a14:hiddenLine>
+            </a:ext>
+          </a:extLst>
+        </p:spPr>
+        <p:txBody>
+          <a:bodyPr wrap="square">
+            <a:spAutoFit/>
+          </a:bodyPr>
+          <a:lstStyle>
+            <a:lvl1pPr>
+              <a:defRPr>
+                <a:solidFill>
+                  <a:schemeClr val="tx1"/>
+                </a:solidFill>
+                <a:latin typeface="Calibri" panose="020F0502020204030204" pitchFamily="34" charset="0"/>
+              </a:defRPr>
+            </a:lvl1pPr>
+            <a:lvl2pPr marL="742950" indent="-285750">
+              <a:defRPr>
+                <a:solidFill>
+                  <a:schemeClr val="tx1"/>
+                </a:solidFill>
+                <a:latin typeface="Calibri" panose="020F0502020204030204" pitchFamily="34" charset="0"/>
+              </a:defRPr>
+            </a:lvl2pPr>
+            <a:lvl3pPr marL="1143000" indent="-228600">
+              <a:defRPr>
+                <a:solidFill>
+                  <a:schemeClr val="tx1"/>
+                </a:solidFill>
+                <a:latin typeface="Calibri" panose="020F0502020204030204" pitchFamily="34" charset="0"/>
+              </a:defRPr>
+            </a:lvl3pPr>
+            <a:lvl4pPr marL="1600200" indent="-228600">
+              <a:defRPr>
+                <a:solidFill>
+                  <a:schemeClr val="tx1"/>
+                </a:solidFill>
+                <a:latin typeface="Calibri" panose="020F0502020204030204" pitchFamily="34" charset="0"/>
+              </a:defRPr>
+            </a:lvl4pPr>
+            <a:lvl5pPr marL="2057400" indent="-228600">
+              <a:defRPr>
+                <a:solidFill>
+                  <a:schemeClr val="tx1"/>
+                </a:solidFill>
+                <a:latin typeface="Calibri" panose="020F0502020204030204" pitchFamily="34" charset="0"/>
+              </a:defRPr>
+            </a:lvl5pPr>
+            <a:lvl6pPr marL="2514600" indent="-228600" eaLnBrk="0" fontAlgn="base" hangingPunct="0">
+              <a:spcBef>
+                <a:spcPct val="0"/>
+              </a:spcBef>
+              <a:spcAft>
+                <a:spcPct val="0"/>
+              </a:spcAft>
+              <a:defRPr>
+                <a:solidFill>
+                  <a:schemeClr val="tx1"/>
+                </a:solidFill>
+                <a:latin typeface="Calibri" panose="020F0502020204030204" pitchFamily="34" charset="0"/>
+              </a:defRPr>
+            </a:lvl6pPr>
+            <a:lvl7pPr marL="2971800" indent="-228600" eaLnBrk="0" fontAlgn="base" hangingPunct="0">
+              <a:spcBef>
+                <a:spcPct val="0"/>
+              </a:spcBef>
+              <a:spcAft>
+                <a:spcPct val="0"/>
+              </a:spcAft>
+              <a:defRPr>
+                <a:solidFill>
+                  <a:schemeClr val="tx1"/>
+                </a:solidFill>
+                <a:latin typeface="Calibri" panose="020F0502020204030204" pitchFamily="34" charset="0"/>
+              </a:defRPr>
+            </a:lvl7pPr>
+            <a:lvl8pPr marL="3429000" indent="-228600" eaLnBrk="0" fontAlgn="base" hangingPunct="0">
+              <a:spcBef>
+                <a:spcPct val="0"/>
+              </a:spcBef>
+              <a:spcAft>
+                <a:spcPct val="0"/>
+              </a:spcAft>
+              <a:defRPr>
+                <a:solidFill>
+                  <a:schemeClr val="tx1"/>
+                </a:solidFill>
+                <a:latin typeface="Calibri" panose="020F0502020204030204" pitchFamily="34" charset="0"/>
+              </a:defRPr>
+            </a:lvl8pPr>
+            <a:lvl9pPr marL="3886200" indent="-228600" eaLnBrk="0" fontAlgn="base" hangingPunct="0">
+              <a:spcBef>
+                <a:spcPct val="0"/>
+              </a:spcBef>
+              <a:spcAft>
+                <a:spcPct val="0"/>
+              </a:spcAft>
+              <a:defRPr>
+                <a:solidFill>
+                  <a:schemeClr val="tx1"/>
+                </a:solidFill>
+                <a:latin typeface="Calibri" panose="020F0502020204030204" pitchFamily="34" charset="0"/>
+              </a:defRPr>
+            </a:lvl9pPr>
+          </a:lstStyle>
+          <a:p>
+            <a:pPr algn="ctr" eaLnBrk="1" hangingPunct="1"/>
+            <a:r>
               <a:rPr lang="en-US" altLang="en-US" sz="1100" dirty="0">
                 <a:latin typeface="Arial" panose="020B0604020202020204" pitchFamily="34" charset="0"/>
                 <a:ea typeface="Amazon Ember" panose="020B0603020204020204" pitchFamily="34" charset="0"/>
                 <a:cs typeface="Arial" panose="020B0604020202020204" pitchFamily="34" charset="0"/>
               </a:rPr>
-              <a:t>Elastigroup</a:t>
+              <a:t>Application Load </a:t>
+            </a:r>
+            <a:br>
+              <a:rPr lang="en-US" altLang="en-US" sz="1100" dirty="0">
+                <a:latin typeface="Arial" panose="020B0604020202020204" pitchFamily="34" charset="0"/>
+                <a:ea typeface="Amazon Ember" panose="020B0603020204020204" pitchFamily="34" charset="0"/>
+                <a:cs typeface="Arial" panose="020B0604020202020204" pitchFamily="34" charset="0"/>
+              </a:rPr>
+            </a:br>
+            <a:r>
+              <a:rPr lang="en-US" altLang="en-US" sz="1100" dirty="0">
+                <a:latin typeface="Arial" panose="020B0604020202020204" pitchFamily="34" charset="0"/>
+                <a:ea typeface="Amazon Ember" panose="020B0603020204020204" pitchFamily="34" charset="0"/>
+                <a:cs typeface="Arial" panose="020B0604020202020204" pitchFamily="34" charset="0"/>
+              </a:rPr>
+              <a:t>Balancer</a:t>
             </a:r>
           </a:p>
         </p:txBody>
       </p:sp>
       <p:pic>
         <p:nvPicPr>
-          <p:cNvPr id="13" name="Graphic 60">
+          <p:cNvPr id="38" name="Graphic 8">
             <a:extLst>
               <a:ext uri="{FF2B5EF4-FFF2-40B4-BE49-F238E27FC236}">
-                <a16:creationId xmlns:a16="http://schemas.microsoft.com/office/drawing/2014/main" id="{50133C66-DD1C-4CE3-809B-518A22458FF7}"/>
+                <a16:creationId xmlns:a16="http://schemas.microsoft.com/office/drawing/2014/main" id="{F7DCF932-9214-4E68-AE22-444891DB7396}"/>
               </a:ext>
             </a:extLst>
           </p:cNvPr>
@@ -3595,7 +3776,7 @@
           <p:nvPr/>
         </p:nvPicPr>
         <p:blipFill>
-          <a:blip r:embed="rId8">
+          <a:blip r:embed="rId9">
             <a:extLst>
               <a:ext uri="{28A0092B-C50C-407E-A947-70E740481C1C}">
                 <a14:useLocalDpi xmlns:a14="http://schemas.microsoft.com/office/drawing/2010/main" val="0"/>
@@ -3609,7 +3790,7 @@
         </p:blipFill>
         <p:spPr bwMode="auto">
           <a:xfrm>
-            <a:off x="4109497" y="2548053"/>
+            <a:off x="2011680" y="2377440"/>
             <a:ext cx="457200" cy="457200"/>
           </a:xfrm>
           <a:prstGeom prst="rect">
@@ -3642,171 +3823,10 @@
       </p:pic>
       <p:sp>
         <p:nvSpPr>
-          <p:cNvPr id="14" name="TextBox 16">
+          <p:cNvPr id="50" name="Rectangle 49">
             <a:extLst>
               <a:ext uri="{FF2B5EF4-FFF2-40B4-BE49-F238E27FC236}">
-                <a16:creationId xmlns:a16="http://schemas.microsoft.com/office/drawing/2014/main" id="{B3D17187-1798-4380-83EC-E300ACE04B7B}"/>
-              </a:ext>
-            </a:extLst>
-          </p:cNvPr>
-          <p:cNvSpPr txBox="1">
-            <a:spLocks noChangeArrowheads="1"/>
-          </p:cNvSpPr>
-          <p:nvPr/>
-        </p:nvSpPr>
-        <p:spPr bwMode="auto">
-          <a:xfrm>
-            <a:off x="3904020" y="2995147"/>
-            <a:ext cx="868155" cy="261610"/>
-          </a:xfrm>
-          <a:prstGeom prst="rect">
-            <a:avLst/>
-          </a:prstGeom>
-          <a:noFill/>
-          <a:ln>
-            <a:noFill/>
-          </a:ln>
-          <a:extLst>
-            <a:ext uri="{909E8E84-426E-40DD-AFC4-6F175D3DCCD1}">
-              <a14:hiddenFill xmlns:a14="http://schemas.microsoft.com/office/drawing/2010/main">
-                <a:solidFill>
-                  <a:srgbClr val="FFFFFF"/>
-                </a:solidFill>
-              </a14:hiddenFill>
-            </a:ext>
-            <a:ext uri="{91240B29-F687-4F45-9708-019B960494DF}">
-              <a14:hiddenLine xmlns:a14="http://schemas.microsoft.com/office/drawing/2010/main" w="9525">
-                <a:solidFill>
-                  <a:srgbClr val="000000"/>
-                </a:solidFill>
-                <a:miter lim="800000"/>
-                <a:headEnd/>
-                <a:tailEnd/>
-              </a14:hiddenLine>
-            </a:ext>
-          </a:extLst>
-        </p:spPr>
-        <p:txBody>
-          <a:bodyPr wrap="square" lIns="0" rIns="0">
-            <a:spAutoFit/>
-          </a:bodyPr>
-          <a:lstStyle>
-            <a:lvl1pPr>
-              <a:defRPr>
-                <a:solidFill>
-                  <a:schemeClr val="tx1"/>
-                </a:solidFill>
-                <a:latin typeface="Calibri" panose="020F0502020204030204" pitchFamily="34" charset="0"/>
-              </a:defRPr>
-            </a:lvl1pPr>
-            <a:lvl2pPr marL="742950" indent="-285750">
-              <a:defRPr>
-                <a:solidFill>
-                  <a:schemeClr val="tx1"/>
-                </a:solidFill>
-                <a:latin typeface="Calibri" panose="020F0502020204030204" pitchFamily="34" charset="0"/>
-              </a:defRPr>
-            </a:lvl2pPr>
-            <a:lvl3pPr marL="1143000" indent="-228600">
-              <a:defRPr>
-                <a:solidFill>
-                  <a:schemeClr val="tx1"/>
-                </a:solidFill>
-                <a:latin typeface="Calibri" panose="020F0502020204030204" pitchFamily="34" charset="0"/>
-              </a:defRPr>
-            </a:lvl3pPr>
-            <a:lvl4pPr marL="1600200" indent="-228600">
-              <a:defRPr>
-                <a:solidFill>
-                  <a:schemeClr val="tx1"/>
-                </a:solidFill>
-                <a:latin typeface="Calibri" panose="020F0502020204030204" pitchFamily="34" charset="0"/>
-              </a:defRPr>
-            </a:lvl4pPr>
-            <a:lvl5pPr marL="2057400" indent="-228600">
-              <a:defRPr>
-                <a:solidFill>
-                  <a:schemeClr val="tx1"/>
-                </a:solidFill>
-                <a:latin typeface="Calibri" panose="020F0502020204030204" pitchFamily="34" charset="0"/>
-              </a:defRPr>
-            </a:lvl5pPr>
-            <a:lvl6pPr marL="2514600" indent="-228600" eaLnBrk="0" fontAlgn="base" hangingPunct="0">
-              <a:spcBef>
-                <a:spcPct val="0"/>
-              </a:spcBef>
-              <a:spcAft>
-                <a:spcPct val="0"/>
-              </a:spcAft>
-              <a:defRPr>
-                <a:solidFill>
-                  <a:schemeClr val="tx1"/>
-                </a:solidFill>
-                <a:latin typeface="Calibri" panose="020F0502020204030204" pitchFamily="34" charset="0"/>
-              </a:defRPr>
-            </a:lvl6pPr>
-            <a:lvl7pPr marL="2971800" indent="-228600" eaLnBrk="0" fontAlgn="base" hangingPunct="0">
-              <a:spcBef>
-                <a:spcPct val="0"/>
-              </a:spcBef>
-              <a:spcAft>
-                <a:spcPct val="0"/>
-              </a:spcAft>
-              <a:defRPr>
-                <a:solidFill>
-                  <a:schemeClr val="tx1"/>
-                </a:solidFill>
-                <a:latin typeface="Calibri" panose="020F0502020204030204" pitchFamily="34" charset="0"/>
-              </a:defRPr>
-            </a:lvl7pPr>
-            <a:lvl8pPr marL="3429000" indent="-228600" eaLnBrk="0" fontAlgn="base" hangingPunct="0">
-              <a:spcBef>
-                <a:spcPct val="0"/>
-              </a:spcBef>
-              <a:spcAft>
-                <a:spcPct val="0"/>
-              </a:spcAft>
-              <a:defRPr>
-                <a:solidFill>
-                  <a:schemeClr val="tx1"/>
-                </a:solidFill>
-                <a:latin typeface="Calibri" panose="020F0502020204030204" pitchFamily="34" charset="0"/>
-              </a:defRPr>
-            </a:lvl8pPr>
-            <a:lvl9pPr marL="3886200" indent="-228600" eaLnBrk="0" fontAlgn="base" hangingPunct="0">
-              <a:spcBef>
-                <a:spcPct val="0"/>
-              </a:spcBef>
-              <a:spcAft>
-                <a:spcPct val="0"/>
-              </a:spcAft>
-              <a:defRPr>
-                <a:solidFill>
-                  <a:schemeClr val="tx1"/>
-                </a:solidFill>
-                <a:latin typeface="Calibri" panose="020F0502020204030204" pitchFamily="34" charset="0"/>
-              </a:defRPr>
-            </a:lvl9pPr>
-          </a:lstStyle>
-          <a:p>
-            <a:pPr algn="ctr" eaLnBrk="1" hangingPunct="1"/>
-            <a:r>
-              <a:rPr lang="en-US" altLang="en-US" sz="1100" dirty="0">
-                <a:latin typeface="Arial" panose="020B0604020202020204" pitchFamily="34" charset="0"/>
-                <a:ea typeface="Amazon Ember" panose="020B0603020204020204" pitchFamily="34" charset="0"/>
-                <a:cs typeface="Arial" panose="020B0604020202020204" pitchFamily="34" charset="0"/>
-              </a:rPr>
-              <a:t>Elastigroup</a:t>
-            </a:r>
-          </a:p>
-        </p:txBody>
-      </p:sp>
-      <p:sp>
-        <p:nvSpPr>
-          <p:cNvPr id="20" name="Rectangle 19">
-            <a:extLst>
-              <a:ext uri="{FF2B5EF4-FFF2-40B4-BE49-F238E27FC236}">
-                <a16:creationId xmlns:a16="http://schemas.microsoft.com/office/drawing/2014/main" id="{3AFB16B2-B8A1-4E09-A81B-F10E47045265}"/>
+                <a16:creationId xmlns:a16="http://schemas.microsoft.com/office/drawing/2014/main" id="{6800CC7D-46C3-4D78-B240-9808EF2C31D1}"/>
               </a:ext>
             </a:extLst>
           </p:cNvPr>
@@ -3815,8 +3835,8 @@
         </p:nvSpPr>
         <p:spPr>
           <a:xfrm>
-            <a:off x="5349249" y="2011795"/>
-            <a:ext cx="1920240" cy="1554480"/>
+            <a:off x="4846320" y="1920240"/>
+            <a:ext cx="1554480" cy="1500877"/>
           </a:xfrm>
           <a:prstGeom prst="rect">
             <a:avLst/>
@@ -3875,10 +3895,10 @@
       </p:sp>
       <p:sp>
         <p:nvSpPr>
-          <p:cNvPr id="21" name="Rectangle 20">
+          <p:cNvPr id="51" name="Rectangle 50">
             <a:extLst>
               <a:ext uri="{FF2B5EF4-FFF2-40B4-BE49-F238E27FC236}">
-                <a16:creationId xmlns:a16="http://schemas.microsoft.com/office/drawing/2014/main" id="{E33E69FA-C2B3-4790-A500-4F5CF64ED8D7}"/>
+                <a16:creationId xmlns:a16="http://schemas.microsoft.com/office/drawing/2014/main" id="{56011DEF-47B1-4308-857B-EF103DD32321}"/>
               </a:ext>
             </a:extLst>
           </p:cNvPr>
@@ -3887,8 +3907,8 @@
         </p:nvSpPr>
         <p:spPr>
           <a:xfrm>
-            <a:off x="5212089" y="1280226"/>
-            <a:ext cx="2194560" cy="2651760"/>
+            <a:off x="4754880" y="1280160"/>
+            <a:ext cx="1737360" cy="2560320"/>
           </a:xfrm>
           <a:prstGeom prst="rect">
             <a:avLst/>
@@ -3938,17 +3958,34 @@
                 <a:latin typeface="Arial" panose="020B0604020202020204" pitchFamily="34" charset="0"/>
                 <a:cs typeface="Arial" panose="020B0604020202020204" pitchFamily="34" charset="0"/>
               </a:rPr>
-              <a:t>Availability Zone 2</a:t>
-            </a:r>
+              <a:t>Availability </a:t>
+            </a:r>
+            <a:r>
+              <a:rPr lang="en-US" sz="1200">
+                <a:solidFill>
+                  <a:srgbClr val="5B9CD5"/>
+                </a:solidFill>
+                <a:latin typeface="Arial" panose="020B0604020202020204" pitchFamily="34" charset="0"/>
+                <a:cs typeface="Arial" panose="020B0604020202020204" pitchFamily="34" charset="0"/>
+              </a:rPr>
+              <a:t>Zone 2</a:t>
+            </a:r>
+            <a:endParaRPr lang="en-US" sz="1200" dirty="0">
+              <a:solidFill>
+                <a:srgbClr val="5B9CD5"/>
+              </a:solidFill>
+              <a:latin typeface="Arial" panose="020B0604020202020204" pitchFamily="34" charset="0"/>
+              <a:cs typeface="Arial" panose="020B0604020202020204" pitchFamily="34" charset="0"/>
+            </a:endParaRPr>
           </a:p>
         </p:txBody>
       </p:sp>
       <p:pic>
         <p:nvPicPr>
-          <p:cNvPr id="22" name="Graphic 21">
+          <p:cNvPr id="52" name="Graphic 51">
             <a:extLst>
               <a:ext uri="{FF2B5EF4-FFF2-40B4-BE49-F238E27FC236}">
-                <a16:creationId xmlns:a16="http://schemas.microsoft.com/office/drawing/2014/main" id="{AD8BD744-0F2F-42E5-AEAF-8959BCA93BD1}"/>
+                <a16:creationId xmlns:a16="http://schemas.microsoft.com/office/drawing/2014/main" id="{C4EED5CD-2604-4C3B-9E7C-4C59827B49CF}"/>
               </a:ext>
             </a:extLst>
           </p:cNvPr>
@@ -3971,8 +4008,8 @@
         </p:blipFill>
         <p:spPr>
           <a:xfrm>
-            <a:off x="5349717" y="2013383"/>
-            <a:ext cx="381000" cy="381000"/>
+            <a:off x="4846320" y="1920240"/>
+            <a:ext cx="381000" cy="367862"/>
           </a:xfrm>
           <a:prstGeom prst="rect">
             <a:avLst/>
@@ -3981,10 +4018,10 @@
       </p:pic>
       <p:pic>
         <p:nvPicPr>
-          <p:cNvPr id="24" name="Graphic 60">
+          <p:cNvPr id="53" name="Graphic 60">
             <a:extLst>
               <a:ext uri="{FF2B5EF4-FFF2-40B4-BE49-F238E27FC236}">
-                <a16:creationId xmlns:a16="http://schemas.microsoft.com/office/drawing/2014/main" id="{F5954712-BE73-4C0D-B2B6-BD59DC3BABC0}"/>
+                <a16:creationId xmlns:a16="http://schemas.microsoft.com/office/drawing/2014/main" id="{FEE0B55D-2DAE-4C6E-AC34-7DA9D6AC0782}"/>
               </a:ext>
             </a:extLst>
           </p:cNvPr>
@@ -4008,8 +4045,8 @@
         </p:blipFill>
         <p:spPr bwMode="auto">
           <a:xfrm>
-            <a:off x="5646691" y="2548053"/>
-            <a:ext cx="457200" cy="457200"/>
+            <a:off x="5394960" y="2377440"/>
+            <a:ext cx="457200" cy="441434"/>
           </a:xfrm>
           <a:prstGeom prst="rect">
             <a:avLst/>
@@ -4041,10 +4078,10 @@
       </p:pic>
       <p:sp>
         <p:nvSpPr>
-          <p:cNvPr id="25" name="TextBox 16">
+          <p:cNvPr id="54" name="TextBox 16">
             <a:extLst>
               <a:ext uri="{FF2B5EF4-FFF2-40B4-BE49-F238E27FC236}">
-                <a16:creationId xmlns:a16="http://schemas.microsoft.com/office/drawing/2014/main" id="{3CBA3089-20BE-4C7F-9292-EEA864D608EE}"/>
+                <a16:creationId xmlns:a16="http://schemas.microsoft.com/office/drawing/2014/main" id="{A4964EEA-C524-46EC-A196-F8C28F63AE47}"/>
               </a:ext>
             </a:extLst>
           </p:cNvPr>
@@ -4055,8 +4092,8 @@
         </p:nvSpPr>
         <p:spPr bwMode="auto">
           <a:xfrm>
-            <a:off x="5441214" y="2995147"/>
-            <a:ext cx="868155" cy="261610"/>
+            <a:off x="5212080" y="2834640"/>
+            <a:ext cx="868155" cy="416029"/>
           </a:xfrm>
           <a:prstGeom prst="rect">
             <a:avLst/>
@@ -4190,243 +4227,27 @@
           <a:p>
             <a:pPr algn="ctr" eaLnBrk="1" hangingPunct="1"/>
             <a:r>
-              <a:rPr lang="en-US" altLang="en-US" sz="1100" dirty="0">
+              <a:rPr lang="en-US" altLang="en-US" sz="1100">
                 <a:latin typeface="Arial" panose="020B0604020202020204" pitchFamily="34" charset="0"/>
                 <a:ea typeface="Amazon Ember" panose="020B0603020204020204" pitchFamily="34" charset="0"/>
                 <a:cs typeface="Arial" panose="020B0604020202020204" pitchFamily="34" charset="0"/>
               </a:rPr>
-              <a:t>Elastigroup</a:t>
-            </a:r>
-          </a:p>
-        </p:txBody>
-      </p:sp>
-      <p:pic>
-        <p:nvPicPr>
-          <p:cNvPr id="26" name="Graphic 60">
+              <a:t>Elastigroup instances</a:t>
+            </a:r>
+            <a:endParaRPr lang="en-US" altLang="en-US" sz="1100" dirty="0">
+              <a:latin typeface="Arial" panose="020B0604020202020204" pitchFamily="34" charset="0"/>
+              <a:ea typeface="Amazon Ember" panose="020B0603020204020204" pitchFamily="34" charset="0"/>
+              <a:cs typeface="Arial" panose="020B0604020202020204" pitchFamily="34" charset="0"/>
+            </a:endParaRPr>
+          </a:p>
+        </p:txBody>
+      </p:sp>
+      <p:sp>
+        <p:nvSpPr>
+          <p:cNvPr id="56" name="Rectangle 55">
             <a:extLst>
               <a:ext uri="{FF2B5EF4-FFF2-40B4-BE49-F238E27FC236}">
-                <a16:creationId xmlns:a16="http://schemas.microsoft.com/office/drawing/2014/main" id="{62C6AB06-712E-44F3-B6FA-CA252EACDE8B}"/>
-              </a:ext>
-            </a:extLst>
-          </p:cNvPr>
-          <p:cNvPicPr>
-            <a:picLocks noChangeAspect="1" noChangeArrowheads="1"/>
-          </p:cNvPicPr>
-          <p:nvPr/>
-        </p:nvPicPr>
-        <p:blipFill>
-          <a:blip r:embed="rId8">
-            <a:extLst>
-              <a:ext uri="{28A0092B-C50C-407E-A947-70E740481C1C}">
-                <a14:useLocalDpi xmlns:a14="http://schemas.microsoft.com/office/drawing/2010/main" val="0"/>
-              </a:ext>
-            </a:extLst>
-          </a:blip>
-          <a:srcRect/>
-          <a:stretch>
-            <a:fillRect/>
-          </a:stretch>
-        </p:blipFill>
-        <p:spPr bwMode="auto">
-          <a:xfrm>
-            <a:off x="6514846" y="2548053"/>
-            <a:ext cx="457200" cy="457200"/>
-          </a:xfrm>
-          <a:prstGeom prst="rect">
-            <a:avLst/>
-          </a:prstGeom>
-          <a:noFill/>
-          <a:ln>
-            <a:noFill/>
-          </a:ln>
-          <a:extLst>
-            <a:ext uri="{909E8E84-426E-40DD-AFC4-6F175D3DCCD1}">
-              <a14:hiddenFill xmlns:a14="http://schemas.microsoft.com/office/drawing/2010/main">
-                <a:solidFill>
-                  <a:srgbClr val="FFFFFF"/>
-                </a:solidFill>
-              </a14:hiddenFill>
-            </a:ext>
-            <a:ext uri="{91240B29-F687-4F45-9708-019B960494DF}">
-              <a14:hiddenLine xmlns:a14="http://schemas.microsoft.com/office/drawing/2010/main" w="9525">
-                <a:solidFill>
-                  <a:srgbClr val="000000"/>
-                </a:solidFill>
-                <a:miter lim="800000"/>
-                <a:headEnd/>
-                <a:tailEnd/>
-              </a14:hiddenLine>
-            </a:ext>
-          </a:extLst>
-        </p:spPr>
-      </p:pic>
-      <p:sp>
-        <p:nvSpPr>
-          <p:cNvPr id="27" name="TextBox 16">
-            <a:extLst>
-              <a:ext uri="{FF2B5EF4-FFF2-40B4-BE49-F238E27FC236}">
-                <a16:creationId xmlns:a16="http://schemas.microsoft.com/office/drawing/2014/main" id="{274A79A9-89ED-4C8D-B5B1-CDAD0394B9EC}"/>
-              </a:ext>
-            </a:extLst>
-          </p:cNvPr>
-          <p:cNvSpPr txBox="1">
-            <a:spLocks noChangeArrowheads="1"/>
-          </p:cNvSpPr>
-          <p:nvPr/>
-        </p:nvSpPr>
-        <p:spPr bwMode="auto">
-          <a:xfrm>
-            <a:off x="6309369" y="2995147"/>
-            <a:ext cx="868155" cy="261610"/>
-          </a:xfrm>
-          <a:prstGeom prst="rect">
-            <a:avLst/>
-          </a:prstGeom>
-          <a:noFill/>
-          <a:ln>
-            <a:noFill/>
-          </a:ln>
-          <a:extLst>
-            <a:ext uri="{909E8E84-426E-40DD-AFC4-6F175D3DCCD1}">
-              <a14:hiddenFill xmlns:a14="http://schemas.microsoft.com/office/drawing/2010/main">
-                <a:solidFill>
-                  <a:srgbClr val="FFFFFF"/>
-                </a:solidFill>
-              </a14:hiddenFill>
-            </a:ext>
-            <a:ext uri="{91240B29-F687-4F45-9708-019B960494DF}">
-              <a14:hiddenLine xmlns:a14="http://schemas.microsoft.com/office/drawing/2010/main" w="9525">
-                <a:solidFill>
-                  <a:srgbClr val="000000"/>
-                </a:solidFill>
-                <a:miter lim="800000"/>
-                <a:headEnd/>
-                <a:tailEnd/>
-              </a14:hiddenLine>
-            </a:ext>
-          </a:extLst>
-        </p:spPr>
-        <p:txBody>
-          <a:bodyPr wrap="square" lIns="0" rIns="0">
-            <a:spAutoFit/>
-          </a:bodyPr>
-          <a:lstStyle>
-            <a:lvl1pPr>
-              <a:defRPr>
-                <a:solidFill>
-                  <a:schemeClr val="tx1"/>
-                </a:solidFill>
-                <a:latin typeface="Calibri" panose="020F0502020204030204" pitchFamily="34" charset="0"/>
-              </a:defRPr>
-            </a:lvl1pPr>
-            <a:lvl2pPr marL="742950" indent="-285750">
-              <a:defRPr>
-                <a:solidFill>
-                  <a:schemeClr val="tx1"/>
-                </a:solidFill>
-                <a:latin typeface="Calibri" panose="020F0502020204030204" pitchFamily="34" charset="0"/>
-              </a:defRPr>
-            </a:lvl2pPr>
-            <a:lvl3pPr marL="1143000" indent="-228600">
-              <a:defRPr>
-                <a:solidFill>
-                  <a:schemeClr val="tx1"/>
-                </a:solidFill>
-                <a:latin typeface="Calibri" panose="020F0502020204030204" pitchFamily="34" charset="0"/>
-              </a:defRPr>
-            </a:lvl3pPr>
-            <a:lvl4pPr marL="1600200" indent="-228600">
-              <a:defRPr>
-                <a:solidFill>
-                  <a:schemeClr val="tx1"/>
-                </a:solidFill>
-                <a:latin typeface="Calibri" panose="020F0502020204030204" pitchFamily="34" charset="0"/>
-              </a:defRPr>
-            </a:lvl4pPr>
-            <a:lvl5pPr marL="2057400" indent="-228600">
-              <a:defRPr>
-                <a:solidFill>
-                  <a:schemeClr val="tx1"/>
-                </a:solidFill>
-                <a:latin typeface="Calibri" panose="020F0502020204030204" pitchFamily="34" charset="0"/>
-              </a:defRPr>
-            </a:lvl5pPr>
-            <a:lvl6pPr marL="2514600" indent="-228600" eaLnBrk="0" fontAlgn="base" hangingPunct="0">
-              <a:spcBef>
-                <a:spcPct val="0"/>
-              </a:spcBef>
-              <a:spcAft>
-                <a:spcPct val="0"/>
-              </a:spcAft>
-              <a:defRPr>
-                <a:solidFill>
-                  <a:schemeClr val="tx1"/>
-                </a:solidFill>
-                <a:latin typeface="Calibri" panose="020F0502020204030204" pitchFamily="34" charset="0"/>
-              </a:defRPr>
-            </a:lvl6pPr>
-            <a:lvl7pPr marL="2971800" indent="-228600" eaLnBrk="0" fontAlgn="base" hangingPunct="0">
-              <a:spcBef>
-                <a:spcPct val="0"/>
-              </a:spcBef>
-              <a:spcAft>
-                <a:spcPct val="0"/>
-              </a:spcAft>
-              <a:defRPr>
-                <a:solidFill>
-                  <a:schemeClr val="tx1"/>
-                </a:solidFill>
-                <a:latin typeface="Calibri" panose="020F0502020204030204" pitchFamily="34" charset="0"/>
-              </a:defRPr>
-            </a:lvl7pPr>
-            <a:lvl8pPr marL="3429000" indent="-228600" eaLnBrk="0" fontAlgn="base" hangingPunct="0">
-              <a:spcBef>
-                <a:spcPct val="0"/>
-              </a:spcBef>
-              <a:spcAft>
-                <a:spcPct val="0"/>
-              </a:spcAft>
-              <a:defRPr>
-                <a:solidFill>
-                  <a:schemeClr val="tx1"/>
-                </a:solidFill>
-                <a:latin typeface="Calibri" panose="020F0502020204030204" pitchFamily="34" charset="0"/>
-              </a:defRPr>
-            </a:lvl8pPr>
-            <a:lvl9pPr marL="3886200" indent="-228600" eaLnBrk="0" fontAlgn="base" hangingPunct="0">
-              <a:spcBef>
-                <a:spcPct val="0"/>
-              </a:spcBef>
-              <a:spcAft>
-                <a:spcPct val="0"/>
-              </a:spcAft>
-              <a:defRPr>
-                <a:solidFill>
-                  <a:schemeClr val="tx1"/>
-                </a:solidFill>
-                <a:latin typeface="Calibri" panose="020F0502020204030204" pitchFamily="34" charset="0"/>
-              </a:defRPr>
-            </a:lvl9pPr>
-          </a:lstStyle>
-          <a:p>
-            <a:pPr algn="ctr" eaLnBrk="1" hangingPunct="1"/>
-            <a:r>
-              <a:rPr lang="en-US" altLang="en-US" sz="1100" dirty="0">
-                <a:latin typeface="Arial" panose="020B0604020202020204" pitchFamily="34" charset="0"/>
-                <a:ea typeface="Amazon Ember" panose="020B0603020204020204" pitchFamily="34" charset="0"/>
-                <a:cs typeface="Arial" panose="020B0604020202020204" pitchFamily="34" charset="0"/>
-              </a:rPr>
-              <a:t>Elastigroup</a:t>
-            </a:r>
-          </a:p>
-        </p:txBody>
-      </p:sp>
-      <p:sp>
-        <p:nvSpPr>
-          <p:cNvPr id="29" name="Rectangle 28">
-            <a:extLst>
-              <a:ext uri="{FF2B5EF4-FFF2-40B4-BE49-F238E27FC236}">
-                <a16:creationId xmlns:a16="http://schemas.microsoft.com/office/drawing/2014/main" id="{DDB989C2-0191-4965-9A1F-F0B48B30CB44}"/>
+                <a16:creationId xmlns:a16="http://schemas.microsoft.com/office/drawing/2014/main" id="{76EEA2A0-D615-4E33-B205-5982D79B0599}"/>
               </a:ext>
             </a:extLst>
           </p:cNvPr>
@@ -4435,8 +4256,8 @@
         </p:nvSpPr>
         <p:spPr>
           <a:xfrm>
-            <a:off x="7818102" y="2011795"/>
-            <a:ext cx="2651760" cy="1554480"/>
+            <a:off x="6766486" y="1920240"/>
+            <a:ext cx="1554480" cy="1500877"/>
           </a:xfrm>
           <a:prstGeom prst="rect">
             <a:avLst/>
@@ -4495,10 +4316,10 @@
       </p:sp>
       <p:sp>
         <p:nvSpPr>
-          <p:cNvPr id="30" name="Rectangle 29">
+          <p:cNvPr id="57" name="Rectangle 56">
             <a:extLst>
               <a:ext uri="{FF2B5EF4-FFF2-40B4-BE49-F238E27FC236}">
-                <a16:creationId xmlns:a16="http://schemas.microsoft.com/office/drawing/2014/main" id="{FE277491-49D4-4D46-8AAD-AE0BA4A9D4BB}"/>
+                <a16:creationId xmlns:a16="http://schemas.microsoft.com/office/drawing/2014/main" id="{185BE8BB-648F-48CE-B9FE-8A29215D0A70}"/>
               </a:ext>
             </a:extLst>
           </p:cNvPr>
@@ -4507,8 +4328,8 @@
         </p:nvSpPr>
         <p:spPr>
           <a:xfrm>
-            <a:off x="7680942" y="1280226"/>
-            <a:ext cx="2926080" cy="2651760"/>
+            <a:off x="6675046" y="1280160"/>
+            <a:ext cx="1737360" cy="2560320"/>
           </a:xfrm>
           <a:prstGeom prst="rect">
             <a:avLst/>
@@ -4558,17 +4379,34 @@
                 <a:latin typeface="Arial" panose="020B0604020202020204" pitchFamily="34" charset="0"/>
                 <a:cs typeface="Arial" panose="020B0604020202020204" pitchFamily="34" charset="0"/>
               </a:rPr>
-              <a:t>Availability Zone 3</a:t>
-            </a:r>
+              <a:t>Availability </a:t>
+            </a:r>
+            <a:r>
+              <a:rPr lang="en-US" sz="1200">
+                <a:solidFill>
+                  <a:srgbClr val="5B9CD5"/>
+                </a:solidFill>
+                <a:latin typeface="Arial" panose="020B0604020202020204" pitchFamily="34" charset="0"/>
+                <a:cs typeface="Arial" panose="020B0604020202020204" pitchFamily="34" charset="0"/>
+              </a:rPr>
+              <a:t>Zone 3</a:t>
+            </a:r>
+            <a:endParaRPr lang="en-US" sz="1200" dirty="0">
+              <a:solidFill>
+                <a:srgbClr val="5B9CD5"/>
+              </a:solidFill>
+              <a:latin typeface="Arial" panose="020B0604020202020204" pitchFamily="34" charset="0"/>
+              <a:cs typeface="Arial" panose="020B0604020202020204" pitchFamily="34" charset="0"/>
+            </a:endParaRPr>
           </a:p>
         </p:txBody>
       </p:sp>
       <p:pic>
         <p:nvPicPr>
-          <p:cNvPr id="31" name="Graphic 30">
+          <p:cNvPr id="58" name="Graphic 57">
             <a:extLst>
               <a:ext uri="{FF2B5EF4-FFF2-40B4-BE49-F238E27FC236}">
-                <a16:creationId xmlns:a16="http://schemas.microsoft.com/office/drawing/2014/main" id="{9F275CE9-816A-4152-A71A-173048F57C9F}"/>
+                <a16:creationId xmlns:a16="http://schemas.microsoft.com/office/drawing/2014/main" id="{5DF67781-F758-415D-94DC-CF747F843082}"/>
               </a:ext>
             </a:extLst>
           </p:cNvPr>
@@ -4591,8 +4429,8 @@
         </p:blipFill>
         <p:spPr>
           <a:xfrm>
-            <a:off x="7818570" y="2013383"/>
-            <a:ext cx="381000" cy="381000"/>
+            <a:off x="6766486" y="1920240"/>
+            <a:ext cx="381000" cy="367862"/>
           </a:xfrm>
           <a:prstGeom prst="rect">
             <a:avLst/>
@@ -4601,10 +4439,10 @@
       </p:pic>
       <p:pic>
         <p:nvPicPr>
-          <p:cNvPr id="33" name="Graphic 60">
+          <p:cNvPr id="59" name="Graphic 60">
             <a:extLst>
               <a:ext uri="{FF2B5EF4-FFF2-40B4-BE49-F238E27FC236}">
-                <a16:creationId xmlns:a16="http://schemas.microsoft.com/office/drawing/2014/main" id="{27CB50B7-4813-44DF-B82C-F5839C3745EC}"/>
+                <a16:creationId xmlns:a16="http://schemas.microsoft.com/office/drawing/2014/main" id="{F91866C6-2F22-4D09-B3BF-382302B42E5F}"/>
               </a:ext>
             </a:extLst>
           </p:cNvPr>
@@ -4628,8 +4466,8 @@
         </p:blipFill>
         <p:spPr bwMode="auto">
           <a:xfrm>
-            <a:off x="8115544" y="2548053"/>
-            <a:ext cx="457200" cy="457200"/>
+            <a:off x="7315126" y="2377440"/>
+            <a:ext cx="457200" cy="441434"/>
           </a:xfrm>
           <a:prstGeom prst="rect">
             <a:avLst/>
@@ -4661,10 +4499,10 @@
       </p:pic>
       <p:sp>
         <p:nvSpPr>
-          <p:cNvPr id="34" name="TextBox 16">
+          <p:cNvPr id="60" name="TextBox 16">
             <a:extLst>
               <a:ext uri="{FF2B5EF4-FFF2-40B4-BE49-F238E27FC236}">
-                <a16:creationId xmlns:a16="http://schemas.microsoft.com/office/drawing/2014/main" id="{052A097B-CAB1-4499-8283-16C81922B06C}"/>
+                <a16:creationId xmlns:a16="http://schemas.microsoft.com/office/drawing/2014/main" id="{83146C24-8990-47C1-9BAD-BD75DEA62389}"/>
               </a:ext>
             </a:extLst>
           </p:cNvPr>
@@ -4675,8 +4513,8 @@
         </p:nvSpPr>
         <p:spPr bwMode="auto">
           <a:xfrm>
-            <a:off x="7910067" y="2995147"/>
-            <a:ext cx="868155" cy="261610"/>
+            <a:off x="7132320" y="2834640"/>
+            <a:ext cx="868155" cy="416029"/>
           </a:xfrm>
           <a:prstGeom prst="rect">
             <a:avLst/>
@@ -4810,691 +4648,18 @@
           <a:p>
             <a:pPr algn="ctr" eaLnBrk="1" hangingPunct="1"/>
             <a:r>
-              <a:rPr lang="en-US" altLang="en-US" sz="1100" dirty="0">
+              <a:rPr lang="en-US" altLang="en-US" sz="1100">
                 <a:latin typeface="Arial" panose="020B0604020202020204" pitchFamily="34" charset="0"/>
                 <a:ea typeface="Amazon Ember" panose="020B0603020204020204" pitchFamily="34" charset="0"/>
                 <a:cs typeface="Arial" panose="020B0604020202020204" pitchFamily="34" charset="0"/>
               </a:rPr>
-              <a:t>Elastigroup</a:t>
-            </a:r>
-          </a:p>
-        </p:txBody>
-      </p:sp>
-      <p:pic>
-        <p:nvPicPr>
-          <p:cNvPr id="35" name="Graphic 60">
-            <a:extLst>
-              <a:ext uri="{FF2B5EF4-FFF2-40B4-BE49-F238E27FC236}">
-                <a16:creationId xmlns:a16="http://schemas.microsoft.com/office/drawing/2014/main" id="{77A3F717-618A-4AEC-B5A1-1A954AA127C0}"/>
-              </a:ext>
-            </a:extLst>
-          </p:cNvPr>
-          <p:cNvPicPr>
-            <a:picLocks noChangeAspect="1" noChangeArrowheads="1"/>
-          </p:cNvPicPr>
-          <p:nvPr/>
-        </p:nvPicPr>
-        <p:blipFill>
-          <a:blip r:embed="rId8">
-            <a:extLst>
-              <a:ext uri="{28A0092B-C50C-407E-A947-70E740481C1C}">
-                <a14:useLocalDpi xmlns:a14="http://schemas.microsoft.com/office/drawing/2010/main" val="0"/>
-              </a:ext>
-            </a:extLst>
-          </a:blip>
-          <a:srcRect/>
-          <a:stretch>
-            <a:fillRect/>
-          </a:stretch>
-        </p:blipFill>
-        <p:spPr bwMode="auto">
-          <a:xfrm>
-            <a:off x="8983699" y="2548053"/>
-            <a:ext cx="457200" cy="457200"/>
-          </a:xfrm>
-          <a:prstGeom prst="rect">
-            <a:avLst/>
-          </a:prstGeom>
-          <a:noFill/>
-          <a:ln>
-            <a:noFill/>
-          </a:ln>
-          <a:extLst>
-            <a:ext uri="{909E8E84-426E-40DD-AFC4-6F175D3DCCD1}">
-              <a14:hiddenFill xmlns:a14="http://schemas.microsoft.com/office/drawing/2010/main">
-                <a:solidFill>
-                  <a:srgbClr val="FFFFFF"/>
-                </a:solidFill>
-              </a14:hiddenFill>
-            </a:ext>
-            <a:ext uri="{91240B29-F687-4F45-9708-019B960494DF}">
-              <a14:hiddenLine xmlns:a14="http://schemas.microsoft.com/office/drawing/2010/main" w="9525">
-                <a:solidFill>
-                  <a:srgbClr val="000000"/>
-                </a:solidFill>
-                <a:miter lim="800000"/>
-                <a:headEnd/>
-                <a:tailEnd/>
-              </a14:hiddenLine>
-            </a:ext>
-          </a:extLst>
-        </p:spPr>
-      </p:pic>
-      <p:sp>
-        <p:nvSpPr>
-          <p:cNvPr id="36" name="TextBox 16">
-            <a:extLst>
-              <a:ext uri="{FF2B5EF4-FFF2-40B4-BE49-F238E27FC236}">
-                <a16:creationId xmlns:a16="http://schemas.microsoft.com/office/drawing/2014/main" id="{11115DD2-8598-4404-9ADC-6E437E584466}"/>
-              </a:ext>
-            </a:extLst>
-          </p:cNvPr>
-          <p:cNvSpPr txBox="1">
-            <a:spLocks noChangeArrowheads="1"/>
-          </p:cNvSpPr>
-          <p:nvPr/>
-        </p:nvSpPr>
-        <p:spPr bwMode="auto">
-          <a:xfrm>
-            <a:off x="8778222" y="2995147"/>
-            <a:ext cx="868155" cy="261610"/>
-          </a:xfrm>
-          <a:prstGeom prst="rect">
-            <a:avLst/>
-          </a:prstGeom>
-          <a:noFill/>
-          <a:ln>
-            <a:noFill/>
-          </a:ln>
-          <a:extLst>
-            <a:ext uri="{909E8E84-426E-40DD-AFC4-6F175D3DCCD1}">
-              <a14:hiddenFill xmlns:a14="http://schemas.microsoft.com/office/drawing/2010/main">
-                <a:solidFill>
-                  <a:srgbClr val="FFFFFF"/>
-                </a:solidFill>
-              </a14:hiddenFill>
-            </a:ext>
-            <a:ext uri="{91240B29-F687-4F45-9708-019B960494DF}">
-              <a14:hiddenLine xmlns:a14="http://schemas.microsoft.com/office/drawing/2010/main" w="9525">
-                <a:solidFill>
-                  <a:srgbClr val="000000"/>
-                </a:solidFill>
-                <a:miter lim="800000"/>
-                <a:headEnd/>
-                <a:tailEnd/>
-              </a14:hiddenLine>
-            </a:ext>
-          </a:extLst>
-        </p:spPr>
-        <p:txBody>
-          <a:bodyPr wrap="square" lIns="0" rIns="0">
-            <a:spAutoFit/>
-          </a:bodyPr>
-          <a:lstStyle>
-            <a:lvl1pPr>
-              <a:defRPr>
-                <a:solidFill>
-                  <a:schemeClr val="tx1"/>
-                </a:solidFill>
-                <a:latin typeface="Calibri" panose="020F0502020204030204" pitchFamily="34" charset="0"/>
-              </a:defRPr>
-            </a:lvl1pPr>
-            <a:lvl2pPr marL="742950" indent="-285750">
-              <a:defRPr>
-                <a:solidFill>
-                  <a:schemeClr val="tx1"/>
-                </a:solidFill>
-                <a:latin typeface="Calibri" panose="020F0502020204030204" pitchFamily="34" charset="0"/>
-              </a:defRPr>
-            </a:lvl2pPr>
-            <a:lvl3pPr marL="1143000" indent="-228600">
-              <a:defRPr>
-                <a:solidFill>
-                  <a:schemeClr val="tx1"/>
-                </a:solidFill>
-                <a:latin typeface="Calibri" panose="020F0502020204030204" pitchFamily="34" charset="0"/>
-              </a:defRPr>
-            </a:lvl3pPr>
-            <a:lvl4pPr marL="1600200" indent="-228600">
-              <a:defRPr>
-                <a:solidFill>
-                  <a:schemeClr val="tx1"/>
-                </a:solidFill>
-                <a:latin typeface="Calibri" panose="020F0502020204030204" pitchFamily="34" charset="0"/>
-              </a:defRPr>
-            </a:lvl4pPr>
-            <a:lvl5pPr marL="2057400" indent="-228600">
-              <a:defRPr>
-                <a:solidFill>
-                  <a:schemeClr val="tx1"/>
-                </a:solidFill>
-                <a:latin typeface="Calibri" panose="020F0502020204030204" pitchFamily="34" charset="0"/>
-              </a:defRPr>
-            </a:lvl5pPr>
-            <a:lvl6pPr marL="2514600" indent="-228600" eaLnBrk="0" fontAlgn="base" hangingPunct="0">
-              <a:spcBef>
-                <a:spcPct val="0"/>
-              </a:spcBef>
-              <a:spcAft>
-                <a:spcPct val="0"/>
-              </a:spcAft>
-              <a:defRPr>
-                <a:solidFill>
-                  <a:schemeClr val="tx1"/>
-                </a:solidFill>
-                <a:latin typeface="Calibri" panose="020F0502020204030204" pitchFamily="34" charset="0"/>
-              </a:defRPr>
-            </a:lvl6pPr>
-            <a:lvl7pPr marL="2971800" indent="-228600" eaLnBrk="0" fontAlgn="base" hangingPunct="0">
-              <a:spcBef>
-                <a:spcPct val="0"/>
-              </a:spcBef>
-              <a:spcAft>
-                <a:spcPct val="0"/>
-              </a:spcAft>
-              <a:defRPr>
-                <a:solidFill>
-                  <a:schemeClr val="tx1"/>
-                </a:solidFill>
-                <a:latin typeface="Calibri" panose="020F0502020204030204" pitchFamily="34" charset="0"/>
-              </a:defRPr>
-            </a:lvl7pPr>
-            <a:lvl8pPr marL="3429000" indent="-228600" eaLnBrk="0" fontAlgn="base" hangingPunct="0">
-              <a:spcBef>
-                <a:spcPct val="0"/>
-              </a:spcBef>
-              <a:spcAft>
-                <a:spcPct val="0"/>
-              </a:spcAft>
-              <a:defRPr>
-                <a:solidFill>
-                  <a:schemeClr val="tx1"/>
-                </a:solidFill>
-                <a:latin typeface="Calibri" panose="020F0502020204030204" pitchFamily="34" charset="0"/>
-              </a:defRPr>
-            </a:lvl8pPr>
-            <a:lvl9pPr marL="3886200" indent="-228600" eaLnBrk="0" fontAlgn="base" hangingPunct="0">
-              <a:spcBef>
-                <a:spcPct val="0"/>
-              </a:spcBef>
-              <a:spcAft>
-                <a:spcPct val="0"/>
-              </a:spcAft>
-              <a:defRPr>
-                <a:solidFill>
-                  <a:schemeClr val="tx1"/>
-                </a:solidFill>
-                <a:latin typeface="Calibri" panose="020F0502020204030204" pitchFamily="34" charset="0"/>
-              </a:defRPr>
-            </a:lvl9pPr>
-          </a:lstStyle>
-          <a:p>
-            <a:pPr algn="ctr" eaLnBrk="1" hangingPunct="1"/>
-            <a:r>
-              <a:rPr lang="en-US" altLang="en-US" sz="1100" dirty="0">
-                <a:latin typeface="Arial" panose="020B0604020202020204" pitchFamily="34" charset="0"/>
-                <a:ea typeface="Amazon Ember" panose="020B0603020204020204" pitchFamily="34" charset="0"/>
-                <a:cs typeface="Arial" panose="020B0604020202020204" pitchFamily="34" charset="0"/>
-              </a:rPr>
-              <a:t>Elastigroup</a:t>
-            </a:r>
-          </a:p>
-        </p:txBody>
-      </p:sp>
-      <p:sp>
-        <p:nvSpPr>
-          <p:cNvPr id="37" name="TextBox 19">
-            <a:extLst>
-              <a:ext uri="{FF2B5EF4-FFF2-40B4-BE49-F238E27FC236}">
-                <a16:creationId xmlns:a16="http://schemas.microsoft.com/office/drawing/2014/main" id="{07A0B1D9-21AB-4437-8890-FE28D0AECCED}"/>
-              </a:ext>
-            </a:extLst>
-          </p:cNvPr>
-          <p:cNvSpPr txBox="1">
-            <a:spLocks noChangeArrowheads="1"/>
-          </p:cNvSpPr>
-          <p:nvPr/>
-        </p:nvSpPr>
-        <p:spPr bwMode="auto">
-          <a:xfrm>
-            <a:off x="1600200" y="2995147"/>
-            <a:ext cx="1252536" cy="430887"/>
-          </a:xfrm>
-          <a:prstGeom prst="rect">
-            <a:avLst/>
-          </a:prstGeom>
-          <a:noFill/>
-          <a:ln>
-            <a:noFill/>
-          </a:ln>
-          <a:extLst>
-            <a:ext uri="{909E8E84-426E-40DD-AFC4-6F175D3DCCD1}">
-              <a14:hiddenFill xmlns:a14="http://schemas.microsoft.com/office/drawing/2010/main">
-                <a:solidFill>
-                  <a:srgbClr val="FFFFFF"/>
-                </a:solidFill>
-              </a14:hiddenFill>
-            </a:ext>
-            <a:ext uri="{91240B29-F687-4F45-9708-019B960494DF}">
-              <a14:hiddenLine xmlns:a14="http://schemas.microsoft.com/office/drawing/2010/main" w="9525">
-                <a:solidFill>
-                  <a:srgbClr val="000000"/>
-                </a:solidFill>
-                <a:miter lim="800000"/>
-                <a:headEnd/>
-                <a:tailEnd/>
-              </a14:hiddenLine>
-            </a:ext>
-          </a:extLst>
-        </p:spPr>
-        <p:txBody>
-          <a:bodyPr wrap="square">
-            <a:spAutoFit/>
-          </a:bodyPr>
-          <a:lstStyle>
-            <a:lvl1pPr>
-              <a:defRPr>
-                <a:solidFill>
-                  <a:schemeClr val="tx1"/>
-                </a:solidFill>
-                <a:latin typeface="Calibri" panose="020F0502020204030204" pitchFamily="34" charset="0"/>
-              </a:defRPr>
-            </a:lvl1pPr>
-            <a:lvl2pPr marL="742950" indent="-285750">
-              <a:defRPr>
-                <a:solidFill>
-                  <a:schemeClr val="tx1"/>
-                </a:solidFill>
-                <a:latin typeface="Calibri" panose="020F0502020204030204" pitchFamily="34" charset="0"/>
-              </a:defRPr>
-            </a:lvl2pPr>
-            <a:lvl3pPr marL="1143000" indent="-228600">
-              <a:defRPr>
-                <a:solidFill>
-                  <a:schemeClr val="tx1"/>
-                </a:solidFill>
-                <a:latin typeface="Calibri" panose="020F0502020204030204" pitchFamily="34" charset="0"/>
-              </a:defRPr>
-            </a:lvl3pPr>
-            <a:lvl4pPr marL="1600200" indent="-228600">
-              <a:defRPr>
-                <a:solidFill>
-                  <a:schemeClr val="tx1"/>
-                </a:solidFill>
-                <a:latin typeface="Calibri" panose="020F0502020204030204" pitchFamily="34" charset="0"/>
-              </a:defRPr>
-            </a:lvl4pPr>
-            <a:lvl5pPr marL="2057400" indent="-228600">
-              <a:defRPr>
-                <a:solidFill>
-                  <a:schemeClr val="tx1"/>
-                </a:solidFill>
-                <a:latin typeface="Calibri" panose="020F0502020204030204" pitchFamily="34" charset="0"/>
-              </a:defRPr>
-            </a:lvl5pPr>
-            <a:lvl6pPr marL="2514600" indent="-228600" eaLnBrk="0" fontAlgn="base" hangingPunct="0">
-              <a:spcBef>
-                <a:spcPct val="0"/>
-              </a:spcBef>
-              <a:spcAft>
-                <a:spcPct val="0"/>
-              </a:spcAft>
-              <a:defRPr>
-                <a:solidFill>
-                  <a:schemeClr val="tx1"/>
-                </a:solidFill>
-                <a:latin typeface="Calibri" panose="020F0502020204030204" pitchFamily="34" charset="0"/>
-              </a:defRPr>
-            </a:lvl6pPr>
-            <a:lvl7pPr marL="2971800" indent="-228600" eaLnBrk="0" fontAlgn="base" hangingPunct="0">
-              <a:spcBef>
-                <a:spcPct val="0"/>
-              </a:spcBef>
-              <a:spcAft>
-                <a:spcPct val="0"/>
-              </a:spcAft>
-              <a:defRPr>
-                <a:solidFill>
-                  <a:schemeClr val="tx1"/>
-                </a:solidFill>
-                <a:latin typeface="Calibri" panose="020F0502020204030204" pitchFamily="34" charset="0"/>
-              </a:defRPr>
-            </a:lvl7pPr>
-            <a:lvl8pPr marL="3429000" indent="-228600" eaLnBrk="0" fontAlgn="base" hangingPunct="0">
-              <a:spcBef>
-                <a:spcPct val="0"/>
-              </a:spcBef>
-              <a:spcAft>
-                <a:spcPct val="0"/>
-              </a:spcAft>
-              <a:defRPr>
-                <a:solidFill>
-                  <a:schemeClr val="tx1"/>
-                </a:solidFill>
-                <a:latin typeface="Calibri" panose="020F0502020204030204" pitchFamily="34" charset="0"/>
-              </a:defRPr>
-            </a:lvl8pPr>
-            <a:lvl9pPr marL="3886200" indent="-228600" eaLnBrk="0" fontAlgn="base" hangingPunct="0">
-              <a:spcBef>
-                <a:spcPct val="0"/>
-              </a:spcBef>
-              <a:spcAft>
-                <a:spcPct val="0"/>
-              </a:spcAft>
-              <a:defRPr>
-                <a:solidFill>
-                  <a:schemeClr val="tx1"/>
-                </a:solidFill>
-                <a:latin typeface="Calibri" panose="020F0502020204030204" pitchFamily="34" charset="0"/>
-              </a:defRPr>
-            </a:lvl9pPr>
-          </a:lstStyle>
-          <a:p>
-            <a:pPr algn="ctr" eaLnBrk="1" hangingPunct="1"/>
-            <a:r>
-              <a:rPr lang="en-US" altLang="en-US" sz="1100" dirty="0">
-                <a:latin typeface="Arial" panose="020B0604020202020204" pitchFamily="34" charset="0"/>
-                <a:ea typeface="Amazon Ember" panose="020B0603020204020204" pitchFamily="34" charset="0"/>
-                <a:cs typeface="Arial" panose="020B0604020202020204" pitchFamily="34" charset="0"/>
-              </a:rPr>
-              <a:t>Application Load </a:t>
-            </a:r>
-            <a:br>
-              <a:rPr lang="en-US" altLang="en-US" sz="1100" dirty="0">
-                <a:latin typeface="Arial" panose="020B0604020202020204" pitchFamily="34" charset="0"/>
-                <a:ea typeface="Amazon Ember" panose="020B0603020204020204" pitchFamily="34" charset="0"/>
-                <a:cs typeface="Arial" panose="020B0604020202020204" pitchFamily="34" charset="0"/>
-              </a:rPr>
-            </a:br>
-            <a:r>
-              <a:rPr lang="en-US" altLang="en-US" sz="1100" dirty="0">
-                <a:latin typeface="Arial" panose="020B0604020202020204" pitchFamily="34" charset="0"/>
-                <a:ea typeface="Amazon Ember" panose="020B0603020204020204" pitchFamily="34" charset="0"/>
-                <a:cs typeface="Arial" panose="020B0604020202020204" pitchFamily="34" charset="0"/>
-              </a:rPr>
-              <a:t>Balancer</a:t>
-            </a:r>
-          </a:p>
-        </p:txBody>
-      </p:sp>
-      <p:pic>
-        <p:nvPicPr>
-          <p:cNvPr id="38" name="Graphic 8">
-            <a:extLst>
-              <a:ext uri="{FF2B5EF4-FFF2-40B4-BE49-F238E27FC236}">
-                <a16:creationId xmlns:a16="http://schemas.microsoft.com/office/drawing/2014/main" id="{F7DCF932-9214-4E68-AE22-444891DB7396}"/>
-              </a:ext>
-            </a:extLst>
-          </p:cNvPr>
-          <p:cNvPicPr>
-            <a:picLocks noChangeAspect="1" noChangeArrowheads="1"/>
-          </p:cNvPicPr>
-          <p:nvPr/>
-        </p:nvPicPr>
-        <p:blipFill>
-          <a:blip r:embed="rId9">
-            <a:extLst>
-              <a:ext uri="{28A0092B-C50C-407E-A947-70E740481C1C}">
-                <a14:useLocalDpi xmlns:a14="http://schemas.microsoft.com/office/drawing/2010/main" val="0"/>
-              </a:ext>
-            </a:extLst>
-          </a:blip>
-          <a:srcRect/>
-          <a:stretch>
-            <a:fillRect/>
-          </a:stretch>
-        </p:blipFill>
-        <p:spPr bwMode="auto">
-          <a:xfrm>
-            <a:off x="1997868" y="2548053"/>
-            <a:ext cx="457200" cy="457200"/>
-          </a:xfrm>
-          <a:prstGeom prst="rect">
-            <a:avLst/>
-          </a:prstGeom>
-          <a:noFill/>
-          <a:ln>
-            <a:noFill/>
-          </a:ln>
-          <a:extLst>
-            <a:ext uri="{909E8E84-426E-40DD-AFC4-6F175D3DCCD1}">
-              <a14:hiddenFill xmlns:a14="http://schemas.microsoft.com/office/drawing/2010/main">
-                <a:solidFill>
-                  <a:srgbClr val="FFFFFF"/>
-                </a:solidFill>
-              </a14:hiddenFill>
-            </a:ext>
-            <a:ext uri="{91240B29-F687-4F45-9708-019B960494DF}">
-              <a14:hiddenLine xmlns:a14="http://schemas.microsoft.com/office/drawing/2010/main" w="9525">
-                <a:solidFill>
-                  <a:srgbClr val="000000"/>
-                </a:solidFill>
-                <a:miter lim="800000"/>
-                <a:headEnd/>
-                <a:tailEnd/>
-              </a14:hiddenLine>
-            </a:ext>
-          </a:extLst>
-        </p:spPr>
-      </p:pic>
-      <p:pic>
-        <p:nvPicPr>
-          <p:cNvPr id="32" name="Graphic 60">
-            <a:extLst>
-              <a:ext uri="{FF2B5EF4-FFF2-40B4-BE49-F238E27FC236}">
-                <a16:creationId xmlns:a16="http://schemas.microsoft.com/office/drawing/2014/main" id="{7EEBFFB6-6EB6-4782-B320-1DB1AF249FD1}"/>
-              </a:ext>
-            </a:extLst>
-          </p:cNvPr>
-          <p:cNvPicPr>
-            <a:picLocks noChangeAspect="1" noChangeArrowheads="1"/>
-          </p:cNvPicPr>
-          <p:nvPr/>
-        </p:nvPicPr>
-        <p:blipFill>
-          <a:blip r:embed="rId8">
-            <a:extLst>
-              <a:ext uri="{28A0092B-C50C-407E-A947-70E740481C1C}">
-                <a14:useLocalDpi xmlns:a14="http://schemas.microsoft.com/office/drawing/2010/main" val="0"/>
-              </a:ext>
-            </a:extLst>
-          </a:blip>
-          <a:srcRect/>
-          <a:stretch>
-            <a:fillRect/>
-          </a:stretch>
-        </p:blipFill>
-        <p:spPr bwMode="auto">
-          <a:xfrm>
-            <a:off x="9806662" y="2548053"/>
-            <a:ext cx="457200" cy="457200"/>
-          </a:xfrm>
-          <a:prstGeom prst="rect">
-            <a:avLst/>
-          </a:prstGeom>
-          <a:noFill/>
-          <a:ln>
-            <a:noFill/>
-          </a:ln>
-          <a:extLst>
-            <a:ext uri="{909E8E84-426E-40DD-AFC4-6F175D3DCCD1}">
-              <a14:hiddenFill xmlns:a14="http://schemas.microsoft.com/office/drawing/2010/main">
-                <a:solidFill>
-                  <a:srgbClr val="FFFFFF"/>
-                </a:solidFill>
-              </a14:hiddenFill>
-            </a:ext>
-            <a:ext uri="{91240B29-F687-4F45-9708-019B960494DF}">
-              <a14:hiddenLine xmlns:a14="http://schemas.microsoft.com/office/drawing/2010/main" w="9525">
-                <a:solidFill>
-                  <a:srgbClr val="000000"/>
-                </a:solidFill>
-                <a:miter lim="800000"/>
-                <a:headEnd/>
-                <a:tailEnd/>
-              </a14:hiddenLine>
-            </a:ext>
-          </a:extLst>
-        </p:spPr>
-      </p:pic>
-      <p:sp>
-        <p:nvSpPr>
-          <p:cNvPr id="39" name="TextBox 16">
-            <a:extLst>
-              <a:ext uri="{FF2B5EF4-FFF2-40B4-BE49-F238E27FC236}">
-                <a16:creationId xmlns:a16="http://schemas.microsoft.com/office/drawing/2014/main" id="{F10A9681-CCD9-4D4E-86BC-5A635C0D3A0B}"/>
-              </a:ext>
-            </a:extLst>
-          </p:cNvPr>
-          <p:cNvSpPr txBox="1">
-            <a:spLocks noChangeArrowheads="1"/>
-          </p:cNvSpPr>
-          <p:nvPr/>
-        </p:nvSpPr>
-        <p:spPr bwMode="auto">
-          <a:xfrm>
-            <a:off x="9601185" y="2995147"/>
-            <a:ext cx="868155" cy="261610"/>
-          </a:xfrm>
-          <a:prstGeom prst="rect">
-            <a:avLst/>
-          </a:prstGeom>
-          <a:noFill/>
-          <a:ln>
-            <a:noFill/>
-          </a:ln>
-          <a:extLst>
-            <a:ext uri="{909E8E84-426E-40DD-AFC4-6F175D3DCCD1}">
-              <a14:hiddenFill xmlns:a14="http://schemas.microsoft.com/office/drawing/2010/main">
-                <a:solidFill>
-                  <a:srgbClr val="FFFFFF"/>
-                </a:solidFill>
-              </a14:hiddenFill>
-            </a:ext>
-            <a:ext uri="{91240B29-F687-4F45-9708-019B960494DF}">
-              <a14:hiddenLine xmlns:a14="http://schemas.microsoft.com/office/drawing/2010/main" w="9525">
-                <a:solidFill>
-                  <a:srgbClr val="000000"/>
-                </a:solidFill>
-                <a:miter lim="800000"/>
-                <a:headEnd/>
-                <a:tailEnd/>
-              </a14:hiddenLine>
-            </a:ext>
-          </a:extLst>
-        </p:spPr>
-        <p:txBody>
-          <a:bodyPr wrap="square" lIns="0" rIns="0">
-            <a:spAutoFit/>
-          </a:bodyPr>
-          <a:lstStyle>
-            <a:lvl1pPr>
-              <a:defRPr>
-                <a:solidFill>
-                  <a:schemeClr val="tx1"/>
-                </a:solidFill>
-                <a:latin typeface="Calibri" panose="020F0502020204030204" pitchFamily="34" charset="0"/>
-              </a:defRPr>
-            </a:lvl1pPr>
-            <a:lvl2pPr marL="742950" indent="-285750">
-              <a:defRPr>
-                <a:solidFill>
-                  <a:schemeClr val="tx1"/>
-                </a:solidFill>
-                <a:latin typeface="Calibri" panose="020F0502020204030204" pitchFamily="34" charset="0"/>
-              </a:defRPr>
-            </a:lvl2pPr>
-            <a:lvl3pPr marL="1143000" indent="-228600">
-              <a:defRPr>
-                <a:solidFill>
-                  <a:schemeClr val="tx1"/>
-                </a:solidFill>
-                <a:latin typeface="Calibri" panose="020F0502020204030204" pitchFamily="34" charset="0"/>
-              </a:defRPr>
-            </a:lvl3pPr>
-            <a:lvl4pPr marL="1600200" indent="-228600">
-              <a:defRPr>
-                <a:solidFill>
-                  <a:schemeClr val="tx1"/>
-                </a:solidFill>
-                <a:latin typeface="Calibri" panose="020F0502020204030204" pitchFamily="34" charset="0"/>
-              </a:defRPr>
-            </a:lvl4pPr>
-            <a:lvl5pPr marL="2057400" indent="-228600">
-              <a:defRPr>
-                <a:solidFill>
-                  <a:schemeClr val="tx1"/>
-                </a:solidFill>
-                <a:latin typeface="Calibri" panose="020F0502020204030204" pitchFamily="34" charset="0"/>
-              </a:defRPr>
-            </a:lvl5pPr>
-            <a:lvl6pPr marL="2514600" indent="-228600" eaLnBrk="0" fontAlgn="base" hangingPunct="0">
-              <a:spcBef>
-                <a:spcPct val="0"/>
-              </a:spcBef>
-              <a:spcAft>
-                <a:spcPct val="0"/>
-              </a:spcAft>
-              <a:defRPr>
-                <a:solidFill>
-                  <a:schemeClr val="tx1"/>
-                </a:solidFill>
-                <a:latin typeface="Calibri" panose="020F0502020204030204" pitchFamily="34" charset="0"/>
-              </a:defRPr>
-            </a:lvl6pPr>
-            <a:lvl7pPr marL="2971800" indent="-228600" eaLnBrk="0" fontAlgn="base" hangingPunct="0">
-              <a:spcBef>
-                <a:spcPct val="0"/>
-              </a:spcBef>
-              <a:spcAft>
-                <a:spcPct val="0"/>
-              </a:spcAft>
-              <a:defRPr>
-                <a:solidFill>
-                  <a:schemeClr val="tx1"/>
-                </a:solidFill>
-                <a:latin typeface="Calibri" panose="020F0502020204030204" pitchFamily="34" charset="0"/>
-              </a:defRPr>
-            </a:lvl7pPr>
-            <a:lvl8pPr marL="3429000" indent="-228600" eaLnBrk="0" fontAlgn="base" hangingPunct="0">
-              <a:spcBef>
-                <a:spcPct val="0"/>
-              </a:spcBef>
-              <a:spcAft>
-                <a:spcPct val="0"/>
-              </a:spcAft>
-              <a:defRPr>
-                <a:solidFill>
-                  <a:schemeClr val="tx1"/>
-                </a:solidFill>
-                <a:latin typeface="Calibri" panose="020F0502020204030204" pitchFamily="34" charset="0"/>
-              </a:defRPr>
-            </a:lvl8pPr>
-            <a:lvl9pPr marL="3886200" indent="-228600" eaLnBrk="0" fontAlgn="base" hangingPunct="0">
-              <a:spcBef>
-                <a:spcPct val="0"/>
-              </a:spcBef>
-              <a:spcAft>
-                <a:spcPct val="0"/>
-              </a:spcAft>
-              <a:defRPr>
-                <a:solidFill>
-                  <a:schemeClr val="tx1"/>
-                </a:solidFill>
-                <a:latin typeface="Calibri" panose="020F0502020204030204" pitchFamily="34" charset="0"/>
-              </a:defRPr>
-            </a:lvl9pPr>
-          </a:lstStyle>
-          <a:p>
-            <a:pPr algn="ctr" eaLnBrk="1" hangingPunct="1"/>
-            <a:r>
-              <a:rPr lang="en-US" altLang="en-US" sz="1100" dirty="0">
-                <a:latin typeface="Arial" panose="020B0604020202020204" pitchFamily="34" charset="0"/>
-                <a:ea typeface="Amazon Ember" panose="020B0603020204020204" pitchFamily="34" charset="0"/>
-                <a:cs typeface="Arial" panose="020B0604020202020204" pitchFamily="34" charset="0"/>
-              </a:rPr>
-              <a:t>Elastigroup</a:t>
-            </a:r>
+              <a:t>Elastigroup instances</a:t>
+            </a:r>
+            <a:endParaRPr lang="en-US" altLang="en-US" sz="1100" dirty="0">
+              <a:latin typeface="Arial" panose="020B0604020202020204" pitchFamily="34" charset="0"/>
+              <a:ea typeface="Amazon Ember" panose="020B0603020204020204" pitchFamily="34" charset="0"/>
+              <a:cs typeface="Arial" panose="020B0604020202020204" pitchFamily="34" charset="0"/>
+            </a:endParaRPr>
           </a:p>
         </p:txBody>
       </p:sp>

</xml_diff>

<commit_message>
TW edits for diagram, links
</commit_message>
<xml_diff>
--- a/docs/deployment_guide/images/elastigroup-quickstart-architecture-diagram.pptx
+++ b/docs/deployment_guide/images/elastigroup-quickstart-architecture-diagram.pptx
@@ -5,7 +5,7 @@
     <p:sldMasterId id="2147483660" r:id="rId1"/>
   </p:sldMasterIdLst>
   <p:sldIdLst>
-    <p:sldId id="257" r:id="rId2"/>
+    <p:sldId id="259" r:id="rId2"/>
   </p:sldIdLst>
   <p:sldSz cx="16459200" cy="14630400"/>
   <p:notesSz cx="6858000" cy="9144000"/>
@@ -243,7 +243,7 @@
           <a:p>
             <a:fld id="{459B9FD8-0105-4AD8-AA20-CD088C77F3CC}" type="datetimeFigureOut">
               <a:rPr lang="en-US" smtClean="0"/>
-              <a:t>12/13/2022</a:t>
+              <a:t>12/19/2022</a:t>
             </a:fld>
             <a:endParaRPr lang="en-US"/>
           </a:p>
@@ -413,7 +413,7 @@
           <a:p>
             <a:fld id="{459B9FD8-0105-4AD8-AA20-CD088C77F3CC}" type="datetimeFigureOut">
               <a:rPr lang="en-US" smtClean="0"/>
-              <a:t>12/13/2022</a:t>
+              <a:t>12/19/2022</a:t>
             </a:fld>
             <a:endParaRPr lang="en-US"/>
           </a:p>
@@ -593,7 +593,7 @@
           <a:p>
             <a:fld id="{459B9FD8-0105-4AD8-AA20-CD088C77F3CC}" type="datetimeFigureOut">
               <a:rPr lang="en-US" smtClean="0"/>
-              <a:t>12/13/2022</a:t>
+              <a:t>12/19/2022</a:t>
             </a:fld>
             <a:endParaRPr lang="en-US"/>
           </a:p>
@@ -763,7 +763,7 @@
           <a:p>
             <a:fld id="{459B9FD8-0105-4AD8-AA20-CD088C77F3CC}" type="datetimeFigureOut">
               <a:rPr lang="en-US" smtClean="0"/>
-              <a:t>12/13/2022</a:t>
+              <a:t>12/19/2022</a:t>
             </a:fld>
             <a:endParaRPr lang="en-US"/>
           </a:p>
@@ -1007,7 +1007,7 @@
           <a:p>
             <a:fld id="{459B9FD8-0105-4AD8-AA20-CD088C77F3CC}" type="datetimeFigureOut">
               <a:rPr lang="en-US" smtClean="0"/>
-              <a:t>12/13/2022</a:t>
+              <a:t>12/19/2022</a:t>
             </a:fld>
             <a:endParaRPr lang="en-US"/>
           </a:p>
@@ -1239,7 +1239,7 @@
           <a:p>
             <a:fld id="{459B9FD8-0105-4AD8-AA20-CD088C77F3CC}" type="datetimeFigureOut">
               <a:rPr lang="en-US" smtClean="0"/>
-              <a:t>12/13/2022</a:t>
+              <a:t>12/19/2022</a:t>
             </a:fld>
             <a:endParaRPr lang="en-US"/>
           </a:p>
@@ -1606,7 +1606,7 @@
           <a:p>
             <a:fld id="{459B9FD8-0105-4AD8-AA20-CD088C77F3CC}" type="datetimeFigureOut">
               <a:rPr lang="en-US" smtClean="0"/>
-              <a:t>12/13/2022</a:t>
+              <a:t>12/19/2022</a:t>
             </a:fld>
             <a:endParaRPr lang="en-US"/>
           </a:p>
@@ -1724,7 +1724,7 @@
           <a:p>
             <a:fld id="{459B9FD8-0105-4AD8-AA20-CD088C77F3CC}" type="datetimeFigureOut">
               <a:rPr lang="en-US" smtClean="0"/>
-              <a:t>12/13/2022</a:t>
+              <a:t>12/19/2022</a:t>
             </a:fld>
             <a:endParaRPr lang="en-US"/>
           </a:p>
@@ -1819,7 +1819,7 @@
           <a:p>
             <a:fld id="{459B9FD8-0105-4AD8-AA20-CD088C77F3CC}" type="datetimeFigureOut">
               <a:rPr lang="en-US" smtClean="0"/>
-              <a:t>12/13/2022</a:t>
+              <a:t>12/19/2022</a:t>
             </a:fld>
             <a:endParaRPr lang="en-US"/>
           </a:p>
@@ -2096,7 +2096,7 @@
           <a:p>
             <a:fld id="{459B9FD8-0105-4AD8-AA20-CD088C77F3CC}" type="datetimeFigureOut">
               <a:rPr lang="en-US" smtClean="0"/>
-              <a:t>12/13/2022</a:t>
+              <a:t>12/19/2022</a:t>
             </a:fld>
             <a:endParaRPr lang="en-US"/>
           </a:p>
@@ -2353,7 +2353,7 @@
           <a:p>
             <a:fld id="{459B9FD8-0105-4AD8-AA20-CD088C77F3CC}" type="datetimeFigureOut">
               <a:rPr lang="en-US" smtClean="0"/>
-              <a:t>12/13/2022</a:t>
+              <a:t>12/19/2022</a:t>
             </a:fld>
             <a:endParaRPr lang="en-US"/>
           </a:p>
@@ -2566,7 +2566,7 @@
           <a:p>
             <a:fld id="{459B9FD8-0105-4AD8-AA20-CD088C77F3CC}" type="datetimeFigureOut">
               <a:rPr lang="en-US" smtClean="0"/>
-              <a:t>12/13/2022</a:t>
+              <a:t>12/19/2022</a:t>
             </a:fld>
             <a:endParaRPr lang="en-US"/>
           </a:p>
@@ -3183,78 +3183,6 @@
       </p:pic>
       <p:sp>
         <p:nvSpPr>
-          <p:cNvPr id="6" name="Rectangle 5">
-            <a:extLst>
-              <a:ext uri="{FF2B5EF4-FFF2-40B4-BE49-F238E27FC236}">
-                <a16:creationId xmlns:a16="http://schemas.microsoft.com/office/drawing/2014/main" id="{4947850A-9BCA-44D6-B497-3F42B679D7D4}"/>
-              </a:ext>
-            </a:extLst>
-          </p:cNvPr>
-          <p:cNvSpPr/>
-          <p:nvPr/>
-        </p:nvSpPr>
-        <p:spPr>
-          <a:xfrm>
-            <a:off x="2926080" y="1920240"/>
-            <a:ext cx="1554480" cy="1554480"/>
-          </a:xfrm>
-          <a:prstGeom prst="rect">
-            <a:avLst/>
-          </a:prstGeom>
-          <a:solidFill>
-            <a:srgbClr val="1D8900">
-              <a:alpha val="9804"/>
-            </a:srgbClr>
-          </a:solidFill>
-          <a:ln w="12700">
-            <a:noFill/>
-            <a:prstDash val="dash"/>
-          </a:ln>
-        </p:spPr>
-        <p:style>
-          <a:lnRef idx="2">
-            <a:schemeClr val="accent1">
-              <a:shade val="50000"/>
-            </a:schemeClr>
-          </a:lnRef>
-          <a:fillRef idx="1">
-            <a:schemeClr val="accent1"/>
-          </a:fillRef>
-          <a:effectRef idx="0">
-            <a:schemeClr val="accent1"/>
-          </a:effectRef>
-          <a:fontRef idx="minor">
-            <a:schemeClr val="lt1"/>
-          </a:fontRef>
-        </p:style>
-        <p:txBody>
-          <a:bodyPr lIns="502920"/>
-          <a:lstStyle/>
-          <a:p>
-            <a:pPr eaLnBrk="1" fontAlgn="auto" hangingPunct="1">
-              <a:spcBef>
-                <a:spcPts val="0"/>
-              </a:spcBef>
-              <a:spcAft>
-                <a:spcPts val="0"/>
-              </a:spcAft>
-              <a:defRPr/>
-            </a:pPr>
-            <a:r>
-              <a:rPr lang="en-US" sz="1200" dirty="0">
-                <a:solidFill>
-                  <a:srgbClr val="1E8900"/>
-                </a:solidFill>
-                <a:latin typeface="Arial" panose="020B0604020202020204" pitchFamily="34" charset="0"/>
-                <a:cs typeface="Arial" panose="020B0604020202020204" pitchFamily="34" charset="0"/>
-              </a:rPr>
-              <a:t>Public subnet</a:t>
-            </a:r>
-          </a:p>
-        </p:txBody>
-      </p:sp>
-      <p:sp>
-        <p:nvSpPr>
           <p:cNvPr id="5" name="Rectangle 4">
             <a:extLst>
               <a:ext uri="{FF2B5EF4-FFF2-40B4-BE49-F238E27FC236}">
@@ -3320,268 +3248,6 @@
               </a:rPr>
               <a:t>Availability Zone 1</a:t>
             </a:r>
-          </a:p>
-        </p:txBody>
-      </p:sp>
-      <p:pic>
-        <p:nvPicPr>
-          <p:cNvPr id="8" name="Graphic 7">
-            <a:extLst>
-              <a:ext uri="{FF2B5EF4-FFF2-40B4-BE49-F238E27FC236}">
-                <a16:creationId xmlns:a16="http://schemas.microsoft.com/office/drawing/2014/main" id="{238A2971-27EC-4C95-8FC9-CD090F6BAF22}"/>
-              </a:ext>
-            </a:extLst>
-          </p:cNvPr>
-          <p:cNvPicPr>
-            <a:picLocks noChangeAspect="1"/>
-          </p:cNvPicPr>
-          <p:nvPr/>
-        </p:nvPicPr>
-        <p:blipFill>
-          <a:blip r:embed="rId6">
-            <a:extLst>
-              <a:ext uri="{96DAC541-7B7A-43D3-8B79-37D633B846F1}">
-                <asvg:svgBlip xmlns:asvg="http://schemas.microsoft.com/office/drawing/2016/SVG/main" r:embed="rId7"/>
-              </a:ext>
-            </a:extLst>
-          </a:blip>
-          <a:stretch>
-            <a:fillRect/>
-          </a:stretch>
-        </p:blipFill>
-        <p:spPr>
-          <a:xfrm>
-            <a:off x="2926080" y="1921870"/>
-            <a:ext cx="381000" cy="381000"/>
-          </a:xfrm>
-          <a:prstGeom prst="rect">
-            <a:avLst/>
-          </a:prstGeom>
-        </p:spPr>
-      </p:pic>
-      <p:pic>
-        <p:nvPicPr>
-          <p:cNvPr id="11" name="Graphic 60">
-            <a:extLst>
-              <a:ext uri="{FF2B5EF4-FFF2-40B4-BE49-F238E27FC236}">
-                <a16:creationId xmlns:a16="http://schemas.microsoft.com/office/drawing/2014/main" id="{3FC9B616-D57D-4A09-8660-13721AA1B83A}"/>
-              </a:ext>
-            </a:extLst>
-          </p:cNvPr>
-          <p:cNvPicPr>
-            <a:picLocks noChangeAspect="1" noChangeArrowheads="1"/>
-          </p:cNvPicPr>
-          <p:nvPr/>
-        </p:nvPicPr>
-        <p:blipFill>
-          <a:blip r:embed="rId8">
-            <a:extLst>
-              <a:ext uri="{28A0092B-C50C-407E-A947-70E740481C1C}">
-                <a14:useLocalDpi xmlns:a14="http://schemas.microsoft.com/office/drawing/2010/main" val="0"/>
-              </a:ext>
-            </a:extLst>
-          </a:blip>
-          <a:srcRect/>
-          <a:stretch>
-            <a:fillRect/>
-          </a:stretch>
-        </p:blipFill>
-        <p:spPr bwMode="auto">
-          <a:xfrm>
-            <a:off x="3474720" y="2377440"/>
-            <a:ext cx="457200" cy="457200"/>
-          </a:xfrm>
-          <a:prstGeom prst="rect">
-            <a:avLst/>
-          </a:prstGeom>
-          <a:noFill/>
-          <a:ln>
-            <a:noFill/>
-          </a:ln>
-          <a:extLst>
-            <a:ext uri="{909E8E84-426E-40DD-AFC4-6F175D3DCCD1}">
-              <a14:hiddenFill xmlns:a14="http://schemas.microsoft.com/office/drawing/2010/main">
-                <a:solidFill>
-                  <a:srgbClr val="FFFFFF"/>
-                </a:solidFill>
-              </a14:hiddenFill>
-            </a:ext>
-            <a:ext uri="{91240B29-F687-4F45-9708-019B960494DF}">
-              <a14:hiddenLine xmlns:a14="http://schemas.microsoft.com/office/drawing/2010/main" w="9525">
-                <a:solidFill>
-                  <a:srgbClr val="000000"/>
-                </a:solidFill>
-                <a:miter lim="800000"/>
-                <a:headEnd/>
-                <a:tailEnd/>
-              </a14:hiddenLine>
-            </a:ext>
-          </a:extLst>
-        </p:spPr>
-      </p:pic>
-      <p:sp>
-        <p:nvSpPr>
-          <p:cNvPr id="12" name="TextBox 16">
-            <a:extLst>
-              <a:ext uri="{FF2B5EF4-FFF2-40B4-BE49-F238E27FC236}">
-                <a16:creationId xmlns:a16="http://schemas.microsoft.com/office/drawing/2014/main" id="{5A59E1F8-1276-45C8-96EC-D0994B1669F7}"/>
-              </a:ext>
-            </a:extLst>
-          </p:cNvPr>
-          <p:cNvSpPr txBox="1">
-            <a:spLocks noChangeArrowheads="1"/>
-          </p:cNvSpPr>
-          <p:nvPr/>
-        </p:nvSpPr>
-        <p:spPr bwMode="auto">
-          <a:xfrm>
-            <a:off x="3291840" y="2834640"/>
-            <a:ext cx="868155" cy="430887"/>
-          </a:xfrm>
-          <a:prstGeom prst="rect">
-            <a:avLst/>
-          </a:prstGeom>
-          <a:noFill/>
-          <a:ln>
-            <a:noFill/>
-          </a:ln>
-          <a:extLst>
-            <a:ext uri="{909E8E84-426E-40DD-AFC4-6F175D3DCCD1}">
-              <a14:hiddenFill xmlns:a14="http://schemas.microsoft.com/office/drawing/2010/main">
-                <a:solidFill>
-                  <a:srgbClr val="FFFFFF"/>
-                </a:solidFill>
-              </a14:hiddenFill>
-            </a:ext>
-            <a:ext uri="{91240B29-F687-4F45-9708-019B960494DF}">
-              <a14:hiddenLine xmlns:a14="http://schemas.microsoft.com/office/drawing/2010/main" w="9525">
-                <a:solidFill>
-                  <a:srgbClr val="000000"/>
-                </a:solidFill>
-                <a:miter lim="800000"/>
-                <a:headEnd/>
-                <a:tailEnd/>
-              </a14:hiddenLine>
-            </a:ext>
-          </a:extLst>
-        </p:spPr>
-        <p:txBody>
-          <a:bodyPr wrap="square" lIns="0" rIns="0">
-            <a:spAutoFit/>
-          </a:bodyPr>
-          <a:lstStyle>
-            <a:lvl1pPr>
-              <a:defRPr>
-                <a:solidFill>
-                  <a:schemeClr val="tx1"/>
-                </a:solidFill>
-                <a:latin typeface="Calibri" panose="020F0502020204030204" pitchFamily="34" charset="0"/>
-              </a:defRPr>
-            </a:lvl1pPr>
-            <a:lvl2pPr marL="742950" indent="-285750">
-              <a:defRPr>
-                <a:solidFill>
-                  <a:schemeClr val="tx1"/>
-                </a:solidFill>
-                <a:latin typeface="Calibri" panose="020F0502020204030204" pitchFamily="34" charset="0"/>
-              </a:defRPr>
-            </a:lvl2pPr>
-            <a:lvl3pPr marL="1143000" indent="-228600">
-              <a:defRPr>
-                <a:solidFill>
-                  <a:schemeClr val="tx1"/>
-                </a:solidFill>
-                <a:latin typeface="Calibri" panose="020F0502020204030204" pitchFamily="34" charset="0"/>
-              </a:defRPr>
-            </a:lvl3pPr>
-            <a:lvl4pPr marL="1600200" indent="-228600">
-              <a:defRPr>
-                <a:solidFill>
-                  <a:schemeClr val="tx1"/>
-                </a:solidFill>
-                <a:latin typeface="Calibri" panose="020F0502020204030204" pitchFamily="34" charset="0"/>
-              </a:defRPr>
-            </a:lvl4pPr>
-            <a:lvl5pPr marL="2057400" indent="-228600">
-              <a:defRPr>
-                <a:solidFill>
-                  <a:schemeClr val="tx1"/>
-                </a:solidFill>
-                <a:latin typeface="Calibri" panose="020F0502020204030204" pitchFamily="34" charset="0"/>
-              </a:defRPr>
-            </a:lvl5pPr>
-            <a:lvl6pPr marL="2514600" indent="-228600" eaLnBrk="0" fontAlgn="base" hangingPunct="0">
-              <a:spcBef>
-                <a:spcPct val="0"/>
-              </a:spcBef>
-              <a:spcAft>
-                <a:spcPct val="0"/>
-              </a:spcAft>
-              <a:defRPr>
-                <a:solidFill>
-                  <a:schemeClr val="tx1"/>
-                </a:solidFill>
-                <a:latin typeface="Calibri" panose="020F0502020204030204" pitchFamily="34" charset="0"/>
-              </a:defRPr>
-            </a:lvl6pPr>
-            <a:lvl7pPr marL="2971800" indent="-228600" eaLnBrk="0" fontAlgn="base" hangingPunct="0">
-              <a:spcBef>
-                <a:spcPct val="0"/>
-              </a:spcBef>
-              <a:spcAft>
-                <a:spcPct val="0"/>
-              </a:spcAft>
-              <a:defRPr>
-                <a:solidFill>
-                  <a:schemeClr val="tx1"/>
-                </a:solidFill>
-                <a:latin typeface="Calibri" panose="020F0502020204030204" pitchFamily="34" charset="0"/>
-              </a:defRPr>
-            </a:lvl7pPr>
-            <a:lvl8pPr marL="3429000" indent="-228600" eaLnBrk="0" fontAlgn="base" hangingPunct="0">
-              <a:spcBef>
-                <a:spcPct val="0"/>
-              </a:spcBef>
-              <a:spcAft>
-                <a:spcPct val="0"/>
-              </a:spcAft>
-              <a:defRPr>
-                <a:solidFill>
-                  <a:schemeClr val="tx1"/>
-                </a:solidFill>
-                <a:latin typeface="Calibri" panose="020F0502020204030204" pitchFamily="34" charset="0"/>
-              </a:defRPr>
-            </a:lvl8pPr>
-            <a:lvl9pPr marL="3886200" indent="-228600" eaLnBrk="0" fontAlgn="base" hangingPunct="0">
-              <a:spcBef>
-                <a:spcPct val="0"/>
-              </a:spcBef>
-              <a:spcAft>
-                <a:spcPct val="0"/>
-              </a:spcAft>
-              <a:defRPr>
-                <a:solidFill>
-                  <a:schemeClr val="tx1"/>
-                </a:solidFill>
-                <a:latin typeface="Calibri" panose="020F0502020204030204" pitchFamily="34" charset="0"/>
-              </a:defRPr>
-            </a:lvl9pPr>
-          </a:lstStyle>
-          <a:p>
-            <a:pPr algn="ctr" eaLnBrk="1" hangingPunct="1"/>
-            <a:r>
-              <a:rPr lang="en-US" altLang="en-US" sz="1100">
-                <a:latin typeface="Arial" panose="020B0604020202020204" pitchFamily="34" charset="0"/>
-                <a:ea typeface="Amazon Ember" panose="020B0603020204020204" pitchFamily="34" charset="0"/>
-                <a:cs typeface="Arial" panose="020B0604020202020204" pitchFamily="34" charset="0"/>
-              </a:rPr>
-              <a:t>Elastigroup instances</a:t>
-            </a:r>
-            <a:endParaRPr lang="en-US" altLang="en-US" sz="1100" dirty="0">
-              <a:latin typeface="Arial" panose="020B0604020202020204" pitchFamily="34" charset="0"/>
-              <a:ea typeface="Amazon Ember" panose="020B0603020204020204" pitchFamily="34" charset="0"/>
-              <a:cs typeface="Arial" panose="020B0604020202020204" pitchFamily="34" charset="0"/>
-            </a:endParaRPr>
           </a:p>
         </p:txBody>
       </p:sp>
@@ -3776,7 +3442,7 @@
           <p:nvPr/>
         </p:nvPicPr>
         <p:blipFill>
-          <a:blip r:embed="rId9">
+          <a:blip r:embed="rId6">
             <a:extLst>
               <a:ext uri="{28A0092B-C50C-407E-A947-70E740481C1C}">
                 <a14:useLocalDpi xmlns:a14="http://schemas.microsoft.com/office/drawing/2010/main" val="0"/>
@@ -3823,78 +3489,6 @@
       </p:pic>
       <p:sp>
         <p:nvSpPr>
-          <p:cNvPr id="50" name="Rectangle 49">
-            <a:extLst>
-              <a:ext uri="{FF2B5EF4-FFF2-40B4-BE49-F238E27FC236}">
-                <a16:creationId xmlns:a16="http://schemas.microsoft.com/office/drawing/2014/main" id="{6800CC7D-46C3-4D78-B240-9808EF2C31D1}"/>
-              </a:ext>
-            </a:extLst>
-          </p:cNvPr>
-          <p:cNvSpPr/>
-          <p:nvPr/>
-        </p:nvSpPr>
-        <p:spPr>
-          <a:xfrm>
-            <a:off x="4846320" y="1920240"/>
-            <a:ext cx="1554480" cy="1500877"/>
-          </a:xfrm>
-          <a:prstGeom prst="rect">
-            <a:avLst/>
-          </a:prstGeom>
-          <a:solidFill>
-            <a:srgbClr val="1D8900">
-              <a:alpha val="9804"/>
-            </a:srgbClr>
-          </a:solidFill>
-          <a:ln w="12700">
-            <a:noFill/>
-            <a:prstDash val="dash"/>
-          </a:ln>
-        </p:spPr>
-        <p:style>
-          <a:lnRef idx="2">
-            <a:schemeClr val="accent1">
-              <a:shade val="50000"/>
-            </a:schemeClr>
-          </a:lnRef>
-          <a:fillRef idx="1">
-            <a:schemeClr val="accent1"/>
-          </a:fillRef>
-          <a:effectRef idx="0">
-            <a:schemeClr val="accent1"/>
-          </a:effectRef>
-          <a:fontRef idx="minor">
-            <a:schemeClr val="lt1"/>
-          </a:fontRef>
-        </p:style>
-        <p:txBody>
-          <a:bodyPr lIns="502920"/>
-          <a:lstStyle/>
-          <a:p>
-            <a:pPr eaLnBrk="1" fontAlgn="auto" hangingPunct="1">
-              <a:spcBef>
-                <a:spcPts val="0"/>
-              </a:spcBef>
-              <a:spcAft>
-                <a:spcPts val="0"/>
-              </a:spcAft>
-              <a:defRPr/>
-            </a:pPr>
-            <a:r>
-              <a:rPr lang="en-US" sz="1200" dirty="0">
-                <a:solidFill>
-                  <a:srgbClr val="1E8900"/>
-                </a:solidFill>
-                <a:latin typeface="Arial" panose="020B0604020202020204" pitchFamily="34" charset="0"/>
-                <a:cs typeface="Arial" panose="020B0604020202020204" pitchFamily="34" charset="0"/>
-              </a:rPr>
-              <a:t>Public subnet</a:t>
-            </a:r>
-          </a:p>
-        </p:txBody>
-      </p:sp>
-      <p:sp>
-        <p:nvSpPr>
           <p:cNvPr id="51" name="Rectangle 50">
             <a:extLst>
               <a:ext uri="{FF2B5EF4-FFF2-40B4-BE49-F238E27FC236}">
@@ -3980,340 +3574,6 @@
           </a:p>
         </p:txBody>
       </p:sp>
-      <p:pic>
-        <p:nvPicPr>
-          <p:cNvPr id="52" name="Graphic 51">
-            <a:extLst>
-              <a:ext uri="{FF2B5EF4-FFF2-40B4-BE49-F238E27FC236}">
-                <a16:creationId xmlns:a16="http://schemas.microsoft.com/office/drawing/2014/main" id="{C4EED5CD-2604-4C3B-9E7C-4C59827B49CF}"/>
-              </a:ext>
-            </a:extLst>
-          </p:cNvPr>
-          <p:cNvPicPr>
-            <a:picLocks noChangeAspect="1"/>
-          </p:cNvPicPr>
-          <p:nvPr/>
-        </p:nvPicPr>
-        <p:blipFill>
-          <a:blip r:embed="rId6">
-            <a:extLst>
-              <a:ext uri="{96DAC541-7B7A-43D3-8B79-37D633B846F1}">
-                <asvg:svgBlip xmlns:asvg="http://schemas.microsoft.com/office/drawing/2016/SVG/main" r:embed="rId7"/>
-              </a:ext>
-            </a:extLst>
-          </a:blip>
-          <a:stretch>
-            <a:fillRect/>
-          </a:stretch>
-        </p:blipFill>
-        <p:spPr>
-          <a:xfrm>
-            <a:off x="4846320" y="1920240"/>
-            <a:ext cx="381000" cy="367862"/>
-          </a:xfrm>
-          <a:prstGeom prst="rect">
-            <a:avLst/>
-          </a:prstGeom>
-        </p:spPr>
-      </p:pic>
-      <p:pic>
-        <p:nvPicPr>
-          <p:cNvPr id="53" name="Graphic 60">
-            <a:extLst>
-              <a:ext uri="{FF2B5EF4-FFF2-40B4-BE49-F238E27FC236}">
-                <a16:creationId xmlns:a16="http://schemas.microsoft.com/office/drawing/2014/main" id="{FEE0B55D-2DAE-4C6E-AC34-7DA9D6AC0782}"/>
-              </a:ext>
-            </a:extLst>
-          </p:cNvPr>
-          <p:cNvPicPr>
-            <a:picLocks noChangeAspect="1" noChangeArrowheads="1"/>
-          </p:cNvPicPr>
-          <p:nvPr/>
-        </p:nvPicPr>
-        <p:blipFill>
-          <a:blip r:embed="rId8">
-            <a:extLst>
-              <a:ext uri="{28A0092B-C50C-407E-A947-70E740481C1C}">
-                <a14:useLocalDpi xmlns:a14="http://schemas.microsoft.com/office/drawing/2010/main" val="0"/>
-              </a:ext>
-            </a:extLst>
-          </a:blip>
-          <a:srcRect/>
-          <a:stretch>
-            <a:fillRect/>
-          </a:stretch>
-        </p:blipFill>
-        <p:spPr bwMode="auto">
-          <a:xfrm>
-            <a:off x="5394960" y="2377440"/>
-            <a:ext cx="457200" cy="441434"/>
-          </a:xfrm>
-          <a:prstGeom prst="rect">
-            <a:avLst/>
-          </a:prstGeom>
-          <a:noFill/>
-          <a:ln>
-            <a:noFill/>
-          </a:ln>
-          <a:extLst>
-            <a:ext uri="{909E8E84-426E-40DD-AFC4-6F175D3DCCD1}">
-              <a14:hiddenFill xmlns:a14="http://schemas.microsoft.com/office/drawing/2010/main">
-                <a:solidFill>
-                  <a:srgbClr val="FFFFFF"/>
-                </a:solidFill>
-              </a14:hiddenFill>
-            </a:ext>
-            <a:ext uri="{91240B29-F687-4F45-9708-019B960494DF}">
-              <a14:hiddenLine xmlns:a14="http://schemas.microsoft.com/office/drawing/2010/main" w="9525">
-                <a:solidFill>
-                  <a:srgbClr val="000000"/>
-                </a:solidFill>
-                <a:miter lim="800000"/>
-                <a:headEnd/>
-                <a:tailEnd/>
-              </a14:hiddenLine>
-            </a:ext>
-          </a:extLst>
-        </p:spPr>
-      </p:pic>
-      <p:sp>
-        <p:nvSpPr>
-          <p:cNvPr id="54" name="TextBox 16">
-            <a:extLst>
-              <a:ext uri="{FF2B5EF4-FFF2-40B4-BE49-F238E27FC236}">
-                <a16:creationId xmlns:a16="http://schemas.microsoft.com/office/drawing/2014/main" id="{A4964EEA-C524-46EC-A196-F8C28F63AE47}"/>
-              </a:ext>
-            </a:extLst>
-          </p:cNvPr>
-          <p:cNvSpPr txBox="1">
-            <a:spLocks noChangeArrowheads="1"/>
-          </p:cNvSpPr>
-          <p:nvPr/>
-        </p:nvSpPr>
-        <p:spPr bwMode="auto">
-          <a:xfrm>
-            <a:off x="5212080" y="2834640"/>
-            <a:ext cx="868155" cy="416029"/>
-          </a:xfrm>
-          <a:prstGeom prst="rect">
-            <a:avLst/>
-          </a:prstGeom>
-          <a:noFill/>
-          <a:ln>
-            <a:noFill/>
-          </a:ln>
-          <a:extLst>
-            <a:ext uri="{909E8E84-426E-40DD-AFC4-6F175D3DCCD1}">
-              <a14:hiddenFill xmlns:a14="http://schemas.microsoft.com/office/drawing/2010/main">
-                <a:solidFill>
-                  <a:srgbClr val="FFFFFF"/>
-                </a:solidFill>
-              </a14:hiddenFill>
-            </a:ext>
-            <a:ext uri="{91240B29-F687-4F45-9708-019B960494DF}">
-              <a14:hiddenLine xmlns:a14="http://schemas.microsoft.com/office/drawing/2010/main" w="9525">
-                <a:solidFill>
-                  <a:srgbClr val="000000"/>
-                </a:solidFill>
-                <a:miter lim="800000"/>
-                <a:headEnd/>
-                <a:tailEnd/>
-              </a14:hiddenLine>
-            </a:ext>
-          </a:extLst>
-        </p:spPr>
-        <p:txBody>
-          <a:bodyPr wrap="square" lIns="0" rIns="0">
-            <a:spAutoFit/>
-          </a:bodyPr>
-          <a:lstStyle>
-            <a:lvl1pPr>
-              <a:defRPr>
-                <a:solidFill>
-                  <a:schemeClr val="tx1"/>
-                </a:solidFill>
-                <a:latin typeface="Calibri" panose="020F0502020204030204" pitchFamily="34" charset="0"/>
-              </a:defRPr>
-            </a:lvl1pPr>
-            <a:lvl2pPr marL="742950" indent="-285750">
-              <a:defRPr>
-                <a:solidFill>
-                  <a:schemeClr val="tx1"/>
-                </a:solidFill>
-                <a:latin typeface="Calibri" panose="020F0502020204030204" pitchFamily="34" charset="0"/>
-              </a:defRPr>
-            </a:lvl2pPr>
-            <a:lvl3pPr marL="1143000" indent="-228600">
-              <a:defRPr>
-                <a:solidFill>
-                  <a:schemeClr val="tx1"/>
-                </a:solidFill>
-                <a:latin typeface="Calibri" panose="020F0502020204030204" pitchFamily="34" charset="0"/>
-              </a:defRPr>
-            </a:lvl3pPr>
-            <a:lvl4pPr marL="1600200" indent="-228600">
-              <a:defRPr>
-                <a:solidFill>
-                  <a:schemeClr val="tx1"/>
-                </a:solidFill>
-                <a:latin typeface="Calibri" panose="020F0502020204030204" pitchFamily="34" charset="0"/>
-              </a:defRPr>
-            </a:lvl4pPr>
-            <a:lvl5pPr marL="2057400" indent="-228600">
-              <a:defRPr>
-                <a:solidFill>
-                  <a:schemeClr val="tx1"/>
-                </a:solidFill>
-                <a:latin typeface="Calibri" panose="020F0502020204030204" pitchFamily="34" charset="0"/>
-              </a:defRPr>
-            </a:lvl5pPr>
-            <a:lvl6pPr marL="2514600" indent="-228600" eaLnBrk="0" fontAlgn="base" hangingPunct="0">
-              <a:spcBef>
-                <a:spcPct val="0"/>
-              </a:spcBef>
-              <a:spcAft>
-                <a:spcPct val="0"/>
-              </a:spcAft>
-              <a:defRPr>
-                <a:solidFill>
-                  <a:schemeClr val="tx1"/>
-                </a:solidFill>
-                <a:latin typeface="Calibri" panose="020F0502020204030204" pitchFamily="34" charset="0"/>
-              </a:defRPr>
-            </a:lvl6pPr>
-            <a:lvl7pPr marL="2971800" indent="-228600" eaLnBrk="0" fontAlgn="base" hangingPunct="0">
-              <a:spcBef>
-                <a:spcPct val="0"/>
-              </a:spcBef>
-              <a:spcAft>
-                <a:spcPct val="0"/>
-              </a:spcAft>
-              <a:defRPr>
-                <a:solidFill>
-                  <a:schemeClr val="tx1"/>
-                </a:solidFill>
-                <a:latin typeface="Calibri" panose="020F0502020204030204" pitchFamily="34" charset="0"/>
-              </a:defRPr>
-            </a:lvl7pPr>
-            <a:lvl8pPr marL="3429000" indent="-228600" eaLnBrk="0" fontAlgn="base" hangingPunct="0">
-              <a:spcBef>
-                <a:spcPct val="0"/>
-              </a:spcBef>
-              <a:spcAft>
-                <a:spcPct val="0"/>
-              </a:spcAft>
-              <a:defRPr>
-                <a:solidFill>
-                  <a:schemeClr val="tx1"/>
-                </a:solidFill>
-                <a:latin typeface="Calibri" panose="020F0502020204030204" pitchFamily="34" charset="0"/>
-              </a:defRPr>
-            </a:lvl8pPr>
-            <a:lvl9pPr marL="3886200" indent="-228600" eaLnBrk="0" fontAlgn="base" hangingPunct="0">
-              <a:spcBef>
-                <a:spcPct val="0"/>
-              </a:spcBef>
-              <a:spcAft>
-                <a:spcPct val="0"/>
-              </a:spcAft>
-              <a:defRPr>
-                <a:solidFill>
-                  <a:schemeClr val="tx1"/>
-                </a:solidFill>
-                <a:latin typeface="Calibri" panose="020F0502020204030204" pitchFamily="34" charset="0"/>
-              </a:defRPr>
-            </a:lvl9pPr>
-          </a:lstStyle>
-          <a:p>
-            <a:pPr algn="ctr" eaLnBrk="1" hangingPunct="1"/>
-            <a:r>
-              <a:rPr lang="en-US" altLang="en-US" sz="1100">
-                <a:latin typeface="Arial" panose="020B0604020202020204" pitchFamily="34" charset="0"/>
-                <a:ea typeface="Amazon Ember" panose="020B0603020204020204" pitchFamily="34" charset="0"/>
-                <a:cs typeface="Arial" panose="020B0604020202020204" pitchFamily="34" charset="0"/>
-              </a:rPr>
-              <a:t>Elastigroup instances</a:t>
-            </a:r>
-            <a:endParaRPr lang="en-US" altLang="en-US" sz="1100" dirty="0">
-              <a:latin typeface="Arial" panose="020B0604020202020204" pitchFamily="34" charset="0"/>
-              <a:ea typeface="Amazon Ember" panose="020B0603020204020204" pitchFamily="34" charset="0"/>
-              <a:cs typeface="Arial" panose="020B0604020202020204" pitchFamily="34" charset="0"/>
-            </a:endParaRPr>
-          </a:p>
-        </p:txBody>
-      </p:sp>
-      <p:sp>
-        <p:nvSpPr>
-          <p:cNvPr id="56" name="Rectangle 55">
-            <a:extLst>
-              <a:ext uri="{FF2B5EF4-FFF2-40B4-BE49-F238E27FC236}">
-                <a16:creationId xmlns:a16="http://schemas.microsoft.com/office/drawing/2014/main" id="{76EEA2A0-D615-4E33-B205-5982D79B0599}"/>
-              </a:ext>
-            </a:extLst>
-          </p:cNvPr>
-          <p:cNvSpPr/>
-          <p:nvPr/>
-        </p:nvSpPr>
-        <p:spPr>
-          <a:xfrm>
-            <a:off x="6766486" y="1920240"/>
-            <a:ext cx="1554480" cy="1500877"/>
-          </a:xfrm>
-          <a:prstGeom prst="rect">
-            <a:avLst/>
-          </a:prstGeom>
-          <a:solidFill>
-            <a:srgbClr val="1D8900">
-              <a:alpha val="9804"/>
-            </a:srgbClr>
-          </a:solidFill>
-          <a:ln w="12700">
-            <a:noFill/>
-            <a:prstDash val="dash"/>
-          </a:ln>
-        </p:spPr>
-        <p:style>
-          <a:lnRef idx="2">
-            <a:schemeClr val="accent1">
-              <a:shade val="50000"/>
-            </a:schemeClr>
-          </a:lnRef>
-          <a:fillRef idx="1">
-            <a:schemeClr val="accent1"/>
-          </a:fillRef>
-          <a:effectRef idx="0">
-            <a:schemeClr val="accent1"/>
-          </a:effectRef>
-          <a:fontRef idx="minor">
-            <a:schemeClr val="lt1"/>
-          </a:fontRef>
-        </p:style>
-        <p:txBody>
-          <a:bodyPr lIns="502920"/>
-          <a:lstStyle/>
-          <a:p>
-            <a:pPr eaLnBrk="1" fontAlgn="auto" hangingPunct="1">
-              <a:spcBef>
-                <a:spcPts val="0"/>
-              </a:spcBef>
-              <a:spcAft>
-                <a:spcPts val="0"/>
-              </a:spcAft>
-              <a:defRPr/>
-            </a:pPr>
-            <a:r>
-              <a:rPr lang="en-US" sz="1200" dirty="0">
-                <a:solidFill>
-                  <a:srgbClr val="1E8900"/>
-                </a:solidFill>
-                <a:latin typeface="Arial" panose="020B0604020202020204" pitchFamily="34" charset="0"/>
-                <a:cs typeface="Arial" panose="020B0604020202020204" pitchFamily="34" charset="0"/>
-              </a:rPr>
-              <a:t>Public subnet</a:t>
-            </a:r>
-          </a:p>
-        </p:txBody>
-      </p:sp>
       <p:sp>
         <p:nvSpPr>
           <p:cNvPr id="57" name="Rectangle 56">
@@ -4401,6 +3661,294 @@
           </a:p>
         </p:txBody>
       </p:sp>
+      <p:sp>
+        <p:nvSpPr>
+          <p:cNvPr id="6" name="Rectangle 5">
+            <a:extLst>
+              <a:ext uri="{FF2B5EF4-FFF2-40B4-BE49-F238E27FC236}">
+                <a16:creationId xmlns:a16="http://schemas.microsoft.com/office/drawing/2014/main" id="{4947850A-9BCA-44D6-B497-3F42B679D7D4}"/>
+              </a:ext>
+            </a:extLst>
+          </p:cNvPr>
+          <p:cNvSpPr/>
+          <p:nvPr/>
+        </p:nvSpPr>
+        <p:spPr>
+          <a:xfrm>
+            <a:off x="2926080" y="1737360"/>
+            <a:ext cx="1554480" cy="1828800"/>
+          </a:xfrm>
+          <a:prstGeom prst="rect">
+            <a:avLst/>
+          </a:prstGeom>
+          <a:solidFill>
+            <a:srgbClr val="1D8900">
+              <a:alpha val="9804"/>
+            </a:srgbClr>
+          </a:solidFill>
+          <a:ln w="12700">
+            <a:noFill/>
+            <a:prstDash val="dash"/>
+          </a:ln>
+        </p:spPr>
+        <p:style>
+          <a:lnRef idx="2">
+            <a:schemeClr val="accent1">
+              <a:shade val="50000"/>
+            </a:schemeClr>
+          </a:lnRef>
+          <a:fillRef idx="1">
+            <a:schemeClr val="accent1"/>
+          </a:fillRef>
+          <a:effectRef idx="0">
+            <a:schemeClr val="accent1"/>
+          </a:effectRef>
+          <a:fontRef idx="minor">
+            <a:schemeClr val="lt1"/>
+          </a:fontRef>
+        </p:style>
+        <p:txBody>
+          <a:bodyPr lIns="502920"/>
+          <a:lstStyle/>
+          <a:p>
+            <a:pPr eaLnBrk="1" fontAlgn="auto" hangingPunct="1">
+              <a:spcBef>
+                <a:spcPts val="0"/>
+              </a:spcBef>
+              <a:spcAft>
+                <a:spcPts val="0"/>
+              </a:spcAft>
+              <a:defRPr/>
+            </a:pPr>
+            <a:r>
+              <a:rPr lang="en-US" sz="1200" dirty="0">
+                <a:solidFill>
+                  <a:srgbClr val="1E8900"/>
+                </a:solidFill>
+                <a:latin typeface="Arial" panose="020B0604020202020204" pitchFamily="34" charset="0"/>
+                <a:cs typeface="Arial" panose="020B0604020202020204" pitchFamily="34" charset="0"/>
+              </a:rPr>
+              <a:t>Public subnet</a:t>
+            </a:r>
+          </a:p>
+        </p:txBody>
+      </p:sp>
+      <p:pic>
+        <p:nvPicPr>
+          <p:cNvPr id="8" name="Graphic 7">
+            <a:extLst>
+              <a:ext uri="{FF2B5EF4-FFF2-40B4-BE49-F238E27FC236}">
+                <a16:creationId xmlns:a16="http://schemas.microsoft.com/office/drawing/2014/main" id="{238A2971-27EC-4C95-8FC9-CD090F6BAF22}"/>
+              </a:ext>
+            </a:extLst>
+          </p:cNvPr>
+          <p:cNvPicPr>
+            <a:picLocks noChangeAspect="1"/>
+          </p:cNvPicPr>
+          <p:nvPr/>
+        </p:nvPicPr>
+        <p:blipFill>
+          <a:blip r:embed="rId7">
+            <a:extLst>
+              <a:ext uri="{96DAC541-7B7A-43D3-8B79-37D633B846F1}">
+                <asvg:svgBlip xmlns:asvg="http://schemas.microsoft.com/office/drawing/2016/SVG/main" r:embed="rId8"/>
+              </a:ext>
+            </a:extLst>
+          </a:blip>
+          <a:stretch>
+            <a:fillRect/>
+          </a:stretch>
+        </p:blipFill>
+        <p:spPr>
+          <a:xfrm>
+            <a:off x="2926080" y="1738990"/>
+            <a:ext cx="381000" cy="381000"/>
+          </a:xfrm>
+          <a:prstGeom prst="rect">
+            <a:avLst/>
+          </a:prstGeom>
+        </p:spPr>
+      </p:pic>
+      <p:sp>
+        <p:nvSpPr>
+          <p:cNvPr id="50" name="Rectangle 49">
+            <a:extLst>
+              <a:ext uri="{FF2B5EF4-FFF2-40B4-BE49-F238E27FC236}">
+                <a16:creationId xmlns:a16="http://schemas.microsoft.com/office/drawing/2014/main" id="{6800CC7D-46C3-4D78-B240-9808EF2C31D1}"/>
+              </a:ext>
+            </a:extLst>
+          </p:cNvPr>
+          <p:cNvSpPr/>
+          <p:nvPr/>
+        </p:nvSpPr>
+        <p:spPr>
+          <a:xfrm>
+            <a:off x="4846320" y="1737359"/>
+            <a:ext cx="1554480" cy="1828800"/>
+          </a:xfrm>
+          <a:prstGeom prst="rect">
+            <a:avLst/>
+          </a:prstGeom>
+          <a:solidFill>
+            <a:srgbClr val="1D8900">
+              <a:alpha val="9804"/>
+            </a:srgbClr>
+          </a:solidFill>
+          <a:ln w="12700">
+            <a:noFill/>
+            <a:prstDash val="dash"/>
+          </a:ln>
+        </p:spPr>
+        <p:style>
+          <a:lnRef idx="2">
+            <a:schemeClr val="accent1">
+              <a:shade val="50000"/>
+            </a:schemeClr>
+          </a:lnRef>
+          <a:fillRef idx="1">
+            <a:schemeClr val="accent1"/>
+          </a:fillRef>
+          <a:effectRef idx="0">
+            <a:schemeClr val="accent1"/>
+          </a:effectRef>
+          <a:fontRef idx="minor">
+            <a:schemeClr val="lt1"/>
+          </a:fontRef>
+        </p:style>
+        <p:txBody>
+          <a:bodyPr lIns="502920"/>
+          <a:lstStyle/>
+          <a:p>
+            <a:pPr eaLnBrk="1" fontAlgn="auto" hangingPunct="1">
+              <a:spcBef>
+                <a:spcPts val="0"/>
+              </a:spcBef>
+              <a:spcAft>
+                <a:spcPts val="0"/>
+              </a:spcAft>
+              <a:defRPr/>
+            </a:pPr>
+            <a:r>
+              <a:rPr lang="en-US" sz="1200" dirty="0">
+                <a:solidFill>
+                  <a:srgbClr val="1E8900"/>
+                </a:solidFill>
+                <a:latin typeface="Arial" panose="020B0604020202020204" pitchFamily="34" charset="0"/>
+                <a:cs typeface="Arial" panose="020B0604020202020204" pitchFamily="34" charset="0"/>
+              </a:rPr>
+              <a:t>Public subnet</a:t>
+            </a:r>
+          </a:p>
+        </p:txBody>
+      </p:sp>
+      <p:pic>
+        <p:nvPicPr>
+          <p:cNvPr id="52" name="Graphic 51">
+            <a:extLst>
+              <a:ext uri="{FF2B5EF4-FFF2-40B4-BE49-F238E27FC236}">
+                <a16:creationId xmlns:a16="http://schemas.microsoft.com/office/drawing/2014/main" id="{C4EED5CD-2604-4C3B-9E7C-4C59827B49CF}"/>
+              </a:ext>
+            </a:extLst>
+          </p:cNvPr>
+          <p:cNvPicPr>
+            <a:picLocks noChangeAspect="1"/>
+          </p:cNvPicPr>
+          <p:nvPr/>
+        </p:nvPicPr>
+        <p:blipFill>
+          <a:blip r:embed="rId7">
+            <a:extLst>
+              <a:ext uri="{96DAC541-7B7A-43D3-8B79-37D633B846F1}">
+                <asvg:svgBlip xmlns:asvg="http://schemas.microsoft.com/office/drawing/2016/SVG/main" r:embed="rId8"/>
+              </a:ext>
+            </a:extLst>
+          </a:blip>
+          <a:stretch>
+            <a:fillRect/>
+          </a:stretch>
+        </p:blipFill>
+        <p:spPr>
+          <a:xfrm>
+            <a:off x="4846320" y="1737360"/>
+            <a:ext cx="381000" cy="367862"/>
+          </a:xfrm>
+          <a:prstGeom prst="rect">
+            <a:avLst/>
+          </a:prstGeom>
+        </p:spPr>
+      </p:pic>
+      <p:sp>
+        <p:nvSpPr>
+          <p:cNvPr id="56" name="Rectangle 55">
+            <a:extLst>
+              <a:ext uri="{FF2B5EF4-FFF2-40B4-BE49-F238E27FC236}">
+                <a16:creationId xmlns:a16="http://schemas.microsoft.com/office/drawing/2014/main" id="{76EEA2A0-D615-4E33-B205-5982D79B0599}"/>
+              </a:ext>
+            </a:extLst>
+          </p:cNvPr>
+          <p:cNvSpPr/>
+          <p:nvPr/>
+        </p:nvSpPr>
+        <p:spPr>
+          <a:xfrm>
+            <a:off x="6766486" y="1737359"/>
+            <a:ext cx="1554480" cy="1828800"/>
+          </a:xfrm>
+          <a:prstGeom prst="rect">
+            <a:avLst/>
+          </a:prstGeom>
+          <a:solidFill>
+            <a:srgbClr val="1D8900">
+              <a:alpha val="9804"/>
+            </a:srgbClr>
+          </a:solidFill>
+          <a:ln w="12700">
+            <a:noFill/>
+            <a:prstDash val="dash"/>
+          </a:ln>
+        </p:spPr>
+        <p:style>
+          <a:lnRef idx="2">
+            <a:schemeClr val="accent1">
+              <a:shade val="50000"/>
+            </a:schemeClr>
+          </a:lnRef>
+          <a:fillRef idx="1">
+            <a:schemeClr val="accent1"/>
+          </a:fillRef>
+          <a:effectRef idx="0">
+            <a:schemeClr val="accent1"/>
+          </a:effectRef>
+          <a:fontRef idx="minor">
+            <a:schemeClr val="lt1"/>
+          </a:fontRef>
+        </p:style>
+        <p:txBody>
+          <a:bodyPr lIns="502920"/>
+          <a:lstStyle/>
+          <a:p>
+            <a:pPr eaLnBrk="1" fontAlgn="auto" hangingPunct="1">
+              <a:spcBef>
+                <a:spcPts val="0"/>
+              </a:spcBef>
+              <a:spcAft>
+                <a:spcPts val="0"/>
+              </a:spcAft>
+              <a:defRPr/>
+            </a:pPr>
+            <a:r>
+              <a:rPr lang="en-US" sz="1200" dirty="0">
+                <a:solidFill>
+                  <a:srgbClr val="1E8900"/>
+                </a:solidFill>
+                <a:latin typeface="Arial" panose="020B0604020202020204" pitchFamily="34" charset="0"/>
+                <a:cs typeface="Arial" panose="020B0604020202020204" pitchFamily="34" charset="0"/>
+              </a:rPr>
+              <a:t>Public subnet</a:t>
+            </a:r>
+          </a:p>
+        </p:txBody>
+      </p:sp>
       <p:pic>
         <p:nvPicPr>
           <p:cNvPr id="58" name="Graphic 57">
@@ -4416,10 +3964,10 @@
           <p:nvPr/>
         </p:nvPicPr>
         <p:blipFill>
-          <a:blip r:embed="rId6">
+          <a:blip r:embed="rId7">
             <a:extLst>
               <a:ext uri="{96DAC541-7B7A-43D3-8B79-37D633B846F1}">
-                <asvg:svgBlip xmlns:asvg="http://schemas.microsoft.com/office/drawing/2016/SVG/main" r:embed="rId7"/>
+                <asvg:svgBlip xmlns:asvg="http://schemas.microsoft.com/office/drawing/2016/SVG/main" r:embed="rId8"/>
               </a:ext>
             </a:extLst>
           </a:blip>
@@ -4429,7 +3977,7 @@
         </p:blipFill>
         <p:spPr>
           <a:xfrm>
-            <a:off x="6766486" y="1920240"/>
+            <a:off x="6766486" y="1737360"/>
             <a:ext cx="381000" cy="367862"/>
           </a:xfrm>
           <a:prstGeom prst="rect">
@@ -4437,227 +3985,777 @@
           </a:prstGeom>
         </p:spPr>
       </p:pic>
-      <p:pic>
-        <p:nvPicPr>
-          <p:cNvPr id="59" name="Graphic 60">
+      <p:grpSp>
+        <p:nvGrpSpPr>
+          <p:cNvPr id="3" name="Group 2">
             <a:extLst>
               <a:ext uri="{FF2B5EF4-FFF2-40B4-BE49-F238E27FC236}">
-                <a16:creationId xmlns:a16="http://schemas.microsoft.com/office/drawing/2014/main" id="{F91866C6-2F22-4D09-B3BF-382302B42E5F}"/>
+                <a16:creationId xmlns:a16="http://schemas.microsoft.com/office/drawing/2014/main" id="{C8042905-4A65-4810-BBF4-186ADF79685B}"/>
               </a:ext>
             </a:extLst>
           </p:cNvPr>
-          <p:cNvPicPr>
-            <a:picLocks noChangeAspect="1" noChangeArrowheads="1"/>
-          </p:cNvPicPr>
+          <p:cNvGrpSpPr/>
           <p:nvPr/>
-        </p:nvPicPr>
-        <p:blipFill>
-          <a:blip r:embed="rId8">
+        </p:nvGrpSpPr>
+        <p:grpSpPr>
+          <a:xfrm>
+            <a:off x="3291840" y="2560320"/>
+            <a:ext cx="4708635" cy="888087"/>
+            <a:chOff x="3291840" y="2377440"/>
+            <a:chExt cx="4708635" cy="888087"/>
+          </a:xfrm>
+        </p:grpSpPr>
+        <p:pic>
+          <p:nvPicPr>
+            <p:cNvPr id="11" name="Graphic 60">
+              <a:extLst>
+                <a:ext uri="{FF2B5EF4-FFF2-40B4-BE49-F238E27FC236}">
+                  <a16:creationId xmlns:a16="http://schemas.microsoft.com/office/drawing/2014/main" id="{3FC9B616-D57D-4A09-8660-13721AA1B83A}"/>
+                </a:ext>
+              </a:extLst>
+            </p:cNvPr>
+            <p:cNvPicPr>
+              <a:picLocks noChangeAspect="1" noChangeArrowheads="1"/>
+            </p:cNvPicPr>
+            <p:nvPr/>
+          </p:nvPicPr>
+          <p:blipFill>
+            <a:blip r:embed="rId9">
+              <a:extLst>
+                <a:ext uri="{28A0092B-C50C-407E-A947-70E740481C1C}">
+                  <a14:useLocalDpi xmlns:a14="http://schemas.microsoft.com/office/drawing/2010/main" val="0"/>
+                </a:ext>
+              </a:extLst>
+            </a:blip>
+            <a:srcRect/>
+            <a:stretch>
+              <a:fillRect/>
+            </a:stretch>
+          </p:blipFill>
+          <p:spPr bwMode="auto">
+            <a:xfrm>
+              <a:off x="3474720" y="2377440"/>
+              <a:ext cx="457200" cy="457200"/>
+            </a:xfrm>
+            <a:prstGeom prst="rect">
+              <a:avLst/>
+            </a:prstGeom>
+            <a:noFill/>
+            <a:ln>
+              <a:noFill/>
+            </a:ln>
             <a:extLst>
-              <a:ext uri="{28A0092B-C50C-407E-A947-70E740481C1C}">
-                <a14:useLocalDpi xmlns:a14="http://schemas.microsoft.com/office/drawing/2010/main" val="0"/>
+              <a:ext uri="{909E8E84-426E-40DD-AFC4-6F175D3DCCD1}">
+                <a14:hiddenFill xmlns:a14="http://schemas.microsoft.com/office/drawing/2010/main">
+                  <a:solidFill>
+                    <a:srgbClr val="FFFFFF"/>
+                  </a:solidFill>
+                </a14:hiddenFill>
+              </a:ext>
+              <a:ext uri="{91240B29-F687-4F45-9708-019B960494DF}">
+                <a14:hiddenLine xmlns:a14="http://schemas.microsoft.com/office/drawing/2010/main" w="9525">
+                  <a:solidFill>
+                    <a:srgbClr val="000000"/>
+                  </a:solidFill>
+                  <a:miter lim="800000"/>
+                  <a:headEnd/>
+                  <a:tailEnd/>
+                </a14:hiddenLine>
               </a:ext>
             </a:extLst>
-          </a:blip>
-          <a:srcRect/>
-          <a:stretch>
-            <a:fillRect/>
-          </a:stretch>
-        </p:blipFill>
-        <p:spPr bwMode="auto">
+          </p:spPr>
+        </p:pic>
+        <p:sp>
+          <p:nvSpPr>
+            <p:cNvPr id="12" name="TextBox 16">
+              <a:extLst>
+                <a:ext uri="{FF2B5EF4-FFF2-40B4-BE49-F238E27FC236}">
+                  <a16:creationId xmlns:a16="http://schemas.microsoft.com/office/drawing/2014/main" id="{5A59E1F8-1276-45C8-96EC-D0994B1669F7}"/>
+                </a:ext>
+              </a:extLst>
+            </p:cNvPr>
+            <p:cNvSpPr txBox="1">
+              <a:spLocks noChangeArrowheads="1"/>
+            </p:cNvSpPr>
+            <p:nvPr/>
+          </p:nvSpPr>
+          <p:spPr bwMode="auto">
+            <a:xfrm>
+              <a:off x="3291840" y="2834640"/>
+              <a:ext cx="868155" cy="430887"/>
+            </a:xfrm>
+            <a:prstGeom prst="rect">
+              <a:avLst/>
+            </a:prstGeom>
+            <a:noFill/>
+            <a:ln>
+              <a:noFill/>
+            </a:ln>
+            <a:extLst>
+              <a:ext uri="{909E8E84-426E-40DD-AFC4-6F175D3DCCD1}">
+                <a14:hiddenFill xmlns:a14="http://schemas.microsoft.com/office/drawing/2010/main">
+                  <a:solidFill>
+                    <a:srgbClr val="FFFFFF"/>
+                  </a:solidFill>
+                </a14:hiddenFill>
+              </a:ext>
+              <a:ext uri="{91240B29-F687-4F45-9708-019B960494DF}">
+                <a14:hiddenLine xmlns:a14="http://schemas.microsoft.com/office/drawing/2010/main" w="9525">
+                  <a:solidFill>
+                    <a:srgbClr val="000000"/>
+                  </a:solidFill>
+                  <a:miter lim="800000"/>
+                  <a:headEnd/>
+                  <a:tailEnd/>
+                </a14:hiddenLine>
+              </a:ext>
+            </a:extLst>
+          </p:spPr>
+          <p:txBody>
+            <a:bodyPr wrap="square" lIns="0" rIns="0">
+              <a:spAutoFit/>
+            </a:bodyPr>
+            <a:lstStyle>
+              <a:lvl1pPr>
+                <a:defRPr>
+                  <a:solidFill>
+                    <a:schemeClr val="tx1"/>
+                  </a:solidFill>
+                  <a:latin typeface="Calibri" panose="020F0502020204030204" pitchFamily="34" charset="0"/>
+                </a:defRPr>
+              </a:lvl1pPr>
+              <a:lvl2pPr marL="742950" indent="-285750">
+                <a:defRPr>
+                  <a:solidFill>
+                    <a:schemeClr val="tx1"/>
+                  </a:solidFill>
+                  <a:latin typeface="Calibri" panose="020F0502020204030204" pitchFamily="34" charset="0"/>
+                </a:defRPr>
+              </a:lvl2pPr>
+              <a:lvl3pPr marL="1143000" indent="-228600">
+                <a:defRPr>
+                  <a:solidFill>
+                    <a:schemeClr val="tx1"/>
+                  </a:solidFill>
+                  <a:latin typeface="Calibri" panose="020F0502020204030204" pitchFamily="34" charset="0"/>
+                </a:defRPr>
+              </a:lvl3pPr>
+              <a:lvl4pPr marL="1600200" indent="-228600">
+                <a:defRPr>
+                  <a:solidFill>
+                    <a:schemeClr val="tx1"/>
+                  </a:solidFill>
+                  <a:latin typeface="Calibri" panose="020F0502020204030204" pitchFamily="34" charset="0"/>
+                </a:defRPr>
+              </a:lvl4pPr>
+              <a:lvl5pPr marL="2057400" indent="-228600">
+                <a:defRPr>
+                  <a:solidFill>
+                    <a:schemeClr val="tx1"/>
+                  </a:solidFill>
+                  <a:latin typeface="Calibri" panose="020F0502020204030204" pitchFamily="34" charset="0"/>
+                </a:defRPr>
+              </a:lvl5pPr>
+              <a:lvl6pPr marL="2514600" indent="-228600" eaLnBrk="0" fontAlgn="base" hangingPunct="0">
+                <a:spcBef>
+                  <a:spcPct val="0"/>
+                </a:spcBef>
+                <a:spcAft>
+                  <a:spcPct val="0"/>
+                </a:spcAft>
+                <a:defRPr>
+                  <a:solidFill>
+                    <a:schemeClr val="tx1"/>
+                  </a:solidFill>
+                  <a:latin typeface="Calibri" panose="020F0502020204030204" pitchFamily="34" charset="0"/>
+                </a:defRPr>
+              </a:lvl6pPr>
+              <a:lvl7pPr marL="2971800" indent="-228600" eaLnBrk="0" fontAlgn="base" hangingPunct="0">
+                <a:spcBef>
+                  <a:spcPct val="0"/>
+                </a:spcBef>
+                <a:spcAft>
+                  <a:spcPct val="0"/>
+                </a:spcAft>
+                <a:defRPr>
+                  <a:solidFill>
+                    <a:schemeClr val="tx1"/>
+                  </a:solidFill>
+                  <a:latin typeface="Calibri" panose="020F0502020204030204" pitchFamily="34" charset="0"/>
+                </a:defRPr>
+              </a:lvl7pPr>
+              <a:lvl8pPr marL="3429000" indent="-228600" eaLnBrk="0" fontAlgn="base" hangingPunct="0">
+                <a:spcBef>
+                  <a:spcPct val="0"/>
+                </a:spcBef>
+                <a:spcAft>
+                  <a:spcPct val="0"/>
+                </a:spcAft>
+                <a:defRPr>
+                  <a:solidFill>
+                    <a:schemeClr val="tx1"/>
+                  </a:solidFill>
+                  <a:latin typeface="Calibri" panose="020F0502020204030204" pitchFamily="34" charset="0"/>
+                </a:defRPr>
+              </a:lvl8pPr>
+              <a:lvl9pPr marL="3886200" indent="-228600" eaLnBrk="0" fontAlgn="base" hangingPunct="0">
+                <a:spcBef>
+                  <a:spcPct val="0"/>
+                </a:spcBef>
+                <a:spcAft>
+                  <a:spcPct val="0"/>
+                </a:spcAft>
+                <a:defRPr>
+                  <a:solidFill>
+                    <a:schemeClr val="tx1"/>
+                  </a:solidFill>
+                  <a:latin typeface="Calibri" panose="020F0502020204030204" pitchFamily="34" charset="0"/>
+                </a:defRPr>
+              </a:lvl9pPr>
+            </a:lstStyle>
+            <a:p>
+              <a:pPr algn="ctr" eaLnBrk="1" hangingPunct="1"/>
+              <a:r>
+                <a:rPr lang="en-US" altLang="en-US" sz="1100">
+                  <a:latin typeface="Arial" panose="020B0604020202020204" pitchFamily="34" charset="0"/>
+                  <a:ea typeface="Amazon Ember" panose="020B0603020204020204" pitchFamily="34" charset="0"/>
+                  <a:cs typeface="Arial" panose="020B0604020202020204" pitchFamily="34" charset="0"/>
+                </a:rPr>
+                <a:t>Managed instance</a:t>
+              </a:r>
+              <a:endParaRPr lang="en-US" altLang="en-US" sz="1100" dirty="0">
+                <a:latin typeface="Arial" panose="020B0604020202020204" pitchFamily="34" charset="0"/>
+                <a:ea typeface="Amazon Ember" panose="020B0603020204020204" pitchFamily="34" charset="0"/>
+                <a:cs typeface="Arial" panose="020B0604020202020204" pitchFamily="34" charset="0"/>
+              </a:endParaRPr>
+            </a:p>
+          </p:txBody>
+        </p:sp>
+        <p:pic>
+          <p:nvPicPr>
+            <p:cNvPr id="53" name="Graphic 60">
+              <a:extLst>
+                <a:ext uri="{FF2B5EF4-FFF2-40B4-BE49-F238E27FC236}">
+                  <a16:creationId xmlns:a16="http://schemas.microsoft.com/office/drawing/2014/main" id="{FEE0B55D-2DAE-4C6E-AC34-7DA9D6AC0782}"/>
+                </a:ext>
+              </a:extLst>
+            </p:cNvPr>
+            <p:cNvPicPr>
+              <a:picLocks noChangeAspect="1" noChangeArrowheads="1"/>
+            </p:cNvPicPr>
+            <p:nvPr/>
+          </p:nvPicPr>
+          <p:blipFill>
+            <a:blip r:embed="rId9">
+              <a:extLst>
+                <a:ext uri="{28A0092B-C50C-407E-A947-70E740481C1C}">
+                  <a14:useLocalDpi xmlns:a14="http://schemas.microsoft.com/office/drawing/2010/main" val="0"/>
+                </a:ext>
+              </a:extLst>
+            </a:blip>
+            <a:srcRect/>
+            <a:stretch>
+              <a:fillRect/>
+            </a:stretch>
+          </p:blipFill>
+          <p:spPr bwMode="auto">
+            <a:xfrm>
+              <a:off x="5394960" y="2377440"/>
+              <a:ext cx="457200" cy="441434"/>
+            </a:xfrm>
+            <a:prstGeom prst="rect">
+              <a:avLst/>
+            </a:prstGeom>
+            <a:noFill/>
+            <a:ln>
+              <a:noFill/>
+            </a:ln>
+            <a:extLst>
+              <a:ext uri="{909E8E84-426E-40DD-AFC4-6F175D3DCCD1}">
+                <a14:hiddenFill xmlns:a14="http://schemas.microsoft.com/office/drawing/2010/main">
+                  <a:solidFill>
+                    <a:srgbClr val="FFFFFF"/>
+                  </a:solidFill>
+                </a14:hiddenFill>
+              </a:ext>
+              <a:ext uri="{91240B29-F687-4F45-9708-019B960494DF}">
+                <a14:hiddenLine xmlns:a14="http://schemas.microsoft.com/office/drawing/2010/main" w="9525">
+                  <a:solidFill>
+                    <a:srgbClr val="000000"/>
+                  </a:solidFill>
+                  <a:miter lim="800000"/>
+                  <a:headEnd/>
+                  <a:tailEnd/>
+                </a14:hiddenLine>
+              </a:ext>
+            </a:extLst>
+          </p:spPr>
+        </p:pic>
+        <p:sp>
+          <p:nvSpPr>
+            <p:cNvPr id="54" name="TextBox 16">
+              <a:extLst>
+                <a:ext uri="{FF2B5EF4-FFF2-40B4-BE49-F238E27FC236}">
+                  <a16:creationId xmlns:a16="http://schemas.microsoft.com/office/drawing/2014/main" id="{A4964EEA-C524-46EC-A196-F8C28F63AE47}"/>
+                </a:ext>
+              </a:extLst>
+            </p:cNvPr>
+            <p:cNvSpPr txBox="1">
+              <a:spLocks noChangeArrowheads="1"/>
+            </p:cNvSpPr>
+            <p:nvPr/>
+          </p:nvSpPr>
+          <p:spPr bwMode="auto">
+            <a:xfrm>
+              <a:off x="5212080" y="2834640"/>
+              <a:ext cx="868155" cy="430887"/>
+            </a:xfrm>
+            <a:prstGeom prst="rect">
+              <a:avLst/>
+            </a:prstGeom>
+            <a:noFill/>
+            <a:ln>
+              <a:noFill/>
+            </a:ln>
+            <a:extLst>
+              <a:ext uri="{909E8E84-426E-40DD-AFC4-6F175D3DCCD1}">
+                <a14:hiddenFill xmlns:a14="http://schemas.microsoft.com/office/drawing/2010/main">
+                  <a:solidFill>
+                    <a:srgbClr val="FFFFFF"/>
+                  </a:solidFill>
+                </a14:hiddenFill>
+              </a:ext>
+              <a:ext uri="{91240B29-F687-4F45-9708-019B960494DF}">
+                <a14:hiddenLine xmlns:a14="http://schemas.microsoft.com/office/drawing/2010/main" w="9525">
+                  <a:solidFill>
+                    <a:srgbClr val="000000"/>
+                  </a:solidFill>
+                  <a:miter lim="800000"/>
+                  <a:headEnd/>
+                  <a:tailEnd/>
+                </a14:hiddenLine>
+              </a:ext>
+            </a:extLst>
+          </p:spPr>
+          <p:txBody>
+            <a:bodyPr wrap="square" lIns="0" rIns="0">
+              <a:spAutoFit/>
+            </a:bodyPr>
+            <a:lstStyle>
+              <a:lvl1pPr>
+                <a:defRPr>
+                  <a:solidFill>
+                    <a:schemeClr val="tx1"/>
+                  </a:solidFill>
+                  <a:latin typeface="Calibri" panose="020F0502020204030204" pitchFamily="34" charset="0"/>
+                </a:defRPr>
+              </a:lvl1pPr>
+              <a:lvl2pPr marL="742950" indent="-285750">
+                <a:defRPr>
+                  <a:solidFill>
+                    <a:schemeClr val="tx1"/>
+                  </a:solidFill>
+                  <a:latin typeface="Calibri" panose="020F0502020204030204" pitchFamily="34" charset="0"/>
+                </a:defRPr>
+              </a:lvl2pPr>
+              <a:lvl3pPr marL="1143000" indent="-228600">
+                <a:defRPr>
+                  <a:solidFill>
+                    <a:schemeClr val="tx1"/>
+                  </a:solidFill>
+                  <a:latin typeface="Calibri" panose="020F0502020204030204" pitchFamily="34" charset="0"/>
+                </a:defRPr>
+              </a:lvl3pPr>
+              <a:lvl4pPr marL="1600200" indent="-228600">
+                <a:defRPr>
+                  <a:solidFill>
+                    <a:schemeClr val="tx1"/>
+                  </a:solidFill>
+                  <a:latin typeface="Calibri" panose="020F0502020204030204" pitchFamily="34" charset="0"/>
+                </a:defRPr>
+              </a:lvl4pPr>
+              <a:lvl5pPr marL="2057400" indent="-228600">
+                <a:defRPr>
+                  <a:solidFill>
+                    <a:schemeClr val="tx1"/>
+                  </a:solidFill>
+                  <a:latin typeface="Calibri" panose="020F0502020204030204" pitchFamily="34" charset="0"/>
+                </a:defRPr>
+              </a:lvl5pPr>
+              <a:lvl6pPr marL="2514600" indent="-228600" eaLnBrk="0" fontAlgn="base" hangingPunct="0">
+                <a:spcBef>
+                  <a:spcPct val="0"/>
+                </a:spcBef>
+                <a:spcAft>
+                  <a:spcPct val="0"/>
+                </a:spcAft>
+                <a:defRPr>
+                  <a:solidFill>
+                    <a:schemeClr val="tx1"/>
+                  </a:solidFill>
+                  <a:latin typeface="Calibri" panose="020F0502020204030204" pitchFamily="34" charset="0"/>
+                </a:defRPr>
+              </a:lvl6pPr>
+              <a:lvl7pPr marL="2971800" indent="-228600" eaLnBrk="0" fontAlgn="base" hangingPunct="0">
+                <a:spcBef>
+                  <a:spcPct val="0"/>
+                </a:spcBef>
+                <a:spcAft>
+                  <a:spcPct val="0"/>
+                </a:spcAft>
+                <a:defRPr>
+                  <a:solidFill>
+                    <a:schemeClr val="tx1"/>
+                  </a:solidFill>
+                  <a:latin typeface="Calibri" panose="020F0502020204030204" pitchFamily="34" charset="0"/>
+                </a:defRPr>
+              </a:lvl7pPr>
+              <a:lvl8pPr marL="3429000" indent="-228600" eaLnBrk="0" fontAlgn="base" hangingPunct="0">
+                <a:spcBef>
+                  <a:spcPct val="0"/>
+                </a:spcBef>
+                <a:spcAft>
+                  <a:spcPct val="0"/>
+                </a:spcAft>
+                <a:defRPr>
+                  <a:solidFill>
+                    <a:schemeClr val="tx1"/>
+                  </a:solidFill>
+                  <a:latin typeface="Calibri" panose="020F0502020204030204" pitchFamily="34" charset="0"/>
+                </a:defRPr>
+              </a:lvl8pPr>
+              <a:lvl9pPr marL="3886200" indent="-228600" eaLnBrk="0" fontAlgn="base" hangingPunct="0">
+                <a:spcBef>
+                  <a:spcPct val="0"/>
+                </a:spcBef>
+                <a:spcAft>
+                  <a:spcPct val="0"/>
+                </a:spcAft>
+                <a:defRPr>
+                  <a:solidFill>
+                    <a:schemeClr val="tx1"/>
+                  </a:solidFill>
+                  <a:latin typeface="Calibri" panose="020F0502020204030204" pitchFamily="34" charset="0"/>
+                </a:defRPr>
+              </a:lvl9pPr>
+            </a:lstStyle>
+            <a:p>
+              <a:pPr algn="ctr"/>
+              <a:r>
+                <a:rPr lang="en-US" altLang="en-US" sz="1100">
+                  <a:latin typeface="Arial" panose="020B0604020202020204" pitchFamily="34" charset="0"/>
+                  <a:ea typeface="Amazon Ember" panose="020B0603020204020204" pitchFamily="34" charset="0"/>
+                  <a:cs typeface="Arial" panose="020B0604020202020204" pitchFamily="34" charset="0"/>
+                </a:rPr>
+                <a:t>Managed instance</a:t>
+              </a:r>
+              <a:endParaRPr lang="en-US" altLang="en-US" sz="1100" dirty="0">
+                <a:latin typeface="Arial" panose="020B0604020202020204" pitchFamily="34" charset="0"/>
+                <a:ea typeface="Amazon Ember" panose="020B0603020204020204" pitchFamily="34" charset="0"/>
+                <a:cs typeface="Arial" panose="020B0604020202020204" pitchFamily="34" charset="0"/>
+              </a:endParaRPr>
+            </a:p>
+          </p:txBody>
+        </p:sp>
+        <p:pic>
+          <p:nvPicPr>
+            <p:cNvPr id="59" name="Graphic 60">
+              <a:extLst>
+                <a:ext uri="{FF2B5EF4-FFF2-40B4-BE49-F238E27FC236}">
+                  <a16:creationId xmlns:a16="http://schemas.microsoft.com/office/drawing/2014/main" id="{F91866C6-2F22-4D09-B3BF-382302B42E5F}"/>
+                </a:ext>
+              </a:extLst>
+            </p:cNvPr>
+            <p:cNvPicPr>
+              <a:picLocks noChangeAspect="1" noChangeArrowheads="1"/>
+            </p:cNvPicPr>
+            <p:nvPr/>
+          </p:nvPicPr>
+          <p:blipFill>
+            <a:blip r:embed="rId9">
+              <a:extLst>
+                <a:ext uri="{28A0092B-C50C-407E-A947-70E740481C1C}">
+                  <a14:useLocalDpi xmlns:a14="http://schemas.microsoft.com/office/drawing/2010/main" val="0"/>
+                </a:ext>
+              </a:extLst>
+            </a:blip>
+            <a:srcRect/>
+            <a:stretch>
+              <a:fillRect/>
+            </a:stretch>
+          </p:blipFill>
+          <p:spPr bwMode="auto">
+            <a:xfrm>
+              <a:off x="7315126" y="2377440"/>
+              <a:ext cx="457200" cy="441434"/>
+            </a:xfrm>
+            <a:prstGeom prst="rect">
+              <a:avLst/>
+            </a:prstGeom>
+            <a:noFill/>
+            <a:ln>
+              <a:noFill/>
+            </a:ln>
+            <a:extLst>
+              <a:ext uri="{909E8E84-426E-40DD-AFC4-6F175D3DCCD1}">
+                <a14:hiddenFill xmlns:a14="http://schemas.microsoft.com/office/drawing/2010/main">
+                  <a:solidFill>
+                    <a:srgbClr val="FFFFFF"/>
+                  </a:solidFill>
+                </a14:hiddenFill>
+              </a:ext>
+              <a:ext uri="{91240B29-F687-4F45-9708-019B960494DF}">
+                <a14:hiddenLine xmlns:a14="http://schemas.microsoft.com/office/drawing/2010/main" w="9525">
+                  <a:solidFill>
+                    <a:srgbClr val="000000"/>
+                  </a:solidFill>
+                  <a:miter lim="800000"/>
+                  <a:headEnd/>
+                  <a:tailEnd/>
+                </a14:hiddenLine>
+              </a:ext>
+            </a:extLst>
+          </p:spPr>
+        </p:pic>
+        <p:sp>
+          <p:nvSpPr>
+            <p:cNvPr id="60" name="TextBox 16">
+              <a:extLst>
+                <a:ext uri="{FF2B5EF4-FFF2-40B4-BE49-F238E27FC236}">
+                  <a16:creationId xmlns:a16="http://schemas.microsoft.com/office/drawing/2014/main" id="{83146C24-8990-47C1-9BAD-BD75DEA62389}"/>
+                </a:ext>
+              </a:extLst>
+            </p:cNvPr>
+            <p:cNvSpPr txBox="1">
+              <a:spLocks noChangeArrowheads="1"/>
+            </p:cNvSpPr>
+            <p:nvPr/>
+          </p:nvSpPr>
+          <p:spPr bwMode="auto">
+            <a:xfrm>
+              <a:off x="7132320" y="2834640"/>
+              <a:ext cx="868155" cy="430887"/>
+            </a:xfrm>
+            <a:prstGeom prst="rect">
+              <a:avLst/>
+            </a:prstGeom>
+            <a:noFill/>
+            <a:ln>
+              <a:noFill/>
+            </a:ln>
+            <a:extLst>
+              <a:ext uri="{909E8E84-426E-40DD-AFC4-6F175D3DCCD1}">
+                <a14:hiddenFill xmlns:a14="http://schemas.microsoft.com/office/drawing/2010/main">
+                  <a:solidFill>
+                    <a:srgbClr val="FFFFFF"/>
+                  </a:solidFill>
+                </a14:hiddenFill>
+              </a:ext>
+              <a:ext uri="{91240B29-F687-4F45-9708-019B960494DF}">
+                <a14:hiddenLine xmlns:a14="http://schemas.microsoft.com/office/drawing/2010/main" w="9525">
+                  <a:solidFill>
+                    <a:srgbClr val="000000"/>
+                  </a:solidFill>
+                  <a:miter lim="800000"/>
+                  <a:headEnd/>
+                  <a:tailEnd/>
+                </a14:hiddenLine>
+              </a:ext>
+            </a:extLst>
+          </p:spPr>
+          <p:txBody>
+            <a:bodyPr wrap="square" lIns="0" rIns="0">
+              <a:spAutoFit/>
+            </a:bodyPr>
+            <a:lstStyle>
+              <a:lvl1pPr>
+                <a:defRPr>
+                  <a:solidFill>
+                    <a:schemeClr val="tx1"/>
+                  </a:solidFill>
+                  <a:latin typeface="Calibri" panose="020F0502020204030204" pitchFamily="34" charset="0"/>
+                </a:defRPr>
+              </a:lvl1pPr>
+              <a:lvl2pPr marL="742950" indent="-285750">
+                <a:defRPr>
+                  <a:solidFill>
+                    <a:schemeClr val="tx1"/>
+                  </a:solidFill>
+                  <a:latin typeface="Calibri" panose="020F0502020204030204" pitchFamily="34" charset="0"/>
+                </a:defRPr>
+              </a:lvl2pPr>
+              <a:lvl3pPr marL="1143000" indent="-228600">
+                <a:defRPr>
+                  <a:solidFill>
+                    <a:schemeClr val="tx1"/>
+                  </a:solidFill>
+                  <a:latin typeface="Calibri" panose="020F0502020204030204" pitchFamily="34" charset="0"/>
+                </a:defRPr>
+              </a:lvl3pPr>
+              <a:lvl4pPr marL="1600200" indent="-228600">
+                <a:defRPr>
+                  <a:solidFill>
+                    <a:schemeClr val="tx1"/>
+                  </a:solidFill>
+                  <a:latin typeface="Calibri" panose="020F0502020204030204" pitchFamily="34" charset="0"/>
+                </a:defRPr>
+              </a:lvl4pPr>
+              <a:lvl5pPr marL="2057400" indent="-228600">
+                <a:defRPr>
+                  <a:solidFill>
+                    <a:schemeClr val="tx1"/>
+                  </a:solidFill>
+                  <a:latin typeface="Calibri" panose="020F0502020204030204" pitchFamily="34" charset="0"/>
+                </a:defRPr>
+              </a:lvl5pPr>
+              <a:lvl6pPr marL="2514600" indent="-228600" eaLnBrk="0" fontAlgn="base" hangingPunct="0">
+                <a:spcBef>
+                  <a:spcPct val="0"/>
+                </a:spcBef>
+                <a:spcAft>
+                  <a:spcPct val="0"/>
+                </a:spcAft>
+                <a:defRPr>
+                  <a:solidFill>
+                    <a:schemeClr val="tx1"/>
+                  </a:solidFill>
+                  <a:latin typeface="Calibri" panose="020F0502020204030204" pitchFamily="34" charset="0"/>
+                </a:defRPr>
+              </a:lvl6pPr>
+              <a:lvl7pPr marL="2971800" indent="-228600" eaLnBrk="0" fontAlgn="base" hangingPunct="0">
+                <a:spcBef>
+                  <a:spcPct val="0"/>
+                </a:spcBef>
+                <a:spcAft>
+                  <a:spcPct val="0"/>
+                </a:spcAft>
+                <a:defRPr>
+                  <a:solidFill>
+                    <a:schemeClr val="tx1"/>
+                  </a:solidFill>
+                  <a:latin typeface="Calibri" panose="020F0502020204030204" pitchFamily="34" charset="0"/>
+                </a:defRPr>
+              </a:lvl7pPr>
+              <a:lvl8pPr marL="3429000" indent="-228600" eaLnBrk="0" fontAlgn="base" hangingPunct="0">
+                <a:spcBef>
+                  <a:spcPct val="0"/>
+                </a:spcBef>
+                <a:spcAft>
+                  <a:spcPct val="0"/>
+                </a:spcAft>
+                <a:defRPr>
+                  <a:solidFill>
+                    <a:schemeClr val="tx1"/>
+                  </a:solidFill>
+                  <a:latin typeface="Calibri" panose="020F0502020204030204" pitchFamily="34" charset="0"/>
+                </a:defRPr>
+              </a:lvl8pPr>
+              <a:lvl9pPr marL="3886200" indent="-228600" eaLnBrk="0" fontAlgn="base" hangingPunct="0">
+                <a:spcBef>
+                  <a:spcPct val="0"/>
+                </a:spcBef>
+                <a:spcAft>
+                  <a:spcPct val="0"/>
+                </a:spcAft>
+                <a:defRPr>
+                  <a:solidFill>
+                    <a:schemeClr val="tx1"/>
+                  </a:solidFill>
+                  <a:latin typeface="Calibri" panose="020F0502020204030204" pitchFamily="34" charset="0"/>
+                </a:defRPr>
+              </a:lvl9pPr>
+            </a:lstStyle>
+            <a:p>
+              <a:pPr algn="ctr"/>
+              <a:r>
+                <a:rPr lang="en-US" altLang="en-US" sz="1100">
+                  <a:latin typeface="Arial" panose="020B0604020202020204" pitchFamily="34" charset="0"/>
+                  <a:ea typeface="Amazon Ember" panose="020B0603020204020204" pitchFamily="34" charset="0"/>
+                  <a:cs typeface="Arial" panose="020B0604020202020204" pitchFamily="34" charset="0"/>
+                </a:rPr>
+                <a:t>Managed instance</a:t>
+              </a:r>
+              <a:endParaRPr lang="en-US" altLang="en-US" sz="1100" dirty="0">
+                <a:latin typeface="Arial" panose="020B0604020202020204" pitchFamily="34" charset="0"/>
+                <a:ea typeface="Amazon Ember" panose="020B0603020204020204" pitchFamily="34" charset="0"/>
+                <a:cs typeface="Arial" panose="020B0604020202020204" pitchFamily="34" charset="0"/>
+              </a:endParaRPr>
+            </a:p>
+          </p:txBody>
+        </p:sp>
+      </p:grpSp>
+      <p:sp>
+        <p:nvSpPr>
+          <p:cNvPr id="24" name="Rectangle 23">
+            <a:extLst>
+              <a:ext uri="{FF2B5EF4-FFF2-40B4-BE49-F238E27FC236}">
+                <a16:creationId xmlns:a16="http://schemas.microsoft.com/office/drawing/2014/main" id="{85F0ED4D-AB5E-4D62-ADE1-1AFA9738D66C}"/>
+              </a:ext>
+            </a:extLst>
+          </p:cNvPr>
+          <p:cNvSpPr/>
+          <p:nvPr/>
+        </p:nvSpPr>
+        <p:spPr>
           <a:xfrm>
-            <a:off x="7315126" y="2377440"/>
-            <a:ext cx="457200" cy="441434"/>
+            <a:off x="3200400" y="2194560"/>
+            <a:ext cx="4846320" cy="1280160"/>
           </a:xfrm>
           <a:prstGeom prst="rect">
             <a:avLst/>
           </a:prstGeom>
           <a:noFill/>
-          <a:ln>
-            <a:noFill/>
+          <a:ln w="12700">
+            <a:solidFill>
+              <a:srgbClr val="5A6B86"/>
+            </a:solidFill>
+            <a:prstDash val="dash"/>
           </a:ln>
-          <a:extLst>
-            <a:ext uri="{909E8E84-426E-40DD-AFC4-6F175D3DCCD1}">
-              <a14:hiddenFill xmlns:a14="http://schemas.microsoft.com/office/drawing/2010/main">
-                <a:solidFill>
-                  <a:srgbClr val="FFFFFF"/>
-                </a:solidFill>
-              </a14:hiddenFill>
-            </a:ext>
-            <a:ext uri="{91240B29-F687-4F45-9708-019B960494DF}">
-              <a14:hiddenLine xmlns:a14="http://schemas.microsoft.com/office/drawing/2010/main" w="9525">
-                <a:solidFill>
-                  <a:srgbClr val="000000"/>
-                </a:solidFill>
-                <a:miter lim="800000"/>
-                <a:headEnd/>
-                <a:tailEnd/>
-              </a14:hiddenLine>
-            </a:ext>
-          </a:extLst>
         </p:spPr>
-      </p:pic>
-      <p:sp>
-        <p:nvSpPr>
-          <p:cNvPr id="60" name="TextBox 16">
-            <a:extLst>
-              <a:ext uri="{FF2B5EF4-FFF2-40B4-BE49-F238E27FC236}">
-                <a16:creationId xmlns:a16="http://schemas.microsoft.com/office/drawing/2014/main" id="{83146C24-8990-47C1-9BAD-BD75DEA62389}"/>
-              </a:ext>
-            </a:extLst>
-          </p:cNvPr>
-          <p:cNvSpPr txBox="1">
-            <a:spLocks noChangeArrowheads="1"/>
-          </p:cNvSpPr>
-          <p:nvPr/>
-        </p:nvSpPr>
-        <p:spPr bwMode="auto">
-          <a:xfrm>
-            <a:off x="7132320" y="2834640"/>
-            <a:ext cx="868155" cy="416029"/>
-          </a:xfrm>
-          <a:prstGeom prst="rect">
-            <a:avLst/>
-          </a:prstGeom>
-          <a:noFill/>
-          <a:ln>
-            <a:noFill/>
-          </a:ln>
-          <a:extLst>
-            <a:ext uri="{909E8E84-426E-40DD-AFC4-6F175D3DCCD1}">
-              <a14:hiddenFill xmlns:a14="http://schemas.microsoft.com/office/drawing/2010/main">
-                <a:solidFill>
-                  <a:srgbClr val="FFFFFF"/>
-                </a:solidFill>
-              </a14:hiddenFill>
-            </a:ext>
-            <a:ext uri="{91240B29-F687-4F45-9708-019B960494DF}">
-              <a14:hiddenLine xmlns:a14="http://schemas.microsoft.com/office/drawing/2010/main" w="9525">
-                <a:solidFill>
-                  <a:srgbClr val="000000"/>
-                </a:solidFill>
-                <a:miter lim="800000"/>
-                <a:headEnd/>
-                <a:tailEnd/>
-              </a14:hiddenLine>
-            </a:ext>
-          </a:extLst>
-        </p:spPr>
-        <p:txBody>
-          <a:bodyPr wrap="square" lIns="0" rIns="0">
-            <a:spAutoFit/>
-          </a:bodyPr>
-          <a:lstStyle>
-            <a:lvl1pPr>
-              <a:defRPr>
-                <a:solidFill>
-                  <a:schemeClr val="tx1"/>
-                </a:solidFill>
-                <a:latin typeface="Calibri" panose="020F0502020204030204" pitchFamily="34" charset="0"/>
-              </a:defRPr>
-            </a:lvl1pPr>
-            <a:lvl2pPr marL="742950" indent="-285750">
-              <a:defRPr>
-                <a:solidFill>
-                  <a:schemeClr val="tx1"/>
-                </a:solidFill>
-                <a:latin typeface="Calibri" panose="020F0502020204030204" pitchFamily="34" charset="0"/>
-              </a:defRPr>
-            </a:lvl2pPr>
-            <a:lvl3pPr marL="1143000" indent="-228600">
-              <a:defRPr>
-                <a:solidFill>
-                  <a:schemeClr val="tx1"/>
-                </a:solidFill>
-                <a:latin typeface="Calibri" panose="020F0502020204030204" pitchFamily="34" charset="0"/>
-              </a:defRPr>
-            </a:lvl3pPr>
-            <a:lvl4pPr marL="1600200" indent="-228600">
-              <a:defRPr>
-                <a:solidFill>
-                  <a:schemeClr val="tx1"/>
-                </a:solidFill>
-                <a:latin typeface="Calibri" panose="020F0502020204030204" pitchFamily="34" charset="0"/>
-              </a:defRPr>
-            </a:lvl4pPr>
-            <a:lvl5pPr marL="2057400" indent="-228600">
-              <a:defRPr>
-                <a:solidFill>
-                  <a:schemeClr val="tx1"/>
-                </a:solidFill>
-                <a:latin typeface="Calibri" panose="020F0502020204030204" pitchFamily="34" charset="0"/>
-              </a:defRPr>
-            </a:lvl5pPr>
-            <a:lvl6pPr marL="2514600" indent="-228600" eaLnBrk="0" fontAlgn="base" hangingPunct="0">
+        <p:style>
+          <a:lnRef idx="2">
+            <a:schemeClr val="accent1">
+              <a:shade val="50000"/>
+            </a:schemeClr>
+          </a:lnRef>
+          <a:fillRef idx="1">
+            <a:schemeClr val="accent1"/>
+          </a:fillRef>
+          <a:effectRef idx="0">
+            <a:schemeClr val="accent1"/>
+          </a:effectRef>
+          <a:fontRef idx="minor">
+            <a:schemeClr val="lt1"/>
+          </a:fontRef>
+        </p:style>
+        <p:txBody>
+          <a:bodyPr tIns="91440"/>
+          <a:lstStyle/>
+          <a:p>
+            <a:pPr algn="ctr" eaLnBrk="1" fontAlgn="auto" hangingPunct="1">
               <a:spcBef>
-                <a:spcPct val="0"/>
+                <a:spcPts val="0"/>
               </a:spcBef>
               <a:spcAft>
-                <a:spcPct val="0"/>
+                <a:spcPts val="0"/>
               </a:spcAft>
-              <a:defRPr>
+              <a:defRPr/>
+            </a:pPr>
+            <a:r>
+              <a:rPr lang="en-US" sz="1200">
                 <a:solidFill>
-                  <a:schemeClr val="tx1"/>
+                  <a:srgbClr val="5A6B86"/>
                 </a:solidFill>
-                <a:latin typeface="Calibri" panose="020F0502020204030204" pitchFamily="34" charset="0"/>
-              </a:defRPr>
-            </a:lvl6pPr>
-            <a:lvl7pPr marL="2971800" indent="-228600" eaLnBrk="0" fontAlgn="base" hangingPunct="0">
-              <a:spcBef>
-                <a:spcPct val="0"/>
-              </a:spcBef>
-              <a:spcAft>
-                <a:spcPct val="0"/>
-              </a:spcAft>
-              <a:defRPr>
-                <a:solidFill>
-                  <a:schemeClr val="tx1"/>
-                </a:solidFill>
-                <a:latin typeface="Calibri" panose="020F0502020204030204" pitchFamily="34" charset="0"/>
-              </a:defRPr>
-            </a:lvl7pPr>
-            <a:lvl8pPr marL="3429000" indent="-228600" eaLnBrk="0" fontAlgn="base" hangingPunct="0">
-              <a:spcBef>
-                <a:spcPct val="0"/>
-              </a:spcBef>
-              <a:spcAft>
-                <a:spcPct val="0"/>
-              </a:spcAft>
-              <a:defRPr>
-                <a:solidFill>
-                  <a:schemeClr val="tx1"/>
-                </a:solidFill>
-                <a:latin typeface="Calibri" panose="020F0502020204030204" pitchFamily="34" charset="0"/>
-              </a:defRPr>
-            </a:lvl8pPr>
-            <a:lvl9pPr marL="3886200" indent="-228600" eaLnBrk="0" fontAlgn="base" hangingPunct="0">
-              <a:spcBef>
-                <a:spcPct val="0"/>
-              </a:spcBef>
-              <a:spcAft>
-                <a:spcPct val="0"/>
-              </a:spcAft>
-              <a:defRPr>
-                <a:solidFill>
-                  <a:schemeClr val="tx1"/>
-                </a:solidFill>
-                <a:latin typeface="Calibri" panose="020F0502020204030204" pitchFamily="34" charset="0"/>
-              </a:defRPr>
-            </a:lvl9pPr>
-          </a:lstStyle>
-          <a:p>
-            <a:pPr algn="ctr" eaLnBrk="1" hangingPunct="1"/>
-            <a:r>
-              <a:rPr lang="en-US" altLang="en-US" sz="1100">
                 <a:latin typeface="Arial" panose="020B0604020202020204" pitchFamily="34" charset="0"/>
-                <a:ea typeface="Amazon Ember" panose="020B0603020204020204" pitchFamily="34" charset="0"/>
                 <a:cs typeface="Arial" panose="020B0604020202020204" pitchFamily="34" charset="0"/>
               </a:rPr>
-              <a:t>Elastigroup instances</a:t>
-            </a:r>
-            <a:endParaRPr lang="en-US" altLang="en-US" sz="1100" dirty="0">
+              <a:t>Elastigroup</a:t>
+            </a:r>
+            <a:endParaRPr lang="en-US" sz="1200" dirty="0">
+              <a:solidFill>
+                <a:srgbClr val="5A6B86"/>
+              </a:solidFill>
               <a:latin typeface="Arial" panose="020B0604020202020204" pitchFamily="34" charset="0"/>
-              <a:ea typeface="Amazon Ember" panose="020B0603020204020204" pitchFamily="34" charset="0"/>
               <a:cs typeface="Arial" panose="020B0604020202020204" pitchFamily="34" charset="0"/>
             </a:endParaRPr>
           </a:p>
@@ -4666,7 +4764,7 @@
     </p:spTree>
     <p:extLst>
       <p:ext uri="{BB962C8B-B14F-4D97-AF65-F5344CB8AC3E}">
-        <p14:creationId xmlns:p14="http://schemas.microsoft.com/office/powerpoint/2010/main" val="3102883028"/>
+        <p14:creationId xmlns:p14="http://schemas.microsoft.com/office/powerpoint/2010/main" val="3799267397"/>
       </p:ext>
     </p:extLst>
   </p:cSld>

</xml_diff>